<commit_message>
alteração em  cardinalidade diagrama de classes
</commit_message>
<xml_diff>
--- a/segunda entrega/segunda entrega.pptx
+++ b/segunda entrega/segunda entrega.pptx
@@ -1,123 +1,23 @@
 
 <file path=ppt/presentation.xml><?xml version="1.0" encoding="utf-8"?>
-<p:presentation xmlns:a="http://schemas.openxmlformats.org/drawingml/2006/main" xmlns:r="http://schemas.openxmlformats.org/officeDocument/2006/relationships" xmlns:p="http://schemas.openxmlformats.org/presentationml/2006/main">
+<p:presentation xmlns:a="http://schemas.openxmlformats.org/drawingml/2006/main" xmlns:p="http://schemas.openxmlformats.org/presentationml/2006/main" xmlns:r="http://schemas.openxmlformats.org/officeDocument/2006/relationships" xmlns:p14="http://schemas.microsoft.com/office/powerpoint/2010/main" xmlns:p15="http://schemas.microsoft.com/office/powerpoint/2012/main" xmlns:mc="http://schemas.openxmlformats.org/markup-compatibility/2006">
   <p:sldMasterIdLst>
-    <p:sldMasterId id="2147483648" r:id="rId1"/>
+    <p:sldMasterId id="2147483648" r:id="rId2"/>
   </p:sldMasterIdLst>
   <p:sldIdLst>
-    <p:sldId id="256" r:id="rId2"/>
-    <p:sldId id="266" r:id="rId3"/>
-    <p:sldId id="265" r:id="rId4"/>
-    <p:sldId id="257" r:id="rId5"/>
-    <p:sldId id="258" r:id="rId6"/>
+    <p:sldId id="256" r:id="rId3"/>
+    <p:sldId id="257" r:id="rId4"/>
+    <p:sldId id="258" r:id="rId5"/>
+    <p:sldId id="259" r:id="rId6"/>
+    <p:sldId id="260" r:id="rId7"/>
   </p:sldIdLst>
   <p:sldSz cx="12192000" cy="6858000"/>
-  <p:notesSz cx="7559675" cy="10691813"/>
-  <p:defaultTextStyle>
-    <a:defPPr>
-      <a:defRPr lang="pt-BR"/>
-    </a:defPPr>
-    <a:lvl1pPr marL="0" algn="l" defTabSz="914400" rtl="0" eaLnBrk="1" latinLnBrk="0" hangingPunct="1">
-      <a:defRPr sz="1800" kern="1200">
-        <a:solidFill>
-          <a:schemeClr val="tx1"/>
-        </a:solidFill>
-        <a:latin typeface="+mn-lt"/>
-        <a:ea typeface="+mn-ea"/>
-        <a:cs typeface="+mn-cs"/>
-      </a:defRPr>
-    </a:lvl1pPr>
-    <a:lvl2pPr marL="457200" algn="l" defTabSz="914400" rtl="0" eaLnBrk="1" latinLnBrk="0" hangingPunct="1">
-      <a:defRPr sz="1800" kern="1200">
-        <a:solidFill>
-          <a:schemeClr val="tx1"/>
-        </a:solidFill>
-        <a:latin typeface="+mn-lt"/>
-        <a:ea typeface="+mn-ea"/>
-        <a:cs typeface="+mn-cs"/>
-      </a:defRPr>
-    </a:lvl2pPr>
-    <a:lvl3pPr marL="914400" algn="l" defTabSz="914400" rtl="0" eaLnBrk="1" latinLnBrk="0" hangingPunct="1">
-      <a:defRPr sz="1800" kern="1200">
-        <a:solidFill>
-          <a:schemeClr val="tx1"/>
-        </a:solidFill>
-        <a:latin typeface="+mn-lt"/>
-        <a:ea typeface="+mn-ea"/>
-        <a:cs typeface="+mn-cs"/>
-      </a:defRPr>
-    </a:lvl3pPr>
-    <a:lvl4pPr marL="1371600" algn="l" defTabSz="914400" rtl="0" eaLnBrk="1" latinLnBrk="0" hangingPunct="1">
-      <a:defRPr sz="1800" kern="1200">
-        <a:solidFill>
-          <a:schemeClr val="tx1"/>
-        </a:solidFill>
-        <a:latin typeface="+mn-lt"/>
-        <a:ea typeface="+mn-ea"/>
-        <a:cs typeface="+mn-cs"/>
-      </a:defRPr>
-    </a:lvl4pPr>
-    <a:lvl5pPr marL="1828800" algn="l" defTabSz="914400" rtl="0" eaLnBrk="1" latinLnBrk="0" hangingPunct="1">
-      <a:defRPr sz="1800" kern="1200">
-        <a:solidFill>
-          <a:schemeClr val="tx1"/>
-        </a:solidFill>
-        <a:latin typeface="+mn-lt"/>
-        <a:ea typeface="+mn-ea"/>
-        <a:cs typeface="+mn-cs"/>
-      </a:defRPr>
-    </a:lvl5pPr>
-    <a:lvl6pPr marL="2286000" algn="l" defTabSz="914400" rtl="0" eaLnBrk="1" latinLnBrk="0" hangingPunct="1">
-      <a:defRPr sz="1800" kern="1200">
-        <a:solidFill>
-          <a:schemeClr val="tx1"/>
-        </a:solidFill>
-        <a:latin typeface="+mn-lt"/>
-        <a:ea typeface="+mn-ea"/>
-        <a:cs typeface="+mn-cs"/>
-      </a:defRPr>
-    </a:lvl6pPr>
-    <a:lvl7pPr marL="2743200" algn="l" defTabSz="914400" rtl="0" eaLnBrk="1" latinLnBrk="0" hangingPunct="1">
-      <a:defRPr sz="1800" kern="1200">
-        <a:solidFill>
-          <a:schemeClr val="tx1"/>
-        </a:solidFill>
-        <a:latin typeface="+mn-lt"/>
-        <a:ea typeface="+mn-ea"/>
-        <a:cs typeface="+mn-cs"/>
-      </a:defRPr>
-    </a:lvl7pPr>
-    <a:lvl8pPr marL="3200400" algn="l" defTabSz="914400" rtl="0" eaLnBrk="1" latinLnBrk="0" hangingPunct="1">
-      <a:defRPr sz="1800" kern="1200">
-        <a:solidFill>
-          <a:schemeClr val="tx1"/>
-        </a:solidFill>
-        <a:latin typeface="+mn-lt"/>
-        <a:ea typeface="+mn-ea"/>
-        <a:cs typeface="+mn-cs"/>
-      </a:defRPr>
-    </a:lvl8pPr>
-    <a:lvl9pPr marL="3657600" algn="l" defTabSz="914400" rtl="0" eaLnBrk="1" latinLnBrk="0" hangingPunct="1">
-      <a:defRPr sz="1800" kern="1200">
-        <a:solidFill>
-          <a:schemeClr val="tx1"/>
-        </a:solidFill>
-        <a:latin typeface="+mn-lt"/>
-        <a:ea typeface="+mn-ea"/>
-        <a:cs typeface="+mn-cs"/>
-      </a:defRPr>
-    </a:lvl9pPr>
-  </p:defaultTextStyle>
-  <p:extLst>
-    <p:ext uri="{EFAFB233-063F-42B5-8137-9DF3F51BA10A}">
-      <p15:sldGuideLst xmlns:p15="http://schemas.microsoft.com/office/powerpoint/2012/main"/>
-    </p:ext>
-  </p:extLst>
+  <p:notesSz cx="7559675" cy="10691812"/>
 </p:presentation>
 </file>
 
 <file path=ppt/slideLayouts/slideLayout1.xml><?xml version="1.0" encoding="utf-8"?>
-<p:sldLayout xmlns:a="http://schemas.openxmlformats.org/drawingml/2006/main" xmlns:r="http://schemas.openxmlformats.org/officeDocument/2006/relationships" xmlns:p="http://schemas.openxmlformats.org/presentationml/2006/main" type="blank" preserve="1">
+<p:sldLayout xmlns:a="http://schemas.openxmlformats.org/drawingml/2006/main" xmlns:p="http://schemas.openxmlformats.org/presentationml/2006/main" xmlns:r="http://schemas.openxmlformats.org/officeDocument/2006/relationships" xmlns:p14="http://schemas.microsoft.com/office/powerpoint/2010/main" xmlns:p15="http://schemas.microsoft.com/office/powerpoint/2012/main" xmlns:mc="http://schemas.openxmlformats.org/markup-compatibility/2006" type="blank" preserve="1">
   <p:cSld name="Blank Slide">
     <p:spTree>
       <p:nvGrpSpPr>
@@ -135,14 +35,11 @@
       </p:grpSpPr>
     </p:spTree>
   </p:cSld>
-  <p:clrMapOvr>
-    <a:masterClrMapping/>
-  </p:clrMapOvr>
 </p:sldLayout>
 </file>
 
 <file path=ppt/slideLayouts/slideLayout10.xml><?xml version="1.0" encoding="utf-8"?>
-<p:sldLayout xmlns:a="http://schemas.openxmlformats.org/drawingml/2006/main" xmlns:r="http://schemas.openxmlformats.org/officeDocument/2006/relationships" xmlns:p="http://schemas.openxmlformats.org/presentationml/2006/main" type="objOverTx" preserve="1">
+<p:sldLayout xmlns:a="http://schemas.openxmlformats.org/drawingml/2006/main" xmlns:p="http://schemas.openxmlformats.org/presentationml/2006/main" xmlns:r="http://schemas.openxmlformats.org/officeDocument/2006/relationships" xmlns:p14="http://schemas.microsoft.com/office/powerpoint/2010/main" xmlns:p15="http://schemas.microsoft.com/office/powerpoint/2012/main" xmlns:mc="http://schemas.openxmlformats.org/markup-compatibility/2006" type="objOverTx" preserve="1">
   <p:cSld name="Title, Content over Content">
     <p:spTree>
       <p:nvGrpSpPr>
@@ -171,17 +68,16 @@
         <p:spPr>
           <a:xfrm>
             <a:off x="609480" y="273600"/>
-            <a:ext cx="10972440" cy="1144800"/>
-          </a:xfrm>
-          <a:prstGeom prst="rect">
-            <a:avLst/>
-          </a:prstGeom>
-        </p:spPr>
-        <p:txBody>
-          <a:bodyPr lIns="0" tIns="0" rIns="0" bIns="0" anchor="ctr"/>
-          <a:lstStyle/>
-          <a:p>
-            <a:endParaRPr lang="pt-BR" sz="1800" b="0" strike="noStrike" spc="-1">
+            <a:ext cx="10972080" cy="1144440"/>
+          </a:xfrm>
+          <a:prstGeom prst="rect">
+            <a:avLst/>
+          </a:prstGeom>
+        </p:spPr>
+        <p:txBody>
+          <a:bodyPr lIns="0" rIns="0" tIns="0" bIns="0" anchor="ctr"/>
+          <a:p>
+            <a:endParaRPr b="0" lang="pt-BR" sz="1800" spc="-1" strike="noStrike">
               <a:solidFill>
                 <a:srgbClr val="000000"/>
               </a:solidFill>
@@ -210,12 +106,11 @@
           </a:prstGeom>
         </p:spPr>
         <p:txBody>
-          <a:bodyPr lIns="0" tIns="0" rIns="0" bIns="0">
+          <a:bodyPr lIns="0" rIns="0" tIns="0" bIns="0">
             <a:normAutofit/>
           </a:bodyPr>
-          <a:lstStyle/>
-          <a:p>
-            <a:endParaRPr lang="pt-BR" sz="2800" b="0" strike="noStrike" spc="-1">
+          <a:p>
+            <a:endParaRPr b="0" lang="pt-BR" sz="2800" spc="-1" strike="noStrike">
               <a:solidFill>
                 <a:srgbClr val="000000"/>
               </a:solidFill>
@@ -244,12 +139,11 @@
           </a:prstGeom>
         </p:spPr>
         <p:txBody>
-          <a:bodyPr lIns="0" tIns="0" rIns="0" bIns="0">
+          <a:bodyPr lIns="0" rIns="0" tIns="0" bIns="0">
             <a:normAutofit/>
           </a:bodyPr>
-          <a:lstStyle/>
-          <a:p>
-            <a:endParaRPr lang="pt-BR" sz="2800" b="0" strike="noStrike" spc="-1">
+          <a:p>
+            <a:endParaRPr b="0" lang="pt-BR" sz="2800" spc="-1" strike="noStrike">
               <a:solidFill>
                 <a:srgbClr val="000000"/>
               </a:solidFill>
@@ -260,14 +154,11 @@
       </p:sp>
     </p:spTree>
   </p:cSld>
-  <p:clrMapOvr>
-    <a:masterClrMapping/>
-  </p:clrMapOvr>
 </p:sldLayout>
 </file>
 
 <file path=ppt/slideLayouts/slideLayout11.xml><?xml version="1.0" encoding="utf-8"?>
-<p:sldLayout xmlns:a="http://schemas.openxmlformats.org/drawingml/2006/main" xmlns:r="http://schemas.openxmlformats.org/officeDocument/2006/relationships" xmlns:p="http://schemas.openxmlformats.org/presentationml/2006/main" type="fourObj" preserve="1">
+<p:sldLayout xmlns:a="http://schemas.openxmlformats.org/drawingml/2006/main" xmlns:p="http://schemas.openxmlformats.org/presentationml/2006/main" xmlns:r="http://schemas.openxmlformats.org/officeDocument/2006/relationships" xmlns:p14="http://schemas.microsoft.com/office/powerpoint/2010/main" xmlns:p15="http://schemas.microsoft.com/office/powerpoint/2012/main" xmlns:mc="http://schemas.openxmlformats.org/markup-compatibility/2006" type="fourObj" preserve="1">
   <p:cSld name="Title, 4 Content">
     <p:spTree>
       <p:nvGrpSpPr>
@@ -296,17 +187,16 @@
         <p:spPr>
           <a:xfrm>
             <a:off x="609480" y="273600"/>
-            <a:ext cx="10972440" cy="1144800"/>
-          </a:xfrm>
-          <a:prstGeom prst="rect">
-            <a:avLst/>
-          </a:prstGeom>
-        </p:spPr>
-        <p:txBody>
-          <a:bodyPr lIns="0" tIns="0" rIns="0" bIns="0" anchor="ctr"/>
-          <a:lstStyle/>
-          <a:p>
-            <a:endParaRPr lang="pt-BR" sz="1800" b="0" strike="noStrike" spc="-1">
+            <a:ext cx="10972080" cy="1144440"/>
+          </a:xfrm>
+          <a:prstGeom prst="rect">
+            <a:avLst/>
+          </a:prstGeom>
+        </p:spPr>
+        <p:txBody>
+          <a:bodyPr lIns="0" rIns="0" tIns="0" bIns="0" anchor="ctr"/>
+          <a:p>
+            <a:endParaRPr b="0" lang="pt-BR" sz="1800" spc="-1" strike="noStrike">
               <a:solidFill>
                 <a:srgbClr val="000000"/>
               </a:solidFill>
@@ -335,12 +225,11 @@
           </a:prstGeom>
         </p:spPr>
         <p:txBody>
-          <a:bodyPr lIns="0" tIns="0" rIns="0" bIns="0">
+          <a:bodyPr lIns="0" rIns="0" tIns="0" bIns="0">
             <a:normAutofit/>
           </a:bodyPr>
-          <a:lstStyle/>
-          <a:p>
-            <a:endParaRPr lang="pt-BR" sz="2800" b="0" strike="noStrike" spc="-1">
+          <a:p>
+            <a:endParaRPr b="0" lang="pt-BR" sz="2800" spc="-1" strike="noStrike">
               <a:solidFill>
                 <a:srgbClr val="000000"/>
               </a:solidFill>
@@ -369,12 +258,11 @@
           </a:prstGeom>
         </p:spPr>
         <p:txBody>
-          <a:bodyPr lIns="0" tIns="0" rIns="0" bIns="0">
+          <a:bodyPr lIns="0" rIns="0" tIns="0" bIns="0">
             <a:normAutofit/>
           </a:bodyPr>
-          <a:lstStyle/>
-          <a:p>
-            <a:endParaRPr lang="pt-BR" sz="2800" b="0" strike="noStrike" spc="-1">
+          <a:p>
+            <a:endParaRPr b="0" lang="pt-BR" sz="2800" spc="-1" strike="noStrike">
               <a:solidFill>
                 <a:srgbClr val="000000"/>
               </a:solidFill>
@@ -403,12 +291,11 @@
           </a:prstGeom>
         </p:spPr>
         <p:txBody>
-          <a:bodyPr lIns="0" tIns="0" rIns="0" bIns="0">
+          <a:bodyPr lIns="0" rIns="0" tIns="0" bIns="0">
             <a:normAutofit/>
           </a:bodyPr>
-          <a:lstStyle/>
-          <a:p>
-            <a:endParaRPr lang="pt-BR" sz="2800" b="0" strike="noStrike" spc="-1">
+          <a:p>
+            <a:endParaRPr b="0" lang="pt-BR" sz="2800" spc="-1" strike="noStrike">
               <a:solidFill>
                 <a:srgbClr val="000000"/>
               </a:solidFill>
@@ -437,12 +324,11 @@
           </a:prstGeom>
         </p:spPr>
         <p:txBody>
-          <a:bodyPr lIns="0" tIns="0" rIns="0" bIns="0">
+          <a:bodyPr lIns="0" rIns="0" tIns="0" bIns="0">
             <a:normAutofit/>
           </a:bodyPr>
-          <a:lstStyle/>
-          <a:p>
-            <a:endParaRPr lang="pt-BR" sz="2800" b="0" strike="noStrike" spc="-1">
+          <a:p>
+            <a:endParaRPr b="0" lang="pt-BR" sz="2800" spc="-1" strike="noStrike">
               <a:solidFill>
                 <a:srgbClr val="000000"/>
               </a:solidFill>
@@ -453,14 +339,11 @@
       </p:sp>
     </p:spTree>
   </p:cSld>
-  <p:clrMapOvr>
-    <a:masterClrMapping/>
-  </p:clrMapOvr>
 </p:sldLayout>
 </file>
 
 <file path=ppt/slideLayouts/slideLayout12.xml><?xml version="1.0" encoding="utf-8"?>
-<p:sldLayout xmlns:a="http://schemas.openxmlformats.org/drawingml/2006/main" xmlns:r="http://schemas.openxmlformats.org/officeDocument/2006/relationships" xmlns:p="http://schemas.openxmlformats.org/presentationml/2006/main" type="blank" preserve="1">
+<p:sldLayout xmlns:a="http://schemas.openxmlformats.org/drawingml/2006/main" xmlns:p="http://schemas.openxmlformats.org/presentationml/2006/main" xmlns:r="http://schemas.openxmlformats.org/officeDocument/2006/relationships" xmlns:p14="http://schemas.microsoft.com/office/powerpoint/2010/main" xmlns:p15="http://schemas.microsoft.com/office/powerpoint/2012/main" xmlns:mc="http://schemas.openxmlformats.org/markup-compatibility/2006" type="blank" preserve="1">
   <p:cSld name="Title, 6 Content">
     <p:spTree>
       <p:nvGrpSpPr>
@@ -489,17 +372,16 @@
         <p:spPr>
           <a:xfrm>
             <a:off x="609480" y="273600"/>
-            <a:ext cx="10972440" cy="1144800"/>
-          </a:xfrm>
-          <a:prstGeom prst="rect">
-            <a:avLst/>
-          </a:prstGeom>
-        </p:spPr>
-        <p:txBody>
-          <a:bodyPr lIns="0" tIns="0" rIns="0" bIns="0" anchor="ctr"/>
-          <a:lstStyle/>
-          <a:p>
-            <a:endParaRPr lang="pt-BR" sz="1800" b="0" strike="noStrike" spc="-1">
+            <a:ext cx="10972080" cy="1144440"/>
+          </a:xfrm>
+          <a:prstGeom prst="rect">
+            <a:avLst/>
+          </a:prstGeom>
+        </p:spPr>
+        <p:txBody>
+          <a:bodyPr lIns="0" rIns="0" tIns="0" bIns="0" anchor="ctr"/>
+          <a:p>
+            <a:endParaRPr b="0" lang="pt-BR" sz="1800" spc="-1" strike="noStrike">
               <a:solidFill>
                 <a:srgbClr val="000000"/>
               </a:solidFill>
@@ -528,12 +410,11 @@
           </a:prstGeom>
         </p:spPr>
         <p:txBody>
-          <a:bodyPr lIns="0" tIns="0" rIns="0" bIns="0">
+          <a:bodyPr lIns="0" rIns="0" tIns="0" bIns="0">
             <a:normAutofit/>
           </a:bodyPr>
-          <a:lstStyle/>
-          <a:p>
-            <a:endParaRPr lang="pt-BR" sz="2800" b="0" strike="noStrike" spc="-1">
+          <a:p>
+            <a:endParaRPr b="0" lang="pt-BR" sz="2800" spc="-1" strike="noStrike">
               <a:solidFill>
                 <a:srgbClr val="000000"/>
               </a:solidFill>
@@ -562,12 +443,11 @@
           </a:prstGeom>
         </p:spPr>
         <p:txBody>
-          <a:bodyPr lIns="0" tIns="0" rIns="0" bIns="0">
+          <a:bodyPr lIns="0" rIns="0" tIns="0" bIns="0">
             <a:normAutofit/>
           </a:bodyPr>
-          <a:lstStyle/>
-          <a:p>
-            <a:endParaRPr lang="pt-BR" sz="2800" b="0" strike="noStrike" spc="-1">
+          <a:p>
+            <a:endParaRPr b="0" lang="pt-BR" sz="2800" spc="-1" strike="noStrike">
               <a:solidFill>
                 <a:srgbClr val="000000"/>
               </a:solidFill>
@@ -596,12 +476,11 @@
           </a:prstGeom>
         </p:spPr>
         <p:txBody>
-          <a:bodyPr lIns="0" tIns="0" rIns="0" bIns="0">
+          <a:bodyPr lIns="0" rIns="0" tIns="0" bIns="0">
             <a:normAutofit/>
           </a:bodyPr>
-          <a:lstStyle/>
-          <a:p>
-            <a:endParaRPr lang="pt-BR" sz="2800" b="0" strike="noStrike" spc="-1">
+          <a:p>
+            <a:endParaRPr b="0" lang="pt-BR" sz="2800" spc="-1" strike="noStrike">
               <a:solidFill>
                 <a:srgbClr val="000000"/>
               </a:solidFill>
@@ -630,12 +509,11 @@
           </a:prstGeom>
         </p:spPr>
         <p:txBody>
-          <a:bodyPr lIns="0" tIns="0" rIns="0" bIns="0">
+          <a:bodyPr lIns="0" rIns="0" tIns="0" bIns="0">
             <a:normAutofit/>
           </a:bodyPr>
-          <a:lstStyle/>
-          <a:p>
-            <a:endParaRPr lang="pt-BR" sz="2800" b="0" strike="noStrike" spc="-1">
+          <a:p>
+            <a:endParaRPr b="0" lang="pt-BR" sz="2800" spc="-1" strike="noStrike">
               <a:solidFill>
                 <a:srgbClr val="000000"/>
               </a:solidFill>
@@ -664,12 +542,11 @@
           </a:prstGeom>
         </p:spPr>
         <p:txBody>
-          <a:bodyPr lIns="0" tIns="0" rIns="0" bIns="0">
+          <a:bodyPr lIns="0" rIns="0" tIns="0" bIns="0">
             <a:normAutofit/>
           </a:bodyPr>
-          <a:lstStyle/>
-          <a:p>
-            <a:endParaRPr lang="pt-BR" sz="2800" b="0" strike="noStrike" spc="-1">
+          <a:p>
+            <a:endParaRPr b="0" lang="pt-BR" sz="2800" spc="-1" strike="noStrike">
               <a:solidFill>
                 <a:srgbClr val="000000"/>
               </a:solidFill>
@@ -698,12 +575,11 @@
           </a:prstGeom>
         </p:spPr>
         <p:txBody>
-          <a:bodyPr lIns="0" tIns="0" rIns="0" bIns="0">
+          <a:bodyPr lIns="0" rIns="0" tIns="0" bIns="0">
             <a:normAutofit/>
           </a:bodyPr>
-          <a:lstStyle/>
-          <a:p>
-            <a:endParaRPr lang="pt-BR" sz="2800" b="0" strike="noStrike" spc="-1">
+          <a:p>
+            <a:endParaRPr b="0" lang="pt-BR" sz="2800" spc="-1" strike="noStrike">
               <a:solidFill>
                 <a:srgbClr val="000000"/>
               </a:solidFill>
@@ -714,14 +590,11 @@
       </p:sp>
     </p:spTree>
   </p:cSld>
-  <p:clrMapOvr>
-    <a:masterClrMapping/>
-  </p:clrMapOvr>
 </p:sldLayout>
 </file>
 
 <file path=ppt/slideLayouts/slideLayout2.xml><?xml version="1.0" encoding="utf-8"?>
-<p:sldLayout xmlns:a="http://schemas.openxmlformats.org/drawingml/2006/main" xmlns:r="http://schemas.openxmlformats.org/officeDocument/2006/relationships" xmlns:p="http://schemas.openxmlformats.org/presentationml/2006/main" type="tx" preserve="1">
+<p:sldLayout xmlns:a="http://schemas.openxmlformats.org/drawingml/2006/main" xmlns:p="http://schemas.openxmlformats.org/presentationml/2006/main" xmlns:r="http://schemas.openxmlformats.org/officeDocument/2006/relationships" xmlns:p14="http://schemas.microsoft.com/office/powerpoint/2010/main" xmlns:p15="http://schemas.microsoft.com/office/powerpoint/2012/main" xmlns:mc="http://schemas.openxmlformats.org/markup-compatibility/2006" type="tx" preserve="1">
   <p:cSld name="Title Slide">
     <p:spTree>
       <p:nvGrpSpPr>
@@ -750,17 +623,16 @@
         <p:spPr>
           <a:xfrm>
             <a:off x="609480" y="273600"/>
-            <a:ext cx="10972440" cy="1144800"/>
-          </a:xfrm>
-          <a:prstGeom prst="rect">
-            <a:avLst/>
-          </a:prstGeom>
-        </p:spPr>
-        <p:txBody>
-          <a:bodyPr lIns="0" tIns="0" rIns="0" bIns="0" anchor="ctr"/>
-          <a:lstStyle/>
-          <a:p>
-            <a:endParaRPr lang="pt-BR" sz="1800" b="0" strike="noStrike" spc="-1">
+            <a:ext cx="10972080" cy="1144440"/>
+          </a:xfrm>
+          <a:prstGeom prst="rect">
+            <a:avLst/>
+          </a:prstGeom>
+        </p:spPr>
+        <p:txBody>
+          <a:bodyPr lIns="0" rIns="0" tIns="0" bIns="0" anchor="ctr"/>
+          <a:p>
+            <a:endParaRPr b="0" lang="pt-BR" sz="1800" spc="-1" strike="noStrike">
               <a:solidFill>
                 <a:srgbClr val="000000"/>
               </a:solidFill>
@@ -789,11 +661,10 @@
           </a:prstGeom>
         </p:spPr>
         <p:txBody>
-          <a:bodyPr lIns="0" tIns="0" rIns="0" bIns="0" anchor="ctr"/>
-          <a:lstStyle/>
+          <a:bodyPr lIns="0" rIns="0" tIns="0" bIns="0" anchor="ctr"/>
           <a:p>
             <a:pPr algn="ctr"/>
-            <a:endParaRPr lang="pt-BR" sz="3200" b="0" strike="noStrike" spc="-1">
+            <a:endParaRPr b="0" lang="pt-BR" sz="3200" spc="-1" strike="noStrike">
               <a:latin typeface="Arial"/>
             </a:endParaRPr>
           </a:p>
@@ -801,14 +672,11 @@
       </p:sp>
     </p:spTree>
   </p:cSld>
-  <p:clrMapOvr>
-    <a:masterClrMapping/>
-  </p:clrMapOvr>
 </p:sldLayout>
 </file>
 
 <file path=ppt/slideLayouts/slideLayout3.xml><?xml version="1.0" encoding="utf-8"?>
-<p:sldLayout xmlns:a="http://schemas.openxmlformats.org/drawingml/2006/main" xmlns:r="http://schemas.openxmlformats.org/officeDocument/2006/relationships" xmlns:p="http://schemas.openxmlformats.org/presentationml/2006/main" type="obj" preserve="1">
+<p:sldLayout xmlns:a="http://schemas.openxmlformats.org/drawingml/2006/main" xmlns:p="http://schemas.openxmlformats.org/presentationml/2006/main" xmlns:r="http://schemas.openxmlformats.org/officeDocument/2006/relationships" xmlns:p14="http://schemas.microsoft.com/office/powerpoint/2010/main" xmlns:p15="http://schemas.microsoft.com/office/powerpoint/2012/main" xmlns:mc="http://schemas.openxmlformats.org/markup-compatibility/2006" type="obj" preserve="1">
   <p:cSld name="Title, Content">
     <p:spTree>
       <p:nvGrpSpPr>
@@ -837,17 +705,16 @@
         <p:spPr>
           <a:xfrm>
             <a:off x="609480" y="273600"/>
-            <a:ext cx="10972440" cy="1144800"/>
-          </a:xfrm>
-          <a:prstGeom prst="rect">
-            <a:avLst/>
-          </a:prstGeom>
-        </p:spPr>
-        <p:txBody>
-          <a:bodyPr lIns="0" tIns="0" rIns="0" bIns="0" anchor="ctr"/>
-          <a:lstStyle/>
-          <a:p>
-            <a:endParaRPr lang="pt-BR" sz="1800" b="0" strike="noStrike" spc="-1">
+            <a:ext cx="10972080" cy="1144440"/>
+          </a:xfrm>
+          <a:prstGeom prst="rect">
+            <a:avLst/>
+          </a:prstGeom>
+        </p:spPr>
+        <p:txBody>
+          <a:bodyPr lIns="0" rIns="0" tIns="0" bIns="0" anchor="ctr"/>
+          <a:p>
+            <a:endParaRPr b="0" lang="pt-BR" sz="1800" spc="-1" strike="noStrike">
               <a:solidFill>
                 <a:srgbClr val="000000"/>
               </a:solidFill>
@@ -876,12 +743,11 @@
           </a:prstGeom>
         </p:spPr>
         <p:txBody>
-          <a:bodyPr lIns="0" tIns="0" rIns="0" bIns="0">
+          <a:bodyPr lIns="0" rIns="0" tIns="0" bIns="0">
             <a:normAutofit/>
           </a:bodyPr>
-          <a:lstStyle/>
-          <a:p>
-            <a:endParaRPr lang="pt-BR" sz="2800" b="0" strike="noStrike" spc="-1">
+          <a:p>
+            <a:endParaRPr b="0" lang="pt-BR" sz="2800" spc="-1" strike="noStrike">
               <a:solidFill>
                 <a:srgbClr val="000000"/>
               </a:solidFill>
@@ -892,14 +758,11 @@
       </p:sp>
     </p:spTree>
   </p:cSld>
-  <p:clrMapOvr>
-    <a:masterClrMapping/>
-  </p:clrMapOvr>
 </p:sldLayout>
 </file>
 
 <file path=ppt/slideLayouts/slideLayout4.xml><?xml version="1.0" encoding="utf-8"?>
-<p:sldLayout xmlns:a="http://schemas.openxmlformats.org/drawingml/2006/main" xmlns:r="http://schemas.openxmlformats.org/officeDocument/2006/relationships" xmlns:p="http://schemas.openxmlformats.org/presentationml/2006/main" type="twoObj" preserve="1">
+<p:sldLayout xmlns:a="http://schemas.openxmlformats.org/drawingml/2006/main" xmlns:p="http://schemas.openxmlformats.org/presentationml/2006/main" xmlns:r="http://schemas.openxmlformats.org/officeDocument/2006/relationships" xmlns:p14="http://schemas.microsoft.com/office/powerpoint/2010/main" xmlns:p15="http://schemas.microsoft.com/office/powerpoint/2012/main" xmlns:mc="http://schemas.openxmlformats.org/markup-compatibility/2006" type="twoObj" preserve="1">
   <p:cSld name="Title, 2 Content">
     <p:spTree>
       <p:nvGrpSpPr>
@@ -928,17 +791,16 @@
         <p:spPr>
           <a:xfrm>
             <a:off x="609480" y="273600"/>
-            <a:ext cx="10972440" cy="1144800"/>
-          </a:xfrm>
-          <a:prstGeom prst="rect">
-            <a:avLst/>
-          </a:prstGeom>
-        </p:spPr>
-        <p:txBody>
-          <a:bodyPr lIns="0" tIns="0" rIns="0" bIns="0" anchor="ctr"/>
-          <a:lstStyle/>
-          <a:p>
-            <a:endParaRPr lang="pt-BR" sz="1800" b="0" strike="noStrike" spc="-1">
+            <a:ext cx="10972080" cy="1144440"/>
+          </a:xfrm>
+          <a:prstGeom prst="rect">
+            <a:avLst/>
+          </a:prstGeom>
+        </p:spPr>
+        <p:txBody>
+          <a:bodyPr lIns="0" rIns="0" tIns="0" bIns="0" anchor="ctr"/>
+          <a:p>
+            <a:endParaRPr b="0" lang="pt-BR" sz="1800" spc="-1" strike="noStrike">
               <a:solidFill>
                 <a:srgbClr val="000000"/>
               </a:solidFill>
@@ -967,12 +829,11 @@
           </a:prstGeom>
         </p:spPr>
         <p:txBody>
-          <a:bodyPr lIns="0" tIns="0" rIns="0" bIns="0">
+          <a:bodyPr lIns="0" rIns="0" tIns="0" bIns="0">
             <a:normAutofit/>
           </a:bodyPr>
-          <a:lstStyle/>
-          <a:p>
-            <a:endParaRPr lang="pt-BR" sz="2800" b="0" strike="noStrike" spc="-1">
+          <a:p>
+            <a:endParaRPr b="0" lang="pt-BR" sz="2800" spc="-1" strike="noStrike">
               <a:solidFill>
                 <a:srgbClr val="000000"/>
               </a:solidFill>
@@ -1001,12 +862,11 @@
           </a:prstGeom>
         </p:spPr>
         <p:txBody>
-          <a:bodyPr lIns="0" tIns="0" rIns="0" bIns="0">
+          <a:bodyPr lIns="0" rIns="0" tIns="0" bIns="0">
             <a:normAutofit/>
           </a:bodyPr>
-          <a:lstStyle/>
-          <a:p>
-            <a:endParaRPr lang="pt-BR" sz="2800" b="0" strike="noStrike" spc="-1">
+          <a:p>
+            <a:endParaRPr b="0" lang="pt-BR" sz="2800" spc="-1" strike="noStrike">
               <a:solidFill>
                 <a:srgbClr val="000000"/>
               </a:solidFill>
@@ -1017,14 +877,11 @@
       </p:sp>
     </p:spTree>
   </p:cSld>
-  <p:clrMapOvr>
-    <a:masterClrMapping/>
-  </p:clrMapOvr>
 </p:sldLayout>
 </file>
 
 <file path=ppt/slideLayouts/slideLayout5.xml><?xml version="1.0" encoding="utf-8"?>
-<p:sldLayout xmlns:a="http://schemas.openxmlformats.org/drawingml/2006/main" xmlns:r="http://schemas.openxmlformats.org/officeDocument/2006/relationships" xmlns:p="http://schemas.openxmlformats.org/presentationml/2006/main" type="titleOnly" preserve="1">
+<p:sldLayout xmlns:a="http://schemas.openxmlformats.org/drawingml/2006/main" xmlns:p="http://schemas.openxmlformats.org/presentationml/2006/main" xmlns:r="http://schemas.openxmlformats.org/officeDocument/2006/relationships" xmlns:p14="http://schemas.microsoft.com/office/powerpoint/2010/main" xmlns:p15="http://schemas.microsoft.com/office/powerpoint/2012/main" xmlns:mc="http://schemas.openxmlformats.org/markup-compatibility/2006" type="titleOnly" preserve="1">
   <p:cSld name="Title Only">
     <p:spTree>
       <p:nvGrpSpPr>
@@ -1053,17 +910,16 @@
         <p:spPr>
           <a:xfrm>
             <a:off x="609480" y="273600"/>
-            <a:ext cx="10972440" cy="1144800"/>
-          </a:xfrm>
-          <a:prstGeom prst="rect">
-            <a:avLst/>
-          </a:prstGeom>
-        </p:spPr>
-        <p:txBody>
-          <a:bodyPr lIns="0" tIns="0" rIns="0" bIns="0" anchor="ctr"/>
-          <a:lstStyle/>
-          <a:p>
-            <a:endParaRPr lang="pt-BR" sz="1800" b="0" strike="noStrike" spc="-1">
+            <a:ext cx="10972080" cy="1144440"/>
+          </a:xfrm>
+          <a:prstGeom prst="rect">
+            <a:avLst/>
+          </a:prstGeom>
+        </p:spPr>
+        <p:txBody>
+          <a:bodyPr lIns="0" rIns="0" tIns="0" bIns="0" anchor="ctr"/>
+          <a:p>
+            <a:endParaRPr b="0" lang="pt-BR" sz="1800" spc="-1" strike="noStrike">
               <a:solidFill>
                 <a:srgbClr val="000000"/>
               </a:solidFill>
@@ -1074,14 +930,11 @@
       </p:sp>
     </p:spTree>
   </p:cSld>
-  <p:clrMapOvr>
-    <a:masterClrMapping/>
-  </p:clrMapOvr>
 </p:sldLayout>
 </file>
 
 <file path=ppt/slideLayouts/slideLayout6.xml><?xml version="1.0" encoding="utf-8"?>
-<p:sldLayout xmlns:a="http://schemas.openxmlformats.org/drawingml/2006/main" xmlns:r="http://schemas.openxmlformats.org/officeDocument/2006/relationships" xmlns:p="http://schemas.openxmlformats.org/presentationml/2006/main" type="objOnly" preserve="1">
+<p:sldLayout xmlns:a="http://schemas.openxmlformats.org/drawingml/2006/main" xmlns:p="http://schemas.openxmlformats.org/presentationml/2006/main" xmlns:r="http://schemas.openxmlformats.org/officeDocument/2006/relationships" xmlns:p14="http://schemas.microsoft.com/office/powerpoint/2010/main" xmlns:p15="http://schemas.microsoft.com/office/powerpoint/2012/main" xmlns:mc="http://schemas.openxmlformats.org/markup-compatibility/2006" type="objOnly" preserve="1">
   <p:cSld name="Centered Text">
     <p:spTree>
       <p:nvGrpSpPr>
@@ -1110,18 +963,17 @@
         <p:spPr>
           <a:xfrm>
             <a:off x="609480" y="273600"/>
-            <a:ext cx="10972440" cy="5307840"/>
-          </a:xfrm>
-          <a:prstGeom prst="rect">
-            <a:avLst/>
-          </a:prstGeom>
-        </p:spPr>
-        <p:txBody>
-          <a:bodyPr lIns="0" tIns="0" rIns="0" bIns="0" anchor="ctr"/>
-          <a:lstStyle/>
+            <a:ext cx="10972080" cy="5306400"/>
+          </a:xfrm>
+          <a:prstGeom prst="rect">
+            <a:avLst/>
+          </a:prstGeom>
+        </p:spPr>
+        <p:txBody>
+          <a:bodyPr lIns="0" rIns="0" tIns="0" bIns="0" anchor="ctr"/>
           <a:p>
             <a:pPr algn="ctr"/>
-            <a:endParaRPr lang="pt-BR" sz="3200" b="0" strike="noStrike" spc="-1">
+            <a:endParaRPr b="0" lang="pt-BR" sz="3200" spc="-1" strike="noStrike">
               <a:latin typeface="Arial"/>
             </a:endParaRPr>
           </a:p>
@@ -1129,14 +981,11 @@
       </p:sp>
     </p:spTree>
   </p:cSld>
-  <p:clrMapOvr>
-    <a:masterClrMapping/>
-  </p:clrMapOvr>
 </p:sldLayout>
 </file>
 
 <file path=ppt/slideLayouts/slideLayout7.xml><?xml version="1.0" encoding="utf-8"?>
-<p:sldLayout xmlns:a="http://schemas.openxmlformats.org/drawingml/2006/main" xmlns:r="http://schemas.openxmlformats.org/officeDocument/2006/relationships" xmlns:p="http://schemas.openxmlformats.org/presentationml/2006/main" type="twoObjAndObj" preserve="1">
+<p:sldLayout xmlns:a="http://schemas.openxmlformats.org/drawingml/2006/main" xmlns:p="http://schemas.openxmlformats.org/presentationml/2006/main" xmlns:r="http://schemas.openxmlformats.org/officeDocument/2006/relationships" xmlns:p14="http://schemas.microsoft.com/office/powerpoint/2010/main" xmlns:p15="http://schemas.microsoft.com/office/powerpoint/2012/main" xmlns:mc="http://schemas.openxmlformats.org/markup-compatibility/2006" type="twoObjAndObj" preserve="1">
   <p:cSld name="Title, 2 Content and Content">
     <p:spTree>
       <p:nvGrpSpPr>
@@ -1165,17 +1014,16 @@
         <p:spPr>
           <a:xfrm>
             <a:off x="609480" y="273600"/>
-            <a:ext cx="10972440" cy="1144800"/>
-          </a:xfrm>
-          <a:prstGeom prst="rect">
-            <a:avLst/>
-          </a:prstGeom>
-        </p:spPr>
-        <p:txBody>
-          <a:bodyPr lIns="0" tIns="0" rIns="0" bIns="0" anchor="ctr"/>
-          <a:lstStyle/>
-          <a:p>
-            <a:endParaRPr lang="pt-BR" sz="1800" b="0" strike="noStrike" spc="-1">
+            <a:ext cx="10972080" cy="1144440"/>
+          </a:xfrm>
+          <a:prstGeom prst="rect">
+            <a:avLst/>
+          </a:prstGeom>
+        </p:spPr>
+        <p:txBody>
+          <a:bodyPr lIns="0" rIns="0" tIns="0" bIns="0" anchor="ctr"/>
+          <a:p>
+            <a:endParaRPr b="0" lang="pt-BR" sz="1800" spc="-1" strike="noStrike">
               <a:solidFill>
                 <a:srgbClr val="000000"/>
               </a:solidFill>
@@ -1204,12 +1052,11 @@
           </a:prstGeom>
         </p:spPr>
         <p:txBody>
-          <a:bodyPr lIns="0" tIns="0" rIns="0" bIns="0">
+          <a:bodyPr lIns="0" rIns="0" tIns="0" bIns="0">
             <a:normAutofit/>
           </a:bodyPr>
-          <a:lstStyle/>
-          <a:p>
-            <a:endParaRPr lang="pt-BR" sz="2800" b="0" strike="noStrike" spc="-1">
+          <a:p>
+            <a:endParaRPr b="0" lang="pt-BR" sz="2800" spc="-1" strike="noStrike">
               <a:solidFill>
                 <a:srgbClr val="000000"/>
               </a:solidFill>
@@ -1238,12 +1085,11 @@
           </a:prstGeom>
         </p:spPr>
         <p:txBody>
-          <a:bodyPr lIns="0" tIns="0" rIns="0" bIns="0">
+          <a:bodyPr lIns="0" rIns="0" tIns="0" bIns="0">
             <a:normAutofit/>
           </a:bodyPr>
-          <a:lstStyle/>
-          <a:p>
-            <a:endParaRPr lang="pt-BR" sz="2800" b="0" strike="noStrike" spc="-1">
+          <a:p>
+            <a:endParaRPr b="0" lang="pt-BR" sz="2800" spc="-1" strike="noStrike">
               <a:solidFill>
                 <a:srgbClr val="000000"/>
               </a:solidFill>
@@ -1272,12 +1118,11 @@
           </a:prstGeom>
         </p:spPr>
         <p:txBody>
-          <a:bodyPr lIns="0" tIns="0" rIns="0" bIns="0">
+          <a:bodyPr lIns="0" rIns="0" tIns="0" bIns="0">
             <a:normAutofit/>
           </a:bodyPr>
-          <a:lstStyle/>
-          <a:p>
-            <a:endParaRPr lang="pt-BR" sz="2800" b="0" strike="noStrike" spc="-1">
+          <a:p>
+            <a:endParaRPr b="0" lang="pt-BR" sz="2800" spc="-1" strike="noStrike">
               <a:solidFill>
                 <a:srgbClr val="000000"/>
               </a:solidFill>
@@ -1288,14 +1133,11 @@
       </p:sp>
     </p:spTree>
   </p:cSld>
-  <p:clrMapOvr>
-    <a:masterClrMapping/>
-  </p:clrMapOvr>
 </p:sldLayout>
 </file>
 
 <file path=ppt/slideLayouts/slideLayout8.xml><?xml version="1.0" encoding="utf-8"?>
-<p:sldLayout xmlns:a="http://schemas.openxmlformats.org/drawingml/2006/main" xmlns:r="http://schemas.openxmlformats.org/officeDocument/2006/relationships" xmlns:p="http://schemas.openxmlformats.org/presentationml/2006/main" type="objAndTwoObj" preserve="1">
+<p:sldLayout xmlns:a="http://schemas.openxmlformats.org/drawingml/2006/main" xmlns:p="http://schemas.openxmlformats.org/presentationml/2006/main" xmlns:r="http://schemas.openxmlformats.org/officeDocument/2006/relationships" xmlns:p14="http://schemas.microsoft.com/office/powerpoint/2010/main" xmlns:p15="http://schemas.microsoft.com/office/powerpoint/2012/main" xmlns:mc="http://schemas.openxmlformats.org/markup-compatibility/2006" type="objAndTwoObj" preserve="1">
   <p:cSld name="Title Content and 2 Content">
     <p:spTree>
       <p:nvGrpSpPr>
@@ -1324,17 +1166,16 @@
         <p:spPr>
           <a:xfrm>
             <a:off x="609480" y="273600"/>
-            <a:ext cx="10972440" cy="1144800"/>
-          </a:xfrm>
-          <a:prstGeom prst="rect">
-            <a:avLst/>
-          </a:prstGeom>
-        </p:spPr>
-        <p:txBody>
-          <a:bodyPr lIns="0" tIns="0" rIns="0" bIns="0" anchor="ctr"/>
-          <a:lstStyle/>
-          <a:p>
-            <a:endParaRPr lang="pt-BR" sz="1800" b="0" strike="noStrike" spc="-1">
+            <a:ext cx="10972080" cy="1144440"/>
+          </a:xfrm>
+          <a:prstGeom prst="rect">
+            <a:avLst/>
+          </a:prstGeom>
+        </p:spPr>
+        <p:txBody>
+          <a:bodyPr lIns="0" rIns="0" tIns="0" bIns="0" anchor="ctr"/>
+          <a:p>
+            <a:endParaRPr b="0" lang="pt-BR" sz="1800" spc="-1" strike="noStrike">
               <a:solidFill>
                 <a:srgbClr val="000000"/>
               </a:solidFill>
@@ -1363,12 +1204,11 @@
           </a:prstGeom>
         </p:spPr>
         <p:txBody>
-          <a:bodyPr lIns="0" tIns="0" rIns="0" bIns="0">
+          <a:bodyPr lIns="0" rIns="0" tIns="0" bIns="0">
             <a:normAutofit/>
           </a:bodyPr>
-          <a:lstStyle/>
-          <a:p>
-            <a:endParaRPr lang="pt-BR" sz="2800" b="0" strike="noStrike" spc="-1">
+          <a:p>
+            <a:endParaRPr b="0" lang="pt-BR" sz="2800" spc="-1" strike="noStrike">
               <a:solidFill>
                 <a:srgbClr val="000000"/>
               </a:solidFill>
@@ -1397,12 +1237,11 @@
           </a:prstGeom>
         </p:spPr>
         <p:txBody>
-          <a:bodyPr lIns="0" tIns="0" rIns="0" bIns="0">
+          <a:bodyPr lIns="0" rIns="0" tIns="0" bIns="0">
             <a:normAutofit/>
           </a:bodyPr>
-          <a:lstStyle/>
-          <a:p>
-            <a:endParaRPr lang="pt-BR" sz="2800" b="0" strike="noStrike" spc="-1">
+          <a:p>
+            <a:endParaRPr b="0" lang="pt-BR" sz="2800" spc="-1" strike="noStrike">
               <a:solidFill>
                 <a:srgbClr val="000000"/>
               </a:solidFill>
@@ -1431,12 +1270,11 @@
           </a:prstGeom>
         </p:spPr>
         <p:txBody>
-          <a:bodyPr lIns="0" tIns="0" rIns="0" bIns="0">
+          <a:bodyPr lIns="0" rIns="0" tIns="0" bIns="0">
             <a:normAutofit/>
           </a:bodyPr>
-          <a:lstStyle/>
-          <a:p>
-            <a:endParaRPr lang="pt-BR" sz="2800" b="0" strike="noStrike" spc="-1">
+          <a:p>
+            <a:endParaRPr b="0" lang="pt-BR" sz="2800" spc="-1" strike="noStrike">
               <a:solidFill>
                 <a:srgbClr val="000000"/>
               </a:solidFill>
@@ -1447,14 +1285,11 @@
       </p:sp>
     </p:spTree>
   </p:cSld>
-  <p:clrMapOvr>
-    <a:masterClrMapping/>
-  </p:clrMapOvr>
 </p:sldLayout>
 </file>
 
 <file path=ppt/slideLayouts/slideLayout9.xml><?xml version="1.0" encoding="utf-8"?>
-<p:sldLayout xmlns:a="http://schemas.openxmlformats.org/drawingml/2006/main" xmlns:r="http://schemas.openxmlformats.org/officeDocument/2006/relationships" xmlns:p="http://schemas.openxmlformats.org/presentationml/2006/main" type="twoObjOverTx" preserve="1">
+<p:sldLayout xmlns:a="http://schemas.openxmlformats.org/drawingml/2006/main" xmlns:p="http://schemas.openxmlformats.org/presentationml/2006/main" xmlns:r="http://schemas.openxmlformats.org/officeDocument/2006/relationships" xmlns:p14="http://schemas.microsoft.com/office/powerpoint/2010/main" xmlns:p15="http://schemas.microsoft.com/office/powerpoint/2012/main" xmlns:mc="http://schemas.openxmlformats.org/markup-compatibility/2006" type="twoObjOverTx" preserve="1">
   <p:cSld name="Title, 2 Content over Content">
     <p:spTree>
       <p:nvGrpSpPr>
@@ -1483,17 +1318,16 @@
         <p:spPr>
           <a:xfrm>
             <a:off x="609480" y="273600"/>
-            <a:ext cx="10972440" cy="1144800"/>
-          </a:xfrm>
-          <a:prstGeom prst="rect">
-            <a:avLst/>
-          </a:prstGeom>
-        </p:spPr>
-        <p:txBody>
-          <a:bodyPr lIns="0" tIns="0" rIns="0" bIns="0" anchor="ctr"/>
-          <a:lstStyle/>
-          <a:p>
-            <a:endParaRPr lang="pt-BR" sz="1800" b="0" strike="noStrike" spc="-1">
+            <a:ext cx="10972080" cy="1144440"/>
+          </a:xfrm>
+          <a:prstGeom prst="rect">
+            <a:avLst/>
+          </a:prstGeom>
+        </p:spPr>
+        <p:txBody>
+          <a:bodyPr lIns="0" rIns="0" tIns="0" bIns="0" anchor="ctr"/>
+          <a:p>
+            <a:endParaRPr b="0" lang="pt-BR" sz="1800" spc="-1" strike="noStrike">
               <a:solidFill>
                 <a:srgbClr val="000000"/>
               </a:solidFill>
@@ -1522,12 +1356,11 @@
           </a:prstGeom>
         </p:spPr>
         <p:txBody>
-          <a:bodyPr lIns="0" tIns="0" rIns="0" bIns="0">
+          <a:bodyPr lIns="0" rIns="0" tIns="0" bIns="0">
             <a:normAutofit/>
           </a:bodyPr>
-          <a:lstStyle/>
-          <a:p>
-            <a:endParaRPr lang="pt-BR" sz="2800" b="0" strike="noStrike" spc="-1">
+          <a:p>
+            <a:endParaRPr b="0" lang="pt-BR" sz="2800" spc="-1" strike="noStrike">
               <a:solidFill>
                 <a:srgbClr val="000000"/>
               </a:solidFill>
@@ -1556,12 +1389,11 @@
           </a:prstGeom>
         </p:spPr>
         <p:txBody>
-          <a:bodyPr lIns="0" tIns="0" rIns="0" bIns="0">
+          <a:bodyPr lIns="0" rIns="0" tIns="0" bIns="0">
             <a:normAutofit/>
           </a:bodyPr>
-          <a:lstStyle/>
-          <a:p>
-            <a:endParaRPr lang="pt-BR" sz="2800" b="0" strike="noStrike" spc="-1">
+          <a:p>
+            <a:endParaRPr b="0" lang="pt-BR" sz="2800" spc="-1" strike="noStrike">
               <a:solidFill>
                 <a:srgbClr val="000000"/>
               </a:solidFill>
@@ -1590,12 +1422,11 @@
           </a:prstGeom>
         </p:spPr>
         <p:txBody>
-          <a:bodyPr lIns="0" tIns="0" rIns="0" bIns="0">
+          <a:bodyPr lIns="0" rIns="0" tIns="0" bIns="0">
             <a:normAutofit/>
           </a:bodyPr>
-          <a:lstStyle/>
-          <a:p>
-            <a:endParaRPr lang="pt-BR" sz="2800" b="0" strike="noStrike" spc="-1">
+          <a:p>
+            <a:endParaRPr b="0" lang="pt-BR" sz="2800" spc="-1" strike="noStrike">
               <a:solidFill>
                 <a:srgbClr val="000000"/>
               </a:solidFill>
@@ -1606,21 +1437,17 @@
       </p:sp>
     </p:spTree>
   </p:cSld>
-  <p:clrMapOvr>
-    <a:masterClrMapping/>
-  </p:clrMapOvr>
 </p:sldLayout>
 </file>
 
 <file path=ppt/slideMasters/slideMaster1.xml><?xml version="1.0" encoding="utf-8"?>
-<p:sldMaster xmlns:a="http://schemas.openxmlformats.org/drawingml/2006/main" xmlns:r="http://schemas.openxmlformats.org/officeDocument/2006/relationships" xmlns:p="http://schemas.openxmlformats.org/presentationml/2006/main">
+<p:sldMaster xmlns:a="http://schemas.openxmlformats.org/drawingml/2006/main" xmlns:p="http://schemas.openxmlformats.org/presentationml/2006/main" xmlns:r="http://schemas.openxmlformats.org/officeDocument/2006/relationships" xmlns:p14="http://schemas.microsoft.com/office/powerpoint/2010/main" xmlns:p15="http://schemas.microsoft.com/office/powerpoint/2012/main" xmlns:mc="http://schemas.openxmlformats.org/markup-compatibility/2006">
   <p:cSld>
     <p:bg>
       <p:bgPr>
         <a:solidFill>
-          <a:srgbClr val="FFFFFF"/>
+          <a:srgbClr val="ffffff"/>
         </a:solidFill>
-        <a:effectLst/>
       </p:bgPr>
     </p:bg>
     <p:spTree>
@@ -1639,7 +1466,7 @@
       </p:grpSpPr>
       <p:sp>
         <p:nvSpPr>
-          <p:cNvPr id="2" name="PlaceHolder 1"/>
+          <p:cNvPr id="0" name="PlaceHolder 1"/>
           <p:cNvSpPr>
             <a:spLocks noGrp="1"/>
           </p:cNvSpPr>
@@ -1650,31 +1477,45 @@
         <p:spPr>
           <a:xfrm>
             <a:off x="609480" y="273600"/>
-            <a:ext cx="10972440" cy="1144800"/>
-          </a:xfrm>
-          <a:prstGeom prst="rect">
-            <a:avLst/>
-          </a:prstGeom>
-        </p:spPr>
-        <p:txBody>
-          <a:bodyPr lIns="0" tIns="0" rIns="0" bIns="0" anchor="ctr"/>
-          <a:lstStyle/>
+            <a:ext cx="10972080" cy="1144440"/>
+          </a:xfrm>
+          <a:prstGeom prst="rect">
+            <a:avLst/>
+          </a:prstGeom>
+        </p:spPr>
+        <p:txBody>
+          <a:bodyPr lIns="0" rIns="0" tIns="0" bIns="0" anchor="ctr"/>
           <a:p>
             <a:r>
-              <a:rPr lang="pt-BR" sz="1800" b="0" strike="noStrike" spc="-1">
+              <a:rPr b="0" lang="pt-BR" sz="4400" spc="-1" strike="noStrike">
                 <a:solidFill>
                   <a:srgbClr val="000000"/>
                 </a:solidFill>
                 <a:latin typeface="Arial"/>
               </a:rPr>
-              <a:t>Clique para editar o formato do texto do título</a:t>
+              <a:t>Clique para editar o formato do texto do </a:t>
             </a:r>
-          </a:p>
-        </p:txBody>
-      </p:sp>
-      <p:sp>
-        <p:nvSpPr>
-          <p:cNvPr id="3" name="PlaceHolder 2"/>
+            <a:r>
+              <a:rPr b="0" lang="pt-BR" sz="4400" spc="-1" strike="noStrike">
+                <a:solidFill>
+                  <a:srgbClr val="000000"/>
+                </a:solidFill>
+                <a:latin typeface="Arial"/>
+              </a:rPr>
+              <a:t>título</a:t>
+            </a:r>
+            <a:endParaRPr b="0" lang="pt-BR" sz="4400" spc="-1" strike="noStrike">
+              <a:solidFill>
+                <a:srgbClr val="000000"/>
+              </a:solidFill>
+              <a:latin typeface="Arial"/>
+            </a:endParaRPr>
+          </a:p>
+        </p:txBody>
+      </p:sp>
+      <p:sp>
+        <p:nvSpPr>
+          <p:cNvPr id="1" name="PlaceHolder 2"/>
           <p:cNvSpPr>
             <a:spLocks noGrp="1"/>
           </p:cNvSpPr>
@@ -1692,10 +1533,9 @@
           </a:prstGeom>
         </p:spPr>
         <p:txBody>
-          <a:bodyPr lIns="0" tIns="0" rIns="0" bIns="0">
+          <a:bodyPr lIns="0" rIns="0" tIns="0" bIns="0">
             <a:normAutofit/>
           </a:bodyPr>
-          <a:lstStyle/>
           <a:p>
             <a:pPr marL="432000" indent="-324000">
               <a:spcBef>
@@ -1709,7 +1549,7 @@
               <a:buChar char=""/>
             </a:pPr>
             <a:r>
-              <a:rPr lang="pt-BR" sz="2800" b="0" strike="noStrike" spc="-1">
+              <a:rPr b="0" lang="pt-BR" sz="2800" spc="-1" strike="noStrike">
                 <a:solidFill>
                   <a:srgbClr val="000000"/>
                 </a:solidFill>
@@ -1717,9 +1557,15 @@
               </a:rPr>
               <a:t>Clique para editar o formato do texto da estrutura de tópicos</a:t>
             </a:r>
-          </a:p>
-          <a:p>
-            <a:pPr marL="864000" lvl="1" indent="-324000">
+            <a:endParaRPr b="0" lang="pt-BR" sz="2800" spc="-1" strike="noStrike">
+              <a:solidFill>
+                <a:srgbClr val="000000"/>
+              </a:solidFill>
+              <a:latin typeface="Arial"/>
+            </a:endParaRPr>
+          </a:p>
+          <a:p>
+            <a:pPr lvl="1" marL="864000" indent="-324000">
               <a:spcBef>
                 <a:spcPts val="1134"/>
               </a:spcBef>
@@ -1731,7 +1577,7 @@
               <a:buChar char=""/>
             </a:pPr>
             <a:r>
-              <a:rPr lang="pt-BR" sz="2000" b="0" strike="noStrike" spc="-1">
+              <a:rPr b="0" lang="pt-BR" sz="2000" spc="-1" strike="noStrike">
                 <a:solidFill>
                   <a:srgbClr val="000000"/>
                 </a:solidFill>
@@ -1739,9 +1585,15 @@
               </a:rPr>
               <a:t>2.º nível da estrutura de tópicos</a:t>
             </a:r>
-          </a:p>
-          <a:p>
-            <a:pPr marL="1296000" lvl="2" indent="-288000">
+            <a:endParaRPr b="0" lang="pt-BR" sz="2000" spc="-1" strike="noStrike">
+              <a:solidFill>
+                <a:srgbClr val="000000"/>
+              </a:solidFill>
+              <a:latin typeface="Arial"/>
+            </a:endParaRPr>
+          </a:p>
+          <a:p>
+            <a:pPr lvl="2" marL="1296000" indent="-288000">
               <a:spcBef>
                 <a:spcPts val="850"/>
               </a:spcBef>
@@ -1753,7 +1605,7 @@
               <a:buChar char=""/>
             </a:pPr>
             <a:r>
-              <a:rPr lang="pt-BR" sz="1800" b="0" strike="noStrike" spc="-1">
+              <a:rPr b="0" lang="pt-BR" sz="1800" spc="-1" strike="noStrike">
                 <a:solidFill>
                   <a:srgbClr val="000000"/>
                 </a:solidFill>
@@ -1761,9 +1613,15 @@
               </a:rPr>
               <a:t>3.º nível da estrutura de tópicos</a:t>
             </a:r>
-          </a:p>
-          <a:p>
-            <a:pPr marL="1728000" lvl="3" indent="-216000">
+            <a:endParaRPr b="0" lang="pt-BR" sz="1800" spc="-1" strike="noStrike">
+              <a:solidFill>
+                <a:srgbClr val="000000"/>
+              </a:solidFill>
+              <a:latin typeface="Arial"/>
+            </a:endParaRPr>
+          </a:p>
+          <a:p>
+            <a:pPr lvl="3" marL="1728000" indent="-216000">
               <a:spcBef>
                 <a:spcPts val="567"/>
               </a:spcBef>
@@ -1775,7 +1633,7 @@
               <a:buChar char=""/>
             </a:pPr>
             <a:r>
-              <a:rPr lang="pt-BR" sz="1800" b="0" strike="noStrike" spc="-1">
+              <a:rPr b="0" lang="pt-BR" sz="1800" spc="-1" strike="noStrike">
                 <a:solidFill>
                   <a:srgbClr val="000000"/>
                 </a:solidFill>
@@ -1783,9 +1641,15 @@
               </a:rPr>
               <a:t>4.º nível da estrutura de tópicos</a:t>
             </a:r>
-          </a:p>
-          <a:p>
-            <a:pPr marL="2160000" lvl="4" indent="-216000">
+            <a:endParaRPr b="0" lang="pt-BR" sz="1800" spc="-1" strike="noStrike">
+              <a:solidFill>
+                <a:srgbClr val="000000"/>
+              </a:solidFill>
+              <a:latin typeface="Arial"/>
+            </a:endParaRPr>
+          </a:p>
+          <a:p>
+            <a:pPr lvl="4" marL="2160000" indent="-216000">
               <a:spcBef>
                 <a:spcPts val="283"/>
               </a:spcBef>
@@ -1797,7 +1661,7 @@
               <a:buChar char=""/>
             </a:pPr>
             <a:r>
-              <a:rPr lang="pt-BR" sz="2000" b="0" strike="noStrike" spc="-1">
+              <a:rPr b="0" lang="pt-BR" sz="2000" spc="-1" strike="noStrike">
                 <a:solidFill>
                   <a:srgbClr val="000000"/>
                 </a:solidFill>
@@ -1805,9 +1669,15 @@
               </a:rPr>
               <a:t>5.º nível da estrutura de tópicos</a:t>
             </a:r>
-          </a:p>
-          <a:p>
-            <a:pPr marL="2592000" lvl="5" indent="-216000">
+            <a:endParaRPr b="0" lang="pt-BR" sz="2000" spc="-1" strike="noStrike">
+              <a:solidFill>
+                <a:srgbClr val="000000"/>
+              </a:solidFill>
+              <a:latin typeface="Arial"/>
+            </a:endParaRPr>
+          </a:p>
+          <a:p>
+            <a:pPr lvl="5" marL="2592000" indent="-216000">
               <a:spcBef>
                 <a:spcPts val="283"/>
               </a:spcBef>
@@ -1819,7 +1689,7 @@
               <a:buChar char=""/>
             </a:pPr>
             <a:r>
-              <a:rPr lang="pt-BR" sz="2000" b="0" strike="noStrike" spc="-1">
+              <a:rPr b="0" lang="pt-BR" sz="2000" spc="-1" strike="noStrike">
                 <a:solidFill>
                   <a:srgbClr val="000000"/>
                 </a:solidFill>
@@ -1827,9 +1697,15 @@
               </a:rPr>
               <a:t>6.º nível da estrutura de tópicos</a:t>
             </a:r>
-          </a:p>
-          <a:p>
-            <a:pPr marL="3024000" lvl="6" indent="-216000">
+            <a:endParaRPr b="0" lang="pt-BR" sz="2000" spc="-1" strike="noStrike">
+              <a:solidFill>
+                <a:srgbClr val="000000"/>
+              </a:solidFill>
+              <a:latin typeface="Arial"/>
+            </a:endParaRPr>
+          </a:p>
+          <a:p>
+            <a:pPr lvl="6" marL="3024000" indent="-216000">
               <a:spcBef>
                 <a:spcPts val="283"/>
               </a:spcBef>
@@ -1841,7 +1717,7 @@
               <a:buChar char=""/>
             </a:pPr>
             <a:r>
-              <a:rPr lang="pt-BR" sz="2000" b="0" strike="noStrike" spc="-1">
+              <a:rPr b="0" lang="pt-BR" sz="2000" spc="-1" strike="noStrike">
                 <a:solidFill>
                   <a:srgbClr val="000000"/>
                 </a:solidFill>
@@ -1849,318 +1725,43 @@
               </a:rPr>
               <a:t>7.º nível da estrutura de tópicos</a:t>
             </a:r>
+            <a:endParaRPr b="0" lang="pt-BR" sz="2000" spc="-1" strike="noStrike">
+              <a:solidFill>
+                <a:srgbClr val="000000"/>
+              </a:solidFill>
+              <a:latin typeface="Arial"/>
+            </a:endParaRPr>
           </a:p>
         </p:txBody>
       </p:sp>
     </p:spTree>
   </p:cSld>
-  <p:clrMap bg1="lt1" tx1="dk1" bg2="lt2" tx2="dk2" accent1="accent1" accent2="accent2" accent3="accent3" accent4="accent4" accent5="accent5" accent6="accent6" hlink="hlink" folHlink="folHlink"/>
+  <p:clrMap bg1="lt1" bg2="lt2" tx1="dk1" tx2="dk2" accent1="accent1" accent2="accent2" accent3="accent3" accent4="accent4" accent5="accent5" accent6="accent6" hlink="hlink" folHlink="folHlink"/>
   <p:sldLayoutIdLst>
-    <p:sldLayoutId id="2147483649" r:id="rId1"/>
-    <p:sldLayoutId id="2147483650" r:id="rId2"/>
-    <p:sldLayoutId id="2147483651" r:id="rId3"/>
-    <p:sldLayoutId id="2147483652" r:id="rId4"/>
-    <p:sldLayoutId id="2147483653" r:id="rId5"/>
-    <p:sldLayoutId id="2147483654" r:id="rId6"/>
-    <p:sldLayoutId id="2147483655" r:id="rId7"/>
-    <p:sldLayoutId id="2147483656" r:id="rId8"/>
-    <p:sldLayoutId id="2147483657" r:id="rId9"/>
-    <p:sldLayoutId id="2147483658" r:id="rId10"/>
-    <p:sldLayoutId id="2147483659" r:id="rId11"/>
-    <p:sldLayoutId id="2147483660" r:id="rId12"/>
+    <p:sldLayoutId id="2147483649" r:id="rId2"/>
+    <p:sldLayoutId id="2147483650" r:id="rId3"/>
+    <p:sldLayoutId id="2147483651" r:id="rId4"/>
+    <p:sldLayoutId id="2147483652" r:id="rId5"/>
+    <p:sldLayoutId id="2147483653" r:id="rId6"/>
+    <p:sldLayoutId id="2147483654" r:id="rId7"/>
+    <p:sldLayoutId id="2147483655" r:id="rId8"/>
+    <p:sldLayoutId id="2147483656" r:id="rId9"/>
+    <p:sldLayoutId id="2147483657" r:id="rId10"/>
+    <p:sldLayoutId id="2147483658" r:id="rId11"/>
+    <p:sldLayoutId id="2147483659" r:id="rId12"/>
+    <p:sldLayoutId id="2147483660" r:id="rId13"/>
   </p:sldLayoutIdLst>
-  <p:txStyles>
-    <p:titleStyle>
-      <a:lvl1pPr algn="l" defTabSz="914400" rtl="0" eaLnBrk="1" latinLnBrk="0" hangingPunct="1">
-        <a:lnSpc>
-          <a:spcPct val="90000"/>
-        </a:lnSpc>
-        <a:spcBef>
-          <a:spcPct val="0"/>
-        </a:spcBef>
-        <a:buNone/>
-        <a:defRPr sz="4400" kern="1200">
-          <a:solidFill>
-            <a:schemeClr val="tx1"/>
-          </a:solidFill>
-          <a:latin typeface="+mj-lt"/>
-          <a:ea typeface="+mj-ea"/>
-          <a:cs typeface="+mj-cs"/>
-        </a:defRPr>
-      </a:lvl1pPr>
-    </p:titleStyle>
-    <p:bodyStyle>
-      <a:lvl1pPr marL="228600" indent="-228600" algn="l" defTabSz="914400" rtl="0" eaLnBrk="1" latinLnBrk="0" hangingPunct="1">
-        <a:lnSpc>
-          <a:spcPct val="90000"/>
-        </a:lnSpc>
-        <a:spcBef>
-          <a:spcPts val="1000"/>
-        </a:spcBef>
-        <a:buFont typeface="Arial" panose="020B0604020202020204" pitchFamily="34" charset="0"/>
-        <a:buChar char="•"/>
-        <a:defRPr sz="2800" kern="1200">
-          <a:solidFill>
-            <a:schemeClr val="tx1"/>
-          </a:solidFill>
-          <a:latin typeface="+mn-lt"/>
-          <a:ea typeface="+mn-ea"/>
-          <a:cs typeface="+mn-cs"/>
-        </a:defRPr>
-      </a:lvl1pPr>
-      <a:lvl2pPr marL="685800" indent="-228600" algn="l" defTabSz="914400" rtl="0" eaLnBrk="1" latinLnBrk="0" hangingPunct="1">
-        <a:lnSpc>
-          <a:spcPct val="90000"/>
-        </a:lnSpc>
-        <a:spcBef>
-          <a:spcPts val="500"/>
-        </a:spcBef>
-        <a:buFont typeface="Arial" panose="020B0604020202020204" pitchFamily="34" charset="0"/>
-        <a:buChar char="•"/>
-        <a:defRPr sz="2400" kern="1200">
-          <a:solidFill>
-            <a:schemeClr val="tx1"/>
-          </a:solidFill>
-          <a:latin typeface="+mn-lt"/>
-          <a:ea typeface="+mn-ea"/>
-          <a:cs typeface="+mn-cs"/>
-        </a:defRPr>
-      </a:lvl2pPr>
-      <a:lvl3pPr marL="1143000" indent="-228600" algn="l" defTabSz="914400" rtl="0" eaLnBrk="1" latinLnBrk="0" hangingPunct="1">
-        <a:lnSpc>
-          <a:spcPct val="90000"/>
-        </a:lnSpc>
-        <a:spcBef>
-          <a:spcPts val="500"/>
-        </a:spcBef>
-        <a:buFont typeface="Arial" panose="020B0604020202020204" pitchFamily="34" charset="0"/>
-        <a:buChar char="•"/>
-        <a:defRPr sz="2000" kern="1200">
-          <a:solidFill>
-            <a:schemeClr val="tx1"/>
-          </a:solidFill>
-          <a:latin typeface="+mn-lt"/>
-          <a:ea typeface="+mn-ea"/>
-          <a:cs typeface="+mn-cs"/>
-        </a:defRPr>
-      </a:lvl3pPr>
-      <a:lvl4pPr marL="1600200" indent="-228600" algn="l" defTabSz="914400" rtl="0" eaLnBrk="1" latinLnBrk="0" hangingPunct="1">
-        <a:lnSpc>
-          <a:spcPct val="90000"/>
-        </a:lnSpc>
-        <a:spcBef>
-          <a:spcPts val="500"/>
-        </a:spcBef>
-        <a:buFont typeface="Arial" panose="020B0604020202020204" pitchFamily="34" charset="0"/>
-        <a:buChar char="•"/>
-        <a:defRPr sz="1800" kern="1200">
-          <a:solidFill>
-            <a:schemeClr val="tx1"/>
-          </a:solidFill>
-          <a:latin typeface="+mn-lt"/>
-          <a:ea typeface="+mn-ea"/>
-          <a:cs typeface="+mn-cs"/>
-        </a:defRPr>
-      </a:lvl4pPr>
-      <a:lvl5pPr marL="2057400" indent="-228600" algn="l" defTabSz="914400" rtl="0" eaLnBrk="1" latinLnBrk="0" hangingPunct="1">
-        <a:lnSpc>
-          <a:spcPct val="90000"/>
-        </a:lnSpc>
-        <a:spcBef>
-          <a:spcPts val="500"/>
-        </a:spcBef>
-        <a:buFont typeface="Arial" panose="020B0604020202020204" pitchFamily="34" charset="0"/>
-        <a:buChar char="•"/>
-        <a:defRPr sz="1800" kern="1200">
-          <a:solidFill>
-            <a:schemeClr val="tx1"/>
-          </a:solidFill>
-          <a:latin typeface="+mn-lt"/>
-          <a:ea typeface="+mn-ea"/>
-          <a:cs typeface="+mn-cs"/>
-        </a:defRPr>
-      </a:lvl5pPr>
-      <a:lvl6pPr marL="2514600" indent="-228600" algn="l" defTabSz="914400" rtl="0" eaLnBrk="1" latinLnBrk="0" hangingPunct="1">
-        <a:lnSpc>
-          <a:spcPct val="90000"/>
-        </a:lnSpc>
-        <a:spcBef>
-          <a:spcPts val="500"/>
-        </a:spcBef>
-        <a:buFont typeface="Arial" panose="020B0604020202020204" pitchFamily="34" charset="0"/>
-        <a:buChar char="•"/>
-        <a:defRPr sz="1800" kern="1200">
-          <a:solidFill>
-            <a:schemeClr val="tx1"/>
-          </a:solidFill>
-          <a:latin typeface="+mn-lt"/>
-          <a:ea typeface="+mn-ea"/>
-          <a:cs typeface="+mn-cs"/>
-        </a:defRPr>
-      </a:lvl6pPr>
-      <a:lvl7pPr marL="2971800" indent="-228600" algn="l" defTabSz="914400" rtl="0" eaLnBrk="1" latinLnBrk="0" hangingPunct="1">
-        <a:lnSpc>
-          <a:spcPct val="90000"/>
-        </a:lnSpc>
-        <a:spcBef>
-          <a:spcPts val="500"/>
-        </a:spcBef>
-        <a:buFont typeface="Arial" panose="020B0604020202020204" pitchFamily="34" charset="0"/>
-        <a:buChar char="•"/>
-        <a:defRPr sz="1800" kern="1200">
-          <a:solidFill>
-            <a:schemeClr val="tx1"/>
-          </a:solidFill>
-          <a:latin typeface="+mn-lt"/>
-          <a:ea typeface="+mn-ea"/>
-          <a:cs typeface="+mn-cs"/>
-        </a:defRPr>
-      </a:lvl7pPr>
-      <a:lvl8pPr marL="3429000" indent="-228600" algn="l" defTabSz="914400" rtl="0" eaLnBrk="1" latinLnBrk="0" hangingPunct="1">
-        <a:lnSpc>
-          <a:spcPct val="90000"/>
-        </a:lnSpc>
-        <a:spcBef>
-          <a:spcPts val="500"/>
-        </a:spcBef>
-        <a:buFont typeface="Arial" panose="020B0604020202020204" pitchFamily="34" charset="0"/>
-        <a:buChar char="•"/>
-        <a:defRPr sz="1800" kern="1200">
-          <a:solidFill>
-            <a:schemeClr val="tx1"/>
-          </a:solidFill>
-          <a:latin typeface="+mn-lt"/>
-          <a:ea typeface="+mn-ea"/>
-          <a:cs typeface="+mn-cs"/>
-        </a:defRPr>
-      </a:lvl8pPr>
-      <a:lvl9pPr marL="3886200" indent="-228600" algn="l" defTabSz="914400" rtl="0" eaLnBrk="1" latinLnBrk="0" hangingPunct="1">
-        <a:lnSpc>
-          <a:spcPct val="90000"/>
-        </a:lnSpc>
-        <a:spcBef>
-          <a:spcPts val="500"/>
-        </a:spcBef>
-        <a:buFont typeface="Arial" panose="020B0604020202020204" pitchFamily="34" charset="0"/>
-        <a:buChar char="•"/>
-        <a:defRPr sz="1800" kern="1200">
-          <a:solidFill>
-            <a:schemeClr val="tx1"/>
-          </a:solidFill>
-          <a:latin typeface="+mn-lt"/>
-          <a:ea typeface="+mn-ea"/>
-          <a:cs typeface="+mn-cs"/>
-        </a:defRPr>
-      </a:lvl9pPr>
-    </p:bodyStyle>
-    <p:otherStyle>
-      <a:defPPr>
-        <a:defRPr lang="pt-BR"/>
-      </a:defPPr>
-      <a:lvl1pPr marL="0" algn="l" defTabSz="914400" rtl="0" eaLnBrk="1" latinLnBrk="0" hangingPunct="1">
-        <a:defRPr sz="1800" kern="1200">
-          <a:solidFill>
-            <a:schemeClr val="tx1"/>
-          </a:solidFill>
-          <a:latin typeface="+mn-lt"/>
-          <a:ea typeface="+mn-ea"/>
-          <a:cs typeface="+mn-cs"/>
-        </a:defRPr>
-      </a:lvl1pPr>
-      <a:lvl2pPr marL="457200" algn="l" defTabSz="914400" rtl="0" eaLnBrk="1" latinLnBrk="0" hangingPunct="1">
-        <a:defRPr sz="1800" kern="1200">
-          <a:solidFill>
-            <a:schemeClr val="tx1"/>
-          </a:solidFill>
-          <a:latin typeface="+mn-lt"/>
-          <a:ea typeface="+mn-ea"/>
-          <a:cs typeface="+mn-cs"/>
-        </a:defRPr>
-      </a:lvl2pPr>
-      <a:lvl3pPr marL="914400" algn="l" defTabSz="914400" rtl="0" eaLnBrk="1" latinLnBrk="0" hangingPunct="1">
-        <a:defRPr sz="1800" kern="1200">
-          <a:solidFill>
-            <a:schemeClr val="tx1"/>
-          </a:solidFill>
-          <a:latin typeface="+mn-lt"/>
-          <a:ea typeface="+mn-ea"/>
-          <a:cs typeface="+mn-cs"/>
-        </a:defRPr>
-      </a:lvl3pPr>
-      <a:lvl4pPr marL="1371600" algn="l" defTabSz="914400" rtl="0" eaLnBrk="1" latinLnBrk="0" hangingPunct="1">
-        <a:defRPr sz="1800" kern="1200">
-          <a:solidFill>
-            <a:schemeClr val="tx1"/>
-          </a:solidFill>
-          <a:latin typeface="+mn-lt"/>
-          <a:ea typeface="+mn-ea"/>
-          <a:cs typeface="+mn-cs"/>
-        </a:defRPr>
-      </a:lvl4pPr>
-      <a:lvl5pPr marL="1828800" algn="l" defTabSz="914400" rtl="0" eaLnBrk="1" latinLnBrk="0" hangingPunct="1">
-        <a:defRPr sz="1800" kern="1200">
-          <a:solidFill>
-            <a:schemeClr val="tx1"/>
-          </a:solidFill>
-          <a:latin typeface="+mn-lt"/>
-          <a:ea typeface="+mn-ea"/>
-          <a:cs typeface="+mn-cs"/>
-        </a:defRPr>
-      </a:lvl5pPr>
-      <a:lvl6pPr marL="2286000" algn="l" defTabSz="914400" rtl="0" eaLnBrk="1" latinLnBrk="0" hangingPunct="1">
-        <a:defRPr sz="1800" kern="1200">
-          <a:solidFill>
-            <a:schemeClr val="tx1"/>
-          </a:solidFill>
-          <a:latin typeface="+mn-lt"/>
-          <a:ea typeface="+mn-ea"/>
-          <a:cs typeface="+mn-cs"/>
-        </a:defRPr>
-      </a:lvl6pPr>
-      <a:lvl7pPr marL="2743200" algn="l" defTabSz="914400" rtl="0" eaLnBrk="1" latinLnBrk="0" hangingPunct="1">
-        <a:defRPr sz="1800" kern="1200">
-          <a:solidFill>
-            <a:schemeClr val="tx1"/>
-          </a:solidFill>
-          <a:latin typeface="+mn-lt"/>
-          <a:ea typeface="+mn-ea"/>
-          <a:cs typeface="+mn-cs"/>
-        </a:defRPr>
-      </a:lvl7pPr>
-      <a:lvl8pPr marL="3200400" algn="l" defTabSz="914400" rtl="0" eaLnBrk="1" latinLnBrk="0" hangingPunct="1">
-        <a:defRPr sz="1800" kern="1200">
-          <a:solidFill>
-            <a:schemeClr val="tx1"/>
-          </a:solidFill>
-          <a:latin typeface="+mn-lt"/>
-          <a:ea typeface="+mn-ea"/>
-          <a:cs typeface="+mn-cs"/>
-        </a:defRPr>
-      </a:lvl8pPr>
-      <a:lvl9pPr marL="3657600" algn="l" defTabSz="914400" rtl="0" eaLnBrk="1" latinLnBrk="0" hangingPunct="1">
-        <a:defRPr sz="1800" kern="1200">
-          <a:solidFill>
-            <a:schemeClr val="tx1"/>
-          </a:solidFill>
-          <a:latin typeface="+mn-lt"/>
-          <a:ea typeface="+mn-ea"/>
-          <a:cs typeface="+mn-cs"/>
-        </a:defRPr>
-      </a:lvl9pPr>
-    </p:otherStyle>
-  </p:txStyles>
 </p:sldMaster>
 </file>
 
 <file path=ppt/slides/slide1.xml><?xml version="1.0" encoding="utf-8"?>
-<p:sld xmlns:a="http://schemas.openxmlformats.org/drawingml/2006/main" xmlns:r="http://schemas.openxmlformats.org/officeDocument/2006/relationships" xmlns:p="http://schemas.openxmlformats.org/presentationml/2006/main">
+<p:sld xmlns:a="http://schemas.openxmlformats.org/drawingml/2006/main" xmlns:p="http://schemas.openxmlformats.org/presentationml/2006/main" xmlns:r="http://schemas.openxmlformats.org/officeDocument/2006/relationships" xmlns:p14="http://schemas.microsoft.com/office/powerpoint/2010/main" xmlns:p15="http://schemas.microsoft.com/office/powerpoint/2012/main" xmlns:mc="http://schemas.openxmlformats.org/markup-compatibility/2006">
   <p:cSld>
     <p:bg>
       <p:bgPr>
         <a:solidFill>
-          <a:srgbClr val="FFFFFF"/>
+          <a:srgbClr val="ffffff"/>
         </a:solidFill>
-        <a:effectLst/>
       </p:bgPr>
     </p:bg>
     <p:spTree>
@@ -2186,34 +1787,110 @@
         <p:spPr>
           <a:xfrm>
             <a:off x="0" y="0"/>
-            <a:ext cx="12191040" cy="1585440"/>
+            <a:ext cx="12190680" cy="1585080"/>
           </a:xfrm>
           <a:prstGeom prst="rect">
             <a:avLst/>
           </a:prstGeom>
           <a:solidFill>
-            <a:srgbClr val="347C36"/>
+            <a:srgbClr val="347c36"/>
           </a:solidFill>
           <a:ln>
             <a:noFill/>
           </a:ln>
         </p:spPr>
         <p:style>
-          <a:lnRef idx="0">
-            <a:scrgbClr r="0" g="0" b="0"/>
-          </a:lnRef>
-          <a:fillRef idx="0">
-            <a:scrgbClr r="0" g="0" b="0"/>
-          </a:fillRef>
-          <a:effectRef idx="0">
-            <a:scrgbClr r="0" g="0" b="0"/>
-          </a:effectRef>
+          <a:lnRef idx="0"/>
+          <a:fillRef idx="0"/>
+          <a:effectRef idx="0"/>
           <a:fontRef idx="minor"/>
         </p:style>
       </p:sp>
       <p:pic>
         <p:nvPicPr>
-          <p:cNvPr id="39" name="Google Shape;89;p13"/>
+          <p:cNvPr id="39" name="Google Shape;89;p13" descr=""/>
+          <p:cNvPicPr/>
+          <p:nvPr/>
+        </p:nvPicPr>
+        <p:blipFill>
+          <a:blip r:embed="rId1"/>
+          <a:stretch/>
+        </p:blipFill>
+        <p:spPr>
+          <a:xfrm>
+            <a:off x="10561680" y="0"/>
+            <a:ext cx="1081800" cy="2505600"/>
+          </a:xfrm>
+          <a:prstGeom prst="rect">
+            <a:avLst/>
+          </a:prstGeom>
+          <a:ln>
+            <a:noFill/>
+          </a:ln>
+        </p:spPr>
+      </p:pic>
+      <p:sp>
+        <p:nvSpPr>
+          <p:cNvPr id="40" name="CustomShape 2"/>
+          <p:cNvSpPr/>
+          <p:nvPr/>
+        </p:nvSpPr>
+        <p:spPr>
+          <a:xfrm>
+            <a:off x="504000" y="6479280"/>
+            <a:ext cx="11128680" cy="718560"/>
+          </a:xfrm>
+          <a:prstGeom prst="rect">
+            <a:avLst/>
+          </a:prstGeom>
+          <a:noFill/>
+          <a:ln>
+            <a:noFill/>
+          </a:ln>
+        </p:spPr>
+        <p:style>
+          <a:lnRef idx="0"/>
+          <a:fillRef idx="0"/>
+          <a:effectRef idx="0"/>
+          <a:fontRef idx="minor"/>
+        </p:style>
+        <p:txBody>
+          <a:bodyPr lIns="90000" rIns="90000" tIns="45000" bIns="45000"/>
+          <a:p>
+            <a:pPr algn="ctr">
+              <a:lnSpc>
+                <a:spcPct val="100000"/>
+              </a:lnSpc>
+            </a:pPr>
+            <a:r>
+              <a:rPr b="1" lang="pt-BR" sz="1500" spc="-1" strike="noStrike">
+                <a:solidFill>
+                  <a:srgbClr val="8dc641"/>
+                </a:solidFill>
+                <a:latin typeface="Arial"/>
+                <a:ea typeface="Arial"/>
+              </a:rPr>
+              <a:t> </a:t>
+            </a:r>
+            <a:r>
+              <a:rPr b="1" lang="pt-BR" sz="1500" spc="-1" strike="noStrike">
+                <a:solidFill>
+                  <a:srgbClr val="8dc641"/>
+                </a:solidFill>
+                <a:latin typeface="Arial"/>
+                <a:ea typeface="Arial"/>
+              </a:rPr>
+              <a:t>Fabio Vasques, Gieder Loreto</a:t>
+            </a:r>
+            <a:endParaRPr b="0" lang="pt-BR" sz="1500" spc="-1" strike="noStrike">
+              <a:latin typeface="Arial"/>
+            </a:endParaRPr>
+          </a:p>
+        </p:txBody>
+      </p:sp>
+      <p:pic>
+        <p:nvPicPr>
+          <p:cNvPr id="41" name="Google Shape;166;p39" descr=""/>
           <p:cNvPicPr/>
           <p:nvPr/>
         </p:nvPicPr>
@@ -2223,8 +1900,8 @@
         </p:blipFill>
         <p:spPr>
           <a:xfrm>
-            <a:off x="10561680" y="0"/>
-            <a:ext cx="1082160" cy="2505960"/>
+            <a:off x="235080" y="283680"/>
+            <a:ext cx="3999240" cy="1018080"/>
           </a:xfrm>
           <a:prstGeom prst="rect">
             <a:avLst/>
@@ -2236,14 +1913,14 @@
       </p:pic>
       <p:sp>
         <p:nvSpPr>
-          <p:cNvPr id="40" name="CustomShape 2"/>
+          <p:cNvPr id="42" name="CustomShape 3"/>
           <p:cNvSpPr/>
           <p:nvPr/>
         </p:nvSpPr>
         <p:spPr>
           <a:xfrm>
-            <a:off x="504000" y="6479280"/>
-            <a:ext cx="11129040" cy="718920"/>
+            <a:off x="3603240" y="3470040"/>
+            <a:ext cx="4930560" cy="1123920"/>
           </a:xfrm>
           <a:prstGeom prst="rect">
             <a:avLst/>
@@ -2254,20 +1931,13 @@
           </a:ln>
         </p:spPr>
         <p:style>
-          <a:lnRef idx="0">
-            <a:scrgbClr r="0" g="0" b="0"/>
-          </a:lnRef>
-          <a:fillRef idx="0">
-            <a:scrgbClr r="0" g="0" b="0"/>
-          </a:fillRef>
-          <a:effectRef idx="0">
-            <a:scrgbClr r="0" g="0" b="0"/>
-          </a:effectRef>
+          <a:lnRef idx="0"/>
+          <a:fillRef idx="0"/>
+          <a:effectRef idx="0"/>
           <a:fontRef idx="minor"/>
         </p:style>
         <p:txBody>
-          <a:bodyPr lIns="90000" tIns="45000" rIns="90000" bIns="45000"/>
-          <a:lstStyle/>
+          <a:bodyPr lIns="90000" rIns="90000" tIns="45000" bIns="45000"/>
           <a:p>
             <a:pPr algn="ctr">
               <a:lnSpc>
@@ -2275,94 +1945,9 @@
               </a:lnSpc>
             </a:pPr>
             <a:r>
-              <a:rPr lang="pt-BR" sz="1500" b="1" strike="noStrike" spc="-1" dirty="0">
+              <a:rPr b="1" lang="pt-BR" sz="1500" spc="-1" strike="noStrike">
                 <a:solidFill>
-                  <a:srgbClr val="8DC641"/>
-                </a:solidFill>
-                <a:latin typeface="Arial"/>
-                <a:ea typeface="Arial"/>
-              </a:rPr>
-              <a:t> Fabio Vasques, Gieder Loreto</a:t>
-            </a:r>
-            <a:endParaRPr lang="pt-BR" sz="1500" b="0" strike="noStrike" spc="-1" dirty="0">
-              <a:latin typeface="Arial"/>
-            </a:endParaRPr>
-          </a:p>
-        </p:txBody>
-      </p:sp>
-      <p:pic>
-        <p:nvPicPr>
-          <p:cNvPr id="41" name="Google Shape;166;p39"/>
-          <p:cNvPicPr/>
-          <p:nvPr/>
-        </p:nvPicPr>
-        <p:blipFill>
-          <a:blip r:embed="rId3"/>
-          <a:stretch/>
-        </p:blipFill>
-        <p:spPr>
-          <a:xfrm>
-            <a:off x="235080" y="283680"/>
-            <a:ext cx="3999600" cy="1018440"/>
-          </a:xfrm>
-          <a:prstGeom prst="rect">
-            <a:avLst/>
-          </a:prstGeom>
-          <a:ln>
-            <a:noFill/>
-          </a:ln>
-        </p:spPr>
-      </p:pic>
-      <p:sp>
-        <p:nvSpPr>
-          <p:cNvPr id="10" name="CustomShape 2">
-            <a:extLst>
-              <a:ext uri="{FF2B5EF4-FFF2-40B4-BE49-F238E27FC236}">
-                <a16:creationId xmlns:a16="http://schemas.microsoft.com/office/drawing/2014/main" id="{FBB4E03E-B609-4DF3-8733-0140379AA662}"/>
-              </a:ext>
-            </a:extLst>
-          </p:cNvPr>
-          <p:cNvSpPr/>
-          <p:nvPr/>
-        </p:nvSpPr>
-        <p:spPr>
-          <a:xfrm>
-            <a:off x="3603097" y="3470138"/>
-            <a:ext cx="4930845" cy="1124443"/>
-          </a:xfrm>
-          <a:prstGeom prst="rect">
-            <a:avLst/>
-          </a:prstGeom>
-          <a:noFill/>
-          <a:ln>
-            <a:noFill/>
-          </a:ln>
-        </p:spPr>
-        <p:style>
-          <a:lnRef idx="0">
-            <a:scrgbClr r="0" g="0" b="0"/>
-          </a:lnRef>
-          <a:fillRef idx="0">
-            <a:scrgbClr r="0" g="0" b="0"/>
-          </a:fillRef>
-          <a:effectRef idx="0">
-            <a:scrgbClr r="0" g="0" b="0"/>
-          </a:effectRef>
-          <a:fontRef idx="minor"/>
-        </p:style>
-        <p:txBody>
-          <a:bodyPr lIns="90000" tIns="45000" rIns="90000" bIns="45000"/>
-          <a:lstStyle/>
-          <a:p>
-            <a:pPr algn="ctr">
-              <a:lnSpc>
-                <a:spcPct val="100000"/>
-              </a:lnSpc>
-            </a:pPr>
-            <a:r>
-              <a:rPr lang="pt-BR" sz="1500" b="1" strike="noStrike" spc="-1" dirty="0">
-                <a:solidFill>
-                  <a:srgbClr val="8DC641"/>
+                  <a:srgbClr val="8dc641"/>
                 </a:solidFill>
                 <a:latin typeface="Arial"/>
                 <a:ea typeface="Arial"/>
@@ -2370,15 +1955,18 @@
               <a:t> </a:t>
             </a:r>
             <a:r>
-              <a:rPr lang="pt-BR" sz="3200" b="1" spc="-1" dirty="0">
+              <a:rPr b="1" lang="pt-BR" sz="3200" spc="-1" strike="noStrike">
                 <a:solidFill>
-                  <a:srgbClr val="8DC641"/>
+                  <a:srgbClr val="8dc641"/>
                 </a:solidFill>
                 <a:latin typeface="Arial"/>
                 <a:ea typeface="Arial"/>
               </a:rPr>
               <a:t>Análise do Sistema</a:t>
             </a:r>
+            <a:endParaRPr b="0" lang="pt-BR" sz="3200" spc="-1" strike="noStrike">
+              <a:latin typeface="Arial"/>
+            </a:endParaRPr>
           </a:p>
           <a:p>
             <a:pPr algn="ctr">
@@ -2386,12 +1974,8 @@
                 <a:spcPct val="100000"/>
               </a:lnSpc>
             </a:pPr>
-            <a:endParaRPr lang="pt-BR" sz="3200" b="1" spc="-1" dirty="0">
-              <a:solidFill>
-                <a:srgbClr val="8DC641"/>
-              </a:solidFill>
-              <a:latin typeface="Arial"/>
-              <a:ea typeface="Arial"/>
+            <a:endParaRPr b="0" lang="pt-BR" sz="3200" spc="-1" strike="noStrike">
+              <a:latin typeface="Arial"/>
             </a:endParaRPr>
           </a:p>
           <a:p>
@@ -2400,12 +1984,8 @@
                 <a:spcPct val="100000"/>
               </a:lnSpc>
             </a:pPr>
-            <a:endParaRPr lang="pt-BR" sz="3200" b="1" spc="-1" dirty="0">
-              <a:solidFill>
-                <a:srgbClr val="8DC641"/>
-              </a:solidFill>
-              <a:latin typeface="Arial"/>
-              <a:ea typeface="Arial"/>
+            <a:endParaRPr b="0" lang="pt-BR" sz="3200" spc="-1" strike="noStrike">
+              <a:latin typeface="Arial"/>
             </a:endParaRPr>
           </a:p>
           <a:p>
@@ -2414,12 +1994,8 @@
                 <a:spcPct val="100000"/>
               </a:lnSpc>
             </a:pPr>
-            <a:endParaRPr lang="pt-BR" sz="3200" b="1" spc="-1" dirty="0">
-              <a:solidFill>
-                <a:srgbClr val="8DC641"/>
-              </a:solidFill>
-              <a:latin typeface="Arial"/>
-              <a:ea typeface="Arial"/>
+            <a:endParaRPr b="0" lang="pt-BR" sz="3200" spc="-1" strike="noStrike">
+              <a:latin typeface="Arial"/>
             </a:endParaRPr>
           </a:p>
           <a:p>
@@ -2429,15 +2005,18 @@
               </a:lnSpc>
             </a:pPr>
             <a:r>
-              <a:rPr lang="pt-BR" sz="2000" b="1" spc="-1" dirty="0">
+              <a:rPr b="1" lang="pt-BR" sz="2000" spc="-1" strike="noStrike">
                 <a:solidFill>
-                  <a:srgbClr val="8DC641"/>
+                  <a:srgbClr val="8dc641"/>
                 </a:solidFill>
                 <a:latin typeface="Arial"/>
                 <a:ea typeface="Arial"/>
               </a:rPr>
               <a:t>Projeto SUS</a:t>
             </a:r>
+            <a:endParaRPr b="0" lang="pt-BR" sz="2000" spc="-1" strike="noStrike">
+              <a:latin typeface="Arial"/>
+            </a:endParaRPr>
           </a:p>
           <a:p>
             <a:pPr algn="ctr">
@@ -2445,10 +2024,7 @@
                 <a:spcPct val="100000"/>
               </a:lnSpc>
             </a:pPr>
-            <a:endParaRPr lang="pt-BR" sz="3200" b="1" strike="noStrike" spc="-1" dirty="0">
-              <a:solidFill>
-                <a:srgbClr val="8DC641"/>
-              </a:solidFill>
+            <a:endParaRPr b="0" lang="pt-BR" sz="2000" spc="-1" strike="noStrike">
               <a:latin typeface="Arial"/>
             </a:endParaRPr>
           </a:p>
@@ -2458,7 +2034,7 @@
                 <a:spcPct val="100000"/>
               </a:lnSpc>
             </a:pPr>
-            <a:endParaRPr lang="pt-BR" sz="3200" b="0" strike="noStrike" spc="-1" dirty="0">
+            <a:endParaRPr b="0" lang="pt-BR" sz="2000" spc="-1" strike="noStrike">
               <a:latin typeface="Arial"/>
             </a:endParaRPr>
           </a:p>
@@ -2466,9 +2042,6 @@
       </p:sp>
     </p:spTree>
   </p:cSld>
-  <p:clrMapOvr>
-    <a:masterClrMapping/>
-  </p:clrMapOvr>
   <p:timing>
     <p:tnLst>
       <p:par>
@@ -2477,14 +2050,14 @@
             <p:seq>
               <p:cTn id="2" dur="indefinite" nodeType="mainSeq"/>
               <p:prevCondLst>
-                <p:cond evt="onPrev" delay="0">
+                <p:cond delay="0" evt="onPrev">
                   <p:tgtEl>
                     <p:sldTgt/>
                   </p:tgtEl>
                 </p:cond>
               </p:prevCondLst>
               <p:nextCondLst>
-                <p:cond evt="onNext" delay="0">
+                <p:cond delay="0" evt="onNext">
                   <p:tgtEl>
                     <p:sldTgt/>
                   </p:tgtEl>
@@ -2500,14 +2073,13 @@
 </file>
 
 <file path=ppt/slides/slide2.xml><?xml version="1.0" encoding="utf-8"?>
-<p:sld xmlns:a="http://schemas.openxmlformats.org/drawingml/2006/main" xmlns:r="http://schemas.openxmlformats.org/officeDocument/2006/relationships" xmlns:p="http://schemas.openxmlformats.org/presentationml/2006/main">
+<p:sld xmlns:a="http://schemas.openxmlformats.org/drawingml/2006/main" xmlns:p="http://schemas.openxmlformats.org/presentationml/2006/main" xmlns:r="http://schemas.openxmlformats.org/officeDocument/2006/relationships" xmlns:p14="http://schemas.microsoft.com/office/powerpoint/2010/main" xmlns:p15="http://schemas.microsoft.com/office/powerpoint/2012/main" xmlns:mc="http://schemas.openxmlformats.org/markup-compatibility/2006">
   <p:cSld>
     <p:bg>
       <p:bgPr>
         <a:solidFill>
-          <a:srgbClr val="FFFFFF"/>
+          <a:srgbClr val="ffffff"/>
         </a:solidFill>
-        <a:effectLst/>
       </p:bgPr>
     </p:bg>
     <p:spTree>
@@ -2526,48 +2098,42 @@
       </p:grpSpPr>
       <p:sp>
         <p:nvSpPr>
-          <p:cNvPr id="38" name="CustomShape 1"/>
+          <p:cNvPr id="43" name="CustomShape 1"/>
           <p:cNvSpPr/>
           <p:nvPr/>
         </p:nvSpPr>
         <p:spPr>
           <a:xfrm>
             <a:off x="0" y="0"/>
-            <a:ext cx="12191040" cy="1585440"/>
+            <a:ext cx="12190680" cy="1585080"/>
           </a:xfrm>
           <a:prstGeom prst="rect">
             <a:avLst/>
           </a:prstGeom>
           <a:solidFill>
-            <a:srgbClr val="347C36"/>
+            <a:srgbClr val="347c36"/>
           </a:solidFill>
           <a:ln>
             <a:noFill/>
           </a:ln>
         </p:spPr>
         <p:style>
-          <a:lnRef idx="0">
-            <a:scrgbClr r="0" g="0" b="0"/>
-          </a:lnRef>
-          <a:fillRef idx="0">
-            <a:scrgbClr r="0" g="0" b="0"/>
-          </a:fillRef>
-          <a:effectRef idx="0">
-            <a:scrgbClr r="0" g="0" b="0"/>
-          </a:effectRef>
+          <a:lnRef idx="0"/>
+          <a:fillRef idx="0"/>
+          <a:effectRef idx="0"/>
           <a:fontRef idx="minor"/>
         </p:style>
       </p:sp>
       <p:sp>
         <p:nvSpPr>
-          <p:cNvPr id="40" name="CustomShape 2"/>
+          <p:cNvPr id="44" name="CustomShape 2"/>
           <p:cNvSpPr/>
           <p:nvPr/>
         </p:nvSpPr>
         <p:spPr>
           <a:xfrm>
             <a:off x="504000" y="6479280"/>
-            <a:ext cx="11129040" cy="718920"/>
+            <a:ext cx="11128680" cy="718560"/>
           </a:xfrm>
           <a:prstGeom prst="rect">
             <a:avLst/>
@@ -2578,20 +2144,13 @@
           </a:ln>
         </p:spPr>
         <p:style>
-          <a:lnRef idx="0">
-            <a:scrgbClr r="0" g="0" b="0"/>
-          </a:lnRef>
-          <a:fillRef idx="0">
-            <a:scrgbClr r="0" g="0" b="0"/>
-          </a:fillRef>
-          <a:effectRef idx="0">
-            <a:scrgbClr r="0" g="0" b="0"/>
-          </a:effectRef>
+          <a:lnRef idx="0"/>
+          <a:fillRef idx="0"/>
+          <a:effectRef idx="0"/>
           <a:fontRef idx="minor"/>
         </p:style>
         <p:txBody>
-          <a:bodyPr lIns="90000" tIns="45000" rIns="90000" bIns="45000"/>
-          <a:lstStyle/>
+          <a:bodyPr lIns="90000" rIns="90000" tIns="45000" bIns="45000"/>
           <a:p>
             <a:pPr algn="ctr">
               <a:lnSpc>
@@ -2599,16 +2158,26 @@
               </a:lnSpc>
             </a:pPr>
             <a:r>
-              <a:rPr lang="pt-BR" sz="1500" b="1" strike="noStrike" spc="-1" dirty="0">
+              <a:rPr b="1" lang="pt-BR" sz="1500" spc="-1" strike="noStrike">
                 <a:solidFill>
-                  <a:srgbClr val="8DC641"/>
+                  <a:srgbClr val="8dc641"/>
                 </a:solidFill>
                 <a:latin typeface="Arial"/>
                 <a:ea typeface="Arial"/>
               </a:rPr>
-              <a:t> Fabio Vasques, Gieder Loreto</a:t>
+              <a:t> </a:t>
             </a:r>
-            <a:endParaRPr lang="pt-BR" sz="1500" b="0" strike="noStrike" spc="-1" dirty="0">
+            <a:r>
+              <a:rPr b="1" lang="pt-BR" sz="1500" spc="-1" strike="noStrike">
+                <a:solidFill>
+                  <a:srgbClr val="8dc641"/>
+                </a:solidFill>
+                <a:latin typeface="Arial"/>
+                <a:ea typeface="Arial"/>
+              </a:rPr>
+              <a:t>Fabio Vasques, Gieder Loreto</a:t>
+            </a:r>
+            <a:endParaRPr b="0" lang="pt-BR" sz="1500" spc="-1" strike="noStrike">
               <a:latin typeface="Arial"/>
             </a:endParaRPr>
           </a:p>
@@ -2616,7 +2185,30 @@
       </p:sp>
       <p:pic>
         <p:nvPicPr>
-          <p:cNvPr id="41" name="Google Shape;166;p39"/>
+          <p:cNvPr id="45" name="Google Shape;166;p39" descr=""/>
+          <p:cNvPicPr/>
+          <p:nvPr/>
+        </p:nvPicPr>
+        <p:blipFill>
+          <a:blip r:embed="rId1"/>
+          <a:stretch/>
+        </p:blipFill>
+        <p:spPr>
+          <a:xfrm>
+            <a:off x="235080" y="283680"/>
+            <a:ext cx="3999240" cy="1018080"/>
+          </a:xfrm>
+          <a:prstGeom prst="rect">
+            <a:avLst/>
+          </a:prstGeom>
+          <a:ln>
+            <a:noFill/>
+          </a:ln>
+        </p:spPr>
+      </p:pic>
+      <p:pic>
+        <p:nvPicPr>
+          <p:cNvPr id="46" name="Imagem 4" descr=""/>
           <p:cNvPicPr/>
           <p:nvPr/>
         </p:nvPicPr>
@@ -2626,8 +2218,8 @@
         </p:blipFill>
         <p:spPr>
           <a:xfrm>
-            <a:off x="235080" y="283680"/>
-            <a:ext cx="3999600" cy="1018440"/>
+            <a:off x="235080" y="2050200"/>
+            <a:ext cx="11471400" cy="3801240"/>
           </a:xfrm>
           <a:prstGeom prst="rect">
             <a:avLst/>
@@ -2639,54 +2231,18 @@
       </p:pic>
       <p:pic>
         <p:nvPicPr>
-          <p:cNvPr id="5" name="Imagem 4">
-            <a:extLst>
-              <a:ext uri="{FF2B5EF4-FFF2-40B4-BE49-F238E27FC236}">
-                <a16:creationId xmlns:a16="http://schemas.microsoft.com/office/drawing/2014/main" id="{316AAA08-5819-4140-8030-223A15EBA046}"/>
-              </a:ext>
-            </a:extLst>
-          </p:cNvPr>
-          <p:cNvPicPr>
-            <a:picLocks noChangeAspect="1"/>
-          </p:cNvPicPr>
-          <p:nvPr/>
-        </p:nvPicPr>
-        <p:blipFill>
-          <a:blip r:embed="rId3">
-            <a:extLst>
-              <a:ext uri="{28A0092B-C50C-407E-A947-70E740481C1C}">
-                <a14:useLocalDpi xmlns:a14="http://schemas.microsoft.com/office/drawing/2010/main" val="0"/>
-              </a:ext>
-            </a:extLst>
-          </a:blip>
-          <a:stretch>
-            <a:fillRect/>
-          </a:stretch>
-        </p:blipFill>
-        <p:spPr>
-          <a:xfrm>
-            <a:off x="235080" y="2050026"/>
-            <a:ext cx="11471690" cy="3801587"/>
-          </a:xfrm>
-          <a:prstGeom prst="rect">
-            <a:avLst/>
-          </a:prstGeom>
-        </p:spPr>
-      </p:pic>
-      <p:pic>
-        <p:nvPicPr>
-          <p:cNvPr id="39" name="Google Shape;89;p13"/>
+          <p:cNvPr id="47" name="Google Shape;89;p13" descr=""/>
           <p:cNvPicPr/>
           <p:nvPr/>
         </p:nvPicPr>
         <p:blipFill>
-          <a:blip r:embed="rId4"/>
+          <a:blip r:embed="rId3"/>
           <a:stretch/>
         </p:blipFill>
         <p:spPr>
           <a:xfrm>
             <a:off x="10561680" y="0"/>
-            <a:ext cx="1082160" cy="2505960"/>
+            <a:ext cx="1081800" cy="2505600"/>
           </a:xfrm>
           <a:prstGeom prst="rect">
             <a:avLst/>
@@ -2697,31 +2253,23 @@
         </p:spPr>
       </p:pic>
     </p:spTree>
-    <p:extLst>
-      <p:ext uri="{BB962C8B-B14F-4D97-AF65-F5344CB8AC3E}">
-        <p14:creationId xmlns:p14="http://schemas.microsoft.com/office/powerpoint/2010/main" val="2175095202"/>
-      </p:ext>
-    </p:extLst>
   </p:cSld>
-  <p:clrMapOvr>
-    <a:masterClrMapping/>
-  </p:clrMapOvr>
   <p:timing>
     <p:tnLst>
       <p:par>
-        <p:cTn id="1" dur="indefinite" restart="never" nodeType="tmRoot">
+        <p:cTn id="3" dur="indefinite" restart="never" nodeType="tmRoot">
           <p:childTnLst>
             <p:seq>
-              <p:cTn id="2" dur="indefinite" nodeType="mainSeq"/>
+              <p:cTn id="4" dur="indefinite" nodeType="mainSeq"/>
               <p:prevCondLst>
-                <p:cond evt="onPrev" delay="0">
+                <p:cond delay="0" evt="onPrev">
                   <p:tgtEl>
                     <p:sldTgt/>
                   </p:tgtEl>
                 </p:cond>
               </p:prevCondLst>
               <p:nextCondLst>
-                <p:cond evt="onNext" delay="0">
+                <p:cond delay="0" evt="onNext">
                   <p:tgtEl>
                     <p:sldTgt/>
                   </p:tgtEl>
@@ -2737,14 +2285,13 @@
 </file>
 
 <file path=ppt/slides/slide3.xml><?xml version="1.0" encoding="utf-8"?>
-<p:sld xmlns:a="http://schemas.openxmlformats.org/drawingml/2006/main" xmlns:r="http://schemas.openxmlformats.org/officeDocument/2006/relationships" xmlns:p="http://schemas.openxmlformats.org/presentationml/2006/main">
+<p:sld xmlns:a="http://schemas.openxmlformats.org/drawingml/2006/main" xmlns:p="http://schemas.openxmlformats.org/presentationml/2006/main" xmlns:r="http://schemas.openxmlformats.org/officeDocument/2006/relationships" xmlns:p14="http://schemas.microsoft.com/office/powerpoint/2010/main" xmlns:p15="http://schemas.microsoft.com/office/powerpoint/2012/main" xmlns:mc="http://schemas.openxmlformats.org/markup-compatibility/2006">
   <p:cSld>
     <p:bg>
       <p:bgPr>
         <a:solidFill>
-          <a:srgbClr val="FFFFFF"/>
+          <a:srgbClr val="ffffff"/>
         </a:solidFill>
-        <a:effectLst/>
       </p:bgPr>
     </p:bg>
     <p:spTree>
@@ -2763,7 +2310,30 @@
       </p:grpSpPr>
       <p:pic>
         <p:nvPicPr>
-          <p:cNvPr id="39" name="Google Shape;89;p13"/>
+          <p:cNvPr id="48" name="Google Shape;89;p13" descr=""/>
+          <p:cNvPicPr/>
+          <p:nvPr/>
+        </p:nvPicPr>
+        <p:blipFill>
+          <a:blip r:embed="rId1"/>
+          <a:stretch/>
+        </p:blipFill>
+        <p:spPr>
+          <a:xfrm>
+            <a:off x="10561680" y="0"/>
+            <a:ext cx="1081800" cy="2505600"/>
+          </a:xfrm>
+          <a:prstGeom prst="rect">
+            <a:avLst/>
+          </a:prstGeom>
+          <a:ln>
+            <a:noFill/>
+          </a:ln>
+        </p:spPr>
+      </p:pic>
+      <p:pic>
+        <p:nvPicPr>
+          <p:cNvPr id="49" name="Google Shape;166;p39" descr=""/>
           <p:cNvPicPr/>
           <p:nvPr/>
         </p:nvPicPr>
@@ -2773,8 +2343,8 @@
         </p:blipFill>
         <p:spPr>
           <a:xfrm>
-            <a:off x="10561680" y="0"/>
-            <a:ext cx="1082160" cy="2505960"/>
+            <a:off x="235080" y="283680"/>
+            <a:ext cx="3999240" cy="1018080"/>
           </a:xfrm>
           <a:prstGeom prst="rect">
             <a:avLst/>
@@ -2784,9 +2354,58 @@
           </a:ln>
         </p:spPr>
       </p:pic>
+      <p:sp>
+        <p:nvSpPr>
+          <p:cNvPr id="50" name="CustomShape 1"/>
+          <p:cNvSpPr/>
+          <p:nvPr/>
+        </p:nvSpPr>
+        <p:spPr>
+          <a:xfrm rot="16200000">
+            <a:off x="-4418280" y="2725200"/>
+            <a:ext cx="10612080" cy="678240"/>
+          </a:xfrm>
+          <a:prstGeom prst="rect">
+            <a:avLst/>
+          </a:prstGeom>
+          <a:noFill/>
+          <a:ln>
+            <a:noFill/>
+          </a:ln>
+        </p:spPr>
+        <p:style>
+          <a:lnRef idx="0"/>
+          <a:fillRef idx="0"/>
+          <a:effectRef idx="0"/>
+          <a:fontRef idx="minor"/>
+        </p:style>
+        <p:txBody>
+          <a:bodyPr lIns="0" rIns="0" tIns="0" bIns="0" anchor="ctr"/>
+          <a:p>
+            <a:pPr algn="ctr">
+              <a:lnSpc>
+                <a:spcPct val="100000"/>
+              </a:lnSpc>
+            </a:pPr>
+            <a:r>
+              <a:rPr b="1" lang="pt-BR" sz="1800" spc="-1" strike="noStrike">
+                <a:solidFill>
+                  <a:srgbClr val="8dc641"/>
+                </a:solidFill>
+                <a:latin typeface="Arial"/>
+                <a:ea typeface="Arial"/>
+              </a:rPr>
+              <a:t>Diagrama Casos de Uso</a:t>
+            </a:r>
+            <a:endParaRPr b="0" lang="pt-BR" sz="1800" spc="-1" strike="noStrike">
+              <a:latin typeface="Arial"/>
+            </a:endParaRPr>
+          </a:p>
+        </p:txBody>
+      </p:sp>
       <p:pic>
         <p:nvPicPr>
-          <p:cNvPr id="41" name="Google Shape;166;p39"/>
+          <p:cNvPr id="51" name="Imagem 2" descr=""/>
           <p:cNvPicPr/>
           <p:nvPr/>
         </p:nvPicPr>
@@ -2796,8 +2415,8 @@
         </p:blipFill>
         <p:spPr>
           <a:xfrm>
-            <a:off x="235080" y="283680"/>
-            <a:ext cx="3999600" cy="1018440"/>
+            <a:off x="2387880" y="0"/>
+            <a:ext cx="6513840" cy="6857640"/>
           </a:xfrm>
           <a:prstGeom prst="rect">
             <a:avLst/>
@@ -2807,117 +2426,24 @@
           </a:ln>
         </p:spPr>
       </p:pic>
-      <p:sp>
-        <p:nvSpPr>
-          <p:cNvPr id="8" name="TextShape 3">
-            <a:extLst>
-              <a:ext uri="{FF2B5EF4-FFF2-40B4-BE49-F238E27FC236}">
-                <a16:creationId xmlns:a16="http://schemas.microsoft.com/office/drawing/2014/main" id="{C8FE3A03-D40F-4921-8F88-984573198A4D}"/>
-              </a:ext>
-            </a:extLst>
-          </p:cNvPr>
-          <p:cNvSpPr txBox="1"/>
-          <p:nvPr/>
-        </p:nvSpPr>
-        <p:spPr>
-          <a:xfrm rot="16200000">
-            <a:off x="-4418786" y="2724686"/>
-            <a:ext cx="10612440" cy="678548"/>
-          </a:xfrm>
-          <a:prstGeom prst="rect">
-            <a:avLst/>
-          </a:prstGeom>
-          <a:noFill/>
-          <a:ln>
-            <a:noFill/>
-          </a:ln>
-        </p:spPr>
-        <p:txBody>
-          <a:bodyPr lIns="0" tIns="0" rIns="0" bIns="0" anchor="ctr"/>
-          <a:lstStyle/>
-          <a:p>
-            <a:pPr algn="ctr"/>
-            <a:r>
-              <a:rPr lang="pt-BR" sz="1800" b="1" strike="noStrike" spc="-1" dirty="0">
-                <a:solidFill>
-                  <a:srgbClr val="8DC641"/>
-                </a:solidFill>
-                <a:latin typeface="Arial"/>
-                <a:ea typeface="Arial"/>
-              </a:rPr>
-              <a:t>Diagrama Casos de Uso</a:t>
-            </a:r>
-            <a:endParaRPr lang="pt-BR" sz="1800" b="0" strike="noStrike" spc="-1" dirty="0">
-              <a:solidFill>
-                <a:srgbClr val="000000"/>
-              </a:solidFill>
-              <a:latin typeface="Arial"/>
-            </a:endParaRPr>
-          </a:p>
-        </p:txBody>
-      </p:sp>
-      <p:pic>
-        <p:nvPicPr>
-          <p:cNvPr id="3" name="Imagem 2">
-            <a:extLst>
-              <a:ext uri="{FF2B5EF4-FFF2-40B4-BE49-F238E27FC236}">
-                <a16:creationId xmlns:a16="http://schemas.microsoft.com/office/drawing/2014/main" id="{F6BA9E06-720E-40C9-BD6B-89FC60A0DFFA}"/>
-              </a:ext>
-            </a:extLst>
-          </p:cNvPr>
-          <p:cNvPicPr>
-            <a:picLocks noChangeAspect="1"/>
-          </p:cNvPicPr>
-          <p:nvPr/>
-        </p:nvPicPr>
-        <p:blipFill>
-          <a:blip r:embed="rId4">
-            <a:extLst>
-              <a:ext uri="{28A0092B-C50C-407E-A947-70E740481C1C}">
-                <a14:useLocalDpi xmlns:a14="http://schemas.microsoft.com/office/drawing/2010/main" val="0"/>
-              </a:ext>
-            </a:extLst>
-          </a:blip>
-          <a:stretch>
-            <a:fillRect/>
-          </a:stretch>
-        </p:blipFill>
-        <p:spPr>
-          <a:xfrm>
-            <a:off x="2388020" y="0"/>
-            <a:ext cx="6514145" cy="6858000"/>
-          </a:xfrm>
-          <a:prstGeom prst="rect">
-            <a:avLst/>
-          </a:prstGeom>
-        </p:spPr>
-      </p:pic>
     </p:spTree>
-    <p:extLst>
-      <p:ext uri="{BB962C8B-B14F-4D97-AF65-F5344CB8AC3E}">
-        <p14:creationId xmlns:p14="http://schemas.microsoft.com/office/powerpoint/2010/main" val="2097499373"/>
-      </p:ext>
-    </p:extLst>
   </p:cSld>
-  <p:clrMapOvr>
-    <a:masterClrMapping/>
-  </p:clrMapOvr>
   <p:timing>
     <p:tnLst>
       <p:par>
-        <p:cTn id="1" dur="indefinite" restart="never" nodeType="tmRoot">
+        <p:cTn id="5" dur="indefinite" restart="never" nodeType="tmRoot">
           <p:childTnLst>
             <p:seq>
-              <p:cTn id="2" dur="indefinite" nodeType="mainSeq"/>
+              <p:cTn id="6" dur="indefinite" nodeType="mainSeq"/>
               <p:prevCondLst>
-                <p:cond evt="onPrev" delay="0">
+                <p:cond delay="0" evt="onPrev">
                   <p:tgtEl>
                     <p:sldTgt/>
                   </p:tgtEl>
                 </p:cond>
               </p:prevCondLst>
               <p:nextCondLst>
-                <p:cond evt="onNext" delay="0">
+                <p:cond delay="0" evt="onNext">
                   <p:tgtEl>
                     <p:sldTgt/>
                   </p:tgtEl>
@@ -2933,14 +2459,13 @@
 </file>
 
 <file path=ppt/slides/slide4.xml><?xml version="1.0" encoding="utf-8"?>
-<p:sld xmlns:a="http://schemas.openxmlformats.org/drawingml/2006/main" xmlns:r="http://schemas.openxmlformats.org/officeDocument/2006/relationships" xmlns:p="http://schemas.openxmlformats.org/presentationml/2006/main">
+<p:sld xmlns:a="http://schemas.openxmlformats.org/drawingml/2006/main" xmlns:p="http://schemas.openxmlformats.org/presentationml/2006/main" xmlns:r="http://schemas.openxmlformats.org/officeDocument/2006/relationships" xmlns:p14="http://schemas.microsoft.com/office/powerpoint/2010/main" xmlns:p15="http://schemas.microsoft.com/office/powerpoint/2012/main" xmlns:mc="http://schemas.openxmlformats.org/markup-compatibility/2006">
   <p:cSld>
     <p:bg>
       <p:bgPr>
         <a:solidFill>
-          <a:srgbClr val="FFFFFF"/>
+          <a:srgbClr val="ffffff"/>
         </a:solidFill>
-        <a:effectLst/>
       </p:bgPr>
     </p:bg>
     <p:spTree>
@@ -2959,7 +2484,89 @@
       </p:grpSpPr>
       <p:pic>
         <p:nvPicPr>
-          <p:cNvPr id="45" name="Google Shape;89;p13"/>
+          <p:cNvPr id="52" name="Google Shape;89;p13" descr=""/>
+          <p:cNvPicPr/>
+          <p:nvPr/>
+        </p:nvPicPr>
+        <p:blipFill>
+          <a:blip r:embed="rId1"/>
+          <a:stretch/>
+        </p:blipFill>
+        <p:spPr>
+          <a:xfrm>
+            <a:off x="10561680" y="0"/>
+            <a:ext cx="1081800" cy="2505600"/>
+          </a:xfrm>
+          <a:prstGeom prst="rect">
+            <a:avLst/>
+          </a:prstGeom>
+          <a:ln>
+            <a:noFill/>
+          </a:ln>
+        </p:spPr>
+      </p:pic>
+      <p:sp>
+        <p:nvSpPr>
+          <p:cNvPr id="53" name="CustomShape 1"/>
+          <p:cNvSpPr/>
+          <p:nvPr/>
+        </p:nvSpPr>
+        <p:spPr>
+          <a:xfrm>
+            <a:off x="504000" y="6479280"/>
+            <a:ext cx="11128680" cy="718560"/>
+          </a:xfrm>
+          <a:prstGeom prst="rect">
+            <a:avLst/>
+          </a:prstGeom>
+          <a:noFill/>
+          <a:ln>
+            <a:noFill/>
+          </a:ln>
+        </p:spPr>
+        <p:style>
+          <a:lnRef idx="0"/>
+          <a:fillRef idx="0"/>
+          <a:effectRef idx="0"/>
+          <a:fontRef idx="minor"/>
+        </p:style>
+        <p:txBody>
+          <a:bodyPr lIns="90000" rIns="90000" tIns="45000" bIns="45000"/>
+          <a:p>
+            <a:pPr algn="ctr">
+              <a:lnSpc>
+                <a:spcPct val="100000"/>
+              </a:lnSpc>
+            </a:pPr>
+            <a:r>
+              <a:rPr b="1" lang="pt-BR" sz="1500" spc="-1" strike="noStrike">
+                <a:solidFill>
+                  <a:srgbClr val="8dc641"/>
+                </a:solidFill>
+                <a:latin typeface="Arial"/>
+                <a:ea typeface="Arial"/>
+              </a:rPr>
+              <a:t> </a:t>
+            </a:r>
+            <a:r>
+              <a:rPr b="1" lang="pt-BR" sz="1500" spc="-1" strike="noStrike">
+                <a:solidFill>
+                  <a:srgbClr val="8dc641"/>
+                </a:solidFill>
+                <a:latin typeface="Arial"/>
+                <a:ea typeface="Arial"/>
+              </a:rPr>
+              <a:t>Fabio Vasques, Gieder Loreto</a:t>
+            </a:r>
+            <a:endParaRPr b="0" lang="pt-BR" sz="1500" spc="-1" strike="noStrike">
+              <a:latin typeface="Arial"/>
+            </a:endParaRPr>
+          </a:p>
+        </p:txBody>
+      </p:sp>
+      <p:pic>
+        <p:nvPicPr>
+          <p:cNvPr id="54" name="Google Shape;166;p39" descr=""/>
           <p:cNvPicPr/>
           <p:nvPr/>
         </p:nvPicPr>
@@ -2969,8 +2576,8 @@
         </p:blipFill>
         <p:spPr>
           <a:xfrm>
-            <a:off x="10561680" y="0"/>
-            <a:ext cx="1082160" cy="2505960"/>
+            <a:off x="235080" y="283680"/>
+            <a:ext cx="3999240" cy="1018080"/>
           </a:xfrm>
           <a:prstGeom prst="rect">
             <a:avLst/>
@@ -2982,14 +2589,14 @@
       </p:pic>
       <p:sp>
         <p:nvSpPr>
-          <p:cNvPr id="46" name="CustomShape 2"/>
+          <p:cNvPr id="55" name="CustomShape 2"/>
           <p:cNvSpPr/>
           <p:nvPr/>
         </p:nvSpPr>
         <p:spPr>
           <a:xfrm>
-            <a:off x="504000" y="6479280"/>
-            <a:ext cx="11129040" cy="718920"/>
+            <a:off x="504000" y="73800"/>
+            <a:ext cx="10612080" cy="1007640"/>
           </a:xfrm>
           <a:prstGeom prst="rect">
             <a:avLst/>
@@ -3000,20 +2607,13 @@
           </a:ln>
         </p:spPr>
         <p:style>
-          <a:lnRef idx="0">
-            <a:scrgbClr r="0" g="0" b="0"/>
-          </a:lnRef>
-          <a:fillRef idx="0">
-            <a:scrgbClr r="0" g="0" b="0"/>
-          </a:fillRef>
-          <a:effectRef idx="0">
-            <a:scrgbClr r="0" g="0" b="0"/>
-          </a:effectRef>
+          <a:lnRef idx="0"/>
+          <a:fillRef idx="0"/>
+          <a:effectRef idx="0"/>
           <a:fontRef idx="minor"/>
         </p:style>
         <p:txBody>
-          <a:bodyPr lIns="90000" tIns="45000" rIns="90000" bIns="45000"/>
-          <a:lstStyle/>
+          <a:bodyPr lIns="0" rIns="0" tIns="0" bIns="0" anchor="ctr"/>
           <a:p>
             <a:pPr algn="ctr">
               <a:lnSpc>
@@ -3021,16 +2621,16 @@
               </a:lnSpc>
             </a:pPr>
             <a:r>
-              <a:rPr lang="pt-BR" sz="1500" b="1" strike="noStrike" spc="-1">
+              <a:rPr b="1" lang="pt-BR" sz="1800" spc="-1" strike="noStrike">
                 <a:solidFill>
-                  <a:srgbClr val="8DC641"/>
+                  <a:srgbClr val="8dc641"/>
                 </a:solidFill>
                 <a:latin typeface="Arial"/>
                 <a:ea typeface="Arial"/>
               </a:rPr>
-              <a:t> Fabio Vasques, Gieder Loreto</a:t>
+              <a:t>Diagrama de Classes</a:t>
             </a:r>
-            <a:endParaRPr lang="pt-BR" sz="1500" b="0" strike="noStrike" spc="-1">
+            <a:endParaRPr b="0" lang="pt-BR" sz="1800" spc="-1" strike="noStrike">
               <a:latin typeface="Arial"/>
             </a:endParaRPr>
           </a:p>
@@ -3038,7 +2638,7 @@
       </p:sp>
       <p:pic>
         <p:nvPicPr>
-          <p:cNvPr id="47" name="Google Shape;166;p39"/>
+          <p:cNvPr id="56" name="" descr=""/>
           <p:cNvPicPr/>
           <p:nvPr/>
         </p:nvPicPr>
@@ -3048,8 +2648,8 @@
         </p:blipFill>
         <p:spPr>
           <a:xfrm>
-            <a:off x="235080" y="283680"/>
-            <a:ext cx="3999600" cy="1018440"/>
+            <a:off x="2134800" y="212760"/>
+            <a:ext cx="8002800" cy="6857640"/>
           </a:xfrm>
           <a:prstGeom prst="rect">
             <a:avLst/>
@@ -3059,93 +2659,24 @@
           </a:ln>
         </p:spPr>
       </p:pic>
-      <p:sp>
-        <p:nvSpPr>
-          <p:cNvPr id="48" name="TextShape 3"/>
-          <p:cNvSpPr txBox="1"/>
-          <p:nvPr/>
-        </p:nvSpPr>
-        <p:spPr>
-          <a:xfrm>
-            <a:off x="504000" y="73620"/>
-            <a:ext cx="10612440" cy="1008000"/>
-          </a:xfrm>
-          <a:prstGeom prst="rect">
-            <a:avLst/>
-          </a:prstGeom>
-          <a:noFill/>
-          <a:ln>
-            <a:noFill/>
-          </a:ln>
-        </p:spPr>
-        <p:txBody>
-          <a:bodyPr lIns="0" tIns="0" rIns="0" bIns="0" anchor="ctr"/>
-          <a:lstStyle/>
-          <a:p>
-            <a:pPr algn="ctr"/>
-            <a:r>
-              <a:rPr lang="pt-BR" sz="1800" b="1" strike="noStrike" spc="-1" dirty="0">
-                <a:solidFill>
-                  <a:srgbClr val="8DC641"/>
-                </a:solidFill>
-                <a:latin typeface="Arial"/>
-                <a:ea typeface="Arial"/>
-              </a:rPr>
-              <a:t>Diagrama de Classes</a:t>
-            </a:r>
-            <a:endParaRPr lang="pt-BR" sz="1800" b="0" strike="noStrike" spc="-1" dirty="0">
-              <a:solidFill>
-                <a:srgbClr val="000000"/>
-              </a:solidFill>
-              <a:latin typeface="Arial"/>
-            </a:endParaRPr>
-          </a:p>
-        </p:txBody>
-      </p:sp>
-      <p:pic>
-        <p:nvPicPr>
-          <p:cNvPr id="49" name="Imagem 48"/>
-          <p:cNvPicPr/>
-          <p:nvPr/>
-        </p:nvPicPr>
-        <p:blipFill>
-          <a:blip r:embed="rId4"/>
-          <a:stretch/>
-        </p:blipFill>
-        <p:spPr>
-          <a:xfrm>
-            <a:off x="881002" y="708045"/>
-            <a:ext cx="9303677" cy="6076335"/>
-          </a:xfrm>
-          <a:prstGeom prst="rect">
-            <a:avLst/>
-          </a:prstGeom>
-          <a:ln>
-            <a:noFill/>
-          </a:ln>
-        </p:spPr>
-      </p:pic>
     </p:spTree>
   </p:cSld>
-  <p:clrMapOvr>
-    <a:masterClrMapping/>
-  </p:clrMapOvr>
   <p:timing>
     <p:tnLst>
       <p:par>
-        <p:cTn id="1" dur="indefinite" restart="never" nodeType="tmRoot">
+        <p:cTn id="7" dur="indefinite" restart="never" nodeType="tmRoot">
           <p:childTnLst>
             <p:seq>
-              <p:cTn id="2" dur="indefinite" nodeType="mainSeq"/>
+              <p:cTn id="8" dur="indefinite" nodeType="mainSeq"/>
               <p:prevCondLst>
-                <p:cond evt="onPrev" delay="0">
+                <p:cond delay="0" evt="onPrev">
                   <p:tgtEl>
                     <p:sldTgt/>
                   </p:tgtEl>
                 </p:cond>
               </p:prevCondLst>
               <p:nextCondLst>
-                <p:cond evt="onNext" delay="0">
+                <p:cond delay="0" evt="onNext">
                   <p:tgtEl>
                     <p:sldTgt/>
                   </p:tgtEl>
@@ -3161,14 +2692,13 @@
 </file>
 
 <file path=ppt/slides/slide5.xml><?xml version="1.0" encoding="utf-8"?>
-<p:sld xmlns:a="http://schemas.openxmlformats.org/drawingml/2006/main" xmlns:r="http://schemas.openxmlformats.org/officeDocument/2006/relationships" xmlns:p="http://schemas.openxmlformats.org/presentationml/2006/main">
+<p:sld xmlns:a="http://schemas.openxmlformats.org/drawingml/2006/main" xmlns:p="http://schemas.openxmlformats.org/presentationml/2006/main" xmlns:r="http://schemas.openxmlformats.org/officeDocument/2006/relationships" xmlns:p14="http://schemas.microsoft.com/office/powerpoint/2010/main" xmlns:p15="http://schemas.microsoft.com/office/powerpoint/2012/main" xmlns:mc="http://schemas.openxmlformats.org/markup-compatibility/2006">
   <p:cSld>
     <p:bg>
       <p:bgPr>
         <a:solidFill>
-          <a:srgbClr val="FFFFFF"/>
+          <a:srgbClr val="ffffff"/>
         </a:solidFill>
-        <a:effectLst/>
       </p:bgPr>
     </p:bg>
     <p:spTree>
@@ -3187,7 +2717,89 @@
       </p:grpSpPr>
       <p:pic>
         <p:nvPicPr>
-          <p:cNvPr id="51" name="Google Shape;89;p13"/>
+          <p:cNvPr id="57" name="Google Shape;89;p13" descr=""/>
+          <p:cNvPicPr/>
+          <p:nvPr/>
+        </p:nvPicPr>
+        <p:blipFill>
+          <a:blip r:embed="rId1"/>
+          <a:stretch/>
+        </p:blipFill>
+        <p:spPr>
+          <a:xfrm>
+            <a:off x="10561680" y="0"/>
+            <a:ext cx="1081800" cy="2505600"/>
+          </a:xfrm>
+          <a:prstGeom prst="rect">
+            <a:avLst/>
+          </a:prstGeom>
+          <a:ln>
+            <a:noFill/>
+          </a:ln>
+        </p:spPr>
+      </p:pic>
+      <p:sp>
+        <p:nvSpPr>
+          <p:cNvPr id="58" name="CustomShape 1"/>
+          <p:cNvSpPr/>
+          <p:nvPr/>
+        </p:nvSpPr>
+        <p:spPr>
+          <a:xfrm>
+            <a:off x="504000" y="6479280"/>
+            <a:ext cx="11128680" cy="718560"/>
+          </a:xfrm>
+          <a:prstGeom prst="rect">
+            <a:avLst/>
+          </a:prstGeom>
+          <a:noFill/>
+          <a:ln>
+            <a:noFill/>
+          </a:ln>
+        </p:spPr>
+        <p:style>
+          <a:lnRef idx="0"/>
+          <a:fillRef idx="0"/>
+          <a:effectRef idx="0"/>
+          <a:fontRef idx="minor"/>
+        </p:style>
+        <p:txBody>
+          <a:bodyPr lIns="90000" rIns="90000" tIns="45000" bIns="45000"/>
+          <a:p>
+            <a:pPr algn="ctr">
+              <a:lnSpc>
+                <a:spcPct val="100000"/>
+              </a:lnSpc>
+            </a:pPr>
+            <a:r>
+              <a:rPr b="1" lang="pt-BR" sz="1500" spc="-1" strike="noStrike">
+                <a:solidFill>
+                  <a:srgbClr val="8dc641"/>
+                </a:solidFill>
+                <a:latin typeface="Arial"/>
+                <a:ea typeface="Arial"/>
+              </a:rPr>
+              <a:t> </a:t>
+            </a:r>
+            <a:r>
+              <a:rPr b="1" lang="pt-BR" sz="1500" spc="-1" strike="noStrike">
+                <a:solidFill>
+                  <a:srgbClr val="8dc641"/>
+                </a:solidFill>
+                <a:latin typeface="Arial"/>
+                <a:ea typeface="Arial"/>
+              </a:rPr>
+              <a:t>Fabio Vasques, Gieder Loreto</a:t>
+            </a:r>
+            <a:endParaRPr b="0" lang="pt-BR" sz="1500" spc="-1" strike="noStrike">
+              <a:latin typeface="Arial"/>
+            </a:endParaRPr>
+          </a:p>
+        </p:txBody>
+      </p:sp>
+      <p:pic>
+        <p:nvPicPr>
+          <p:cNvPr id="59" name="Google Shape;166;p39" descr=""/>
           <p:cNvPicPr/>
           <p:nvPr/>
         </p:nvPicPr>
@@ -3197,8 +2809,8 @@
         </p:blipFill>
         <p:spPr>
           <a:xfrm>
-            <a:off x="10561680" y="0"/>
-            <a:ext cx="1082160" cy="2505960"/>
+            <a:off x="235080" y="283680"/>
+            <a:ext cx="3999240" cy="1018080"/>
           </a:xfrm>
           <a:prstGeom prst="rect">
             <a:avLst/>
@@ -3210,14 +2822,14 @@
       </p:pic>
       <p:sp>
         <p:nvSpPr>
-          <p:cNvPr id="52" name="CustomShape 2"/>
+          <p:cNvPr id="60" name="CustomShape 2"/>
           <p:cNvSpPr/>
           <p:nvPr/>
         </p:nvSpPr>
         <p:spPr>
           <a:xfrm>
-            <a:off x="504000" y="6479280"/>
-            <a:ext cx="11129040" cy="718920"/>
+            <a:off x="490320" y="-215280"/>
+            <a:ext cx="10612080" cy="1007640"/>
           </a:xfrm>
           <a:prstGeom prst="rect">
             <a:avLst/>
@@ -3228,20 +2840,13 @@
           </a:ln>
         </p:spPr>
         <p:style>
-          <a:lnRef idx="0">
-            <a:scrgbClr r="0" g="0" b="0"/>
-          </a:lnRef>
-          <a:fillRef idx="0">
-            <a:scrgbClr r="0" g="0" b="0"/>
-          </a:fillRef>
-          <a:effectRef idx="0">
-            <a:scrgbClr r="0" g="0" b="0"/>
-          </a:effectRef>
+          <a:lnRef idx="0"/>
+          <a:fillRef idx="0"/>
+          <a:effectRef idx="0"/>
           <a:fontRef idx="minor"/>
         </p:style>
         <p:txBody>
-          <a:bodyPr lIns="90000" tIns="45000" rIns="90000" bIns="45000"/>
-          <a:lstStyle/>
+          <a:bodyPr lIns="0" rIns="0" tIns="0" bIns="0" anchor="ctr"/>
           <a:p>
             <a:pPr algn="ctr">
               <a:lnSpc>
@@ -3249,16 +2854,16 @@
               </a:lnSpc>
             </a:pPr>
             <a:r>
-              <a:rPr lang="pt-BR" sz="1500" b="1" strike="noStrike" spc="-1">
+              <a:rPr b="1" lang="pt-BR" sz="1800" spc="-1" strike="noStrike">
                 <a:solidFill>
-                  <a:srgbClr val="8DC641"/>
+                  <a:srgbClr val="8dc641"/>
                 </a:solidFill>
                 <a:latin typeface="Arial"/>
                 <a:ea typeface="Arial"/>
               </a:rPr>
-              <a:t> Fabio Vasques, Gieder Loreto</a:t>
+              <a:t>Modelo Lógico</a:t>
             </a:r>
-            <a:endParaRPr lang="pt-BR" sz="1500" b="0" strike="noStrike" spc="-1">
+            <a:endParaRPr b="0" lang="pt-BR" sz="1800" spc="-1" strike="noStrike">
               <a:latin typeface="Arial"/>
             </a:endParaRPr>
           </a:p>
@@ -3266,7 +2871,7 @@
       </p:sp>
       <p:pic>
         <p:nvPicPr>
-          <p:cNvPr id="53" name="Google Shape;166;p39"/>
+          <p:cNvPr id="61" name="Imagem 54" descr=""/>
           <p:cNvPicPr/>
           <p:nvPr/>
         </p:nvPicPr>
@@ -3276,8 +2881,8 @@
         </p:blipFill>
         <p:spPr>
           <a:xfrm>
-            <a:off x="235080" y="283680"/>
-            <a:ext cx="3999600" cy="1018440"/>
+            <a:off x="235080" y="575280"/>
+            <a:ext cx="10132560" cy="6282360"/>
           </a:xfrm>
           <a:prstGeom prst="rect">
             <a:avLst/>
@@ -3287,93 +2892,24 @@
           </a:ln>
         </p:spPr>
       </p:pic>
-      <p:sp>
-        <p:nvSpPr>
-          <p:cNvPr id="54" name="TextShape 3"/>
-          <p:cNvSpPr txBox="1"/>
-          <p:nvPr/>
-        </p:nvSpPr>
-        <p:spPr>
-          <a:xfrm>
-            <a:off x="490320" y="-215100"/>
-            <a:ext cx="10612440" cy="1008000"/>
-          </a:xfrm>
-          <a:prstGeom prst="rect">
-            <a:avLst/>
-          </a:prstGeom>
-          <a:noFill/>
-          <a:ln>
-            <a:noFill/>
-          </a:ln>
-        </p:spPr>
-        <p:txBody>
-          <a:bodyPr lIns="0" tIns="0" rIns="0" bIns="0" anchor="ctr"/>
-          <a:lstStyle/>
-          <a:p>
-            <a:pPr algn="ctr"/>
-            <a:r>
-              <a:rPr lang="pt-BR" sz="1800" b="1" strike="noStrike" spc="-1" dirty="0">
-                <a:solidFill>
-                  <a:srgbClr val="8DC641"/>
-                </a:solidFill>
-                <a:latin typeface="Arial"/>
-                <a:ea typeface="Arial"/>
-              </a:rPr>
-              <a:t>Modelo Lógico</a:t>
-            </a:r>
-            <a:endParaRPr lang="pt-BR" sz="1800" b="0" strike="noStrike" spc="-1" dirty="0">
-              <a:solidFill>
-                <a:srgbClr val="000000"/>
-              </a:solidFill>
-              <a:latin typeface="Arial"/>
-            </a:endParaRPr>
-          </a:p>
-        </p:txBody>
-      </p:sp>
-      <p:pic>
-        <p:nvPicPr>
-          <p:cNvPr id="55" name="Imagem 54"/>
-          <p:cNvPicPr/>
-          <p:nvPr/>
-        </p:nvPicPr>
-        <p:blipFill>
-          <a:blip r:embed="rId4"/>
-          <a:stretch/>
-        </p:blipFill>
-        <p:spPr>
-          <a:xfrm>
-            <a:off x="235080" y="575187"/>
-            <a:ext cx="10133036" cy="6282813"/>
-          </a:xfrm>
-          <a:prstGeom prst="rect">
-            <a:avLst/>
-          </a:prstGeom>
-          <a:ln>
-            <a:noFill/>
-          </a:ln>
-        </p:spPr>
-      </p:pic>
     </p:spTree>
   </p:cSld>
-  <p:clrMapOvr>
-    <a:masterClrMapping/>
-  </p:clrMapOvr>
   <p:timing>
     <p:tnLst>
       <p:par>
-        <p:cTn id="1" dur="indefinite" restart="never" nodeType="tmRoot">
+        <p:cTn id="9" dur="indefinite" restart="never" nodeType="tmRoot">
           <p:childTnLst>
             <p:seq>
-              <p:cTn id="2" dur="indefinite" nodeType="mainSeq"/>
+              <p:cTn id="10" dur="indefinite" nodeType="mainSeq"/>
               <p:prevCondLst>
-                <p:cond evt="onPrev" delay="0">
+                <p:cond delay="0" evt="onPrev">
                   <p:tgtEl>
                     <p:sldTgt/>
                   </p:tgtEl>
                 </p:cond>
               </p:prevCondLst>
               <p:nextCondLst>
-                <p:cond evt="onNext" delay="0">
+                <p:cond delay="0" evt="onNext">
                   <p:tgtEl>
                     <p:sldTgt/>
                   </p:tgtEl>
@@ -3399,22 +2935,22 @@
         <a:sysClr val="window" lastClr="FFFFFF"/>
       </a:lt1>
       <a:dk2>
-        <a:srgbClr val="6A7887"/>
+        <a:srgbClr val="6a7887"/>
       </a:dk2>
       <a:lt2>
-        <a:srgbClr val="E7E6E6"/>
+        <a:srgbClr val="e7e6e6"/>
       </a:lt2>
       <a:accent1>
-        <a:srgbClr val="1D9A78"/>
+        <a:srgbClr val="1d9a78"/>
       </a:accent1>
       <a:accent2>
-        <a:srgbClr val="7BC68E"/>
+        <a:srgbClr val="7bc68e"/>
       </a:accent2>
       <a:accent3>
-        <a:srgbClr val="3F3F3F"/>
+        <a:srgbClr val="3f3f3f"/>
       </a:accent3>
       <a:accent4>
-        <a:srgbClr val="3F3F3F"/>
+        <a:srgbClr val="3f3f3f"/>
       </a:accent4>
       <a:accent5>
         <a:srgbClr val="595959"/>
@@ -3608,7 +3144,5 @@
       </a:bgFillStyleLst>
     </a:fmtScheme>
   </a:themeElements>
-  <a:objectDefaults/>
-  <a:extraClrSchemeLst/>
 </a:theme>
 </file>
</xml_diff>

<commit_message>
segunda apresentacao sem modelos logicos
</commit_message>
<xml_diff>
--- a/segunda entrega/segunda entrega.pptx
+++ b/segunda entrega/segunda entrega.pptx
@@ -10,12 +10,6 @@
     <p:sldId id="265" r:id="rId4"/>
     <p:sldId id="257" r:id="rId5"/>
     <p:sldId id="258" r:id="rId6"/>
-    <p:sldId id="259" r:id="rId7"/>
-    <p:sldId id="260" r:id="rId8"/>
-    <p:sldId id="261" r:id="rId9"/>
-    <p:sldId id="262" r:id="rId10"/>
-    <p:sldId id="263" r:id="rId11"/>
-    <p:sldId id="264" r:id="rId12"/>
   </p:sldIdLst>
   <p:sldSz cx="12192000" cy="6858000"/>
   <p:notesSz cx="7559675" cy="10691813"/>
@@ -2505,677 +2499,6 @@
 </p:sld>
 </file>
 
-<file path=ppt/slides/slide10.xml><?xml version="1.0" encoding="utf-8"?>
-<p:sld xmlns:a="http://schemas.openxmlformats.org/drawingml/2006/main" xmlns:r="http://schemas.openxmlformats.org/officeDocument/2006/relationships" xmlns:p="http://schemas.openxmlformats.org/presentationml/2006/main">
-  <p:cSld>
-    <p:bg>
-      <p:bgPr>
-        <a:solidFill>
-          <a:srgbClr val="FFFFFF"/>
-        </a:solidFill>
-        <a:effectLst/>
-      </p:bgPr>
-    </p:bg>
-    <p:spTree>
-      <p:nvGrpSpPr>
-        <p:cNvPr id="1" name=""/>
-        <p:cNvGrpSpPr/>
-        <p:nvPr/>
-      </p:nvGrpSpPr>
-      <p:grpSpPr>
-        <a:xfrm>
-          <a:off x="0" y="0"/>
-          <a:ext cx="0" cy="0"/>
-          <a:chOff x="0" y="0"/>
-          <a:chExt cx="0" cy="0"/>
-        </a:xfrm>
-      </p:grpSpPr>
-      <p:sp>
-        <p:nvSpPr>
-          <p:cNvPr id="80" name="CustomShape 1"/>
-          <p:cNvSpPr/>
-          <p:nvPr/>
-        </p:nvSpPr>
-        <p:spPr>
-          <a:xfrm>
-            <a:off x="0" y="0"/>
-            <a:ext cx="12191040" cy="1585440"/>
-          </a:xfrm>
-          <a:prstGeom prst="rect">
-            <a:avLst/>
-          </a:prstGeom>
-          <a:solidFill>
-            <a:srgbClr val="347C36"/>
-          </a:solidFill>
-          <a:ln>
-            <a:noFill/>
-          </a:ln>
-        </p:spPr>
-        <p:style>
-          <a:lnRef idx="0">
-            <a:scrgbClr r="0" g="0" b="0"/>
-          </a:lnRef>
-          <a:fillRef idx="0">
-            <a:scrgbClr r="0" g="0" b="0"/>
-          </a:fillRef>
-          <a:effectRef idx="0">
-            <a:scrgbClr r="0" g="0" b="0"/>
-          </a:effectRef>
-          <a:fontRef idx="minor"/>
-        </p:style>
-      </p:sp>
-      <p:pic>
-        <p:nvPicPr>
-          <p:cNvPr id="81" name="Google Shape;89;p13"/>
-          <p:cNvPicPr/>
-          <p:nvPr/>
-        </p:nvPicPr>
-        <p:blipFill>
-          <a:blip r:embed="rId2"/>
-          <a:stretch/>
-        </p:blipFill>
-        <p:spPr>
-          <a:xfrm>
-            <a:off x="10561680" y="0"/>
-            <a:ext cx="1082160" cy="2505960"/>
-          </a:xfrm>
-          <a:prstGeom prst="rect">
-            <a:avLst/>
-          </a:prstGeom>
-          <a:ln>
-            <a:noFill/>
-          </a:ln>
-        </p:spPr>
-      </p:pic>
-      <p:sp>
-        <p:nvSpPr>
-          <p:cNvPr id="82" name="CustomShape 2"/>
-          <p:cNvSpPr/>
-          <p:nvPr/>
-        </p:nvSpPr>
-        <p:spPr>
-          <a:xfrm>
-            <a:off x="504000" y="6479280"/>
-            <a:ext cx="11129040" cy="718920"/>
-          </a:xfrm>
-          <a:prstGeom prst="rect">
-            <a:avLst/>
-          </a:prstGeom>
-          <a:noFill/>
-          <a:ln>
-            <a:noFill/>
-          </a:ln>
-        </p:spPr>
-        <p:style>
-          <a:lnRef idx="0">
-            <a:scrgbClr r="0" g="0" b="0"/>
-          </a:lnRef>
-          <a:fillRef idx="0">
-            <a:scrgbClr r="0" g="0" b="0"/>
-          </a:fillRef>
-          <a:effectRef idx="0">
-            <a:scrgbClr r="0" g="0" b="0"/>
-          </a:effectRef>
-          <a:fontRef idx="minor"/>
-        </p:style>
-        <p:txBody>
-          <a:bodyPr lIns="90000" tIns="45000" rIns="90000" bIns="45000"/>
-          <a:lstStyle/>
-          <a:p>
-            <a:pPr algn="ctr">
-              <a:lnSpc>
-                <a:spcPct val="100000"/>
-              </a:lnSpc>
-            </a:pPr>
-            <a:r>
-              <a:rPr lang="pt-BR" sz="1500" b="1" strike="noStrike" spc="-1">
-                <a:solidFill>
-                  <a:srgbClr val="8DC641"/>
-                </a:solidFill>
-                <a:latin typeface="Arial"/>
-                <a:ea typeface="Arial"/>
-              </a:rPr>
-              <a:t> Fabio Vasques, Gieder Loreto</a:t>
-            </a:r>
-            <a:endParaRPr lang="pt-BR" sz="1500" b="0" strike="noStrike" spc="-1">
-              <a:latin typeface="Arial"/>
-            </a:endParaRPr>
-          </a:p>
-        </p:txBody>
-      </p:sp>
-      <p:pic>
-        <p:nvPicPr>
-          <p:cNvPr id="83" name="Google Shape;166;p39"/>
-          <p:cNvPicPr/>
-          <p:nvPr/>
-        </p:nvPicPr>
-        <p:blipFill>
-          <a:blip r:embed="rId3"/>
-          <a:stretch/>
-        </p:blipFill>
-        <p:spPr>
-          <a:xfrm>
-            <a:off x="235080" y="283680"/>
-            <a:ext cx="3999600" cy="1018440"/>
-          </a:xfrm>
-          <a:prstGeom prst="rect">
-            <a:avLst/>
-          </a:prstGeom>
-          <a:ln>
-            <a:noFill/>
-          </a:ln>
-        </p:spPr>
-      </p:pic>
-      <p:sp>
-        <p:nvSpPr>
-          <p:cNvPr id="84" name="TextShape 3"/>
-          <p:cNvSpPr txBox="1"/>
-          <p:nvPr/>
-        </p:nvSpPr>
-        <p:spPr>
-          <a:xfrm>
-            <a:off x="403560" y="1116000"/>
-            <a:ext cx="10612440" cy="1008000"/>
-          </a:xfrm>
-          <a:prstGeom prst="rect">
-            <a:avLst/>
-          </a:prstGeom>
-          <a:noFill/>
-          <a:ln>
-            <a:noFill/>
-          </a:ln>
-        </p:spPr>
-        <p:txBody>
-          <a:bodyPr lIns="0" tIns="0" rIns="0" bIns="0" anchor="ctr"/>
-          <a:lstStyle/>
-          <a:p>
-            <a:pPr algn="ctr"/>
-            <a:r>
-              <a:rPr lang="pt-BR" sz="1800" b="0" strike="noStrike" spc="-1">
-                <a:solidFill>
-                  <a:srgbClr val="000000"/>
-                </a:solidFill>
-                <a:latin typeface="Arial"/>
-              </a:rPr>
-              <a:t>Modelo Físico</a:t>
-            </a:r>
-          </a:p>
-        </p:txBody>
-      </p:sp>
-      <p:sp>
-        <p:nvSpPr>
-          <p:cNvPr id="85" name="TextShape 4"/>
-          <p:cNvSpPr txBox="1"/>
-          <p:nvPr/>
-        </p:nvSpPr>
-        <p:spPr>
-          <a:xfrm>
-            <a:off x="0" y="1728000"/>
-            <a:ext cx="11874600" cy="5465880"/>
-          </a:xfrm>
-          <a:prstGeom prst="rect">
-            <a:avLst/>
-          </a:prstGeom>
-          <a:noFill/>
-          <a:ln>
-            <a:noFill/>
-          </a:ln>
-        </p:spPr>
-        <p:txBody>
-          <a:bodyPr lIns="90000" tIns="45000" rIns="90000" bIns="45000"/>
-          <a:lstStyle/>
-          <a:p>
-            <a:r>
-              <a:rPr lang="pt-BR" sz="1800" b="0" strike="noStrike" spc="-1">
-                <a:latin typeface="Arial"/>
-              </a:rPr>
-              <a:t>CREATE TABLE IF NOT EXISTS `bd-sus`.`especialidade_has_usuario` (</a:t>
-            </a:r>
-          </a:p>
-          <a:p>
-            <a:r>
-              <a:rPr lang="pt-BR" sz="1800" b="0" strike="noStrike" spc="-1">
-                <a:latin typeface="Arial"/>
-              </a:rPr>
-              <a:t>  `especialidade_cod-especialidade` INT NOT NULL,</a:t>
-            </a:r>
-          </a:p>
-          <a:p>
-            <a:r>
-              <a:rPr lang="pt-BR" sz="1800" b="0" strike="noStrike" spc="-1">
-                <a:latin typeface="Arial"/>
-              </a:rPr>
-              <a:t>  `especialidade_agenda_cod-agenda` INT NOT NULL,</a:t>
-            </a:r>
-          </a:p>
-          <a:p>
-            <a:r>
-              <a:rPr lang="pt-BR" sz="1800" b="0" strike="noStrike" spc="-1">
-                <a:latin typeface="Arial"/>
-              </a:rPr>
-              <a:t>  `usuario_cod-usuario` INT NOT NULL,</a:t>
-            </a:r>
-          </a:p>
-          <a:p>
-            <a:r>
-              <a:rPr lang="pt-BR" sz="1800" b="0" strike="noStrike" spc="-1">
-                <a:latin typeface="Arial"/>
-              </a:rPr>
-              <a:t>  PRIMARY KEY (`especialidade_cod-especialidade`, `especialidade_agenda_cod-agenda`, `usuario_cod-usuario`),</a:t>
-            </a:r>
-          </a:p>
-          <a:p>
-            <a:r>
-              <a:rPr lang="pt-BR" sz="1800" b="0" strike="noStrike" spc="-1">
-                <a:latin typeface="Arial"/>
-              </a:rPr>
-              <a:t>  INDEX `fk_especialidade_has_usuario_usuario1_idx` (`usuario_cod-usuario` ASC),</a:t>
-            </a:r>
-          </a:p>
-          <a:p>
-            <a:r>
-              <a:rPr lang="pt-BR" sz="1800" b="0" strike="noStrike" spc="-1">
-                <a:latin typeface="Arial"/>
-              </a:rPr>
-              <a:t>  INDEX `fk_especialidade_has_usuario_especialidade1_idx` (`especialidade_cod-especialidade` ASC, `especialidade_agenda_cod-agenda` ASC),</a:t>
-            </a:r>
-          </a:p>
-          <a:p>
-            <a:r>
-              <a:rPr lang="pt-BR" sz="1800" b="0" strike="noStrike" spc="-1">
-                <a:latin typeface="Arial"/>
-              </a:rPr>
-              <a:t>  CONSTRAINT `fk_especialidade_has_usuario_especialidade1`</a:t>
-            </a:r>
-          </a:p>
-          <a:p>
-            <a:r>
-              <a:rPr lang="pt-BR" sz="1800" b="0" strike="noStrike" spc="-1">
-                <a:latin typeface="Arial"/>
-              </a:rPr>
-              <a:t>    FOREIGN KEY (`especialidade_cod-especialidade` , `especialidade_agenda_cod-agenda`)</a:t>
-            </a:r>
-          </a:p>
-          <a:p>
-            <a:r>
-              <a:rPr lang="pt-BR" sz="1800" b="0" strike="noStrike" spc="-1">
-                <a:latin typeface="Arial"/>
-              </a:rPr>
-              <a:t>    REFERENCES `bd-sus`.`especialidade` (`cod-especialidade` , `agenda_cod-agenda`)</a:t>
-            </a:r>
-          </a:p>
-          <a:p>
-            <a:r>
-              <a:rPr lang="pt-BR" sz="1800" b="0" strike="noStrike" spc="-1">
-                <a:latin typeface="Arial"/>
-              </a:rPr>
-              <a:t>    ON DELETE NO ACTION</a:t>
-            </a:r>
-          </a:p>
-          <a:p>
-            <a:r>
-              <a:rPr lang="pt-BR" sz="1800" b="0" strike="noStrike" spc="-1">
-                <a:latin typeface="Arial"/>
-              </a:rPr>
-              <a:t>    ON UPDATE NO ACTION,</a:t>
-            </a:r>
-          </a:p>
-          <a:p>
-            <a:r>
-              <a:rPr lang="pt-BR" sz="1800" b="0" strike="noStrike" spc="-1">
-                <a:latin typeface="Arial"/>
-              </a:rPr>
-              <a:t>  CONSTRAINT `fk_especialidade_has_usuario_usuario1`</a:t>
-            </a:r>
-          </a:p>
-          <a:p>
-            <a:r>
-              <a:rPr lang="pt-BR" sz="1800" b="0" strike="noStrike" spc="-1">
-                <a:latin typeface="Arial"/>
-              </a:rPr>
-              <a:t>    FOREIGN KEY (`usuario_cod-usuario`)</a:t>
-            </a:r>
-          </a:p>
-          <a:p>
-            <a:r>
-              <a:rPr lang="pt-BR" sz="1800" b="0" strike="noStrike" spc="-1">
-                <a:latin typeface="Arial"/>
-              </a:rPr>
-              <a:t>    REFERENCES `bd-sus`.`usuario` (`cod-usuario`)</a:t>
-            </a:r>
-          </a:p>
-          <a:p>
-            <a:r>
-              <a:rPr lang="pt-BR" sz="1800" b="0" strike="noStrike" spc="-1">
-                <a:latin typeface="Arial"/>
-              </a:rPr>
-              <a:t>    ON DELETE NO ACTION</a:t>
-            </a:r>
-          </a:p>
-          <a:p>
-            <a:r>
-              <a:rPr lang="pt-BR" sz="1800" b="0" strike="noStrike" spc="-1">
-                <a:latin typeface="Arial"/>
-              </a:rPr>
-              <a:t>    ON UPDATE NO ACTION)</a:t>
-            </a:r>
-          </a:p>
-          <a:p>
-            <a:r>
-              <a:rPr lang="pt-BR" sz="1800" b="0" strike="noStrike" spc="-1">
-                <a:latin typeface="Arial"/>
-              </a:rPr>
-              <a:t>ENGINE = InnoDB</a:t>
-            </a:r>
-          </a:p>
-          <a:p>
-            <a:r>
-              <a:rPr lang="pt-BR" sz="1800" b="0" strike="noStrike" spc="-1">
-                <a:latin typeface="Arial"/>
-              </a:rPr>
-              <a:t>DEFAULT CHARACTER SET = latin1</a:t>
-            </a:r>
-          </a:p>
-          <a:p>
-            <a:r>
-              <a:rPr lang="pt-BR" sz="1800" b="0" strike="noStrike" spc="-1">
-                <a:latin typeface="Arial"/>
-              </a:rPr>
-              <a:t>COLLATE = latin1_german2_ci;</a:t>
-            </a:r>
-          </a:p>
-        </p:txBody>
-      </p:sp>
-    </p:spTree>
-  </p:cSld>
-  <p:clrMapOvr>
-    <a:masterClrMapping/>
-  </p:clrMapOvr>
-  <p:timing>
-    <p:tnLst>
-      <p:par>
-        <p:cTn id="1" dur="indefinite" restart="never" nodeType="tmRoot">
-          <p:childTnLst>
-            <p:seq>
-              <p:cTn id="2" dur="indefinite" nodeType="mainSeq"/>
-              <p:prevCondLst>
-                <p:cond evt="onPrev" delay="0">
-                  <p:tgtEl>
-                    <p:sldTgt/>
-                  </p:tgtEl>
-                </p:cond>
-              </p:prevCondLst>
-              <p:nextCondLst>
-                <p:cond evt="onNext" delay="0">
-                  <p:tgtEl>
-                    <p:sldTgt/>
-                  </p:tgtEl>
-                </p:cond>
-              </p:nextCondLst>
-            </p:seq>
-          </p:childTnLst>
-        </p:cTn>
-      </p:par>
-    </p:tnLst>
-  </p:timing>
-</p:sld>
-</file>
-
-<file path=ppt/slides/slide11.xml><?xml version="1.0" encoding="utf-8"?>
-<p:sld xmlns:a="http://schemas.openxmlformats.org/drawingml/2006/main" xmlns:r="http://schemas.openxmlformats.org/officeDocument/2006/relationships" xmlns:p="http://schemas.openxmlformats.org/presentationml/2006/main">
-  <p:cSld>
-    <p:bg>
-      <p:bgPr>
-        <a:solidFill>
-          <a:srgbClr val="FFFFFF"/>
-        </a:solidFill>
-        <a:effectLst/>
-      </p:bgPr>
-    </p:bg>
-    <p:spTree>
-      <p:nvGrpSpPr>
-        <p:cNvPr id="1" name=""/>
-        <p:cNvGrpSpPr/>
-        <p:nvPr/>
-      </p:nvGrpSpPr>
-      <p:grpSpPr>
-        <a:xfrm>
-          <a:off x="0" y="0"/>
-          <a:ext cx="0" cy="0"/>
-          <a:chOff x="0" y="0"/>
-          <a:chExt cx="0" cy="0"/>
-        </a:xfrm>
-      </p:grpSpPr>
-      <p:sp>
-        <p:nvSpPr>
-          <p:cNvPr id="86" name="CustomShape 1"/>
-          <p:cNvSpPr/>
-          <p:nvPr/>
-        </p:nvSpPr>
-        <p:spPr>
-          <a:xfrm>
-            <a:off x="0" y="0"/>
-            <a:ext cx="12191040" cy="1585440"/>
-          </a:xfrm>
-          <a:prstGeom prst="rect">
-            <a:avLst/>
-          </a:prstGeom>
-          <a:solidFill>
-            <a:srgbClr val="347C36"/>
-          </a:solidFill>
-          <a:ln>
-            <a:noFill/>
-          </a:ln>
-        </p:spPr>
-        <p:style>
-          <a:lnRef idx="0">
-            <a:scrgbClr r="0" g="0" b="0"/>
-          </a:lnRef>
-          <a:fillRef idx="0">
-            <a:scrgbClr r="0" g="0" b="0"/>
-          </a:fillRef>
-          <a:effectRef idx="0">
-            <a:scrgbClr r="0" g="0" b="0"/>
-          </a:effectRef>
-          <a:fontRef idx="minor"/>
-        </p:style>
-      </p:sp>
-      <p:pic>
-        <p:nvPicPr>
-          <p:cNvPr id="87" name="Google Shape;89;p13"/>
-          <p:cNvPicPr/>
-          <p:nvPr/>
-        </p:nvPicPr>
-        <p:blipFill>
-          <a:blip r:embed="rId2"/>
-          <a:stretch/>
-        </p:blipFill>
-        <p:spPr>
-          <a:xfrm>
-            <a:off x="10561680" y="0"/>
-            <a:ext cx="1082160" cy="2505960"/>
-          </a:xfrm>
-          <a:prstGeom prst="rect">
-            <a:avLst/>
-          </a:prstGeom>
-          <a:ln>
-            <a:noFill/>
-          </a:ln>
-        </p:spPr>
-      </p:pic>
-      <p:sp>
-        <p:nvSpPr>
-          <p:cNvPr id="88" name="CustomShape 2"/>
-          <p:cNvSpPr/>
-          <p:nvPr/>
-        </p:nvSpPr>
-        <p:spPr>
-          <a:xfrm>
-            <a:off x="504000" y="6479280"/>
-            <a:ext cx="11129040" cy="718920"/>
-          </a:xfrm>
-          <a:prstGeom prst="rect">
-            <a:avLst/>
-          </a:prstGeom>
-          <a:noFill/>
-          <a:ln>
-            <a:noFill/>
-          </a:ln>
-        </p:spPr>
-        <p:style>
-          <a:lnRef idx="0">
-            <a:scrgbClr r="0" g="0" b="0"/>
-          </a:lnRef>
-          <a:fillRef idx="0">
-            <a:scrgbClr r="0" g="0" b="0"/>
-          </a:fillRef>
-          <a:effectRef idx="0">
-            <a:scrgbClr r="0" g="0" b="0"/>
-          </a:effectRef>
-          <a:fontRef idx="minor"/>
-        </p:style>
-        <p:txBody>
-          <a:bodyPr lIns="90000" tIns="45000" rIns="90000" bIns="45000"/>
-          <a:lstStyle/>
-          <a:p>
-            <a:pPr algn="ctr">
-              <a:lnSpc>
-                <a:spcPct val="100000"/>
-              </a:lnSpc>
-            </a:pPr>
-            <a:r>
-              <a:rPr lang="pt-BR" sz="1500" b="1" strike="noStrike" spc="-1">
-                <a:solidFill>
-                  <a:srgbClr val="8DC641"/>
-                </a:solidFill>
-                <a:latin typeface="Arial"/>
-                <a:ea typeface="Arial"/>
-              </a:rPr>
-              <a:t> Fabio Vasques, Gieder Loreto</a:t>
-            </a:r>
-            <a:endParaRPr lang="pt-BR" sz="1500" b="0" strike="noStrike" spc="-1">
-              <a:latin typeface="Arial"/>
-            </a:endParaRPr>
-          </a:p>
-        </p:txBody>
-      </p:sp>
-      <p:pic>
-        <p:nvPicPr>
-          <p:cNvPr id="89" name="Google Shape;166;p39"/>
-          <p:cNvPicPr/>
-          <p:nvPr/>
-        </p:nvPicPr>
-        <p:blipFill>
-          <a:blip r:embed="rId3"/>
-          <a:stretch/>
-        </p:blipFill>
-        <p:spPr>
-          <a:xfrm>
-            <a:off x="235080" y="283680"/>
-            <a:ext cx="3999600" cy="1018440"/>
-          </a:xfrm>
-          <a:prstGeom prst="rect">
-            <a:avLst/>
-          </a:prstGeom>
-          <a:ln>
-            <a:noFill/>
-          </a:ln>
-        </p:spPr>
-      </p:pic>
-      <p:sp>
-        <p:nvSpPr>
-          <p:cNvPr id="90" name="TextShape 3"/>
-          <p:cNvSpPr txBox="1"/>
-          <p:nvPr/>
-        </p:nvSpPr>
-        <p:spPr>
-          <a:xfrm>
-            <a:off x="403560" y="1116000"/>
-            <a:ext cx="10612440" cy="1008000"/>
-          </a:xfrm>
-          <a:prstGeom prst="rect">
-            <a:avLst/>
-          </a:prstGeom>
-          <a:noFill/>
-          <a:ln>
-            <a:noFill/>
-          </a:ln>
-        </p:spPr>
-        <p:txBody>
-          <a:bodyPr lIns="0" tIns="0" rIns="0" bIns="0" anchor="ctr"/>
-          <a:lstStyle/>
-          <a:p>
-            <a:pPr algn="ctr"/>
-            <a:r>
-              <a:rPr lang="pt-BR" sz="1800" b="0" strike="noStrike" spc="-1">
-                <a:solidFill>
-                  <a:srgbClr val="000000"/>
-                </a:solidFill>
-                <a:latin typeface="Arial"/>
-              </a:rPr>
-              <a:t>Modelo Físico</a:t>
-            </a:r>
-          </a:p>
-        </p:txBody>
-      </p:sp>
-      <p:pic>
-        <p:nvPicPr>
-          <p:cNvPr id="91" name="Imagem 90"/>
-          <p:cNvPicPr/>
-          <p:nvPr/>
-        </p:nvPicPr>
-        <p:blipFill>
-          <a:blip r:embed="rId4"/>
-          <a:stretch/>
-        </p:blipFill>
-        <p:spPr>
-          <a:xfrm>
-            <a:off x="2808000" y="1755360"/>
-            <a:ext cx="4723920" cy="4723920"/>
-          </a:xfrm>
-          <a:prstGeom prst="rect">
-            <a:avLst/>
-          </a:prstGeom>
-          <a:ln>
-            <a:noFill/>
-          </a:ln>
-        </p:spPr>
-      </p:pic>
-    </p:spTree>
-  </p:cSld>
-  <p:clrMapOvr>
-    <a:masterClrMapping/>
-  </p:clrMapOvr>
-  <p:timing>
-    <p:tnLst>
-      <p:par>
-        <p:cTn id="1" dur="indefinite" restart="never" nodeType="tmRoot">
-          <p:childTnLst>
-            <p:seq>
-              <p:cTn id="2" dur="indefinite" nodeType="mainSeq"/>
-              <p:prevCondLst>
-                <p:cond evt="onPrev" delay="0">
-                  <p:tgtEl>
-                    <p:sldTgt/>
-                  </p:tgtEl>
-                </p:cond>
-              </p:prevCondLst>
-              <p:nextCondLst>
-                <p:cond evt="onNext" delay="0">
-                  <p:tgtEl>
-                    <p:sldTgt/>
-                  </p:tgtEl>
-                </p:cond>
-              </p:nextCondLst>
-            </p:seq>
-          </p:childTnLst>
-        </p:cTn>
-      </p:par>
-    </p:tnLst>
-  </p:timing>
-</p:sld>
-</file>
-
 <file path=ppt/slides/slide2.xml><?xml version="1.0" encoding="utf-8"?>
 <p:sld xmlns:a="http://schemas.openxmlformats.org/drawingml/2006/main" xmlns:r="http://schemas.openxmlformats.org/officeDocument/2006/relationships" xmlns:p="http://schemas.openxmlformats.org/presentationml/2006/main">
   <p:cSld>
@@ -3438,40 +2761,6 @@
           <a:chExt cx="0" cy="0"/>
         </a:xfrm>
       </p:grpSpPr>
-      <p:sp>
-        <p:nvSpPr>
-          <p:cNvPr id="38" name="CustomShape 1"/>
-          <p:cNvSpPr/>
-          <p:nvPr/>
-        </p:nvSpPr>
-        <p:spPr>
-          <a:xfrm>
-            <a:off x="0" y="0"/>
-            <a:ext cx="12191040" cy="1585440"/>
-          </a:xfrm>
-          <a:prstGeom prst="rect">
-            <a:avLst/>
-          </a:prstGeom>
-          <a:solidFill>
-            <a:srgbClr val="347C36"/>
-          </a:solidFill>
-          <a:ln>
-            <a:noFill/>
-          </a:ln>
-        </p:spPr>
-        <p:style>
-          <a:lnRef idx="0">
-            <a:scrgbClr r="0" g="0" b="0"/>
-          </a:lnRef>
-          <a:fillRef idx="0">
-            <a:scrgbClr r="0" g="0" b="0"/>
-          </a:fillRef>
-          <a:effectRef idx="0">
-            <a:scrgbClr r="0" g="0" b="0"/>
-          </a:effectRef>
-          <a:fontRef idx="minor"/>
-        </p:style>
-      </p:sp>
       <p:pic>
         <p:nvPicPr>
           <p:cNvPr id="39" name="Google Shape;89;p13"/>
@@ -3495,62 +2784,6 @@
           </a:ln>
         </p:spPr>
       </p:pic>
-      <p:sp>
-        <p:nvSpPr>
-          <p:cNvPr id="40" name="CustomShape 2"/>
-          <p:cNvSpPr/>
-          <p:nvPr/>
-        </p:nvSpPr>
-        <p:spPr>
-          <a:xfrm>
-            <a:off x="504000" y="6479280"/>
-            <a:ext cx="11129040" cy="718920"/>
-          </a:xfrm>
-          <a:prstGeom prst="rect">
-            <a:avLst/>
-          </a:prstGeom>
-          <a:noFill/>
-          <a:ln>
-            <a:noFill/>
-          </a:ln>
-        </p:spPr>
-        <p:style>
-          <a:lnRef idx="0">
-            <a:scrgbClr r="0" g="0" b="0"/>
-          </a:lnRef>
-          <a:fillRef idx="0">
-            <a:scrgbClr r="0" g="0" b="0"/>
-          </a:fillRef>
-          <a:effectRef idx="0">
-            <a:scrgbClr r="0" g="0" b="0"/>
-          </a:effectRef>
-          <a:fontRef idx="minor"/>
-        </p:style>
-        <p:txBody>
-          <a:bodyPr lIns="90000" tIns="45000" rIns="90000" bIns="45000"/>
-          <a:lstStyle/>
-          <a:p>
-            <a:pPr algn="ctr">
-              <a:lnSpc>
-                <a:spcPct val="100000"/>
-              </a:lnSpc>
-            </a:pPr>
-            <a:r>
-              <a:rPr lang="pt-BR" sz="1500" b="1" strike="noStrike" spc="-1">
-                <a:solidFill>
-                  <a:srgbClr val="8DC641"/>
-                </a:solidFill>
-                <a:latin typeface="Arial"/>
-                <a:ea typeface="Arial"/>
-              </a:rPr>
-              <a:t> Fabio Vasques, Gieder Loreto</a:t>
-            </a:r>
-            <a:endParaRPr lang="pt-BR" sz="1500" b="0" strike="noStrike" spc="-1">
-              <a:latin typeface="Arial"/>
-            </a:endParaRPr>
-          </a:p>
-        </p:txBody>
-      </p:sp>
       <p:pic>
         <p:nvPicPr>
           <p:cNvPr id="41" name="Google Shape;166;p39"/>
@@ -3629,8 +2862,8 @@
         </p:blipFill>
         <p:spPr>
           <a:xfrm>
-            <a:off x="1836000" y="1872000"/>
-            <a:ext cx="7956000" cy="4680000"/>
+            <a:off x="707623" y="530942"/>
+            <a:ext cx="9055809" cy="6327058"/>
           </a:xfrm>
           <a:prstGeom prst="rect">
             <a:avLst/>
@@ -3640,6 +2873,55 @@
           </a:ln>
         </p:spPr>
       </p:pic>
+      <p:sp>
+        <p:nvSpPr>
+          <p:cNvPr id="8" name="TextShape 3">
+            <a:extLst>
+              <a:ext uri="{FF2B5EF4-FFF2-40B4-BE49-F238E27FC236}">
+                <a16:creationId xmlns:a16="http://schemas.microsoft.com/office/drawing/2014/main" id="{C8FE3A03-D40F-4921-8F88-984573198A4D}"/>
+              </a:ext>
+            </a:extLst>
+          </p:cNvPr>
+          <p:cNvSpPr txBox="1"/>
+          <p:nvPr/>
+        </p:nvSpPr>
+        <p:spPr>
+          <a:xfrm>
+            <a:off x="504000" y="73620"/>
+            <a:ext cx="10612440" cy="678548"/>
+          </a:xfrm>
+          <a:prstGeom prst="rect">
+            <a:avLst/>
+          </a:prstGeom>
+          <a:noFill/>
+          <a:ln>
+            <a:noFill/>
+          </a:ln>
+        </p:spPr>
+        <p:txBody>
+          <a:bodyPr lIns="0" tIns="0" rIns="0" bIns="0" anchor="ctr"/>
+          <a:lstStyle/>
+          <a:p>
+            <a:pPr algn="ctr"/>
+            <a:r>
+              <a:rPr lang="pt-BR" sz="1800" b="1" strike="noStrike" spc="-1" dirty="0">
+                <a:solidFill>
+                  <a:srgbClr val="8DC641"/>
+                </a:solidFill>
+                <a:latin typeface="Arial"/>
+                <a:ea typeface="Arial"/>
+              </a:rPr>
+              <a:t>Diagrama Casos de Uso</a:t>
+            </a:r>
+            <a:endParaRPr lang="pt-BR" sz="1800" b="0" strike="noStrike" spc="-1" dirty="0">
+              <a:solidFill>
+                <a:srgbClr val="000000"/>
+              </a:solidFill>
+              <a:latin typeface="Arial"/>
+            </a:endParaRPr>
+          </a:p>
+        </p:txBody>
+      </p:sp>
     </p:spTree>
     <p:extLst>
       <p:ext uri="{BB962C8B-B14F-4D97-AF65-F5344CB8AC3E}">
@@ -3705,40 +2987,6 @@
           <a:chExt cx="0" cy="0"/>
         </a:xfrm>
       </p:grpSpPr>
-      <p:sp>
-        <p:nvSpPr>
-          <p:cNvPr id="44" name="CustomShape 1"/>
-          <p:cNvSpPr/>
-          <p:nvPr/>
-        </p:nvSpPr>
-        <p:spPr>
-          <a:xfrm>
-            <a:off x="0" y="0"/>
-            <a:ext cx="12191040" cy="1585440"/>
-          </a:xfrm>
-          <a:prstGeom prst="rect">
-            <a:avLst/>
-          </a:prstGeom>
-          <a:solidFill>
-            <a:srgbClr val="347C36"/>
-          </a:solidFill>
-          <a:ln>
-            <a:noFill/>
-          </a:ln>
-        </p:spPr>
-        <p:style>
-          <a:lnRef idx="0">
-            <a:scrgbClr r="0" g="0" b="0"/>
-          </a:lnRef>
-          <a:fillRef idx="0">
-            <a:scrgbClr r="0" g="0" b="0"/>
-          </a:fillRef>
-          <a:effectRef idx="0">
-            <a:scrgbClr r="0" g="0" b="0"/>
-          </a:effectRef>
-          <a:fontRef idx="minor"/>
-        </p:style>
-      </p:sp>
       <p:pic>
         <p:nvPicPr>
           <p:cNvPr id="45" name="Google Shape;89;p13"/>
@@ -3849,7 +3097,7 @@
         </p:nvSpPr>
         <p:spPr>
           <a:xfrm>
-            <a:off x="403560" y="1224000"/>
+            <a:off x="504000" y="73620"/>
             <a:ext cx="10612440" cy="1008000"/>
           </a:xfrm>
           <a:prstGeom prst="rect">
@@ -3896,8 +3144,8 @@
         </p:blipFill>
         <p:spPr>
           <a:xfrm>
-            <a:off x="2484000" y="1869120"/>
-            <a:ext cx="5864870" cy="4988880"/>
+            <a:off x="881002" y="708045"/>
+            <a:ext cx="9303677" cy="6076335"/>
           </a:xfrm>
           <a:prstGeom prst="rect">
             <a:avLst/>
@@ -3967,40 +3215,6 @@
           <a:chExt cx="0" cy="0"/>
         </a:xfrm>
       </p:grpSpPr>
-      <p:sp>
-        <p:nvSpPr>
-          <p:cNvPr id="50" name="CustomShape 1"/>
-          <p:cNvSpPr/>
-          <p:nvPr/>
-        </p:nvSpPr>
-        <p:spPr>
-          <a:xfrm>
-            <a:off x="0" y="0"/>
-            <a:ext cx="12191040" cy="1585440"/>
-          </a:xfrm>
-          <a:prstGeom prst="rect">
-            <a:avLst/>
-          </a:prstGeom>
-          <a:solidFill>
-            <a:srgbClr val="347C36"/>
-          </a:solidFill>
-          <a:ln>
-            <a:noFill/>
-          </a:ln>
-        </p:spPr>
-        <p:style>
-          <a:lnRef idx="0">
-            <a:scrgbClr r="0" g="0" b="0"/>
-          </a:lnRef>
-          <a:fillRef idx="0">
-            <a:scrgbClr r="0" g="0" b="0"/>
-          </a:fillRef>
-          <a:effectRef idx="0">
-            <a:scrgbClr r="0" g="0" b="0"/>
-          </a:effectRef>
-          <a:fontRef idx="minor"/>
-        </p:style>
-      </p:sp>
       <p:pic>
         <p:nvPicPr>
           <p:cNvPr id="51" name="Google Shape;89;p13"/>
@@ -4111,7 +3325,7 @@
         </p:nvSpPr>
         <p:spPr>
           <a:xfrm>
-            <a:off x="403560" y="1224000"/>
+            <a:off x="490320" y="-215100"/>
             <a:ext cx="10612440" cy="1008000"/>
           </a:xfrm>
           <a:prstGeom prst="rect">
@@ -4158,8 +3372,8 @@
         </p:blipFill>
         <p:spPr>
           <a:xfrm>
-            <a:off x="2088000" y="1923480"/>
-            <a:ext cx="6248520" cy="4934520"/>
+            <a:off x="235080" y="575187"/>
+            <a:ext cx="10133036" cy="6282813"/>
           </a:xfrm>
           <a:prstGeom prst="rect">
             <a:avLst/>
@@ -4169,1494 +3383,6 @@
           </a:ln>
         </p:spPr>
       </p:pic>
-    </p:spTree>
-  </p:cSld>
-  <p:clrMapOvr>
-    <a:masterClrMapping/>
-  </p:clrMapOvr>
-  <p:timing>
-    <p:tnLst>
-      <p:par>
-        <p:cTn id="1" dur="indefinite" restart="never" nodeType="tmRoot">
-          <p:childTnLst>
-            <p:seq>
-              <p:cTn id="2" dur="indefinite" nodeType="mainSeq"/>
-              <p:prevCondLst>
-                <p:cond evt="onPrev" delay="0">
-                  <p:tgtEl>
-                    <p:sldTgt/>
-                  </p:tgtEl>
-                </p:cond>
-              </p:prevCondLst>
-              <p:nextCondLst>
-                <p:cond evt="onNext" delay="0">
-                  <p:tgtEl>
-                    <p:sldTgt/>
-                  </p:tgtEl>
-                </p:cond>
-              </p:nextCondLst>
-            </p:seq>
-          </p:childTnLst>
-        </p:cTn>
-      </p:par>
-    </p:tnLst>
-  </p:timing>
-</p:sld>
-</file>
-
-<file path=ppt/slides/slide6.xml><?xml version="1.0" encoding="utf-8"?>
-<p:sld xmlns:a="http://schemas.openxmlformats.org/drawingml/2006/main" xmlns:r="http://schemas.openxmlformats.org/officeDocument/2006/relationships" xmlns:p="http://schemas.openxmlformats.org/presentationml/2006/main">
-  <p:cSld>
-    <p:bg>
-      <p:bgPr>
-        <a:solidFill>
-          <a:srgbClr val="FFFFFF"/>
-        </a:solidFill>
-        <a:effectLst/>
-      </p:bgPr>
-    </p:bg>
-    <p:spTree>
-      <p:nvGrpSpPr>
-        <p:cNvPr id="1" name=""/>
-        <p:cNvGrpSpPr/>
-        <p:nvPr/>
-      </p:nvGrpSpPr>
-      <p:grpSpPr>
-        <a:xfrm>
-          <a:off x="0" y="0"/>
-          <a:ext cx="0" cy="0"/>
-          <a:chOff x="0" y="0"/>
-          <a:chExt cx="0" cy="0"/>
-        </a:xfrm>
-      </p:grpSpPr>
-      <p:sp>
-        <p:nvSpPr>
-          <p:cNvPr id="56" name="CustomShape 1"/>
-          <p:cNvSpPr/>
-          <p:nvPr/>
-        </p:nvSpPr>
-        <p:spPr>
-          <a:xfrm>
-            <a:off x="0" y="0"/>
-            <a:ext cx="12191040" cy="1585440"/>
-          </a:xfrm>
-          <a:prstGeom prst="rect">
-            <a:avLst/>
-          </a:prstGeom>
-          <a:solidFill>
-            <a:srgbClr val="347C36"/>
-          </a:solidFill>
-          <a:ln>
-            <a:noFill/>
-          </a:ln>
-        </p:spPr>
-        <p:style>
-          <a:lnRef idx="0">
-            <a:scrgbClr r="0" g="0" b="0"/>
-          </a:lnRef>
-          <a:fillRef idx="0">
-            <a:scrgbClr r="0" g="0" b="0"/>
-          </a:fillRef>
-          <a:effectRef idx="0">
-            <a:scrgbClr r="0" g="0" b="0"/>
-          </a:effectRef>
-          <a:fontRef idx="minor"/>
-        </p:style>
-      </p:sp>
-      <p:pic>
-        <p:nvPicPr>
-          <p:cNvPr id="57" name="Google Shape;89;p13"/>
-          <p:cNvPicPr/>
-          <p:nvPr/>
-        </p:nvPicPr>
-        <p:blipFill>
-          <a:blip r:embed="rId2"/>
-          <a:stretch/>
-        </p:blipFill>
-        <p:spPr>
-          <a:xfrm>
-            <a:off x="10561680" y="0"/>
-            <a:ext cx="1082160" cy="2505960"/>
-          </a:xfrm>
-          <a:prstGeom prst="rect">
-            <a:avLst/>
-          </a:prstGeom>
-          <a:ln>
-            <a:noFill/>
-          </a:ln>
-        </p:spPr>
-      </p:pic>
-      <p:sp>
-        <p:nvSpPr>
-          <p:cNvPr id="58" name="CustomShape 2"/>
-          <p:cNvSpPr/>
-          <p:nvPr/>
-        </p:nvSpPr>
-        <p:spPr>
-          <a:xfrm>
-            <a:off x="504000" y="6479280"/>
-            <a:ext cx="11129040" cy="718920"/>
-          </a:xfrm>
-          <a:prstGeom prst="rect">
-            <a:avLst/>
-          </a:prstGeom>
-          <a:noFill/>
-          <a:ln>
-            <a:noFill/>
-          </a:ln>
-        </p:spPr>
-        <p:style>
-          <a:lnRef idx="0">
-            <a:scrgbClr r="0" g="0" b="0"/>
-          </a:lnRef>
-          <a:fillRef idx="0">
-            <a:scrgbClr r="0" g="0" b="0"/>
-          </a:fillRef>
-          <a:effectRef idx="0">
-            <a:scrgbClr r="0" g="0" b="0"/>
-          </a:effectRef>
-          <a:fontRef idx="minor"/>
-        </p:style>
-        <p:txBody>
-          <a:bodyPr lIns="90000" tIns="45000" rIns="90000" bIns="45000"/>
-          <a:lstStyle/>
-          <a:p>
-            <a:pPr algn="ctr">
-              <a:lnSpc>
-                <a:spcPct val="100000"/>
-              </a:lnSpc>
-            </a:pPr>
-            <a:r>
-              <a:rPr lang="pt-BR" sz="1500" b="1" strike="noStrike" spc="-1">
-                <a:solidFill>
-                  <a:srgbClr val="8DC641"/>
-                </a:solidFill>
-                <a:latin typeface="Arial"/>
-                <a:ea typeface="Arial"/>
-              </a:rPr>
-              <a:t> Fabio Vasques, Gieder Loreto</a:t>
-            </a:r>
-            <a:endParaRPr lang="pt-BR" sz="1500" b="0" strike="noStrike" spc="-1">
-              <a:latin typeface="Arial"/>
-            </a:endParaRPr>
-          </a:p>
-        </p:txBody>
-      </p:sp>
-      <p:pic>
-        <p:nvPicPr>
-          <p:cNvPr id="59" name="Google Shape;166;p39"/>
-          <p:cNvPicPr/>
-          <p:nvPr/>
-        </p:nvPicPr>
-        <p:blipFill>
-          <a:blip r:embed="rId3"/>
-          <a:stretch/>
-        </p:blipFill>
-        <p:spPr>
-          <a:xfrm>
-            <a:off x="235080" y="283680"/>
-            <a:ext cx="3999600" cy="1018440"/>
-          </a:xfrm>
-          <a:prstGeom prst="rect">
-            <a:avLst/>
-          </a:prstGeom>
-          <a:ln>
-            <a:noFill/>
-          </a:ln>
-        </p:spPr>
-      </p:pic>
-      <p:sp>
-        <p:nvSpPr>
-          <p:cNvPr id="60" name="TextShape 3"/>
-          <p:cNvSpPr txBox="1"/>
-          <p:nvPr/>
-        </p:nvSpPr>
-        <p:spPr>
-          <a:xfrm>
-            <a:off x="403560" y="1224000"/>
-            <a:ext cx="10612440" cy="1008000"/>
-          </a:xfrm>
-          <a:prstGeom prst="rect">
-            <a:avLst/>
-          </a:prstGeom>
-          <a:noFill/>
-          <a:ln>
-            <a:noFill/>
-          </a:ln>
-        </p:spPr>
-        <p:txBody>
-          <a:bodyPr lIns="0" tIns="0" rIns="0" bIns="0" anchor="ctr"/>
-          <a:lstStyle/>
-          <a:p>
-            <a:pPr algn="ctr"/>
-            <a:r>
-              <a:rPr lang="pt-BR" sz="1800" b="0" strike="noStrike" spc="-1">
-                <a:solidFill>
-                  <a:srgbClr val="000000"/>
-                </a:solidFill>
-                <a:latin typeface="Arial"/>
-              </a:rPr>
-              <a:t>Modelo Físico</a:t>
-            </a:r>
-          </a:p>
-        </p:txBody>
-      </p:sp>
-      <p:sp>
-        <p:nvSpPr>
-          <p:cNvPr id="61" name="TextShape 4"/>
-          <p:cNvSpPr txBox="1"/>
-          <p:nvPr/>
-        </p:nvSpPr>
-        <p:spPr>
-          <a:xfrm>
-            <a:off x="2016000" y="2173680"/>
-            <a:ext cx="6386760" cy="2650320"/>
-          </a:xfrm>
-          <a:prstGeom prst="rect">
-            <a:avLst/>
-          </a:prstGeom>
-          <a:noFill/>
-          <a:ln>
-            <a:noFill/>
-          </a:ln>
-        </p:spPr>
-        <p:txBody>
-          <a:bodyPr lIns="90000" tIns="45000" rIns="90000" bIns="45000"/>
-          <a:lstStyle/>
-          <a:p>
-            <a:r>
-              <a:rPr lang="pt-BR" sz="1800" b="0" strike="noStrike" spc="-1">
-                <a:latin typeface="Arial"/>
-              </a:rPr>
-              <a:t>CREATE TABLE IF NOT EXISTS `bd-sus`.`agenda` (</a:t>
-            </a:r>
-          </a:p>
-          <a:p>
-            <a:r>
-              <a:rPr lang="pt-BR" sz="1800" b="0" strike="noStrike" spc="-1">
-                <a:latin typeface="Arial"/>
-              </a:rPr>
-              <a:t>  `cod-agenda` INT NOT NULL AUTO_INCREMENT,</a:t>
-            </a:r>
-          </a:p>
-          <a:p>
-            <a:r>
-              <a:rPr lang="pt-BR" sz="1800" b="0" strike="noStrike" spc="-1">
-                <a:latin typeface="Arial"/>
-              </a:rPr>
-              <a:t>  `data-agendamento` DATETIME NOT NULL,</a:t>
-            </a:r>
-          </a:p>
-          <a:p>
-            <a:r>
-              <a:rPr lang="pt-BR" sz="1800" b="0" strike="noStrike" spc="-1">
-                <a:latin typeface="Arial"/>
-              </a:rPr>
-              <a:t>  `hora-agendamento` VARCHAR(45) NOT NULL,</a:t>
-            </a:r>
-          </a:p>
-          <a:p>
-            <a:r>
-              <a:rPr lang="pt-BR" sz="1800" b="0" strike="noStrike" spc="-1">
-                <a:latin typeface="Arial"/>
-              </a:rPr>
-              <a:t>  `num-fichas` INT NOT NULL,</a:t>
-            </a:r>
-          </a:p>
-          <a:p>
-            <a:r>
-              <a:rPr lang="pt-BR" sz="1800" b="0" strike="noStrike" spc="-1">
-                <a:latin typeface="Arial"/>
-              </a:rPr>
-              <a:t>  `status-agenda` CHAR(1) NOT NULL,</a:t>
-            </a:r>
-          </a:p>
-          <a:p>
-            <a:r>
-              <a:rPr lang="pt-BR" sz="1800" b="0" strike="noStrike" spc="-1">
-                <a:latin typeface="Arial"/>
-              </a:rPr>
-              <a:t>  PRIMARY KEY (`cod-agenda`),</a:t>
-            </a:r>
-          </a:p>
-          <a:p>
-            <a:r>
-              <a:rPr lang="pt-BR" sz="1800" b="0" strike="noStrike" spc="-1">
-                <a:latin typeface="Arial"/>
-              </a:rPr>
-              <a:t>  UNIQUE INDEX `num-fichas_UNIQUE` (`num-fichas` ASC))</a:t>
-            </a:r>
-          </a:p>
-          <a:p>
-            <a:r>
-              <a:rPr lang="pt-BR" sz="1800" b="0" strike="noStrike" spc="-1">
-                <a:latin typeface="Arial"/>
-              </a:rPr>
-              <a:t>ENGINE = InnoDB</a:t>
-            </a:r>
-          </a:p>
-          <a:p>
-            <a:r>
-              <a:rPr lang="pt-BR" sz="1800" b="0" strike="noStrike" spc="-1">
-                <a:latin typeface="Arial"/>
-              </a:rPr>
-              <a:t>DEFAULT CHARACTER SET = latin1;</a:t>
-            </a:r>
-          </a:p>
-        </p:txBody>
-      </p:sp>
-    </p:spTree>
-  </p:cSld>
-  <p:clrMapOvr>
-    <a:masterClrMapping/>
-  </p:clrMapOvr>
-  <p:timing>
-    <p:tnLst>
-      <p:par>
-        <p:cTn id="1" dur="indefinite" restart="never" nodeType="tmRoot">
-          <p:childTnLst>
-            <p:seq>
-              <p:cTn id="2" dur="indefinite" nodeType="mainSeq"/>
-              <p:prevCondLst>
-                <p:cond evt="onPrev" delay="0">
-                  <p:tgtEl>
-                    <p:sldTgt/>
-                  </p:tgtEl>
-                </p:cond>
-              </p:prevCondLst>
-              <p:nextCondLst>
-                <p:cond evt="onNext" delay="0">
-                  <p:tgtEl>
-                    <p:sldTgt/>
-                  </p:tgtEl>
-                </p:cond>
-              </p:nextCondLst>
-            </p:seq>
-          </p:childTnLst>
-        </p:cTn>
-      </p:par>
-    </p:tnLst>
-  </p:timing>
-</p:sld>
-</file>
-
-<file path=ppt/slides/slide7.xml><?xml version="1.0" encoding="utf-8"?>
-<p:sld xmlns:a="http://schemas.openxmlformats.org/drawingml/2006/main" xmlns:r="http://schemas.openxmlformats.org/officeDocument/2006/relationships" xmlns:p="http://schemas.openxmlformats.org/presentationml/2006/main">
-  <p:cSld>
-    <p:bg>
-      <p:bgPr>
-        <a:solidFill>
-          <a:srgbClr val="FFFFFF"/>
-        </a:solidFill>
-        <a:effectLst/>
-      </p:bgPr>
-    </p:bg>
-    <p:spTree>
-      <p:nvGrpSpPr>
-        <p:cNvPr id="1" name=""/>
-        <p:cNvGrpSpPr/>
-        <p:nvPr/>
-      </p:nvGrpSpPr>
-      <p:grpSpPr>
-        <a:xfrm>
-          <a:off x="0" y="0"/>
-          <a:ext cx="0" cy="0"/>
-          <a:chOff x="0" y="0"/>
-          <a:chExt cx="0" cy="0"/>
-        </a:xfrm>
-      </p:grpSpPr>
-      <p:sp>
-        <p:nvSpPr>
-          <p:cNvPr id="62" name="CustomShape 1"/>
-          <p:cNvSpPr/>
-          <p:nvPr/>
-        </p:nvSpPr>
-        <p:spPr>
-          <a:xfrm>
-            <a:off x="0" y="0"/>
-            <a:ext cx="12191040" cy="1585440"/>
-          </a:xfrm>
-          <a:prstGeom prst="rect">
-            <a:avLst/>
-          </a:prstGeom>
-          <a:solidFill>
-            <a:srgbClr val="347C36"/>
-          </a:solidFill>
-          <a:ln>
-            <a:noFill/>
-          </a:ln>
-        </p:spPr>
-        <p:style>
-          <a:lnRef idx="0">
-            <a:scrgbClr r="0" g="0" b="0"/>
-          </a:lnRef>
-          <a:fillRef idx="0">
-            <a:scrgbClr r="0" g="0" b="0"/>
-          </a:fillRef>
-          <a:effectRef idx="0">
-            <a:scrgbClr r="0" g="0" b="0"/>
-          </a:effectRef>
-          <a:fontRef idx="minor"/>
-        </p:style>
-      </p:sp>
-      <p:pic>
-        <p:nvPicPr>
-          <p:cNvPr id="63" name="Google Shape;89;p13"/>
-          <p:cNvPicPr/>
-          <p:nvPr/>
-        </p:nvPicPr>
-        <p:blipFill>
-          <a:blip r:embed="rId2"/>
-          <a:stretch/>
-        </p:blipFill>
-        <p:spPr>
-          <a:xfrm>
-            <a:off x="10561680" y="0"/>
-            <a:ext cx="1082160" cy="2505960"/>
-          </a:xfrm>
-          <a:prstGeom prst="rect">
-            <a:avLst/>
-          </a:prstGeom>
-          <a:ln>
-            <a:noFill/>
-          </a:ln>
-        </p:spPr>
-      </p:pic>
-      <p:sp>
-        <p:nvSpPr>
-          <p:cNvPr id="64" name="CustomShape 2"/>
-          <p:cNvSpPr/>
-          <p:nvPr/>
-        </p:nvSpPr>
-        <p:spPr>
-          <a:xfrm>
-            <a:off x="504000" y="6479280"/>
-            <a:ext cx="11129040" cy="718920"/>
-          </a:xfrm>
-          <a:prstGeom prst="rect">
-            <a:avLst/>
-          </a:prstGeom>
-          <a:noFill/>
-          <a:ln>
-            <a:noFill/>
-          </a:ln>
-        </p:spPr>
-        <p:style>
-          <a:lnRef idx="0">
-            <a:scrgbClr r="0" g="0" b="0"/>
-          </a:lnRef>
-          <a:fillRef idx="0">
-            <a:scrgbClr r="0" g="0" b="0"/>
-          </a:fillRef>
-          <a:effectRef idx="0">
-            <a:scrgbClr r="0" g="0" b="0"/>
-          </a:effectRef>
-          <a:fontRef idx="minor"/>
-        </p:style>
-        <p:txBody>
-          <a:bodyPr lIns="90000" tIns="45000" rIns="90000" bIns="45000"/>
-          <a:lstStyle/>
-          <a:p>
-            <a:pPr algn="ctr">
-              <a:lnSpc>
-                <a:spcPct val="100000"/>
-              </a:lnSpc>
-            </a:pPr>
-            <a:r>
-              <a:rPr lang="pt-BR" sz="1500" b="1" strike="noStrike" spc="-1">
-                <a:solidFill>
-                  <a:srgbClr val="8DC641"/>
-                </a:solidFill>
-                <a:latin typeface="Arial"/>
-                <a:ea typeface="Arial"/>
-              </a:rPr>
-              <a:t> Fabio Vasques, Gieder Loreto</a:t>
-            </a:r>
-            <a:endParaRPr lang="pt-BR" sz="1500" b="0" strike="noStrike" spc="-1">
-              <a:latin typeface="Arial"/>
-            </a:endParaRPr>
-          </a:p>
-        </p:txBody>
-      </p:sp>
-      <p:pic>
-        <p:nvPicPr>
-          <p:cNvPr id="65" name="Google Shape;166;p39"/>
-          <p:cNvPicPr/>
-          <p:nvPr/>
-        </p:nvPicPr>
-        <p:blipFill>
-          <a:blip r:embed="rId3"/>
-          <a:stretch/>
-        </p:blipFill>
-        <p:spPr>
-          <a:xfrm>
-            <a:off x="235080" y="283680"/>
-            <a:ext cx="3999600" cy="1018440"/>
-          </a:xfrm>
-          <a:prstGeom prst="rect">
-            <a:avLst/>
-          </a:prstGeom>
-          <a:ln>
-            <a:noFill/>
-          </a:ln>
-        </p:spPr>
-      </p:pic>
-      <p:sp>
-        <p:nvSpPr>
-          <p:cNvPr id="66" name="TextShape 3"/>
-          <p:cNvSpPr txBox="1"/>
-          <p:nvPr/>
-        </p:nvSpPr>
-        <p:spPr>
-          <a:xfrm>
-            <a:off x="403560" y="1224000"/>
-            <a:ext cx="10612440" cy="1008000"/>
-          </a:xfrm>
-          <a:prstGeom prst="rect">
-            <a:avLst/>
-          </a:prstGeom>
-          <a:noFill/>
-          <a:ln>
-            <a:noFill/>
-          </a:ln>
-        </p:spPr>
-        <p:txBody>
-          <a:bodyPr lIns="0" tIns="0" rIns="0" bIns="0" anchor="ctr"/>
-          <a:lstStyle/>
-          <a:p>
-            <a:pPr algn="ctr"/>
-            <a:r>
-              <a:rPr lang="pt-BR" sz="1800" b="0" strike="noStrike" spc="-1">
-                <a:solidFill>
-                  <a:srgbClr val="000000"/>
-                </a:solidFill>
-                <a:latin typeface="Arial"/>
-              </a:rPr>
-              <a:t>Modelo Físico</a:t>
-            </a:r>
-          </a:p>
-        </p:txBody>
-      </p:sp>
-      <p:sp>
-        <p:nvSpPr>
-          <p:cNvPr id="67" name="TextShape 4"/>
-          <p:cNvSpPr txBox="1"/>
-          <p:nvPr/>
-        </p:nvSpPr>
-        <p:spPr>
-          <a:xfrm>
-            <a:off x="1800000" y="2135880"/>
-            <a:ext cx="7263000" cy="3930120"/>
-          </a:xfrm>
-          <a:prstGeom prst="rect">
-            <a:avLst/>
-          </a:prstGeom>
-          <a:noFill/>
-          <a:ln>
-            <a:noFill/>
-          </a:ln>
-        </p:spPr>
-        <p:txBody>
-          <a:bodyPr lIns="90000" tIns="45000" rIns="90000" bIns="45000"/>
-          <a:lstStyle/>
-          <a:p>
-            <a:r>
-              <a:rPr lang="pt-BR" sz="1800" b="0" strike="noStrike" spc="-1">
-                <a:latin typeface="Arial"/>
-              </a:rPr>
-              <a:t>CREATE TABLE IF NOT EXISTS `bd-sus`.`especialidade` (</a:t>
-            </a:r>
-          </a:p>
-          <a:p>
-            <a:r>
-              <a:rPr lang="pt-BR" sz="1800" b="0" strike="noStrike" spc="-1">
-                <a:latin typeface="Arial"/>
-              </a:rPr>
-              <a:t>  `cod-especialidade` INT NOT NULL AUTO_INCREMENT,</a:t>
-            </a:r>
-          </a:p>
-          <a:p>
-            <a:r>
-              <a:rPr lang="pt-BR" sz="1800" b="0" strike="noStrike" spc="-1">
-                <a:latin typeface="Arial"/>
-              </a:rPr>
-              <a:t>  `nome-especialidade` VARCHAR(60) NOT NULL,</a:t>
-            </a:r>
-          </a:p>
-          <a:p>
-            <a:r>
-              <a:rPr lang="pt-BR" sz="1800" b="0" strike="noStrike" spc="-1">
-                <a:latin typeface="Arial"/>
-              </a:rPr>
-              <a:t>  `descricao-especialidade` VARCHAR(100) NULL,</a:t>
-            </a:r>
-          </a:p>
-          <a:p>
-            <a:r>
-              <a:rPr lang="pt-BR" sz="1800" b="0" strike="noStrike" spc="-1">
-                <a:latin typeface="Arial"/>
-              </a:rPr>
-              <a:t>  `agenda_cod-agenda` INT NOT NULL,</a:t>
-            </a:r>
-          </a:p>
-          <a:p>
-            <a:r>
-              <a:rPr lang="pt-BR" sz="1800" b="0" strike="noStrike" spc="-1">
-                <a:latin typeface="Arial"/>
-              </a:rPr>
-              <a:t>  PRIMARY KEY (`cod-especialidade`, `agenda_cod-agenda`),</a:t>
-            </a:r>
-          </a:p>
-          <a:p>
-            <a:r>
-              <a:rPr lang="pt-BR" sz="1800" b="0" strike="noStrike" spc="-1">
-                <a:latin typeface="Arial"/>
-              </a:rPr>
-              <a:t>  INDEX `fk_especialidade_agenda_idx` (`agenda_cod-agenda` ASC),</a:t>
-            </a:r>
-          </a:p>
-          <a:p>
-            <a:r>
-              <a:rPr lang="pt-BR" sz="1800" b="0" strike="noStrike" spc="-1">
-                <a:latin typeface="Arial"/>
-              </a:rPr>
-              <a:t>  CONSTRAINT `fk_especialidade_agenda`</a:t>
-            </a:r>
-          </a:p>
-          <a:p>
-            <a:r>
-              <a:rPr lang="pt-BR" sz="1800" b="0" strike="noStrike" spc="-1">
-                <a:latin typeface="Arial"/>
-              </a:rPr>
-              <a:t>    FOREIGN KEY (`agenda_cod-agenda`)</a:t>
-            </a:r>
-          </a:p>
-          <a:p>
-            <a:r>
-              <a:rPr lang="pt-BR" sz="1800" b="0" strike="noStrike" spc="-1">
-                <a:latin typeface="Arial"/>
-              </a:rPr>
-              <a:t>    REFERENCES `bd-sus`.`agenda` (`cod-agenda`)</a:t>
-            </a:r>
-          </a:p>
-          <a:p>
-            <a:r>
-              <a:rPr lang="pt-BR" sz="1800" b="0" strike="noStrike" spc="-1">
-                <a:latin typeface="Arial"/>
-              </a:rPr>
-              <a:t>    ON DELETE NO ACTION</a:t>
-            </a:r>
-          </a:p>
-          <a:p>
-            <a:r>
-              <a:rPr lang="pt-BR" sz="1800" b="0" strike="noStrike" spc="-1">
-                <a:latin typeface="Arial"/>
-              </a:rPr>
-              <a:t>    ON UPDATE NO ACTION)</a:t>
-            </a:r>
-          </a:p>
-          <a:p>
-            <a:r>
-              <a:rPr lang="pt-BR" sz="1800" b="0" strike="noStrike" spc="-1">
-                <a:latin typeface="Arial"/>
-              </a:rPr>
-              <a:t>ENGINE = InnoDB</a:t>
-            </a:r>
-          </a:p>
-          <a:p>
-            <a:r>
-              <a:rPr lang="pt-BR" sz="1800" b="0" strike="noStrike" spc="-1">
-                <a:latin typeface="Arial"/>
-              </a:rPr>
-              <a:t>DEFAULT CHARACTER SET = latin1</a:t>
-            </a:r>
-          </a:p>
-          <a:p>
-            <a:r>
-              <a:rPr lang="pt-BR" sz="1800" b="0" strike="noStrike" spc="-1">
-                <a:latin typeface="Arial"/>
-              </a:rPr>
-              <a:t>COLLATE = latin1_german2_ci;</a:t>
-            </a:r>
-          </a:p>
-        </p:txBody>
-      </p:sp>
-    </p:spTree>
-  </p:cSld>
-  <p:clrMapOvr>
-    <a:masterClrMapping/>
-  </p:clrMapOvr>
-  <p:timing>
-    <p:tnLst>
-      <p:par>
-        <p:cTn id="1" dur="indefinite" restart="never" nodeType="tmRoot">
-          <p:childTnLst>
-            <p:seq>
-              <p:cTn id="2" dur="indefinite" nodeType="mainSeq"/>
-              <p:prevCondLst>
-                <p:cond evt="onPrev" delay="0">
-                  <p:tgtEl>
-                    <p:sldTgt/>
-                  </p:tgtEl>
-                </p:cond>
-              </p:prevCondLst>
-              <p:nextCondLst>
-                <p:cond evt="onNext" delay="0">
-                  <p:tgtEl>
-                    <p:sldTgt/>
-                  </p:tgtEl>
-                </p:cond>
-              </p:nextCondLst>
-            </p:seq>
-          </p:childTnLst>
-        </p:cTn>
-      </p:par>
-    </p:tnLst>
-  </p:timing>
-</p:sld>
-</file>
-
-<file path=ppt/slides/slide8.xml><?xml version="1.0" encoding="utf-8"?>
-<p:sld xmlns:a="http://schemas.openxmlformats.org/drawingml/2006/main" xmlns:r="http://schemas.openxmlformats.org/officeDocument/2006/relationships" xmlns:p="http://schemas.openxmlformats.org/presentationml/2006/main">
-  <p:cSld>
-    <p:bg>
-      <p:bgPr>
-        <a:solidFill>
-          <a:srgbClr val="FFFFFF"/>
-        </a:solidFill>
-        <a:effectLst/>
-      </p:bgPr>
-    </p:bg>
-    <p:spTree>
-      <p:nvGrpSpPr>
-        <p:cNvPr id="1" name=""/>
-        <p:cNvGrpSpPr/>
-        <p:nvPr/>
-      </p:nvGrpSpPr>
-      <p:grpSpPr>
-        <a:xfrm>
-          <a:off x="0" y="0"/>
-          <a:ext cx="0" cy="0"/>
-          <a:chOff x="0" y="0"/>
-          <a:chExt cx="0" cy="0"/>
-        </a:xfrm>
-      </p:grpSpPr>
-      <p:sp>
-        <p:nvSpPr>
-          <p:cNvPr id="68" name="CustomShape 1"/>
-          <p:cNvSpPr/>
-          <p:nvPr/>
-        </p:nvSpPr>
-        <p:spPr>
-          <a:xfrm>
-            <a:off x="0" y="0"/>
-            <a:ext cx="12191040" cy="1585440"/>
-          </a:xfrm>
-          <a:prstGeom prst="rect">
-            <a:avLst/>
-          </a:prstGeom>
-          <a:solidFill>
-            <a:srgbClr val="347C36"/>
-          </a:solidFill>
-          <a:ln>
-            <a:noFill/>
-          </a:ln>
-        </p:spPr>
-        <p:style>
-          <a:lnRef idx="0">
-            <a:scrgbClr r="0" g="0" b="0"/>
-          </a:lnRef>
-          <a:fillRef idx="0">
-            <a:scrgbClr r="0" g="0" b="0"/>
-          </a:fillRef>
-          <a:effectRef idx="0">
-            <a:scrgbClr r="0" g="0" b="0"/>
-          </a:effectRef>
-          <a:fontRef idx="minor"/>
-        </p:style>
-      </p:sp>
-      <p:pic>
-        <p:nvPicPr>
-          <p:cNvPr id="69" name="Google Shape;89;p13"/>
-          <p:cNvPicPr/>
-          <p:nvPr/>
-        </p:nvPicPr>
-        <p:blipFill>
-          <a:blip r:embed="rId2"/>
-          <a:stretch/>
-        </p:blipFill>
-        <p:spPr>
-          <a:xfrm>
-            <a:off x="10561680" y="0"/>
-            <a:ext cx="1082160" cy="2505960"/>
-          </a:xfrm>
-          <a:prstGeom prst="rect">
-            <a:avLst/>
-          </a:prstGeom>
-          <a:ln>
-            <a:noFill/>
-          </a:ln>
-        </p:spPr>
-      </p:pic>
-      <p:sp>
-        <p:nvSpPr>
-          <p:cNvPr id="70" name="CustomShape 2"/>
-          <p:cNvSpPr/>
-          <p:nvPr/>
-        </p:nvSpPr>
-        <p:spPr>
-          <a:xfrm>
-            <a:off x="504000" y="6479280"/>
-            <a:ext cx="11129040" cy="718920"/>
-          </a:xfrm>
-          <a:prstGeom prst="rect">
-            <a:avLst/>
-          </a:prstGeom>
-          <a:noFill/>
-          <a:ln>
-            <a:noFill/>
-          </a:ln>
-        </p:spPr>
-        <p:style>
-          <a:lnRef idx="0">
-            <a:scrgbClr r="0" g="0" b="0"/>
-          </a:lnRef>
-          <a:fillRef idx="0">
-            <a:scrgbClr r="0" g="0" b="0"/>
-          </a:fillRef>
-          <a:effectRef idx="0">
-            <a:scrgbClr r="0" g="0" b="0"/>
-          </a:effectRef>
-          <a:fontRef idx="minor"/>
-        </p:style>
-        <p:txBody>
-          <a:bodyPr lIns="90000" tIns="45000" rIns="90000" bIns="45000"/>
-          <a:lstStyle/>
-          <a:p>
-            <a:pPr algn="ctr">
-              <a:lnSpc>
-                <a:spcPct val="100000"/>
-              </a:lnSpc>
-            </a:pPr>
-            <a:r>
-              <a:rPr lang="pt-BR" sz="1500" b="1" strike="noStrike" spc="-1">
-                <a:solidFill>
-                  <a:srgbClr val="8DC641"/>
-                </a:solidFill>
-                <a:latin typeface="Arial"/>
-                <a:ea typeface="Arial"/>
-              </a:rPr>
-              <a:t> Fabio Vasques, Gieder Loreto</a:t>
-            </a:r>
-            <a:endParaRPr lang="pt-BR" sz="1500" b="0" strike="noStrike" spc="-1">
-              <a:latin typeface="Arial"/>
-            </a:endParaRPr>
-          </a:p>
-        </p:txBody>
-      </p:sp>
-      <p:pic>
-        <p:nvPicPr>
-          <p:cNvPr id="71" name="Google Shape;166;p39"/>
-          <p:cNvPicPr/>
-          <p:nvPr/>
-        </p:nvPicPr>
-        <p:blipFill>
-          <a:blip r:embed="rId3"/>
-          <a:stretch/>
-        </p:blipFill>
-        <p:spPr>
-          <a:xfrm>
-            <a:off x="235080" y="283680"/>
-            <a:ext cx="3999600" cy="1018440"/>
-          </a:xfrm>
-          <a:prstGeom prst="rect">
-            <a:avLst/>
-          </a:prstGeom>
-          <a:ln>
-            <a:noFill/>
-          </a:ln>
-        </p:spPr>
-      </p:pic>
-      <p:sp>
-        <p:nvSpPr>
-          <p:cNvPr id="72" name="TextShape 3"/>
-          <p:cNvSpPr txBox="1"/>
-          <p:nvPr/>
-        </p:nvSpPr>
-        <p:spPr>
-          <a:xfrm>
-            <a:off x="403560" y="1224000"/>
-            <a:ext cx="10612440" cy="1008000"/>
-          </a:xfrm>
-          <a:prstGeom prst="rect">
-            <a:avLst/>
-          </a:prstGeom>
-          <a:noFill/>
-          <a:ln>
-            <a:noFill/>
-          </a:ln>
-        </p:spPr>
-        <p:txBody>
-          <a:bodyPr lIns="0" tIns="0" rIns="0" bIns="0" anchor="ctr"/>
-          <a:lstStyle/>
-          <a:p>
-            <a:pPr algn="ctr"/>
-            <a:r>
-              <a:rPr lang="pt-BR" sz="1800" b="0" strike="noStrike" spc="-1">
-                <a:solidFill>
-                  <a:srgbClr val="000000"/>
-                </a:solidFill>
-                <a:latin typeface="Arial"/>
-              </a:rPr>
-              <a:t>Modelo Físico</a:t>
-            </a:r>
-          </a:p>
-        </p:txBody>
-      </p:sp>
-      <p:sp>
-        <p:nvSpPr>
-          <p:cNvPr id="73" name="TextShape 4"/>
-          <p:cNvSpPr txBox="1"/>
-          <p:nvPr/>
-        </p:nvSpPr>
-        <p:spPr>
-          <a:xfrm>
-            <a:off x="1593720" y="2125800"/>
-            <a:ext cx="7334280" cy="3490200"/>
-          </a:xfrm>
-          <a:prstGeom prst="rect">
-            <a:avLst/>
-          </a:prstGeom>
-          <a:noFill/>
-          <a:ln>
-            <a:noFill/>
-          </a:ln>
-        </p:spPr>
-        <p:txBody>
-          <a:bodyPr lIns="90000" tIns="45000" rIns="90000" bIns="45000"/>
-          <a:lstStyle/>
-          <a:p>
-            <a:r>
-              <a:rPr lang="pt-BR" sz="1800" b="0" strike="noStrike" spc="-1">
-                <a:latin typeface="Arial"/>
-              </a:rPr>
-              <a:t>CREATE TABLE IF NOT EXISTS `bd-sus`.`ubs` (</a:t>
-            </a:r>
-          </a:p>
-          <a:p>
-            <a:r>
-              <a:rPr lang="pt-BR" sz="1800" b="0" strike="noStrike" spc="-1">
-                <a:latin typeface="Arial"/>
-              </a:rPr>
-              <a:t>  `cod-ubs` INT NOT NULL AUTO_INCREMENT,</a:t>
-            </a:r>
-          </a:p>
-          <a:p>
-            <a:r>
-              <a:rPr lang="pt-BR" sz="1800" b="0" strike="noStrike" spc="-1">
-                <a:latin typeface="Arial"/>
-              </a:rPr>
-              <a:t>  `nome-ubs` VARCHAR(100) NULL,</a:t>
-            </a:r>
-          </a:p>
-          <a:p>
-            <a:r>
-              <a:rPr lang="pt-BR" sz="1800" b="0" strike="noStrike" spc="-1">
-                <a:latin typeface="Arial"/>
-              </a:rPr>
-              <a:t>  `rua-ubs` VARCHAR(45) NULL,</a:t>
-            </a:r>
-          </a:p>
-          <a:p>
-            <a:r>
-              <a:rPr lang="pt-BR" sz="1800" b="0" strike="noStrike" spc="-1">
-                <a:latin typeface="Arial"/>
-              </a:rPr>
-              <a:t>  `numero-rua-ubs` VARCHAR(45) NULL,</a:t>
-            </a:r>
-          </a:p>
-          <a:p>
-            <a:r>
-              <a:rPr lang="pt-BR" sz="1800" b="0" strike="noStrike" spc="-1">
-                <a:latin typeface="Arial"/>
-              </a:rPr>
-              <a:t>  `bairro-ubs` VARCHAR(45) NULL,</a:t>
-            </a:r>
-          </a:p>
-          <a:p>
-            <a:r>
-              <a:rPr lang="pt-BR" sz="1800" b="0" strike="noStrike" spc="-1">
-                <a:latin typeface="Arial"/>
-              </a:rPr>
-              <a:t>  `cidade-ubs` VARCHAR(45) NULL,</a:t>
-            </a:r>
-          </a:p>
-          <a:p>
-            <a:r>
-              <a:rPr lang="pt-BR" sz="1800" b="0" strike="noStrike" spc="-1">
-                <a:latin typeface="Arial"/>
-              </a:rPr>
-              <a:t>  `email-ubs` VARCHAR(45) NULL,</a:t>
-            </a:r>
-          </a:p>
-          <a:p>
-            <a:r>
-              <a:rPr lang="pt-BR" sz="1800" b="0" strike="noStrike" spc="-1">
-                <a:latin typeface="Arial"/>
-              </a:rPr>
-              <a:t>  `uf-ubs` CHAR(2) NULL,</a:t>
-            </a:r>
-          </a:p>
-          <a:p>
-            <a:r>
-              <a:rPr lang="pt-BR" sz="1800" b="0" strike="noStrike" spc="-1">
-                <a:latin typeface="Arial"/>
-              </a:rPr>
-              <a:t>  PRIMARY KEY (`cod-ubs`),</a:t>
-            </a:r>
-          </a:p>
-          <a:p>
-            <a:r>
-              <a:rPr lang="pt-BR" sz="1800" b="0" strike="noStrike" spc="-1">
-                <a:latin typeface="Arial"/>
-              </a:rPr>
-              <a:t>  UNIQUE INDEX `nome-ubs_UNIQUE` (`nome-ubs` ASC))</a:t>
-            </a:r>
-          </a:p>
-          <a:p>
-            <a:r>
-              <a:rPr lang="pt-BR" sz="1800" b="0" strike="noStrike" spc="-1">
-                <a:latin typeface="Arial"/>
-              </a:rPr>
-              <a:t>ENGINE = InnoDB</a:t>
-            </a:r>
-          </a:p>
-          <a:p>
-            <a:r>
-              <a:rPr lang="pt-BR" sz="1800" b="0" strike="noStrike" spc="-1">
-                <a:latin typeface="Arial"/>
-              </a:rPr>
-              <a:t>DEFAULT CHARACTER SET = latin1;</a:t>
-            </a:r>
-          </a:p>
-        </p:txBody>
-      </p:sp>
-    </p:spTree>
-  </p:cSld>
-  <p:clrMapOvr>
-    <a:masterClrMapping/>
-  </p:clrMapOvr>
-  <p:timing>
-    <p:tnLst>
-      <p:par>
-        <p:cTn id="1" dur="indefinite" restart="never" nodeType="tmRoot">
-          <p:childTnLst>
-            <p:seq>
-              <p:cTn id="2" dur="indefinite" nodeType="mainSeq"/>
-              <p:prevCondLst>
-                <p:cond evt="onPrev" delay="0">
-                  <p:tgtEl>
-                    <p:sldTgt/>
-                  </p:tgtEl>
-                </p:cond>
-              </p:prevCondLst>
-              <p:nextCondLst>
-                <p:cond evt="onNext" delay="0">
-                  <p:tgtEl>
-                    <p:sldTgt/>
-                  </p:tgtEl>
-                </p:cond>
-              </p:nextCondLst>
-            </p:seq>
-          </p:childTnLst>
-        </p:cTn>
-      </p:par>
-    </p:tnLst>
-  </p:timing>
-</p:sld>
-</file>
-
-<file path=ppt/slides/slide9.xml><?xml version="1.0" encoding="utf-8"?>
-<p:sld xmlns:a="http://schemas.openxmlformats.org/drawingml/2006/main" xmlns:r="http://schemas.openxmlformats.org/officeDocument/2006/relationships" xmlns:p="http://schemas.openxmlformats.org/presentationml/2006/main">
-  <p:cSld>
-    <p:bg>
-      <p:bgPr>
-        <a:solidFill>
-          <a:srgbClr val="FFFFFF"/>
-        </a:solidFill>
-        <a:effectLst/>
-      </p:bgPr>
-    </p:bg>
-    <p:spTree>
-      <p:nvGrpSpPr>
-        <p:cNvPr id="1" name=""/>
-        <p:cNvGrpSpPr/>
-        <p:nvPr/>
-      </p:nvGrpSpPr>
-      <p:grpSpPr>
-        <a:xfrm>
-          <a:off x="0" y="0"/>
-          <a:ext cx="0" cy="0"/>
-          <a:chOff x="0" y="0"/>
-          <a:chExt cx="0" cy="0"/>
-        </a:xfrm>
-      </p:grpSpPr>
-      <p:sp>
-        <p:nvSpPr>
-          <p:cNvPr id="74" name="CustomShape 1"/>
-          <p:cNvSpPr/>
-          <p:nvPr/>
-        </p:nvSpPr>
-        <p:spPr>
-          <a:xfrm>
-            <a:off x="0" y="0"/>
-            <a:ext cx="12191040" cy="1585440"/>
-          </a:xfrm>
-          <a:prstGeom prst="rect">
-            <a:avLst/>
-          </a:prstGeom>
-          <a:solidFill>
-            <a:srgbClr val="347C36"/>
-          </a:solidFill>
-          <a:ln>
-            <a:noFill/>
-          </a:ln>
-        </p:spPr>
-        <p:style>
-          <a:lnRef idx="0">
-            <a:scrgbClr r="0" g="0" b="0"/>
-          </a:lnRef>
-          <a:fillRef idx="0">
-            <a:scrgbClr r="0" g="0" b="0"/>
-          </a:fillRef>
-          <a:effectRef idx="0">
-            <a:scrgbClr r="0" g="0" b="0"/>
-          </a:effectRef>
-          <a:fontRef idx="minor"/>
-        </p:style>
-      </p:sp>
-      <p:pic>
-        <p:nvPicPr>
-          <p:cNvPr id="75" name="Google Shape;89;p13"/>
-          <p:cNvPicPr/>
-          <p:nvPr/>
-        </p:nvPicPr>
-        <p:blipFill>
-          <a:blip r:embed="rId2"/>
-          <a:stretch/>
-        </p:blipFill>
-        <p:spPr>
-          <a:xfrm>
-            <a:off x="10561680" y="0"/>
-            <a:ext cx="1082160" cy="2505960"/>
-          </a:xfrm>
-          <a:prstGeom prst="rect">
-            <a:avLst/>
-          </a:prstGeom>
-          <a:ln>
-            <a:noFill/>
-          </a:ln>
-        </p:spPr>
-      </p:pic>
-      <p:sp>
-        <p:nvSpPr>
-          <p:cNvPr id="76" name="CustomShape 2"/>
-          <p:cNvSpPr/>
-          <p:nvPr/>
-        </p:nvSpPr>
-        <p:spPr>
-          <a:xfrm>
-            <a:off x="504000" y="6479280"/>
-            <a:ext cx="11129040" cy="718920"/>
-          </a:xfrm>
-          <a:prstGeom prst="rect">
-            <a:avLst/>
-          </a:prstGeom>
-          <a:noFill/>
-          <a:ln>
-            <a:noFill/>
-          </a:ln>
-        </p:spPr>
-        <p:style>
-          <a:lnRef idx="0">
-            <a:scrgbClr r="0" g="0" b="0"/>
-          </a:lnRef>
-          <a:fillRef idx="0">
-            <a:scrgbClr r="0" g="0" b="0"/>
-          </a:fillRef>
-          <a:effectRef idx="0">
-            <a:scrgbClr r="0" g="0" b="0"/>
-          </a:effectRef>
-          <a:fontRef idx="minor"/>
-        </p:style>
-        <p:txBody>
-          <a:bodyPr lIns="90000" tIns="45000" rIns="90000" bIns="45000"/>
-          <a:lstStyle/>
-          <a:p>
-            <a:pPr algn="ctr">
-              <a:lnSpc>
-                <a:spcPct val="100000"/>
-              </a:lnSpc>
-            </a:pPr>
-            <a:r>
-              <a:rPr lang="pt-BR" sz="1500" b="1" strike="noStrike" spc="-1">
-                <a:solidFill>
-                  <a:srgbClr val="8DC641"/>
-                </a:solidFill>
-                <a:latin typeface="Arial"/>
-                <a:ea typeface="Arial"/>
-              </a:rPr>
-              <a:t> Fabio Vasques, Gieder Loreto</a:t>
-            </a:r>
-            <a:endParaRPr lang="pt-BR" sz="1500" b="0" strike="noStrike" spc="-1">
-              <a:latin typeface="Arial"/>
-            </a:endParaRPr>
-          </a:p>
-        </p:txBody>
-      </p:sp>
-      <p:pic>
-        <p:nvPicPr>
-          <p:cNvPr id="77" name="Google Shape;166;p39"/>
-          <p:cNvPicPr/>
-          <p:nvPr/>
-        </p:nvPicPr>
-        <p:blipFill>
-          <a:blip r:embed="rId3"/>
-          <a:stretch/>
-        </p:blipFill>
-        <p:spPr>
-          <a:xfrm>
-            <a:off x="235080" y="283680"/>
-            <a:ext cx="3999600" cy="1018440"/>
-          </a:xfrm>
-          <a:prstGeom prst="rect">
-            <a:avLst/>
-          </a:prstGeom>
-          <a:ln>
-            <a:noFill/>
-          </a:ln>
-        </p:spPr>
-      </p:pic>
-      <p:sp>
-        <p:nvSpPr>
-          <p:cNvPr id="78" name="TextShape 3"/>
-          <p:cNvSpPr txBox="1"/>
-          <p:nvPr/>
-        </p:nvSpPr>
-        <p:spPr>
-          <a:xfrm>
-            <a:off x="403560" y="1116000"/>
-            <a:ext cx="10612440" cy="1008000"/>
-          </a:xfrm>
-          <a:prstGeom prst="rect">
-            <a:avLst/>
-          </a:prstGeom>
-          <a:noFill/>
-          <a:ln>
-            <a:noFill/>
-          </a:ln>
-        </p:spPr>
-        <p:txBody>
-          <a:bodyPr lIns="0" tIns="0" rIns="0" bIns="0" anchor="ctr"/>
-          <a:lstStyle/>
-          <a:p>
-            <a:pPr algn="ctr"/>
-            <a:r>
-              <a:rPr lang="pt-BR" sz="1800" b="0" strike="noStrike" spc="-1">
-                <a:solidFill>
-                  <a:srgbClr val="000000"/>
-                </a:solidFill>
-                <a:latin typeface="Arial"/>
-              </a:rPr>
-              <a:t>Modelo Físico</a:t>
-            </a:r>
-          </a:p>
-        </p:txBody>
-      </p:sp>
-      <p:sp>
-        <p:nvSpPr>
-          <p:cNvPr id="79" name="TextShape 4"/>
-          <p:cNvSpPr txBox="1"/>
-          <p:nvPr/>
-        </p:nvSpPr>
-        <p:spPr>
-          <a:xfrm>
-            <a:off x="576000" y="1692000"/>
-            <a:ext cx="11115720" cy="5465520"/>
-          </a:xfrm>
-          <a:prstGeom prst="rect">
-            <a:avLst/>
-          </a:prstGeom>
-          <a:noFill/>
-          <a:ln>
-            <a:noFill/>
-          </a:ln>
-        </p:spPr>
-        <p:txBody>
-          <a:bodyPr lIns="90000" tIns="45000" rIns="90000" bIns="45000"/>
-          <a:lstStyle/>
-          <a:p>
-            <a:r>
-              <a:rPr lang="pt-BR" sz="1800" b="0" strike="noStrike" spc="-1">
-                <a:latin typeface="Arial"/>
-              </a:rPr>
-              <a:t>CREATE TABLE IF NOT EXISTS `bd-sus`.`especialidade_has_ubs` (</a:t>
-            </a:r>
-          </a:p>
-          <a:p>
-            <a:r>
-              <a:rPr lang="pt-BR" sz="1800" b="0" strike="noStrike" spc="-1">
-                <a:latin typeface="Arial"/>
-              </a:rPr>
-              <a:t>  `especialidade_cod-especialidade` INT NOT NULL,</a:t>
-            </a:r>
-          </a:p>
-          <a:p>
-            <a:r>
-              <a:rPr lang="pt-BR" sz="1800" b="0" strike="noStrike" spc="-1">
-                <a:latin typeface="Arial"/>
-              </a:rPr>
-              <a:t>  `especialidade_agenda_cod-agenda` INT NOT NULL,</a:t>
-            </a:r>
-          </a:p>
-          <a:p>
-            <a:r>
-              <a:rPr lang="pt-BR" sz="1800" b="0" strike="noStrike" spc="-1">
-                <a:latin typeface="Arial"/>
-              </a:rPr>
-              <a:t>  `ubs_cod-ubs` INT NOT NULL,</a:t>
-            </a:r>
-          </a:p>
-          <a:p>
-            <a:r>
-              <a:rPr lang="pt-BR" sz="1800" b="0" strike="noStrike" spc="-1">
-                <a:latin typeface="Arial"/>
-              </a:rPr>
-              <a:t>  PRIMARY KEY (`especialidade_cod-especialidade`, `especialidade_agenda_cod-agenda`, `ubs_cod-ubs`),</a:t>
-            </a:r>
-          </a:p>
-          <a:p>
-            <a:r>
-              <a:rPr lang="pt-BR" sz="1800" b="0" strike="noStrike" spc="-1">
-                <a:latin typeface="Arial"/>
-              </a:rPr>
-              <a:t>  INDEX `fk_especialidade_has_ubs_ubs1_idx` (`ubs_cod-ubs` ASC),</a:t>
-            </a:r>
-          </a:p>
-          <a:p>
-            <a:r>
-              <a:rPr lang="pt-BR" sz="1800" b="0" strike="noStrike" spc="-1">
-                <a:latin typeface="Arial"/>
-              </a:rPr>
-              <a:t>  INDEX `fk_especialidade_has_ubs_especialidade1_idx` (`especialidade_cod-especialidade` ASC, `especialidade_agenda_cod-agenda` ASC),</a:t>
-            </a:r>
-          </a:p>
-          <a:p>
-            <a:r>
-              <a:rPr lang="pt-BR" sz="1800" b="0" strike="noStrike" spc="-1">
-                <a:latin typeface="Arial"/>
-              </a:rPr>
-              <a:t>  CONSTRAINT `fk_especialidade_has_ubs_especialidade1`</a:t>
-            </a:r>
-          </a:p>
-          <a:p>
-            <a:r>
-              <a:rPr lang="pt-BR" sz="1800" b="0" strike="noStrike" spc="-1">
-                <a:latin typeface="Arial"/>
-              </a:rPr>
-              <a:t>    FOREIGN KEY (`especialidade_cod-especialidade` , `especialidade_agenda_cod-agenda`)</a:t>
-            </a:r>
-          </a:p>
-          <a:p>
-            <a:r>
-              <a:rPr lang="pt-BR" sz="1800" b="0" strike="noStrike" spc="-1">
-                <a:latin typeface="Arial"/>
-              </a:rPr>
-              <a:t>    REFERENCES `bd-sus`.`especialidade` (`cod-especialidade` , `agenda_cod-agenda`)</a:t>
-            </a:r>
-          </a:p>
-          <a:p>
-            <a:r>
-              <a:rPr lang="pt-BR" sz="1800" b="0" strike="noStrike" spc="-1">
-                <a:latin typeface="Arial"/>
-              </a:rPr>
-              <a:t>    ON DELETE NO ACTION</a:t>
-            </a:r>
-          </a:p>
-          <a:p>
-            <a:r>
-              <a:rPr lang="pt-BR" sz="1800" b="0" strike="noStrike" spc="-1">
-                <a:latin typeface="Arial"/>
-              </a:rPr>
-              <a:t>    ON UPDATE NO ACTION,</a:t>
-            </a:r>
-          </a:p>
-          <a:p>
-            <a:r>
-              <a:rPr lang="pt-BR" sz="1800" b="0" strike="noStrike" spc="-1">
-                <a:latin typeface="Arial"/>
-              </a:rPr>
-              <a:t>  CONSTRAINT `fk_especialidade_has_ubs_ubs1`</a:t>
-            </a:r>
-          </a:p>
-          <a:p>
-            <a:r>
-              <a:rPr lang="pt-BR" sz="1800" b="0" strike="noStrike" spc="-1">
-                <a:latin typeface="Arial"/>
-              </a:rPr>
-              <a:t>    FOREIGN KEY (`ubs_cod-ubs`)</a:t>
-            </a:r>
-          </a:p>
-          <a:p>
-            <a:r>
-              <a:rPr lang="pt-BR" sz="1800" b="0" strike="noStrike" spc="-1">
-                <a:latin typeface="Arial"/>
-              </a:rPr>
-              <a:t>    REFERENCES `bd-sus`.`ubs` (`cod-ubs`)</a:t>
-            </a:r>
-          </a:p>
-          <a:p>
-            <a:r>
-              <a:rPr lang="pt-BR" sz="1800" b="0" strike="noStrike" spc="-1">
-                <a:latin typeface="Arial"/>
-              </a:rPr>
-              <a:t>    ON DELETE NO ACTION</a:t>
-            </a:r>
-          </a:p>
-          <a:p>
-            <a:r>
-              <a:rPr lang="pt-BR" sz="1800" b="0" strike="noStrike" spc="-1">
-                <a:latin typeface="Arial"/>
-              </a:rPr>
-              <a:t>    ON UPDATE NO ACTION)</a:t>
-            </a:r>
-          </a:p>
-          <a:p>
-            <a:r>
-              <a:rPr lang="pt-BR" sz="1800" b="0" strike="noStrike" spc="-1">
-                <a:latin typeface="Arial"/>
-              </a:rPr>
-              <a:t>ENGINE = InnoDB</a:t>
-            </a:r>
-          </a:p>
-          <a:p>
-            <a:r>
-              <a:rPr lang="pt-BR" sz="1800" b="0" strike="noStrike" spc="-1">
-                <a:latin typeface="Arial"/>
-              </a:rPr>
-              <a:t>DEFAULT CHARACTER SET = latin1</a:t>
-            </a:r>
-          </a:p>
-          <a:p>
-            <a:r>
-              <a:rPr lang="pt-BR" sz="1800" b="0" strike="noStrike" spc="-1">
-                <a:latin typeface="Arial"/>
-              </a:rPr>
-              <a:t>COLLATE = latin1_german2_ci;</a:t>
-            </a:r>
-          </a:p>
-        </p:txBody>
-      </p:sp>
     </p:spTree>
   </p:cSld>
   <p:clrMapOvr>

</xml_diff>

<commit_message>
Alteração modelo segunda entrega e criação página home.php
</commit_message>
<xml_diff>
--- a/segunda entrega/segunda entrega.pptx
+++ b/segunda entrega/segunda entrega.pptx
@@ -68,7 +68,7 @@
         <p:spPr>
           <a:xfrm>
             <a:off x="609480" y="273600"/>
-            <a:ext cx="10972080" cy="1144440"/>
+            <a:ext cx="10971720" cy="1144080"/>
           </a:xfrm>
           <a:prstGeom prst="rect">
             <a:avLst/>
@@ -77,10 +77,8 @@
         <p:txBody>
           <a:bodyPr lIns="0" rIns="0" tIns="0" bIns="0" anchor="ctr"/>
           <a:p>
-            <a:endParaRPr b="0" lang="pt-BR" sz="1800" spc="-1" strike="noStrike">
-              <a:solidFill>
-                <a:srgbClr val="000000"/>
-              </a:solidFill>
+            <a:pPr algn="ctr"/>
+            <a:endParaRPr b="0" lang="pt-BR" sz="4400" spc="-1" strike="noStrike">
               <a:latin typeface="Arial"/>
             </a:endParaRPr>
           </a:p>
@@ -99,7 +97,7 @@
         <p:spPr>
           <a:xfrm>
             <a:off x="609480" y="1604520"/>
-            <a:ext cx="10972440" cy="1896840"/>
+            <a:ext cx="10972080" cy="1896840"/>
           </a:xfrm>
           <a:prstGeom prst="rect">
             <a:avLst/>
@@ -110,10 +108,7 @@
             <a:normAutofit/>
           </a:bodyPr>
           <a:p>
-            <a:endParaRPr b="0" lang="pt-BR" sz="2800" spc="-1" strike="noStrike">
-              <a:solidFill>
-                <a:srgbClr val="000000"/>
-              </a:solidFill>
+            <a:endParaRPr b="0" lang="pt-BR" sz="3200" spc="-1" strike="noStrike">
               <a:latin typeface="Arial"/>
             </a:endParaRPr>
           </a:p>
@@ -132,7 +127,7 @@
         <p:spPr>
           <a:xfrm>
             <a:off x="609480" y="3682080"/>
-            <a:ext cx="10972440" cy="1896840"/>
+            <a:ext cx="10972080" cy="1896840"/>
           </a:xfrm>
           <a:prstGeom prst="rect">
             <a:avLst/>
@@ -143,10 +138,7 @@
             <a:normAutofit/>
           </a:bodyPr>
           <a:p>
-            <a:endParaRPr b="0" lang="pt-BR" sz="2800" spc="-1" strike="noStrike">
-              <a:solidFill>
-                <a:srgbClr val="000000"/>
-              </a:solidFill>
+            <a:endParaRPr b="0" lang="pt-BR" sz="3200" spc="-1" strike="noStrike">
               <a:latin typeface="Arial"/>
             </a:endParaRPr>
           </a:p>
@@ -187,7 +179,7 @@
         <p:spPr>
           <a:xfrm>
             <a:off x="609480" y="273600"/>
-            <a:ext cx="10972080" cy="1144440"/>
+            <a:ext cx="10971720" cy="1144080"/>
           </a:xfrm>
           <a:prstGeom prst="rect">
             <a:avLst/>
@@ -196,10 +188,8 @@
         <p:txBody>
           <a:bodyPr lIns="0" rIns="0" tIns="0" bIns="0" anchor="ctr"/>
           <a:p>
-            <a:endParaRPr b="0" lang="pt-BR" sz="1800" spc="-1" strike="noStrike">
-              <a:solidFill>
-                <a:srgbClr val="000000"/>
-              </a:solidFill>
+            <a:pPr algn="ctr"/>
+            <a:endParaRPr b="0" lang="pt-BR" sz="4400" spc="-1" strike="noStrike">
               <a:latin typeface="Arial"/>
             </a:endParaRPr>
           </a:p>
@@ -229,10 +219,7 @@
             <a:normAutofit/>
           </a:bodyPr>
           <a:p>
-            <a:endParaRPr b="0" lang="pt-BR" sz="2800" spc="-1" strike="noStrike">
-              <a:solidFill>
-                <a:srgbClr val="000000"/>
-              </a:solidFill>
+            <a:endParaRPr b="0" lang="pt-BR" sz="3200" spc="-1" strike="noStrike">
               <a:latin typeface="Arial"/>
             </a:endParaRPr>
           </a:p>
@@ -262,10 +249,7 @@
             <a:normAutofit/>
           </a:bodyPr>
           <a:p>
-            <a:endParaRPr b="0" lang="pt-BR" sz="2800" spc="-1" strike="noStrike">
-              <a:solidFill>
-                <a:srgbClr val="000000"/>
-              </a:solidFill>
+            <a:endParaRPr b="0" lang="pt-BR" sz="3200" spc="-1" strike="noStrike">
               <a:latin typeface="Arial"/>
             </a:endParaRPr>
           </a:p>
@@ -295,10 +279,7 @@
             <a:normAutofit/>
           </a:bodyPr>
           <a:p>
-            <a:endParaRPr b="0" lang="pt-BR" sz="2800" spc="-1" strike="noStrike">
-              <a:solidFill>
-                <a:srgbClr val="000000"/>
-              </a:solidFill>
+            <a:endParaRPr b="0" lang="pt-BR" sz="3200" spc="-1" strike="noStrike">
               <a:latin typeface="Arial"/>
             </a:endParaRPr>
           </a:p>
@@ -328,10 +309,7 @@
             <a:normAutofit/>
           </a:bodyPr>
           <a:p>
-            <a:endParaRPr b="0" lang="pt-BR" sz="2800" spc="-1" strike="noStrike">
-              <a:solidFill>
-                <a:srgbClr val="000000"/>
-              </a:solidFill>
+            <a:endParaRPr b="0" lang="pt-BR" sz="3200" spc="-1" strike="noStrike">
               <a:latin typeface="Arial"/>
             </a:endParaRPr>
           </a:p>
@@ -372,7 +350,7 @@
         <p:spPr>
           <a:xfrm>
             <a:off x="609480" y="273600"/>
-            <a:ext cx="10972080" cy="1144440"/>
+            <a:ext cx="10971720" cy="1144080"/>
           </a:xfrm>
           <a:prstGeom prst="rect">
             <a:avLst/>
@@ -381,10 +359,8 @@
         <p:txBody>
           <a:bodyPr lIns="0" rIns="0" tIns="0" bIns="0" anchor="ctr"/>
           <a:p>
-            <a:endParaRPr b="0" lang="pt-BR" sz="1800" spc="-1" strike="noStrike">
-              <a:solidFill>
-                <a:srgbClr val="000000"/>
-              </a:solidFill>
+            <a:pPr algn="ctr"/>
+            <a:endParaRPr b="0" lang="pt-BR" sz="4400" spc="-1" strike="noStrike">
               <a:latin typeface="Arial"/>
             </a:endParaRPr>
           </a:p>
@@ -403,7 +379,7 @@
         <p:spPr>
           <a:xfrm>
             <a:off x="609480" y="1604520"/>
-            <a:ext cx="3533040" cy="1896840"/>
+            <a:ext cx="3532680" cy="1896840"/>
           </a:xfrm>
           <a:prstGeom prst="rect">
             <a:avLst/>
@@ -414,10 +390,7 @@
             <a:normAutofit/>
           </a:bodyPr>
           <a:p>
-            <a:endParaRPr b="0" lang="pt-BR" sz="2800" spc="-1" strike="noStrike">
-              <a:solidFill>
-                <a:srgbClr val="000000"/>
-              </a:solidFill>
+            <a:endParaRPr b="0" lang="pt-BR" sz="3200" spc="-1" strike="noStrike">
               <a:latin typeface="Arial"/>
             </a:endParaRPr>
           </a:p>
@@ -435,8 +408,8 @@
         </p:nvSpPr>
         <p:spPr>
           <a:xfrm>
-            <a:off x="4319640" y="1604520"/>
-            <a:ext cx="3533040" cy="1896840"/>
+            <a:off x="4319280" y="1604520"/>
+            <a:ext cx="3532680" cy="1896840"/>
           </a:xfrm>
           <a:prstGeom prst="rect">
             <a:avLst/>
@@ -447,10 +420,7 @@
             <a:normAutofit/>
           </a:bodyPr>
           <a:p>
-            <a:endParaRPr b="0" lang="pt-BR" sz="2800" spc="-1" strike="noStrike">
-              <a:solidFill>
-                <a:srgbClr val="000000"/>
-              </a:solidFill>
+            <a:endParaRPr b="0" lang="pt-BR" sz="3200" spc="-1" strike="noStrike">
               <a:latin typeface="Arial"/>
             </a:endParaRPr>
           </a:p>
@@ -468,8 +438,8 @@
         </p:nvSpPr>
         <p:spPr>
           <a:xfrm>
-            <a:off x="8029800" y="1604520"/>
-            <a:ext cx="3533040" cy="1896840"/>
+            <a:off x="8028720" y="1604520"/>
+            <a:ext cx="3532680" cy="1896840"/>
           </a:xfrm>
           <a:prstGeom prst="rect">
             <a:avLst/>
@@ -480,10 +450,7 @@
             <a:normAutofit/>
           </a:bodyPr>
           <a:p>
-            <a:endParaRPr b="0" lang="pt-BR" sz="2800" spc="-1" strike="noStrike">
-              <a:solidFill>
-                <a:srgbClr val="000000"/>
-              </a:solidFill>
+            <a:endParaRPr b="0" lang="pt-BR" sz="3200" spc="-1" strike="noStrike">
               <a:latin typeface="Arial"/>
             </a:endParaRPr>
           </a:p>
@@ -502,7 +469,7 @@
         <p:spPr>
           <a:xfrm>
             <a:off x="609480" y="3682080"/>
-            <a:ext cx="3533040" cy="1896840"/>
+            <a:ext cx="3532680" cy="1896840"/>
           </a:xfrm>
           <a:prstGeom prst="rect">
             <a:avLst/>
@@ -513,10 +480,7 @@
             <a:normAutofit/>
           </a:bodyPr>
           <a:p>
-            <a:endParaRPr b="0" lang="pt-BR" sz="2800" spc="-1" strike="noStrike">
-              <a:solidFill>
-                <a:srgbClr val="000000"/>
-              </a:solidFill>
+            <a:endParaRPr b="0" lang="pt-BR" sz="3200" spc="-1" strike="noStrike">
               <a:latin typeface="Arial"/>
             </a:endParaRPr>
           </a:p>
@@ -534,8 +498,8 @@
         </p:nvSpPr>
         <p:spPr>
           <a:xfrm>
-            <a:off x="4319640" y="3682080"/>
-            <a:ext cx="3533040" cy="1896840"/>
+            <a:off x="4319280" y="3682080"/>
+            <a:ext cx="3532680" cy="1896840"/>
           </a:xfrm>
           <a:prstGeom prst="rect">
             <a:avLst/>
@@ -546,10 +510,7 @@
             <a:normAutofit/>
           </a:bodyPr>
           <a:p>
-            <a:endParaRPr b="0" lang="pt-BR" sz="2800" spc="-1" strike="noStrike">
-              <a:solidFill>
-                <a:srgbClr val="000000"/>
-              </a:solidFill>
+            <a:endParaRPr b="0" lang="pt-BR" sz="3200" spc="-1" strike="noStrike">
               <a:latin typeface="Arial"/>
             </a:endParaRPr>
           </a:p>
@@ -567,8 +528,8 @@
         </p:nvSpPr>
         <p:spPr>
           <a:xfrm>
-            <a:off x="8029800" y="3682080"/>
-            <a:ext cx="3533040" cy="1896840"/>
+            <a:off x="8028720" y="3682080"/>
+            <a:ext cx="3532680" cy="1896840"/>
           </a:xfrm>
           <a:prstGeom prst="rect">
             <a:avLst/>
@@ -579,10 +540,7 @@
             <a:normAutofit/>
           </a:bodyPr>
           <a:p>
-            <a:endParaRPr b="0" lang="pt-BR" sz="2800" spc="-1" strike="noStrike">
-              <a:solidFill>
-                <a:srgbClr val="000000"/>
-              </a:solidFill>
+            <a:endParaRPr b="0" lang="pt-BR" sz="3200" spc="-1" strike="noStrike">
               <a:latin typeface="Arial"/>
             </a:endParaRPr>
           </a:p>
@@ -623,7 +581,7 @@
         <p:spPr>
           <a:xfrm>
             <a:off x="609480" y="273600"/>
-            <a:ext cx="10972080" cy="1144440"/>
+            <a:ext cx="10971720" cy="1144080"/>
           </a:xfrm>
           <a:prstGeom prst="rect">
             <a:avLst/>
@@ -632,10 +590,8 @@
         <p:txBody>
           <a:bodyPr lIns="0" rIns="0" tIns="0" bIns="0" anchor="ctr"/>
           <a:p>
-            <a:endParaRPr b="0" lang="pt-BR" sz="1800" spc="-1" strike="noStrike">
-              <a:solidFill>
-                <a:srgbClr val="000000"/>
-              </a:solidFill>
+            <a:pPr algn="ctr"/>
+            <a:endParaRPr b="0" lang="pt-BR" sz="4400" spc="-1" strike="noStrike">
               <a:latin typeface="Arial"/>
             </a:endParaRPr>
           </a:p>
@@ -654,7 +610,7 @@
         <p:spPr>
           <a:xfrm>
             <a:off x="609480" y="1604520"/>
-            <a:ext cx="10972440" cy="3977280"/>
+            <a:ext cx="10972080" cy="3976920"/>
           </a:xfrm>
           <a:prstGeom prst="rect">
             <a:avLst/>
@@ -705,7 +661,7 @@
         <p:spPr>
           <a:xfrm>
             <a:off x="609480" y="273600"/>
-            <a:ext cx="10972080" cy="1144440"/>
+            <a:ext cx="10971720" cy="1144080"/>
           </a:xfrm>
           <a:prstGeom prst="rect">
             <a:avLst/>
@@ -714,10 +670,8 @@
         <p:txBody>
           <a:bodyPr lIns="0" rIns="0" tIns="0" bIns="0" anchor="ctr"/>
           <a:p>
-            <a:endParaRPr b="0" lang="pt-BR" sz="1800" spc="-1" strike="noStrike">
-              <a:solidFill>
-                <a:srgbClr val="000000"/>
-              </a:solidFill>
+            <a:pPr algn="ctr"/>
+            <a:endParaRPr b="0" lang="pt-BR" sz="4400" spc="-1" strike="noStrike">
               <a:latin typeface="Arial"/>
             </a:endParaRPr>
           </a:p>
@@ -736,7 +690,7 @@
         <p:spPr>
           <a:xfrm>
             <a:off x="609480" y="1604520"/>
-            <a:ext cx="10972440" cy="3977280"/>
+            <a:ext cx="10972080" cy="3976920"/>
           </a:xfrm>
           <a:prstGeom prst="rect">
             <a:avLst/>
@@ -747,10 +701,7 @@
             <a:normAutofit/>
           </a:bodyPr>
           <a:p>
-            <a:endParaRPr b="0" lang="pt-BR" sz="2800" spc="-1" strike="noStrike">
-              <a:solidFill>
-                <a:srgbClr val="000000"/>
-              </a:solidFill>
+            <a:endParaRPr b="0" lang="pt-BR" sz="3200" spc="-1" strike="noStrike">
               <a:latin typeface="Arial"/>
             </a:endParaRPr>
           </a:p>
@@ -791,7 +742,7 @@
         <p:spPr>
           <a:xfrm>
             <a:off x="609480" y="273600"/>
-            <a:ext cx="10972080" cy="1144440"/>
+            <a:ext cx="10971720" cy="1144080"/>
           </a:xfrm>
           <a:prstGeom prst="rect">
             <a:avLst/>
@@ -800,10 +751,8 @@
         <p:txBody>
           <a:bodyPr lIns="0" rIns="0" tIns="0" bIns="0" anchor="ctr"/>
           <a:p>
-            <a:endParaRPr b="0" lang="pt-BR" sz="1800" spc="-1" strike="noStrike">
-              <a:solidFill>
-                <a:srgbClr val="000000"/>
-              </a:solidFill>
+            <a:pPr algn="ctr"/>
+            <a:endParaRPr b="0" lang="pt-BR" sz="4400" spc="-1" strike="noStrike">
               <a:latin typeface="Arial"/>
             </a:endParaRPr>
           </a:p>
@@ -822,7 +771,7 @@
         <p:spPr>
           <a:xfrm>
             <a:off x="609480" y="1604520"/>
-            <a:ext cx="5354280" cy="3977280"/>
+            <a:ext cx="5354280" cy="3976920"/>
           </a:xfrm>
           <a:prstGeom prst="rect">
             <a:avLst/>
@@ -833,10 +782,7 @@
             <a:normAutofit/>
           </a:bodyPr>
           <a:p>
-            <a:endParaRPr b="0" lang="pt-BR" sz="2800" spc="-1" strike="noStrike">
-              <a:solidFill>
-                <a:srgbClr val="000000"/>
-              </a:solidFill>
+            <a:endParaRPr b="0" lang="pt-BR" sz="3200" spc="-1" strike="noStrike">
               <a:latin typeface="Arial"/>
             </a:endParaRPr>
           </a:p>
@@ -855,7 +801,7 @@
         <p:spPr>
           <a:xfrm>
             <a:off x="6231960" y="1604520"/>
-            <a:ext cx="5354280" cy="3977280"/>
+            <a:ext cx="5354280" cy="3976920"/>
           </a:xfrm>
           <a:prstGeom prst="rect">
             <a:avLst/>
@@ -866,10 +812,7 @@
             <a:normAutofit/>
           </a:bodyPr>
           <a:p>
-            <a:endParaRPr b="0" lang="pt-BR" sz="2800" spc="-1" strike="noStrike">
-              <a:solidFill>
-                <a:srgbClr val="000000"/>
-              </a:solidFill>
+            <a:endParaRPr b="0" lang="pt-BR" sz="3200" spc="-1" strike="noStrike">
               <a:latin typeface="Arial"/>
             </a:endParaRPr>
           </a:p>
@@ -910,7 +853,7 @@
         <p:spPr>
           <a:xfrm>
             <a:off x="609480" y="273600"/>
-            <a:ext cx="10972080" cy="1144440"/>
+            <a:ext cx="10971720" cy="1144080"/>
           </a:xfrm>
           <a:prstGeom prst="rect">
             <a:avLst/>
@@ -919,10 +862,8 @@
         <p:txBody>
           <a:bodyPr lIns="0" rIns="0" tIns="0" bIns="0" anchor="ctr"/>
           <a:p>
-            <a:endParaRPr b="0" lang="pt-BR" sz="1800" spc="-1" strike="noStrike">
-              <a:solidFill>
-                <a:srgbClr val="000000"/>
-              </a:solidFill>
+            <a:pPr algn="ctr"/>
+            <a:endParaRPr b="0" lang="pt-BR" sz="4400" spc="-1" strike="noStrike">
               <a:latin typeface="Arial"/>
             </a:endParaRPr>
           </a:p>
@@ -963,7 +904,7 @@
         <p:spPr>
           <a:xfrm>
             <a:off x="609480" y="273600"/>
-            <a:ext cx="10972080" cy="5306400"/>
+            <a:ext cx="10971720" cy="5304600"/>
           </a:xfrm>
           <a:prstGeom prst="rect">
             <a:avLst/>
@@ -1014,7 +955,7 @@
         <p:spPr>
           <a:xfrm>
             <a:off x="609480" y="273600"/>
-            <a:ext cx="10972080" cy="1144440"/>
+            <a:ext cx="10971720" cy="1144080"/>
           </a:xfrm>
           <a:prstGeom prst="rect">
             <a:avLst/>
@@ -1023,10 +964,8 @@
         <p:txBody>
           <a:bodyPr lIns="0" rIns="0" tIns="0" bIns="0" anchor="ctr"/>
           <a:p>
-            <a:endParaRPr b="0" lang="pt-BR" sz="1800" spc="-1" strike="noStrike">
-              <a:solidFill>
-                <a:srgbClr val="000000"/>
-              </a:solidFill>
+            <a:pPr algn="ctr"/>
+            <a:endParaRPr b="0" lang="pt-BR" sz="4400" spc="-1" strike="noStrike">
               <a:latin typeface="Arial"/>
             </a:endParaRPr>
           </a:p>
@@ -1056,10 +995,7 @@
             <a:normAutofit/>
           </a:bodyPr>
           <a:p>
-            <a:endParaRPr b="0" lang="pt-BR" sz="2800" spc="-1" strike="noStrike">
-              <a:solidFill>
-                <a:srgbClr val="000000"/>
-              </a:solidFill>
+            <a:endParaRPr b="0" lang="pt-BR" sz="3200" spc="-1" strike="noStrike">
               <a:latin typeface="Arial"/>
             </a:endParaRPr>
           </a:p>
@@ -1078,7 +1014,7 @@
         <p:spPr>
           <a:xfrm>
             <a:off x="6231960" y="1604520"/>
-            <a:ext cx="5354280" cy="3977280"/>
+            <a:ext cx="5354280" cy="3976920"/>
           </a:xfrm>
           <a:prstGeom prst="rect">
             <a:avLst/>
@@ -1089,10 +1025,7 @@
             <a:normAutofit/>
           </a:bodyPr>
           <a:p>
-            <a:endParaRPr b="0" lang="pt-BR" sz="2800" spc="-1" strike="noStrike">
-              <a:solidFill>
-                <a:srgbClr val="000000"/>
-              </a:solidFill>
+            <a:endParaRPr b="0" lang="pt-BR" sz="3200" spc="-1" strike="noStrike">
               <a:latin typeface="Arial"/>
             </a:endParaRPr>
           </a:p>
@@ -1122,10 +1055,7 @@
             <a:normAutofit/>
           </a:bodyPr>
           <a:p>
-            <a:endParaRPr b="0" lang="pt-BR" sz="2800" spc="-1" strike="noStrike">
-              <a:solidFill>
-                <a:srgbClr val="000000"/>
-              </a:solidFill>
+            <a:endParaRPr b="0" lang="pt-BR" sz="3200" spc="-1" strike="noStrike">
               <a:latin typeface="Arial"/>
             </a:endParaRPr>
           </a:p>
@@ -1166,7 +1096,7 @@
         <p:spPr>
           <a:xfrm>
             <a:off x="609480" y="273600"/>
-            <a:ext cx="10972080" cy="1144440"/>
+            <a:ext cx="10971720" cy="1144080"/>
           </a:xfrm>
           <a:prstGeom prst="rect">
             <a:avLst/>
@@ -1175,10 +1105,8 @@
         <p:txBody>
           <a:bodyPr lIns="0" rIns="0" tIns="0" bIns="0" anchor="ctr"/>
           <a:p>
-            <a:endParaRPr b="0" lang="pt-BR" sz="1800" spc="-1" strike="noStrike">
-              <a:solidFill>
-                <a:srgbClr val="000000"/>
-              </a:solidFill>
+            <a:pPr algn="ctr"/>
+            <a:endParaRPr b="0" lang="pt-BR" sz="4400" spc="-1" strike="noStrike">
               <a:latin typeface="Arial"/>
             </a:endParaRPr>
           </a:p>
@@ -1197,7 +1125,7 @@
         <p:spPr>
           <a:xfrm>
             <a:off x="609480" y="1604520"/>
-            <a:ext cx="5354280" cy="3977280"/>
+            <a:ext cx="5354280" cy="3976920"/>
           </a:xfrm>
           <a:prstGeom prst="rect">
             <a:avLst/>
@@ -1208,10 +1136,7 @@
             <a:normAutofit/>
           </a:bodyPr>
           <a:p>
-            <a:endParaRPr b="0" lang="pt-BR" sz="2800" spc="-1" strike="noStrike">
-              <a:solidFill>
-                <a:srgbClr val="000000"/>
-              </a:solidFill>
+            <a:endParaRPr b="0" lang="pt-BR" sz="3200" spc="-1" strike="noStrike">
               <a:latin typeface="Arial"/>
             </a:endParaRPr>
           </a:p>
@@ -1241,10 +1166,7 @@
             <a:normAutofit/>
           </a:bodyPr>
           <a:p>
-            <a:endParaRPr b="0" lang="pt-BR" sz="2800" spc="-1" strike="noStrike">
-              <a:solidFill>
-                <a:srgbClr val="000000"/>
-              </a:solidFill>
+            <a:endParaRPr b="0" lang="pt-BR" sz="3200" spc="-1" strike="noStrike">
               <a:latin typeface="Arial"/>
             </a:endParaRPr>
           </a:p>
@@ -1274,10 +1196,7 @@
             <a:normAutofit/>
           </a:bodyPr>
           <a:p>
-            <a:endParaRPr b="0" lang="pt-BR" sz="2800" spc="-1" strike="noStrike">
-              <a:solidFill>
-                <a:srgbClr val="000000"/>
-              </a:solidFill>
+            <a:endParaRPr b="0" lang="pt-BR" sz="3200" spc="-1" strike="noStrike">
               <a:latin typeface="Arial"/>
             </a:endParaRPr>
           </a:p>
@@ -1318,7 +1237,7 @@
         <p:spPr>
           <a:xfrm>
             <a:off x="609480" y="273600"/>
-            <a:ext cx="10972080" cy="1144440"/>
+            <a:ext cx="10971720" cy="1144080"/>
           </a:xfrm>
           <a:prstGeom prst="rect">
             <a:avLst/>
@@ -1327,10 +1246,8 @@
         <p:txBody>
           <a:bodyPr lIns="0" rIns="0" tIns="0" bIns="0" anchor="ctr"/>
           <a:p>
-            <a:endParaRPr b="0" lang="pt-BR" sz="1800" spc="-1" strike="noStrike">
-              <a:solidFill>
-                <a:srgbClr val="000000"/>
-              </a:solidFill>
+            <a:pPr algn="ctr"/>
+            <a:endParaRPr b="0" lang="pt-BR" sz="4400" spc="-1" strike="noStrike">
               <a:latin typeface="Arial"/>
             </a:endParaRPr>
           </a:p>
@@ -1360,10 +1277,7 @@
             <a:normAutofit/>
           </a:bodyPr>
           <a:p>
-            <a:endParaRPr b="0" lang="pt-BR" sz="2800" spc="-1" strike="noStrike">
-              <a:solidFill>
-                <a:srgbClr val="000000"/>
-              </a:solidFill>
+            <a:endParaRPr b="0" lang="pt-BR" sz="3200" spc="-1" strike="noStrike">
               <a:latin typeface="Arial"/>
             </a:endParaRPr>
           </a:p>
@@ -1393,10 +1307,7 @@
             <a:normAutofit/>
           </a:bodyPr>
           <a:p>
-            <a:endParaRPr b="0" lang="pt-BR" sz="2800" spc="-1" strike="noStrike">
-              <a:solidFill>
-                <a:srgbClr val="000000"/>
-              </a:solidFill>
+            <a:endParaRPr b="0" lang="pt-BR" sz="3200" spc="-1" strike="noStrike">
               <a:latin typeface="Arial"/>
             </a:endParaRPr>
           </a:p>
@@ -1415,7 +1326,7 @@
         <p:spPr>
           <a:xfrm>
             <a:off x="609480" y="3682080"/>
-            <a:ext cx="10972440" cy="1896840"/>
+            <a:ext cx="10972080" cy="1896840"/>
           </a:xfrm>
           <a:prstGeom prst="rect">
             <a:avLst/>
@@ -1426,10 +1337,7 @@
             <a:normAutofit/>
           </a:bodyPr>
           <a:p>
-            <a:endParaRPr b="0" lang="pt-BR" sz="2800" spc="-1" strike="noStrike">
-              <a:solidFill>
-                <a:srgbClr val="000000"/>
-              </a:solidFill>
+            <a:endParaRPr b="0" lang="pt-BR" sz="3200" spc="-1" strike="noStrike">
               <a:latin typeface="Arial"/>
             </a:endParaRPr>
           </a:p>
@@ -1477,7 +1385,7 @@
         <p:spPr>
           <a:xfrm>
             <a:off x="609480" y="273600"/>
-            <a:ext cx="10972080" cy="1144440"/>
+            <a:ext cx="10971720" cy="1144080"/>
           </a:xfrm>
           <a:prstGeom prst="rect">
             <a:avLst/>
@@ -1487,18 +1395,12 @@
           <a:bodyPr lIns="0" rIns="0" tIns="0" bIns="0" anchor="ctr"/>
           <a:p>
             <a:r>
-              <a:rPr b="0" lang="pt-BR" sz="4400" spc="-1" strike="noStrike">
-                <a:solidFill>
-                  <a:srgbClr val="000000"/>
-                </a:solidFill>
+              <a:rPr b="0" lang="pt-BR" sz="1800" spc="-1" strike="noStrike">
                 <a:latin typeface="Arial"/>
               </a:rPr>
               <a:t>Clique para editar o formato do texto do título</a:t>
             </a:r>
-            <a:endParaRPr b="0" lang="pt-BR" sz="4400" spc="-1" strike="noStrike">
-              <a:solidFill>
-                <a:srgbClr val="000000"/>
-              </a:solidFill>
+            <a:endParaRPr b="0" lang="pt-BR" sz="1800" spc="-1" strike="noStrike">
               <a:latin typeface="Arial"/>
             </a:endParaRPr>
           </a:p>
@@ -1517,7 +1419,7 @@
         <p:spPr>
           <a:xfrm>
             <a:off x="609480" y="1604520"/>
-            <a:ext cx="10972440" cy="3977280"/>
+            <a:ext cx="10972080" cy="3976920"/>
           </a:xfrm>
           <a:prstGeom prst="rect">
             <a:avLst/>
@@ -1540,18 +1442,12 @@
               <a:buChar char=""/>
             </a:pPr>
             <a:r>
-              <a:rPr b="0" lang="pt-BR" sz="2800" spc="-1" strike="noStrike">
-                <a:solidFill>
-                  <a:srgbClr val="000000"/>
-                </a:solidFill>
+              <a:rPr b="0" lang="pt-BR" sz="1800" spc="-1" strike="noStrike">
                 <a:latin typeface="Arial"/>
               </a:rPr>
               <a:t>Clique para editar o formato do texto da estrutura de tópicos</a:t>
             </a:r>
-            <a:endParaRPr b="0" lang="pt-BR" sz="2800" spc="-1" strike="noStrike">
-              <a:solidFill>
-                <a:srgbClr val="000000"/>
-              </a:solidFill>
+            <a:endParaRPr b="0" lang="pt-BR" sz="1800" spc="-1" strike="noStrike">
               <a:latin typeface="Arial"/>
             </a:endParaRPr>
           </a:p>
@@ -1568,18 +1464,12 @@
               <a:buChar char=""/>
             </a:pPr>
             <a:r>
-              <a:rPr b="0" lang="pt-BR" sz="2000" spc="-1" strike="noStrike">
-                <a:solidFill>
-                  <a:srgbClr val="000000"/>
-                </a:solidFill>
+              <a:rPr b="0" lang="pt-BR" sz="1800" spc="-1" strike="noStrike">
                 <a:latin typeface="Arial"/>
               </a:rPr>
               <a:t>2.º nível da estrutura de tópicos</a:t>
             </a:r>
-            <a:endParaRPr b="0" lang="pt-BR" sz="2000" spc="-1" strike="noStrike">
-              <a:solidFill>
-                <a:srgbClr val="000000"/>
-              </a:solidFill>
+            <a:endParaRPr b="0" lang="pt-BR" sz="1800" spc="-1" strike="noStrike">
               <a:latin typeface="Arial"/>
             </a:endParaRPr>
           </a:p>
@@ -1597,17 +1487,11 @@
             </a:pPr>
             <a:r>
               <a:rPr b="0" lang="pt-BR" sz="1800" spc="-1" strike="noStrike">
-                <a:solidFill>
-                  <a:srgbClr val="000000"/>
-                </a:solidFill>
                 <a:latin typeface="Arial"/>
               </a:rPr>
               <a:t>3.º nível da estrutura de tópicos</a:t>
             </a:r>
             <a:endParaRPr b="0" lang="pt-BR" sz="1800" spc="-1" strike="noStrike">
-              <a:solidFill>
-                <a:srgbClr val="000000"/>
-              </a:solidFill>
               <a:latin typeface="Arial"/>
             </a:endParaRPr>
           </a:p>
@@ -1625,17 +1509,11 @@
             </a:pPr>
             <a:r>
               <a:rPr b="0" lang="pt-BR" sz="1800" spc="-1" strike="noStrike">
-                <a:solidFill>
-                  <a:srgbClr val="000000"/>
-                </a:solidFill>
                 <a:latin typeface="Arial"/>
               </a:rPr>
               <a:t>4.º nível da estrutura de tópicos</a:t>
             </a:r>
             <a:endParaRPr b="0" lang="pt-BR" sz="1800" spc="-1" strike="noStrike">
-              <a:solidFill>
-                <a:srgbClr val="000000"/>
-              </a:solidFill>
               <a:latin typeface="Arial"/>
             </a:endParaRPr>
           </a:p>
@@ -1652,18 +1530,12 @@
               <a:buChar char=""/>
             </a:pPr>
             <a:r>
-              <a:rPr b="0" lang="pt-BR" sz="2000" spc="-1" strike="noStrike">
-                <a:solidFill>
-                  <a:srgbClr val="000000"/>
-                </a:solidFill>
+              <a:rPr b="0" lang="pt-BR" sz="1800" spc="-1" strike="noStrike">
                 <a:latin typeface="Arial"/>
               </a:rPr>
               <a:t>5.º nível da estrutura de tópicos</a:t>
             </a:r>
-            <a:endParaRPr b="0" lang="pt-BR" sz="2000" spc="-1" strike="noStrike">
-              <a:solidFill>
-                <a:srgbClr val="000000"/>
-              </a:solidFill>
+            <a:endParaRPr b="0" lang="pt-BR" sz="1800" spc="-1" strike="noStrike">
               <a:latin typeface="Arial"/>
             </a:endParaRPr>
           </a:p>
@@ -1680,18 +1552,12 @@
               <a:buChar char=""/>
             </a:pPr>
             <a:r>
-              <a:rPr b="0" lang="pt-BR" sz="2000" spc="-1" strike="noStrike">
-                <a:solidFill>
-                  <a:srgbClr val="000000"/>
-                </a:solidFill>
+              <a:rPr b="0" lang="pt-BR" sz="1800" spc="-1" strike="noStrike">
                 <a:latin typeface="Arial"/>
               </a:rPr>
               <a:t>6.º nível da estrutura de tópicos</a:t>
             </a:r>
-            <a:endParaRPr b="0" lang="pt-BR" sz="2000" spc="-1" strike="noStrike">
-              <a:solidFill>
-                <a:srgbClr val="000000"/>
-              </a:solidFill>
+            <a:endParaRPr b="0" lang="pt-BR" sz="1800" spc="-1" strike="noStrike">
               <a:latin typeface="Arial"/>
             </a:endParaRPr>
           </a:p>
@@ -1708,18 +1574,12 @@
               <a:buChar char=""/>
             </a:pPr>
             <a:r>
-              <a:rPr b="0" lang="pt-BR" sz="2000" spc="-1" strike="noStrike">
-                <a:solidFill>
-                  <a:srgbClr val="000000"/>
-                </a:solidFill>
+              <a:rPr b="0" lang="pt-BR" sz="1800" spc="-1" strike="noStrike">
                 <a:latin typeface="Arial"/>
               </a:rPr>
               <a:t>7.º nível da estrutura de tópicos</a:t>
             </a:r>
-            <a:endParaRPr b="0" lang="pt-BR" sz="2000" spc="-1" strike="noStrike">
-              <a:solidFill>
-                <a:srgbClr val="000000"/>
-              </a:solidFill>
+            <a:endParaRPr b="0" lang="pt-BR" sz="1800" spc="-1" strike="noStrike">
               <a:latin typeface="Arial"/>
             </a:endParaRPr>
           </a:p>
@@ -1778,7 +1638,7 @@
         <p:spPr>
           <a:xfrm>
             <a:off x="0" y="0"/>
-            <a:ext cx="12190680" cy="1585080"/>
+            <a:ext cx="12190320" cy="1584720"/>
           </a:xfrm>
           <a:prstGeom prst="rect">
             <a:avLst/>
@@ -1810,7 +1670,7 @@
         <p:spPr>
           <a:xfrm>
             <a:off x="10561680" y="0"/>
-            <a:ext cx="1081800" cy="2505600"/>
+            <a:ext cx="1081440" cy="2505240"/>
           </a:xfrm>
           <a:prstGeom prst="rect">
             <a:avLst/>
@@ -1829,7 +1689,7 @@
         <p:spPr>
           <a:xfrm>
             <a:off x="504000" y="6479280"/>
-            <a:ext cx="11128680" cy="718560"/>
+            <a:ext cx="11128320" cy="718200"/>
           </a:xfrm>
           <a:prstGeom prst="rect">
             <a:avLst/>
@@ -1892,7 +1752,7 @@
         <p:spPr>
           <a:xfrm>
             <a:off x="235080" y="283680"/>
-            <a:ext cx="3999240" cy="1018080"/>
+            <a:ext cx="3998880" cy="1017720"/>
           </a:xfrm>
           <a:prstGeom prst="rect">
             <a:avLst/>
@@ -1911,7 +1771,7 @@
         <p:spPr>
           <a:xfrm>
             <a:off x="3603240" y="3470040"/>
-            <a:ext cx="4930560" cy="1123920"/>
+            <a:ext cx="4930200" cy="1123560"/>
           </a:xfrm>
           <a:prstGeom prst="rect">
             <a:avLst/>
@@ -2003,7 +1863,7 @@
                 <a:latin typeface="Arial"/>
                 <a:ea typeface="Arial"/>
               </a:rPr>
-              <a:t>Projeto SUS</a:t>
+              <a:t>TEC SUS</a:t>
             </a:r>
             <a:endParaRPr b="0" lang="pt-BR" sz="2000" spc="-1" strike="noStrike">
               <a:latin typeface="Arial"/>
@@ -2096,7 +1956,7 @@
         <p:spPr>
           <a:xfrm>
             <a:off x="0" y="0"/>
-            <a:ext cx="12190680" cy="1585080"/>
+            <a:ext cx="12190320" cy="1584720"/>
           </a:xfrm>
           <a:prstGeom prst="rect">
             <a:avLst/>
@@ -2124,7 +1984,7 @@
         <p:spPr>
           <a:xfrm>
             <a:off x="504000" y="6479280"/>
-            <a:ext cx="11128680" cy="718560"/>
+            <a:ext cx="11128320" cy="718200"/>
           </a:xfrm>
           <a:prstGeom prst="rect">
             <a:avLst/>
@@ -2187,7 +2047,7 @@
         <p:spPr>
           <a:xfrm>
             <a:off x="235080" y="283680"/>
-            <a:ext cx="3999240" cy="1018080"/>
+            <a:ext cx="3998880" cy="1017720"/>
           </a:xfrm>
           <a:prstGeom prst="rect">
             <a:avLst/>
@@ -2210,7 +2070,7 @@
         <p:spPr>
           <a:xfrm>
             <a:off x="235080" y="2050200"/>
-            <a:ext cx="11471400" cy="3801240"/>
+            <a:ext cx="11471040" cy="3800880"/>
           </a:xfrm>
           <a:prstGeom prst="rect">
             <a:avLst/>
@@ -2233,7 +2093,7 @@
         <p:spPr>
           <a:xfrm>
             <a:off x="10561680" y="0"/>
-            <a:ext cx="1081800" cy="2505600"/>
+            <a:ext cx="1081440" cy="2505240"/>
           </a:xfrm>
           <a:prstGeom prst="rect">
             <a:avLst/>
@@ -2312,7 +2172,7 @@
         <p:spPr>
           <a:xfrm>
             <a:off x="10561680" y="0"/>
-            <a:ext cx="1081800" cy="2505600"/>
+            <a:ext cx="1081440" cy="2505240"/>
           </a:xfrm>
           <a:prstGeom prst="rect">
             <a:avLst/>
@@ -2335,7 +2195,7 @@
         <p:spPr>
           <a:xfrm>
             <a:off x="235080" y="283680"/>
-            <a:ext cx="3999240" cy="1018080"/>
+            <a:ext cx="3998880" cy="1017720"/>
           </a:xfrm>
           <a:prstGeom prst="rect">
             <a:avLst/>
@@ -2353,8 +2213,8 @@
         </p:nvSpPr>
         <p:spPr>
           <a:xfrm rot="16200000">
-            <a:off x="-4418280" y="2725200"/>
-            <a:ext cx="10612080" cy="678240"/>
+            <a:off x="-4417920" y="2725560"/>
+            <a:ext cx="10611720" cy="677880"/>
           </a:xfrm>
           <a:prstGeom prst="rect">
             <a:avLst/>
@@ -2396,7 +2256,7 @@
       </p:sp>
       <p:pic>
         <p:nvPicPr>
-          <p:cNvPr id="51" name="Imagem 2" descr=""/>
+          <p:cNvPr id="51" name="" descr=""/>
           <p:cNvPicPr/>
           <p:nvPr/>
         </p:nvPicPr>
@@ -2406,8 +2266,8 @@
         </p:blipFill>
         <p:spPr>
           <a:xfrm>
-            <a:off x="2387880" y="0"/>
-            <a:ext cx="6513840" cy="6857640"/>
+            <a:off x="2425680" y="32760"/>
+            <a:ext cx="7421040" cy="6857640"/>
           </a:xfrm>
           <a:prstGeom prst="rect">
             <a:avLst/>
@@ -2486,7 +2346,7 @@
         <p:spPr>
           <a:xfrm>
             <a:off x="10561680" y="0"/>
-            <a:ext cx="1081800" cy="2505600"/>
+            <a:ext cx="1081440" cy="2505240"/>
           </a:xfrm>
           <a:prstGeom prst="rect">
             <a:avLst/>
@@ -2505,7 +2365,7 @@
         <p:spPr>
           <a:xfrm>
             <a:off x="504000" y="6479280"/>
-            <a:ext cx="11128680" cy="718560"/>
+            <a:ext cx="11128320" cy="718200"/>
           </a:xfrm>
           <a:prstGeom prst="rect">
             <a:avLst/>
@@ -2557,7 +2417,7 @@
       </p:sp>
       <p:pic>
         <p:nvPicPr>
-          <p:cNvPr id="54" name="Google Shape;166;p39" descr=""/>
+          <p:cNvPr id="54" name="" descr=""/>
           <p:cNvPicPr/>
           <p:nvPr/>
         </p:nvPicPr>
@@ -2567,8 +2427,8 @@
         </p:blipFill>
         <p:spPr>
           <a:xfrm>
-            <a:off x="235080" y="283680"/>
-            <a:ext cx="3999240" cy="1018080"/>
+            <a:off x="1348200" y="648000"/>
+            <a:ext cx="9576000" cy="6170400"/>
           </a:xfrm>
           <a:prstGeom prst="rect">
             <a:avLst/>
@@ -2585,9 +2445,9 @@
           <p:nvPr/>
         </p:nvSpPr>
         <p:spPr>
-          <a:xfrm>
-            <a:off x="504000" y="73800"/>
-            <a:ext cx="10612080" cy="1007640"/>
+          <a:xfrm rot="16200000">
+            <a:off x="-4417920" y="2725920"/>
+            <a:ext cx="10611720" cy="677880"/>
           </a:xfrm>
           <a:prstGeom prst="rect">
             <a:avLst/>
@@ -2619,7 +2479,7 @@
                 <a:latin typeface="Arial"/>
                 <a:ea typeface="Arial"/>
               </a:rPr>
-              <a:t>Diagrama de Classes</a:t>
+              <a:t>Diagrama Classe</a:t>
             </a:r>
             <a:endParaRPr b="0" lang="pt-BR" sz="1800" spc="-1" strike="noStrike">
               <a:latin typeface="Arial"/>
@@ -2627,29 +2487,6 @@
           </a:p>
         </p:txBody>
       </p:sp>
-      <p:pic>
-        <p:nvPicPr>
-          <p:cNvPr id="56" name="" descr=""/>
-          <p:cNvPicPr/>
-          <p:nvPr/>
-        </p:nvPicPr>
-        <p:blipFill>
-          <a:blip r:embed="rId3"/>
-          <a:stretch/>
-        </p:blipFill>
-        <p:spPr>
-          <a:xfrm>
-            <a:off x="2084760" y="271080"/>
-            <a:ext cx="8102880" cy="6857640"/>
-          </a:xfrm>
-          <a:prstGeom prst="rect">
-            <a:avLst/>
-          </a:prstGeom>
-          <a:ln>
-            <a:noFill/>
-          </a:ln>
-        </p:spPr>
-      </p:pic>
     </p:spTree>
   </p:cSld>
   <p:timing>
@@ -2706,39 +2543,16 @@
           <a:chExt cx="0" cy="0"/>
         </a:xfrm>
       </p:grpSpPr>
-      <p:pic>
-        <p:nvPicPr>
-          <p:cNvPr id="57" name="Google Shape;89;p13" descr=""/>
-          <p:cNvPicPr/>
-          <p:nvPr/>
-        </p:nvPicPr>
-        <p:blipFill>
-          <a:blip r:embed="rId1"/>
-          <a:stretch/>
-        </p:blipFill>
-        <p:spPr>
-          <a:xfrm>
-            <a:off x="10561680" y="0"/>
-            <a:ext cx="1081800" cy="2505600"/>
-          </a:xfrm>
-          <a:prstGeom prst="rect">
-            <a:avLst/>
-          </a:prstGeom>
-          <a:ln>
-            <a:noFill/>
-          </a:ln>
-        </p:spPr>
-      </p:pic>
-      <p:sp>
-        <p:nvSpPr>
-          <p:cNvPr id="58" name="CustomShape 1"/>
+      <p:sp>
+        <p:nvSpPr>
+          <p:cNvPr id="56" name="CustomShape 1"/>
           <p:cNvSpPr/>
           <p:nvPr/>
         </p:nvSpPr>
         <p:spPr>
           <a:xfrm>
             <a:off x="504000" y="6479280"/>
-            <a:ext cx="11128680" cy="718560"/>
+            <a:ext cx="11128320" cy="718200"/>
           </a:xfrm>
           <a:prstGeom prst="rect">
             <a:avLst/>
@@ -2790,18 +2604,18 @@
       </p:sp>
       <p:pic>
         <p:nvPicPr>
-          <p:cNvPr id="59" name="Google Shape;166;p39" descr=""/>
+          <p:cNvPr id="57" name="" descr=""/>
           <p:cNvPicPr/>
           <p:nvPr/>
         </p:nvPicPr>
         <p:blipFill>
-          <a:blip r:embed="rId2"/>
+          <a:blip r:embed="rId1"/>
           <a:stretch/>
         </p:blipFill>
         <p:spPr>
           <a:xfrm>
-            <a:off x="235080" y="283680"/>
-            <a:ext cx="3999240" cy="1018080"/>
+            <a:off x="559080" y="144000"/>
+            <a:ext cx="11633040" cy="6714000"/>
           </a:xfrm>
           <a:prstGeom prst="rect">
             <a:avLst/>
@@ -2813,14 +2627,14 @@
       </p:pic>
       <p:sp>
         <p:nvSpPr>
-          <p:cNvPr id="60" name="CustomShape 2"/>
+          <p:cNvPr id="58" name="CustomShape 2"/>
           <p:cNvSpPr/>
           <p:nvPr/>
         </p:nvSpPr>
         <p:spPr>
-          <a:xfrm>
-            <a:off x="490320" y="-215280"/>
-            <a:ext cx="10612080" cy="1007640"/>
+          <a:xfrm rot="16200000">
+            <a:off x="-4993920" y="2725920"/>
+            <a:ext cx="10611720" cy="677880"/>
           </a:xfrm>
           <a:prstGeom prst="rect">
             <a:avLst/>
@@ -2860,29 +2674,6 @@
           </a:p>
         </p:txBody>
       </p:sp>
-      <p:pic>
-        <p:nvPicPr>
-          <p:cNvPr id="61" name="" descr=""/>
-          <p:cNvPicPr/>
-          <p:nvPr/>
-        </p:nvPicPr>
-        <p:blipFill>
-          <a:blip r:embed="rId3"/>
-          <a:stretch/>
-        </p:blipFill>
-        <p:spPr>
-          <a:xfrm>
-            <a:off x="2304000" y="1080000"/>
-            <a:ext cx="7344000" cy="5826960"/>
-          </a:xfrm>
-          <a:prstGeom prst="rect">
-            <a:avLst/>
-          </a:prstGeom>
-          <a:ln>
-            <a:noFill/>
-          </a:ln>
-        </p:spPr>
-      </p:pic>
     </p:spTree>
   </p:cSld>
   <p:timing>

</xml_diff>

<commit_message>
principal alteração nos slides segunda entrega
</commit_message>
<xml_diff>
--- a/segunda entrega/segunda entrega.pptx
+++ b/segunda entrega/segunda entrega.pptx
@@ -68,7 +68,7 @@
         <p:spPr>
           <a:xfrm>
             <a:off x="609480" y="273600"/>
-            <a:ext cx="10971720" cy="1144080"/>
+            <a:ext cx="10972440" cy="1144800"/>
           </a:xfrm>
           <a:prstGeom prst="rect">
             <a:avLst/>
@@ -97,7 +97,7 @@
         <p:spPr>
           <a:xfrm>
             <a:off x="609480" y="1604520"/>
-            <a:ext cx="10972080" cy="1896840"/>
+            <a:ext cx="10972440" cy="1896840"/>
           </a:xfrm>
           <a:prstGeom prst="rect">
             <a:avLst/>
@@ -127,7 +127,7 @@
         <p:spPr>
           <a:xfrm>
             <a:off x="609480" y="3682080"/>
-            <a:ext cx="10972080" cy="1896840"/>
+            <a:ext cx="10972440" cy="1896840"/>
           </a:xfrm>
           <a:prstGeom prst="rect">
             <a:avLst/>
@@ -179,7 +179,7 @@
         <p:spPr>
           <a:xfrm>
             <a:off x="609480" y="273600"/>
-            <a:ext cx="10971720" cy="1144080"/>
+            <a:ext cx="10972440" cy="1144800"/>
           </a:xfrm>
           <a:prstGeom prst="rect">
             <a:avLst/>
@@ -350,7 +350,7 @@
         <p:spPr>
           <a:xfrm>
             <a:off x="609480" y="273600"/>
-            <a:ext cx="10971720" cy="1144080"/>
+            <a:ext cx="10972440" cy="1144800"/>
           </a:xfrm>
           <a:prstGeom prst="rect">
             <a:avLst/>
@@ -379,7 +379,7 @@
         <p:spPr>
           <a:xfrm>
             <a:off x="609480" y="1604520"/>
-            <a:ext cx="3532680" cy="1896840"/>
+            <a:ext cx="3533040" cy="1896840"/>
           </a:xfrm>
           <a:prstGeom prst="rect">
             <a:avLst/>
@@ -408,8 +408,8 @@
         </p:nvSpPr>
         <p:spPr>
           <a:xfrm>
-            <a:off x="4319280" y="1604520"/>
-            <a:ext cx="3532680" cy="1896840"/>
+            <a:off x="4319640" y="1604520"/>
+            <a:ext cx="3533040" cy="1896840"/>
           </a:xfrm>
           <a:prstGeom prst="rect">
             <a:avLst/>
@@ -438,8 +438,8 @@
         </p:nvSpPr>
         <p:spPr>
           <a:xfrm>
-            <a:off x="8028720" y="1604520"/>
-            <a:ext cx="3532680" cy="1896840"/>
+            <a:off x="8029800" y="1604520"/>
+            <a:ext cx="3533040" cy="1896840"/>
           </a:xfrm>
           <a:prstGeom prst="rect">
             <a:avLst/>
@@ -469,7 +469,7 @@
         <p:spPr>
           <a:xfrm>
             <a:off x="609480" y="3682080"/>
-            <a:ext cx="3532680" cy="1896840"/>
+            <a:ext cx="3533040" cy="1896840"/>
           </a:xfrm>
           <a:prstGeom prst="rect">
             <a:avLst/>
@@ -498,8 +498,8 @@
         </p:nvSpPr>
         <p:spPr>
           <a:xfrm>
-            <a:off x="4319280" y="3682080"/>
-            <a:ext cx="3532680" cy="1896840"/>
+            <a:off x="4319640" y="3682080"/>
+            <a:ext cx="3533040" cy="1896840"/>
           </a:xfrm>
           <a:prstGeom prst="rect">
             <a:avLst/>
@@ -528,8 +528,8 @@
         </p:nvSpPr>
         <p:spPr>
           <a:xfrm>
-            <a:off x="8028720" y="3682080"/>
-            <a:ext cx="3532680" cy="1896840"/>
+            <a:off x="8029800" y="3682080"/>
+            <a:ext cx="3533040" cy="1896840"/>
           </a:xfrm>
           <a:prstGeom prst="rect">
             <a:avLst/>
@@ -581,7 +581,7 @@
         <p:spPr>
           <a:xfrm>
             <a:off x="609480" y="273600"/>
-            <a:ext cx="10971720" cy="1144080"/>
+            <a:ext cx="10972440" cy="1144800"/>
           </a:xfrm>
           <a:prstGeom prst="rect">
             <a:avLst/>
@@ -610,7 +610,7 @@
         <p:spPr>
           <a:xfrm>
             <a:off x="609480" y="1604520"/>
-            <a:ext cx="10972080" cy="3976920"/>
+            <a:ext cx="10972440" cy="3977280"/>
           </a:xfrm>
           <a:prstGeom prst="rect">
             <a:avLst/>
@@ -661,7 +661,7 @@
         <p:spPr>
           <a:xfrm>
             <a:off x="609480" y="273600"/>
-            <a:ext cx="10971720" cy="1144080"/>
+            <a:ext cx="10972440" cy="1144800"/>
           </a:xfrm>
           <a:prstGeom prst="rect">
             <a:avLst/>
@@ -690,7 +690,7 @@
         <p:spPr>
           <a:xfrm>
             <a:off x="609480" y="1604520"/>
-            <a:ext cx="10972080" cy="3976920"/>
+            <a:ext cx="10972440" cy="3977280"/>
           </a:xfrm>
           <a:prstGeom prst="rect">
             <a:avLst/>
@@ -742,7 +742,7 @@
         <p:spPr>
           <a:xfrm>
             <a:off x="609480" y="273600"/>
-            <a:ext cx="10971720" cy="1144080"/>
+            <a:ext cx="10972440" cy="1144800"/>
           </a:xfrm>
           <a:prstGeom prst="rect">
             <a:avLst/>
@@ -771,7 +771,7 @@
         <p:spPr>
           <a:xfrm>
             <a:off x="609480" y="1604520"/>
-            <a:ext cx="5354280" cy="3976920"/>
+            <a:ext cx="5354280" cy="3977280"/>
           </a:xfrm>
           <a:prstGeom prst="rect">
             <a:avLst/>
@@ -801,7 +801,7 @@
         <p:spPr>
           <a:xfrm>
             <a:off x="6231960" y="1604520"/>
-            <a:ext cx="5354280" cy="3976920"/>
+            <a:ext cx="5354280" cy="3977280"/>
           </a:xfrm>
           <a:prstGeom prst="rect">
             <a:avLst/>
@@ -853,7 +853,7 @@
         <p:spPr>
           <a:xfrm>
             <a:off x="609480" y="273600"/>
-            <a:ext cx="10971720" cy="1144080"/>
+            <a:ext cx="10972440" cy="1144800"/>
           </a:xfrm>
           <a:prstGeom prst="rect">
             <a:avLst/>
@@ -904,7 +904,7 @@
         <p:spPr>
           <a:xfrm>
             <a:off x="609480" y="273600"/>
-            <a:ext cx="10971720" cy="5304600"/>
+            <a:ext cx="10972440" cy="5307840"/>
           </a:xfrm>
           <a:prstGeom prst="rect">
             <a:avLst/>
@@ -955,7 +955,7 @@
         <p:spPr>
           <a:xfrm>
             <a:off x="609480" y="273600"/>
-            <a:ext cx="10971720" cy="1144080"/>
+            <a:ext cx="10972440" cy="1144800"/>
           </a:xfrm>
           <a:prstGeom prst="rect">
             <a:avLst/>
@@ -1014,7 +1014,7 @@
         <p:spPr>
           <a:xfrm>
             <a:off x="6231960" y="1604520"/>
-            <a:ext cx="5354280" cy="3976920"/>
+            <a:ext cx="5354280" cy="3977280"/>
           </a:xfrm>
           <a:prstGeom prst="rect">
             <a:avLst/>
@@ -1096,7 +1096,7 @@
         <p:spPr>
           <a:xfrm>
             <a:off x="609480" y="273600"/>
-            <a:ext cx="10971720" cy="1144080"/>
+            <a:ext cx="10972440" cy="1144800"/>
           </a:xfrm>
           <a:prstGeom prst="rect">
             <a:avLst/>
@@ -1125,7 +1125,7 @@
         <p:spPr>
           <a:xfrm>
             <a:off x="609480" y="1604520"/>
-            <a:ext cx="5354280" cy="3976920"/>
+            <a:ext cx="5354280" cy="3977280"/>
           </a:xfrm>
           <a:prstGeom prst="rect">
             <a:avLst/>
@@ -1237,7 +1237,7 @@
         <p:spPr>
           <a:xfrm>
             <a:off x="609480" y="273600"/>
-            <a:ext cx="10971720" cy="1144080"/>
+            <a:ext cx="10972440" cy="1144800"/>
           </a:xfrm>
           <a:prstGeom prst="rect">
             <a:avLst/>
@@ -1326,7 +1326,7 @@
         <p:spPr>
           <a:xfrm>
             <a:off x="609480" y="3682080"/>
-            <a:ext cx="10972080" cy="1896840"/>
+            <a:ext cx="10972440" cy="1896840"/>
           </a:xfrm>
           <a:prstGeom prst="rect">
             <a:avLst/>
@@ -1385,7 +1385,7 @@
         <p:spPr>
           <a:xfrm>
             <a:off x="609480" y="273600"/>
-            <a:ext cx="10971720" cy="1144080"/>
+            <a:ext cx="10972440" cy="1144800"/>
           </a:xfrm>
           <a:prstGeom prst="rect">
             <a:avLst/>
@@ -1394,13 +1394,14 @@
         <p:txBody>
           <a:bodyPr lIns="0" rIns="0" tIns="0" bIns="0" anchor="ctr"/>
           <a:p>
+            <a:pPr algn="ctr"/>
             <a:r>
-              <a:rPr b="0" lang="pt-BR" sz="1800" spc="-1" strike="noStrike">
+              <a:rPr b="0" lang="pt-BR" sz="4400" spc="-1" strike="noStrike">
                 <a:latin typeface="Arial"/>
               </a:rPr>
               <a:t>Clique para editar o formato do texto do título</a:t>
             </a:r>
-            <a:endParaRPr b="0" lang="pt-BR" sz="1800" spc="-1" strike="noStrike">
+            <a:endParaRPr b="0" lang="pt-BR" sz="4400" spc="-1" strike="noStrike">
               <a:latin typeface="Arial"/>
             </a:endParaRPr>
           </a:p>
@@ -1419,7 +1420,7 @@
         <p:spPr>
           <a:xfrm>
             <a:off x="609480" y="1604520"/>
-            <a:ext cx="10972080" cy="3976920"/>
+            <a:ext cx="10972440" cy="3977280"/>
           </a:xfrm>
           <a:prstGeom prst="rect">
             <a:avLst/>
@@ -1442,12 +1443,12 @@
               <a:buChar char=""/>
             </a:pPr>
             <a:r>
-              <a:rPr b="0" lang="pt-BR" sz="1800" spc="-1" strike="noStrike">
+              <a:rPr b="0" lang="pt-BR" sz="3200" spc="-1" strike="noStrike">
                 <a:latin typeface="Arial"/>
               </a:rPr>
               <a:t>Clique para editar o formato do texto da estrutura de tópicos</a:t>
             </a:r>
-            <a:endParaRPr b="0" lang="pt-BR" sz="1800" spc="-1" strike="noStrike">
+            <a:endParaRPr b="0" lang="pt-BR" sz="3200" spc="-1" strike="noStrike">
               <a:latin typeface="Arial"/>
             </a:endParaRPr>
           </a:p>
@@ -1464,12 +1465,12 @@
               <a:buChar char=""/>
             </a:pPr>
             <a:r>
-              <a:rPr b="0" lang="pt-BR" sz="1800" spc="-1" strike="noStrike">
+              <a:rPr b="0" lang="pt-BR" sz="2800" spc="-1" strike="noStrike">
                 <a:latin typeface="Arial"/>
               </a:rPr>
               <a:t>2.º nível da estrutura de tópicos</a:t>
             </a:r>
-            <a:endParaRPr b="0" lang="pt-BR" sz="1800" spc="-1" strike="noStrike">
+            <a:endParaRPr b="0" lang="pt-BR" sz="2800" spc="-1" strike="noStrike">
               <a:latin typeface="Arial"/>
             </a:endParaRPr>
           </a:p>
@@ -1486,12 +1487,12 @@
               <a:buChar char=""/>
             </a:pPr>
             <a:r>
-              <a:rPr b="0" lang="pt-BR" sz="1800" spc="-1" strike="noStrike">
+              <a:rPr b="0" lang="pt-BR" sz="2400" spc="-1" strike="noStrike">
                 <a:latin typeface="Arial"/>
               </a:rPr>
               <a:t>3.º nível da estrutura de tópicos</a:t>
             </a:r>
-            <a:endParaRPr b="0" lang="pt-BR" sz="1800" spc="-1" strike="noStrike">
+            <a:endParaRPr b="0" lang="pt-BR" sz="2400" spc="-1" strike="noStrike">
               <a:latin typeface="Arial"/>
             </a:endParaRPr>
           </a:p>
@@ -1508,12 +1509,12 @@
               <a:buChar char=""/>
             </a:pPr>
             <a:r>
-              <a:rPr b="0" lang="pt-BR" sz="1800" spc="-1" strike="noStrike">
+              <a:rPr b="0" lang="pt-BR" sz="2000" spc="-1" strike="noStrike">
                 <a:latin typeface="Arial"/>
               </a:rPr>
               <a:t>4.º nível da estrutura de tópicos</a:t>
             </a:r>
-            <a:endParaRPr b="0" lang="pt-BR" sz="1800" spc="-1" strike="noStrike">
+            <a:endParaRPr b="0" lang="pt-BR" sz="2000" spc="-1" strike="noStrike">
               <a:latin typeface="Arial"/>
             </a:endParaRPr>
           </a:p>
@@ -1530,12 +1531,12 @@
               <a:buChar char=""/>
             </a:pPr>
             <a:r>
-              <a:rPr b="0" lang="pt-BR" sz="1800" spc="-1" strike="noStrike">
+              <a:rPr b="0" lang="pt-BR" sz="2000" spc="-1" strike="noStrike">
                 <a:latin typeface="Arial"/>
               </a:rPr>
               <a:t>5.º nível da estrutura de tópicos</a:t>
             </a:r>
-            <a:endParaRPr b="0" lang="pt-BR" sz="1800" spc="-1" strike="noStrike">
+            <a:endParaRPr b="0" lang="pt-BR" sz="2000" spc="-1" strike="noStrike">
               <a:latin typeface="Arial"/>
             </a:endParaRPr>
           </a:p>
@@ -1552,12 +1553,12 @@
               <a:buChar char=""/>
             </a:pPr>
             <a:r>
-              <a:rPr b="0" lang="pt-BR" sz="1800" spc="-1" strike="noStrike">
+              <a:rPr b="0" lang="pt-BR" sz="2000" spc="-1" strike="noStrike">
                 <a:latin typeface="Arial"/>
               </a:rPr>
               <a:t>6.º nível da estrutura de tópicos</a:t>
             </a:r>
-            <a:endParaRPr b="0" lang="pt-BR" sz="1800" spc="-1" strike="noStrike">
+            <a:endParaRPr b="0" lang="pt-BR" sz="2000" spc="-1" strike="noStrike">
               <a:latin typeface="Arial"/>
             </a:endParaRPr>
           </a:p>
@@ -1574,12 +1575,12 @@
               <a:buChar char=""/>
             </a:pPr>
             <a:r>
-              <a:rPr b="0" lang="pt-BR" sz="1800" spc="-1" strike="noStrike">
+              <a:rPr b="0" lang="pt-BR" sz="2000" spc="-1" strike="noStrike">
                 <a:latin typeface="Arial"/>
               </a:rPr>
               <a:t>7.º nível da estrutura de tópicos</a:t>
             </a:r>
-            <a:endParaRPr b="0" lang="pt-BR" sz="1800" spc="-1" strike="noStrike">
+            <a:endParaRPr b="0" lang="pt-BR" sz="2000" spc="-1" strike="noStrike">
               <a:latin typeface="Arial"/>
             </a:endParaRPr>
           </a:p>
@@ -1638,7 +1639,7 @@
         <p:spPr>
           <a:xfrm>
             <a:off x="0" y="0"/>
-            <a:ext cx="12190320" cy="1584720"/>
+            <a:ext cx="12189600" cy="1584000"/>
           </a:xfrm>
           <a:prstGeom prst="rect">
             <a:avLst/>
@@ -1670,7 +1671,7 @@
         <p:spPr>
           <a:xfrm>
             <a:off x="10561680" y="0"/>
-            <a:ext cx="1081440" cy="2505240"/>
+            <a:ext cx="1080720" cy="2504520"/>
           </a:xfrm>
           <a:prstGeom prst="rect">
             <a:avLst/>
@@ -1689,7 +1690,7 @@
         <p:spPr>
           <a:xfrm>
             <a:off x="504000" y="6479280"/>
-            <a:ext cx="11128320" cy="718200"/>
+            <a:ext cx="11127600" cy="717480"/>
           </a:xfrm>
           <a:prstGeom prst="rect">
             <a:avLst/>
@@ -1752,7 +1753,7 @@
         <p:spPr>
           <a:xfrm>
             <a:off x="235080" y="283680"/>
-            <a:ext cx="3998880" cy="1017720"/>
+            <a:ext cx="3998160" cy="1017000"/>
           </a:xfrm>
           <a:prstGeom prst="rect">
             <a:avLst/>
@@ -1771,7 +1772,7 @@
         <p:spPr>
           <a:xfrm>
             <a:off x="3603240" y="3470040"/>
-            <a:ext cx="4930200" cy="1123560"/>
+            <a:ext cx="4929480" cy="1122840"/>
           </a:xfrm>
           <a:prstGeom prst="rect">
             <a:avLst/>
@@ -1956,7 +1957,7 @@
         <p:spPr>
           <a:xfrm>
             <a:off x="0" y="0"/>
-            <a:ext cx="12190320" cy="1584720"/>
+            <a:ext cx="12189600" cy="1584000"/>
           </a:xfrm>
           <a:prstGeom prst="rect">
             <a:avLst/>
@@ -1984,7 +1985,7 @@
         <p:spPr>
           <a:xfrm>
             <a:off x="504000" y="6479280"/>
-            <a:ext cx="11128320" cy="718200"/>
+            <a:ext cx="11127600" cy="717480"/>
           </a:xfrm>
           <a:prstGeom prst="rect">
             <a:avLst/>
@@ -2047,7 +2048,7 @@
         <p:spPr>
           <a:xfrm>
             <a:off x="235080" y="283680"/>
-            <a:ext cx="3998880" cy="1017720"/>
+            <a:ext cx="3998160" cy="1017000"/>
           </a:xfrm>
           <a:prstGeom prst="rect">
             <a:avLst/>
@@ -2070,7 +2071,7 @@
         <p:spPr>
           <a:xfrm>
             <a:off x="235080" y="2050200"/>
-            <a:ext cx="11471040" cy="3800880"/>
+            <a:ext cx="11470320" cy="3800160"/>
           </a:xfrm>
           <a:prstGeom prst="rect">
             <a:avLst/>
@@ -2093,7 +2094,7 @@
         <p:spPr>
           <a:xfrm>
             <a:off x="10561680" y="0"/>
-            <a:ext cx="1081440" cy="2505240"/>
+            <a:ext cx="1080720" cy="2504520"/>
           </a:xfrm>
           <a:prstGeom prst="rect">
             <a:avLst/>
@@ -2172,7 +2173,7 @@
         <p:spPr>
           <a:xfrm>
             <a:off x="10561680" y="0"/>
-            <a:ext cx="1081440" cy="2505240"/>
+            <a:ext cx="1080720" cy="2504520"/>
           </a:xfrm>
           <a:prstGeom prst="rect">
             <a:avLst/>
@@ -2195,7 +2196,7 @@
         <p:spPr>
           <a:xfrm>
             <a:off x="235080" y="283680"/>
-            <a:ext cx="3998880" cy="1017720"/>
+            <a:ext cx="3998160" cy="1017000"/>
           </a:xfrm>
           <a:prstGeom prst="rect">
             <a:avLst/>
@@ -2213,8 +2214,8 @@
         </p:nvSpPr>
         <p:spPr>
           <a:xfrm rot="16200000">
-            <a:off x="-4417920" y="2725560"/>
-            <a:ext cx="10611720" cy="677880"/>
+            <a:off x="-4417200" y="2726280"/>
+            <a:ext cx="10611000" cy="677160"/>
           </a:xfrm>
           <a:prstGeom prst="rect">
             <a:avLst/>
@@ -2266,8 +2267,8 @@
         </p:blipFill>
         <p:spPr>
           <a:xfrm>
-            <a:off x="2425680" y="32760"/>
-            <a:ext cx="7421040" cy="6857640"/>
+            <a:off x="2466360" y="34560"/>
+            <a:ext cx="7333560" cy="6857280"/>
           </a:xfrm>
           <a:prstGeom prst="rect">
             <a:avLst/>
@@ -2346,7 +2347,7 @@
         <p:spPr>
           <a:xfrm>
             <a:off x="10561680" y="0"/>
-            <a:ext cx="1081440" cy="2505240"/>
+            <a:ext cx="1080720" cy="2504520"/>
           </a:xfrm>
           <a:prstGeom prst="rect">
             <a:avLst/>
@@ -2365,7 +2366,7 @@
         <p:spPr>
           <a:xfrm>
             <a:off x="504000" y="6479280"/>
-            <a:ext cx="11128320" cy="718200"/>
+            <a:ext cx="11127600" cy="717480"/>
           </a:xfrm>
           <a:prstGeom prst="rect">
             <a:avLst/>
@@ -2415,39 +2416,16 @@
           </a:p>
         </p:txBody>
       </p:sp>
-      <p:pic>
-        <p:nvPicPr>
-          <p:cNvPr id="54" name="" descr=""/>
-          <p:cNvPicPr/>
-          <p:nvPr/>
-        </p:nvPicPr>
-        <p:blipFill>
-          <a:blip r:embed="rId2"/>
-          <a:stretch/>
-        </p:blipFill>
-        <p:spPr>
-          <a:xfrm>
-            <a:off x="1348200" y="648000"/>
-            <a:ext cx="9576000" cy="6170400"/>
-          </a:xfrm>
-          <a:prstGeom prst="rect">
-            <a:avLst/>
-          </a:prstGeom>
-          <a:ln>
-            <a:noFill/>
-          </a:ln>
-        </p:spPr>
-      </p:pic>
-      <p:sp>
-        <p:nvSpPr>
-          <p:cNvPr id="55" name="CustomShape 2"/>
+      <p:sp>
+        <p:nvSpPr>
+          <p:cNvPr id="54" name="CustomShape 2"/>
           <p:cNvSpPr/>
           <p:nvPr/>
         </p:nvSpPr>
         <p:spPr>
           <a:xfrm rot="16200000">
-            <a:off x="-4417920" y="2725920"/>
-            <a:ext cx="10611720" cy="677880"/>
+            <a:off x="-4417200" y="2726640"/>
+            <a:ext cx="10611000" cy="677160"/>
           </a:xfrm>
           <a:prstGeom prst="rect">
             <a:avLst/>
@@ -2487,6 +2465,29 @@
           </a:p>
         </p:txBody>
       </p:sp>
+      <p:pic>
+        <p:nvPicPr>
+          <p:cNvPr id="55" name="" descr=""/>
+          <p:cNvPicPr/>
+          <p:nvPr/>
+        </p:nvPicPr>
+        <p:blipFill>
+          <a:blip r:embed="rId2"/>
+          <a:stretch/>
+        </p:blipFill>
+        <p:spPr>
+          <a:xfrm>
+            <a:off x="1296000" y="34560"/>
+            <a:ext cx="10388880" cy="6857280"/>
+          </a:xfrm>
+          <a:prstGeom prst="rect">
+            <a:avLst/>
+          </a:prstGeom>
+          <a:ln>
+            <a:noFill/>
+          </a:ln>
+        </p:spPr>
+      </p:pic>
     </p:spTree>
   </p:cSld>
   <p:timing>
@@ -2552,7 +2553,7 @@
         <p:spPr>
           <a:xfrm>
             <a:off x="504000" y="6479280"/>
-            <a:ext cx="11128320" cy="718200"/>
+            <a:ext cx="11127600" cy="717480"/>
           </a:xfrm>
           <a:prstGeom prst="rect">
             <a:avLst/>
@@ -2602,39 +2603,16 @@
           </a:p>
         </p:txBody>
       </p:sp>
-      <p:pic>
-        <p:nvPicPr>
-          <p:cNvPr id="57" name="" descr=""/>
-          <p:cNvPicPr/>
-          <p:nvPr/>
-        </p:nvPicPr>
-        <p:blipFill>
-          <a:blip r:embed="rId1"/>
-          <a:stretch/>
-        </p:blipFill>
-        <p:spPr>
-          <a:xfrm>
-            <a:off x="559080" y="144000"/>
-            <a:ext cx="11633040" cy="6714000"/>
-          </a:xfrm>
-          <a:prstGeom prst="rect">
-            <a:avLst/>
-          </a:prstGeom>
-          <a:ln>
-            <a:noFill/>
-          </a:ln>
-        </p:spPr>
-      </p:pic>
-      <p:sp>
-        <p:nvSpPr>
-          <p:cNvPr id="58" name="CustomShape 2"/>
+      <p:sp>
+        <p:nvSpPr>
+          <p:cNvPr id="57" name="CustomShape 2"/>
           <p:cNvSpPr/>
           <p:nvPr/>
         </p:nvSpPr>
         <p:spPr>
           <a:xfrm rot="16200000">
-            <a:off x="-4993920" y="2725920"/>
-            <a:ext cx="10611720" cy="677880"/>
+            <a:off x="-4993200" y="2726640"/>
+            <a:ext cx="10611000" cy="677160"/>
           </a:xfrm>
           <a:prstGeom prst="rect">
             <a:avLst/>
@@ -2674,6 +2652,29 @@
           </a:p>
         </p:txBody>
       </p:sp>
+      <p:pic>
+        <p:nvPicPr>
+          <p:cNvPr id="58" name="" descr=""/>
+          <p:cNvPicPr/>
+          <p:nvPr/>
+        </p:nvPicPr>
+        <p:blipFill>
+          <a:blip r:embed="rId1"/>
+          <a:stretch/>
+        </p:blipFill>
+        <p:spPr>
+          <a:xfrm>
+            <a:off x="1431360" y="32760"/>
+            <a:ext cx="9769680" cy="6857640"/>
+          </a:xfrm>
+          <a:prstGeom prst="rect">
+            <a:avLst/>
+          </a:prstGeom>
+          <a:ln>
+            <a:noFill/>
+          </a:ln>
+        </p:spPr>
+      </p:pic>
     </p:spTree>
   </p:cSld>
   <p:timing>

</xml_diff>

<commit_message>
alteração principal no modelo logico e diagrama de classe
</commit_message>
<xml_diff>
--- a/segunda entrega/segunda entrega.pptx
+++ b/segunda entrega/segunda entrega.pptx
@@ -1399,7 +1399,13 @@
               <a:rPr b="0" lang="pt-BR" sz="4400" spc="-1" strike="noStrike">
                 <a:latin typeface="Arial"/>
               </a:rPr>
-              <a:t>Clique para editar o formato do texto do título</a:t>
+              <a:t>Clique para editar o formato do texto do </a:t>
+            </a:r>
+            <a:r>
+              <a:rPr b="0" lang="pt-BR" sz="4400" spc="-1" strike="noStrike">
+                <a:latin typeface="Arial"/>
+              </a:rPr>
+              <a:t>título</a:t>
             </a:r>
             <a:endParaRPr b="0" lang="pt-BR" sz="4400" spc="-1" strike="noStrike">
               <a:latin typeface="Arial"/>
@@ -1639,7 +1645,7 @@
         <p:spPr>
           <a:xfrm>
             <a:off x="0" y="0"/>
-            <a:ext cx="12189600" cy="1584000"/>
+            <a:ext cx="12189240" cy="1583640"/>
           </a:xfrm>
           <a:prstGeom prst="rect">
             <a:avLst/>
@@ -1671,7 +1677,7 @@
         <p:spPr>
           <a:xfrm>
             <a:off x="10561680" y="0"/>
-            <a:ext cx="1080720" cy="2504520"/>
+            <a:ext cx="1080360" cy="2504160"/>
           </a:xfrm>
           <a:prstGeom prst="rect">
             <a:avLst/>
@@ -1690,7 +1696,7 @@
         <p:spPr>
           <a:xfrm>
             <a:off x="504000" y="6479280"/>
-            <a:ext cx="11127600" cy="717480"/>
+            <a:ext cx="11127240" cy="717120"/>
           </a:xfrm>
           <a:prstGeom prst="rect">
             <a:avLst/>
@@ -1753,7 +1759,7 @@
         <p:spPr>
           <a:xfrm>
             <a:off x="235080" y="283680"/>
-            <a:ext cx="3998160" cy="1017000"/>
+            <a:ext cx="3997800" cy="1016640"/>
           </a:xfrm>
           <a:prstGeom prst="rect">
             <a:avLst/>
@@ -1772,7 +1778,7 @@
         <p:spPr>
           <a:xfrm>
             <a:off x="3603240" y="3470040"/>
-            <a:ext cx="4929480" cy="1122840"/>
+            <a:ext cx="4929120" cy="1122480"/>
           </a:xfrm>
           <a:prstGeom prst="rect">
             <a:avLst/>
@@ -1957,7 +1963,7 @@
         <p:spPr>
           <a:xfrm>
             <a:off x="0" y="0"/>
-            <a:ext cx="12189600" cy="1584000"/>
+            <a:ext cx="12189240" cy="1583640"/>
           </a:xfrm>
           <a:prstGeom prst="rect">
             <a:avLst/>
@@ -1985,7 +1991,7 @@
         <p:spPr>
           <a:xfrm>
             <a:off x="504000" y="6479280"/>
-            <a:ext cx="11127600" cy="717480"/>
+            <a:ext cx="11127240" cy="717120"/>
           </a:xfrm>
           <a:prstGeom prst="rect">
             <a:avLst/>
@@ -2048,7 +2054,7 @@
         <p:spPr>
           <a:xfrm>
             <a:off x="235080" y="283680"/>
-            <a:ext cx="3998160" cy="1017000"/>
+            <a:ext cx="3997800" cy="1016640"/>
           </a:xfrm>
           <a:prstGeom prst="rect">
             <a:avLst/>
@@ -2071,7 +2077,7 @@
         <p:spPr>
           <a:xfrm>
             <a:off x="235080" y="2050200"/>
-            <a:ext cx="11470320" cy="3800160"/>
+            <a:ext cx="11469960" cy="3799800"/>
           </a:xfrm>
           <a:prstGeom prst="rect">
             <a:avLst/>
@@ -2094,7 +2100,7 @@
         <p:spPr>
           <a:xfrm>
             <a:off x="10561680" y="0"/>
-            <a:ext cx="1080720" cy="2504520"/>
+            <a:ext cx="1080360" cy="2504160"/>
           </a:xfrm>
           <a:prstGeom prst="rect">
             <a:avLst/>
@@ -2173,7 +2179,7 @@
         <p:spPr>
           <a:xfrm>
             <a:off x="10561680" y="0"/>
-            <a:ext cx="1080720" cy="2504520"/>
+            <a:ext cx="1080360" cy="2504160"/>
           </a:xfrm>
           <a:prstGeom prst="rect">
             <a:avLst/>
@@ -2196,7 +2202,7 @@
         <p:spPr>
           <a:xfrm>
             <a:off x="235080" y="283680"/>
-            <a:ext cx="3998160" cy="1017000"/>
+            <a:ext cx="3997800" cy="1016640"/>
           </a:xfrm>
           <a:prstGeom prst="rect">
             <a:avLst/>
@@ -2214,8 +2220,8 @@
         </p:nvSpPr>
         <p:spPr>
           <a:xfrm rot="16200000">
-            <a:off x="-4417200" y="2726280"/>
-            <a:ext cx="10611000" cy="677160"/>
+            <a:off x="-4416840" y="2726640"/>
+            <a:ext cx="10610640" cy="676800"/>
           </a:xfrm>
           <a:prstGeom prst="rect">
             <a:avLst/>
@@ -2268,7 +2274,7 @@
         <p:spPr>
           <a:xfrm>
             <a:off x="2466360" y="34560"/>
-            <a:ext cx="7333560" cy="6857280"/>
+            <a:ext cx="7333200" cy="6856920"/>
           </a:xfrm>
           <a:prstGeom prst="rect">
             <a:avLst/>
@@ -2347,7 +2353,7 @@
         <p:spPr>
           <a:xfrm>
             <a:off x="10561680" y="0"/>
-            <a:ext cx="1080720" cy="2504520"/>
+            <a:ext cx="1080360" cy="2504160"/>
           </a:xfrm>
           <a:prstGeom prst="rect">
             <a:avLst/>
@@ -2366,7 +2372,7 @@
         <p:spPr>
           <a:xfrm>
             <a:off x="504000" y="6479280"/>
-            <a:ext cx="11127600" cy="717480"/>
+            <a:ext cx="11127240" cy="717120"/>
           </a:xfrm>
           <a:prstGeom prst="rect">
             <a:avLst/>
@@ -2424,8 +2430,8 @@
         </p:nvSpPr>
         <p:spPr>
           <a:xfrm rot="16200000">
-            <a:off x="-4417200" y="2726640"/>
-            <a:ext cx="10611000" cy="677160"/>
+            <a:off x="-4416840" y="2727000"/>
+            <a:ext cx="10610640" cy="676800"/>
           </a:xfrm>
           <a:prstGeom prst="rect">
             <a:avLst/>
@@ -2477,8 +2483,8 @@
         </p:blipFill>
         <p:spPr>
           <a:xfrm>
-            <a:off x="1296000" y="34560"/>
-            <a:ext cx="10388880" cy="6857280"/>
+            <a:off x="1163160" y="176760"/>
+            <a:ext cx="9276840" cy="6687000"/>
           </a:xfrm>
           <a:prstGeom prst="rect">
             <a:avLst/>
@@ -2553,7 +2559,7 @@
         <p:spPr>
           <a:xfrm>
             <a:off x="504000" y="6479280"/>
-            <a:ext cx="11127600" cy="717480"/>
+            <a:ext cx="11127240" cy="717120"/>
           </a:xfrm>
           <a:prstGeom prst="rect">
             <a:avLst/>
@@ -2611,8 +2617,8 @@
         </p:nvSpPr>
         <p:spPr>
           <a:xfrm rot="16200000">
-            <a:off x="-4993200" y="2726640"/>
-            <a:ext cx="10611000" cy="677160"/>
+            <a:off x="-4992840" y="2727000"/>
+            <a:ext cx="10610640" cy="676800"/>
           </a:xfrm>
           <a:prstGeom prst="rect">
             <a:avLst/>
@@ -2664,8 +2670,8 @@
         </p:blipFill>
         <p:spPr>
           <a:xfrm>
-            <a:off x="1431360" y="32760"/>
-            <a:ext cx="9769680" cy="6857640"/>
+            <a:off x="1305360" y="32760"/>
+            <a:ext cx="9661320" cy="6857640"/>
           </a:xfrm>
           <a:prstGeom prst="rect">
             <a:avLst/>

</xml_diff>

<commit_message>
alteração diagrama de clase e modelo logico segunda entrega
</commit_message>
<xml_diff>
--- a/segunda entrega/segunda entrega.pptx
+++ b/segunda entrega/segunda entrega.pptx
@@ -1399,13 +1399,7 @@
               <a:rPr b="0" lang="pt-BR" sz="4400" spc="-1" strike="noStrike">
                 <a:latin typeface="Arial"/>
               </a:rPr>
-              <a:t>Clique para editar o formato do texto do </a:t>
-            </a:r>
-            <a:r>
-              <a:rPr b="0" lang="pt-BR" sz="4400" spc="-1" strike="noStrike">
-                <a:latin typeface="Arial"/>
-              </a:rPr>
-              <a:t>título</a:t>
+              <a:t>Clique para editar o formato do texto do título</a:t>
             </a:r>
             <a:endParaRPr b="0" lang="pt-BR" sz="4400" spc="-1" strike="noStrike">
               <a:latin typeface="Arial"/>
@@ -1645,7 +1639,7 @@
         <p:spPr>
           <a:xfrm>
             <a:off x="0" y="0"/>
-            <a:ext cx="12189240" cy="1583640"/>
+            <a:ext cx="12188880" cy="1583280"/>
           </a:xfrm>
           <a:prstGeom prst="rect">
             <a:avLst/>
@@ -1677,7 +1671,7 @@
         <p:spPr>
           <a:xfrm>
             <a:off x="10561680" y="0"/>
-            <a:ext cx="1080360" cy="2504160"/>
+            <a:ext cx="1080000" cy="2503800"/>
           </a:xfrm>
           <a:prstGeom prst="rect">
             <a:avLst/>
@@ -1696,7 +1690,7 @@
         <p:spPr>
           <a:xfrm>
             <a:off x="504000" y="6479280"/>
-            <a:ext cx="11127240" cy="717120"/>
+            <a:ext cx="11126880" cy="716760"/>
           </a:xfrm>
           <a:prstGeom prst="rect">
             <a:avLst/>
@@ -1759,7 +1753,7 @@
         <p:spPr>
           <a:xfrm>
             <a:off x="235080" y="283680"/>
-            <a:ext cx="3997800" cy="1016640"/>
+            <a:ext cx="3997440" cy="1016280"/>
           </a:xfrm>
           <a:prstGeom prst="rect">
             <a:avLst/>
@@ -1778,7 +1772,7 @@
         <p:spPr>
           <a:xfrm>
             <a:off x="3603240" y="3470040"/>
-            <a:ext cx="4929120" cy="1122480"/>
+            <a:ext cx="4928760" cy="1122120"/>
           </a:xfrm>
           <a:prstGeom prst="rect">
             <a:avLst/>
@@ -1963,7 +1957,7 @@
         <p:spPr>
           <a:xfrm>
             <a:off x="0" y="0"/>
-            <a:ext cx="12189240" cy="1583640"/>
+            <a:ext cx="12188880" cy="1583280"/>
           </a:xfrm>
           <a:prstGeom prst="rect">
             <a:avLst/>
@@ -1991,7 +1985,7 @@
         <p:spPr>
           <a:xfrm>
             <a:off x="504000" y="6479280"/>
-            <a:ext cx="11127240" cy="717120"/>
+            <a:ext cx="11126880" cy="716760"/>
           </a:xfrm>
           <a:prstGeom prst="rect">
             <a:avLst/>
@@ -2054,7 +2048,7 @@
         <p:spPr>
           <a:xfrm>
             <a:off x="235080" y="283680"/>
-            <a:ext cx="3997800" cy="1016640"/>
+            <a:ext cx="3997440" cy="1016280"/>
           </a:xfrm>
           <a:prstGeom prst="rect">
             <a:avLst/>
@@ -2077,7 +2071,7 @@
         <p:spPr>
           <a:xfrm>
             <a:off x="235080" y="2050200"/>
-            <a:ext cx="11469960" cy="3799800"/>
+            <a:ext cx="11469600" cy="3799440"/>
           </a:xfrm>
           <a:prstGeom prst="rect">
             <a:avLst/>
@@ -2100,7 +2094,7 @@
         <p:spPr>
           <a:xfrm>
             <a:off x="10561680" y="0"/>
-            <a:ext cx="1080360" cy="2504160"/>
+            <a:ext cx="1080000" cy="2503800"/>
           </a:xfrm>
           <a:prstGeom prst="rect">
             <a:avLst/>
@@ -2179,7 +2173,7 @@
         <p:spPr>
           <a:xfrm>
             <a:off x="10561680" y="0"/>
-            <a:ext cx="1080360" cy="2504160"/>
+            <a:ext cx="1080000" cy="2503800"/>
           </a:xfrm>
           <a:prstGeom prst="rect">
             <a:avLst/>
@@ -2202,7 +2196,7 @@
         <p:spPr>
           <a:xfrm>
             <a:off x="235080" y="283680"/>
-            <a:ext cx="3997800" cy="1016640"/>
+            <a:ext cx="3997440" cy="1016280"/>
           </a:xfrm>
           <a:prstGeom prst="rect">
             <a:avLst/>
@@ -2220,8 +2214,8 @@
         </p:nvSpPr>
         <p:spPr>
           <a:xfrm rot="16200000">
-            <a:off x="-4416840" y="2726640"/>
-            <a:ext cx="10610640" cy="676800"/>
+            <a:off x="-4416480" y="2727000"/>
+            <a:ext cx="10610280" cy="676440"/>
           </a:xfrm>
           <a:prstGeom prst="rect">
             <a:avLst/>
@@ -2274,7 +2268,7 @@
         <p:spPr>
           <a:xfrm>
             <a:off x="2466360" y="34560"/>
-            <a:ext cx="7333200" cy="6856920"/>
+            <a:ext cx="7332840" cy="6856560"/>
           </a:xfrm>
           <a:prstGeom prst="rect">
             <a:avLst/>
@@ -2353,7 +2347,7 @@
         <p:spPr>
           <a:xfrm>
             <a:off x="10561680" y="0"/>
-            <a:ext cx="1080360" cy="2504160"/>
+            <a:ext cx="1080000" cy="2503800"/>
           </a:xfrm>
           <a:prstGeom prst="rect">
             <a:avLst/>
@@ -2372,7 +2366,7 @@
         <p:spPr>
           <a:xfrm>
             <a:off x="504000" y="6479280"/>
-            <a:ext cx="11127240" cy="717120"/>
+            <a:ext cx="11126880" cy="716760"/>
           </a:xfrm>
           <a:prstGeom prst="rect">
             <a:avLst/>
@@ -2430,8 +2424,8 @@
         </p:nvSpPr>
         <p:spPr>
           <a:xfrm rot="16200000">
-            <a:off x="-4416840" y="2727000"/>
-            <a:ext cx="10610640" cy="676800"/>
+            <a:off x="-4416480" y="2727360"/>
+            <a:ext cx="10610280" cy="676440"/>
           </a:xfrm>
           <a:prstGeom prst="rect">
             <a:avLst/>
@@ -2483,8 +2477,8 @@
         </p:blipFill>
         <p:spPr>
           <a:xfrm>
-            <a:off x="1163160" y="176760"/>
-            <a:ext cx="9276840" cy="6687000"/>
+            <a:off x="1379160" y="32760"/>
+            <a:ext cx="9513720" cy="6857640"/>
           </a:xfrm>
           <a:prstGeom prst="rect">
             <a:avLst/>
@@ -2559,7 +2553,7 @@
         <p:spPr>
           <a:xfrm>
             <a:off x="504000" y="6479280"/>
-            <a:ext cx="11127240" cy="717120"/>
+            <a:ext cx="11126880" cy="716760"/>
           </a:xfrm>
           <a:prstGeom prst="rect">
             <a:avLst/>
@@ -2617,8 +2611,8 @@
         </p:nvSpPr>
         <p:spPr>
           <a:xfrm rot="16200000">
-            <a:off x="-4992840" y="2727000"/>
-            <a:ext cx="10610640" cy="676800"/>
+            <a:off x="-4992480" y="2727360"/>
+            <a:ext cx="10610280" cy="676440"/>
           </a:xfrm>
           <a:prstGeom prst="rect">
             <a:avLst/>
@@ -2670,8 +2664,8 @@
         </p:blipFill>
         <p:spPr>
           <a:xfrm>
-            <a:off x="1305360" y="32760"/>
-            <a:ext cx="9661320" cy="6857640"/>
+            <a:off x="1266120" y="32760"/>
+            <a:ext cx="9739800" cy="6857640"/>
           </a:xfrm>
           <a:prstGeom prst="rect">
             <a:avLst/>

</xml_diff>

<commit_message>
alteração modelo logicorelacionamento medico-ubs repetido
</commit_message>
<xml_diff>
--- a/segunda entrega/segunda entrega.pptx
+++ b/segunda entrega/segunda entrega.pptx
@@ -1,123 +1,23 @@
 
 <file path=ppt/presentation.xml><?xml version="1.0" encoding="utf-8"?>
-<p:presentation xmlns:a="http://schemas.openxmlformats.org/drawingml/2006/main" xmlns:r="http://schemas.openxmlformats.org/officeDocument/2006/relationships" xmlns:p="http://schemas.openxmlformats.org/presentationml/2006/main">
+<p:presentation xmlns:a="http://schemas.openxmlformats.org/drawingml/2006/main" xmlns:p="http://schemas.openxmlformats.org/presentationml/2006/main" xmlns:r="http://schemas.openxmlformats.org/officeDocument/2006/relationships" xmlns:p14="http://schemas.microsoft.com/office/powerpoint/2010/main" xmlns:p15="http://schemas.microsoft.com/office/powerpoint/2012/main" xmlns:mc="http://schemas.openxmlformats.org/markup-compatibility/2006">
   <p:sldMasterIdLst>
-    <p:sldMasterId id="2147483648" r:id="rId1"/>
+    <p:sldMasterId id="2147483648" r:id="rId2"/>
   </p:sldMasterIdLst>
   <p:sldIdLst>
-    <p:sldId id="256" r:id="rId2"/>
-    <p:sldId id="257" r:id="rId3"/>
-    <p:sldId id="258" r:id="rId4"/>
-    <p:sldId id="259" r:id="rId5"/>
-    <p:sldId id="260" r:id="rId6"/>
+    <p:sldId id="256" r:id="rId3"/>
+    <p:sldId id="257" r:id="rId4"/>
+    <p:sldId id="258" r:id="rId5"/>
+    <p:sldId id="259" r:id="rId6"/>
+    <p:sldId id="260" r:id="rId7"/>
   </p:sldIdLst>
   <p:sldSz cx="12192000" cy="6858000"/>
-  <p:notesSz cx="7559675" cy="10691813"/>
-  <p:defaultTextStyle>
-    <a:defPPr>
-      <a:defRPr lang="pt-BR"/>
-    </a:defPPr>
-    <a:lvl1pPr marL="0" algn="l" defTabSz="914400" rtl="0" eaLnBrk="1" latinLnBrk="0" hangingPunct="1">
-      <a:defRPr sz="1800" kern="1200">
-        <a:solidFill>
-          <a:schemeClr val="tx1"/>
-        </a:solidFill>
-        <a:latin typeface="+mn-lt"/>
-        <a:ea typeface="+mn-ea"/>
-        <a:cs typeface="+mn-cs"/>
-      </a:defRPr>
-    </a:lvl1pPr>
-    <a:lvl2pPr marL="457200" algn="l" defTabSz="914400" rtl="0" eaLnBrk="1" latinLnBrk="0" hangingPunct="1">
-      <a:defRPr sz="1800" kern="1200">
-        <a:solidFill>
-          <a:schemeClr val="tx1"/>
-        </a:solidFill>
-        <a:latin typeface="+mn-lt"/>
-        <a:ea typeface="+mn-ea"/>
-        <a:cs typeface="+mn-cs"/>
-      </a:defRPr>
-    </a:lvl2pPr>
-    <a:lvl3pPr marL="914400" algn="l" defTabSz="914400" rtl="0" eaLnBrk="1" latinLnBrk="0" hangingPunct="1">
-      <a:defRPr sz="1800" kern="1200">
-        <a:solidFill>
-          <a:schemeClr val="tx1"/>
-        </a:solidFill>
-        <a:latin typeface="+mn-lt"/>
-        <a:ea typeface="+mn-ea"/>
-        <a:cs typeface="+mn-cs"/>
-      </a:defRPr>
-    </a:lvl3pPr>
-    <a:lvl4pPr marL="1371600" algn="l" defTabSz="914400" rtl="0" eaLnBrk="1" latinLnBrk="0" hangingPunct="1">
-      <a:defRPr sz="1800" kern="1200">
-        <a:solidFill>
-          <a:schemeClr val="tx1"/>
-        </a:solidFill>
-        <a:latin typeface="+mn-lt"/>
-        <a:ea typeface="+mn-ea"/>
-        <a:cs typeface="+mn-cs"/>
-      </a:defRPr>
-    </a:lvl4pPr>
-    <a:lvl5pPr marL="1828800" algn="l" defTabSz="914400" rtl="0" eaLnBrk="1" latinLnBrk="0" hangingPunct="1">
-      <a:defRPr sz="1800" kern="1200">
-        <a:solidFill>
-          <a:schemeClr val="tx1"/>
-        </a:solidFill>
-        <a:latin typeface="+mn-lt"/>
-        <a:ea typeface="+mn-ea"/>
-        <a:cs typeface="+mn-cs"/>
-      </a:defRPr>
-    </a:lvl5pPr>
-    <a:lvl6pPr marL="2286000" algn="l" defTabSz="914400" rtl="0" eaLnBrk="1" latinLnBrk="0" hangingPunct="1">
-      <a:defRPr sz="1800" kern="1200">
-        <a:solidFill>
-          <a:schemeClr val="tx1"/>
-        </a:solidFill>
-        <a:latin typeface="+mn-lt"/>
-        <a:ea typeface="+mn-ea"/>
-        <a:cs typeface="+mn-cs"/>
-      </a:defRPr>
-    </a:lvl6pPr>
-    <a:lvl7pPr marL="2743200" algn="l" defTabSz="914400" rtl="0" eaLnBrk="1" latinLnBrk="0" hangingPunct="1">
-      <a:defRPr sz="1800" kern="1200">
-        <a:solidFill>
-          <a:schemeClr val="tx1"/>
-        </a:solidFill>
-        <a:latin typeface="+mn-lt"/>
-        <a:ea typeface="+mn-ea"/>
-        <a:cs typeface="+mn-cs"/>
-      </a:defRPr>
-    </a:lvl7pPr>
-    <a:lvl8pPr marL="3200400" algn="l" defTabSz="914400" rtl="0" eaLnBrk="1" latinLnBrk="0" hangingPunct="1">
-      <a:defRPr sz="1800" kern="1200">
-        <a:solidFill>
-          <a:schemeClr val="tx1"/>
-        </a:solidFill>
-        <a:latin typeface="+mn-lt"/>
-        <a:ea typeface="+mn-ea"/>
-        <a:cs typeface="+mn-cs"/>
-      </a:defRPr>
-    </a:lvl8pPr>
-    <a:lvl9pPr marL="3657600" algn="l" defTabSz="914400" rtl="0" eaLnBrk="1" latinLnBrk="0" hangingPunct="1">
-      <a:defRPr sz="1800" kern="1200">
-        <a:solidFill>
-          <a:schemeClr val="tx1"/>
-        </a:solidFill>
-        <a:latin typeface="+mn-lt"/>
-        <a:ea typeface="+mn-ea"/>
-        <a:cs typeface="+mn-cs"/>
-      </a:defRPr>
-    </a:lvl9pPr>
-  </p:defaultTextStyle>
-  <p:extLst>
-    <p:ext uri="{EFAFB233-063F-42B5-8137-9DF3F51BA10A}">
-      <p15:sldGuideLst xmlns:p15="http://schemas.microsoft.com/office/powerpoint/2012/main"/>
-    </p:ext>
-  </p:extLst>
+  <p:notesSz cx="7559675" cy="10691812"/>
 </p:presentation>
 </file>
 
 <file path=ppt/slideLayouts/slideLayout1.xml><?xml version="1.0" encoding="utf-8"?>
-<p:sldLayout xmlns:a="http://schemas.openxmlformats.org/drawingml/2006/main" xmlns:r="http://schemas.openxmlformats.org/officeDocument/2006/relationships" xmlns:p="http://schemas.openxmlformats.org/presentationml/2006/main" type="blank" preserve="1">
+<p:sldLayout xmlns:a="http://schemas.openxmlformats.org/drawingml/2006/main" xmlns:p="http://schemas.openxmlformats.org/presentationml/2006/main" xmlns:r="http://schemas.openxmlformats.org/officeDocument/2006/relationships" xmlns:p14="http://schemas.microsoft.com/office/powerpoint/2010/main" xmlns:p15="http://schemas.microsoft.com/office/powerpoint/2012/main" xmlns:mc="http://schemas.openxmlformats.org/markup-compatibility/2006" type="blank" preserve="1">
   <p:cSld name="Blank Slide">
     <p:spTree>
       <p:nvGrpSpPr>
@@ -135,14 +35,11 @@
       </p:grpSpPr>
     </p:spTree>
   </p:cSld>
-  <p:clrMapOvr>
-    <a:masterClrMapping/>
-  </p:clrMapOvr>
 </p:sldLayout>
 </file>
 
 <file path=ppt/slideLayouts/slideLayout10.xml><?xml version="1.0" encoding="utf-8"?>
-<p:sldLayout xmlns:a="http://schemas.openxmlformats.org/drawingml/2006/main" xmlns:r="http://schemas.openxmlformats.org/officeDocument/2006/relationships" xmlns:p="http://schemas.openxmlformats.org/presentationml/2006/main" type="objOverTx" preserve="1">
+<p:sldLayout xmlns:a="http://schemas.openxmlformats.org/drawingml/2006/main" xmlns:p="http://schemas.openxmlformats.org/presentationml/2006/main" xmlns:r="http://schemas.openxmlformats.org/officeDocument/2006/relationships" xmlns:p14="http://schemas.microsoft.com/office/powerpoint/2010/main" xmlns:p15="http://schemas.microsoft.com/office/powerpoint/2012/main" xmlns:mc="http://schemas.openxmlformats.org/markup-compatibility/2006" type="objOverTx" preserve="1">
   <p:cSld name="Title, Content over Content">
     <p:spTree>
       <p:nvGrpSpPr>
@@ -178,11 +75,12 @@
           </a:prstGeom>
         </p:spPr>
         <p:txBody>
-          <a:bodyPr lIns="0" tIns="0" rIns="0" bIns="0" anchor="ctr"/>
-          <a:lstStyle/>
-          <a:p>
-            <a:pPr algn="ctr"/>
-            <a:endParaRPr lang="pt-BR" sz="4400" b="0" strike="noStrike" spc="-1">
+          <a:bodyPr lIns="0" rIns="0" tIns="0" bIns="0" anchor="ctr"/>
+          <a:p>
+            <a:endParaRPr b="0" lang="pt-BR" sz="1800" spc="-1" strike="noStrike">
+              <a:solidFill>
+                <a:srgbClr val="000000"/>
+              </a:solidFill>
               <a:latin typeface="Arial"/>
             </a:endParaRPr>
           </a:p>
@@ -208,12 +106,14 @@
           </a:prstGeom>
         </p:spPr>
         <p:txBody>
-          <a:bodyPr lIns="0" tIns="0" rIns="0" bIns="0">
+          <a:bodyPr lIns="0" rIns="0" tIns="0" bIns="0">
             <a:normAutofit/>
           </a:bodyPr>
-          <a:lstStyle/>
-          <a:p>
-            <a:endParaRPr lang="pt-BR" sz="3200" b="0" strike="noStrike" spc="-1">
+          <a:p>
+            <a:endParaRPr b="0" lang="pt-BR" sz="2800" spc="-1" strike="noStrike">
+              <a:solidFill>
+                <a:srgbClr val="000000"/>
+              </a:solidFill>
               <a:latin typeface="Arial"/>
             </a:endParaRPr>
           </a:p>
@@ -239,12 +139,14 @@
           </a:prstGeom>
         </p:spPr>
         <p:txBody>
-          <a:bodyPr lIns="0" tIns="0" rIns="0" bIns="0">
+          <a:bodyPr lIns="0" rIns="0" tIns="0" bIns="0">
             <a:normAutofit/>
           </a:bodyPr>
-          <a:lstStyle/>
-          <a:p>
-            <a:endParaRPr lang="pt-BR" sz="3200" b="0" strike="noStrike" spc="-1">
+          <a:p>
+            <a:endParaRPr b="0" lang="pt-BR" sz="2800" spc="-1" strike="noStrike">
+              <a:solidFill>
+                <a:srgbClr val="000000"/>
+              </a:solidFill>
               <a:latin typeface="Arial"/>
             </a:endParaRPr>
           </a:p>
@@ -252,14 +154,11 @@
       </p:sp>
     </p:spTree>
   </p:cSld>
-  <p:clrMapOvr>
-    <a:masterClrMapping/>
-  </p:clrMapOvr>
 </p:sldLayout>
 </file>
 
 <file path=ppt/slideLayouts/slideLayout11.xml><?xml version="1.0" encoding="utf-8"?>
-<p:sldLayout xmlns:a="http://schemas.openxmlformats.org/drawingml/2006/main" xmlns:r="http://schemas.openxmlformats.org/officeDocument/2006/relationships" xmlns:p="http://schemas.openxmlformats.org/presentationml/2006/main" type="fourObj" preserve="1">
+<p:sldLayout xmlns:a="http://schemas.openxmlformats.org/drawingml/2006/main" xmlns:p="http://schemas.openxmlformats.org/presentationml/2006/main" xmlns:r="http://schemas.openxmlformats.org/officeDocument/2006/relationships" xmlns:p14="http://schemas.microsoft.com/office/powerpoint/2010/main" xmlns:p15="http://schemas.microsoft.com/office/powerpoint/2012/main" xmlns:mc="http://schemas.openxmlformats.org/markup-compatibility/2006" type="fourObj" preserve="1">
   <p:cSld name="Title, 4 Content">
     <p:spTree>
       <p:nvGrpSpPr>
@@ -295,11 +194,12 @@
           </a:prstGeom>
         </p:spPr>
         <p:txBody>
-          <a:bodyPr lIns="0" tIns="0" rIns="0" bIns="0" anchor="ctr"/>
-          <a:lstStyle/>
-          <a:p>
-            <a:pPr algn="ctr"/>
-            <a:endParaRPr lang="pt-BR" sz="4400" b="0" strike="noStrike" spc="-1">
+          <a:bodyPr lIns="0" rIns="0" tIns="0" bIns="0" anchor="ctr"/>
+          <a:p>
+            <a:endParaRPr b="0" lang="pt-BR" sz="1800" spc="-1" strike="noStrike">
+              <a:solidFill>
+                <a:srgbClr val="000000"/>
+              </a:solidFill>
               <a:latin typeface="Arial"/>
             </a:endParaRPr>
           </a:p>
@@ -325,12 +225,14 @@
           </a:prstGeom>
         </p:spPr>
         <p:txBody>
-          <a:bodyPr lIns="0" tIns="0" rIns="0" bIns="0">
+          <a:bodyPr lIns="0" rIns="0" tIns="0" bIns="0">
             <a:normAutofit/>
           </a:bodyPr>
-          <a:lstStyle/>
-          <a:p>
-            <a:endParaRPr lang="pt-BR" sz="3200" b="0" strike="noStrike" spc="-1">
+          <a:p>
+            <a:endParaRPr b="0" lang="pt-BR" sz="2800" spc="-1" strike="noStrike">
+              <a:solidFill>
+                <a:srgbClr val="000000"/>
+              </a:solidFill>
               <a:latin typeface="Arial"/>
             </a:endParaRPr>
           </a:p>
@@ -356,12 +258,14 @@
           </a:prstGeom>
         </p:spPr>
         <p:txBody>
-          <a:bodyPr lIns="0" tIns="0" rIns="0" bIns="0">
+          <a:bodyPr lIns="0" rIns="0" tIns="0" bIns="0">
             <a:normAutofit/>
           </a:bodyPr>
-          <a:lstStyle/>
-          <a:p>
-            <a:endParaRPr lang="pt-BR" sz="3200" b="0" strike="noStrike" spc="-1">
+          <a:p>
+            <a:endParaRPr b="0" lang="pt-BR" sz="2800" spc="-1" strike="noStrike">
+              <a:solidFill>
+                <a:srgbClr val="000000"/>
+              </a:solidFill>
               <a:latin typeface="Arial"/>
             </a:endParaRPr>
           </a:p>
@@ -387,12 +291,14 @@
           </a:prstGeom>
         </p:spPr>
         <p:txBody>
-          <a:bodyPr lIns="0" tIns="0" rIns="0" bIns="0">
+          <a:bodyPr lIns="0" rIns="0" tIns="0" bIns="0">
             <a:normAutofit/>
           </a:bodyPr>
-          <a:lstStyle/>
-          <a:p>
-            <a:endParaRPr lang="pt-BR" sz="3200" b="0" strike="noStrike" spc="-1">
+          <a:p>
+            <a:endParaRPr b="0" lang="pt-BR" sz="2800" spc="-1" strike="noStrike">
+              <a:solidFill>
+                <a:srgbClr val="000000"/>
+              </a:solidFill>
               <a:latin typeface="Arial"/>
             </a:endParaRPr>
           </a:p>
@@ -418,12 +324,14 @@
           </a:prstGeom>
         </p:spPr>
         <p:txBody>
-          <a:bodyPr lIns="0" tIns="0" rIns="0" bIns="0">
+          <a:bodyPr lIns="0" rIns="0" tIns="0" bIns="0">
             <a:normAutofit/>
           </a:bodyPr>
-          <a:lstStyle/>
-          <a:p>
-            <a:endParaRPr lang="pt-BR" sz="3200" b="0" strike="noStrike" spc="-1">
+          <a:p>
+            <a:endParaRPr b="0" lang="pt-BR" sz="2800" spc="-1" strike="noStrike">
+              <a:solidFill>
+                <a:srgbClr val="000000"/>
+              </a:solidFill>
               <a:latin typeface="Arial"/>
             </a:endParaRPr>
           </a:p>
@@ -431,14 +339,11 @@
       </p:sp>
     </p:spTree>
   </p:cSld>
-  <p:clrMapOvr>
-    <a:masterClrMapping/>
-  </p:clrMapOvr>
 </p:sldLayout>
 </file>
 
 <file path=ppt/slideLayouts/slideLayout12.xml><?xml version="1.0" encoding="utf-8"?>
-<p:sldLayout xmlns:a="http://schemas.openxmlformats.org/drawingml/2006/main" xmlns:r="http://schemas.openxmlformats.org/officeDocument/2006/relationships" xmlns:p="http://schemas.openxmlformats.org/presentationml/2006/main" type="blank" preserve="1">
+<p:sldLayout xmlns:a="http://schemas.openxmlformats.org/drawingml/2006/main" xmlns:p="http://schemas.openxmlformats.org/presentationml/2006/main" xmlns:r="http://schemas.openxmlformats.org/officeDocument/2006/relationships" xmlns:p14="http://schemas.microsoft.com/office/powerpoint/2010/main" xmlns:p15="http://schemas.microsoft.com/office/powerpoint/2012/main" xmlns:mc="http://schemas.openxmlformats.org/markup-compatibility/2006" type="blank" preserve="1">
   <p:cSld name="Title, 6 Content">
     <p:spTree>
       <p:nvGrpSpPr>
@@ -474,11 +379,12 @@
           </a:prstGeom>
         </p:spPr>
         <p:txBody>
-          <a:bodyPr lIns="0" tIns="0" rIns="0" bIns="0" anchor="ctr"/>
-          <a:lstStyle/>
-          <a:p>
-            <a:pPr algn="ctr"/>
-            <a:endParaRPr lang="pt-BR" sz="4400" b="0" strike="noStrike" spc="-1">
+          <a:bodyPr lIns="0" rIns="0" tIns="0" bIns="0" anchor="ctr"/>
+          <a:p>
+            <a:endParaRPr b="0" lang="pt-BR" sz="1800" spc="-1" strike="noStrike">
+              <a:solidFill>
+                <a:srgbClr val="000000"/>
+              </a:solidFill>
               <a:latin typeface="Arial"/>
             </a:endParaRPr>
           </a:p>
@@ -504,12 +410,14 @@
           </a:prstGeom>
         </p:spPr>
         <p:txBody>
-          <a:bodyPr lIns="0" tIns="0" rIns="0" bIns="0">
+          <a:bodyPr lIns="0" rIns="0" tIns="0" bIns="0">
             <a:normAutofit/>
           </a:bodyPr>
-          <a:lstStyle/>
-          <a:p>
-            <a:endParaRPr lang="pt-BR" sz="3200" b="0" strike="noStrike" spc="-1">
+          <a:p>
+            <a:endParaRPr b="0" lang="pt-BR" sz="2800" spc="-1" strike="noStrike">
+              <a:solidFill>
+                <a:srgbClr val="000000"/>
+              </a:solidFill>
               <a:latin typeface="Arial"/>
             </a:endParaRPr>
           </a:p>
@@ -535,12 +443,14 @@
           </a:prstGeom>
         </p:spPr>
         <p:txBody>
-          <a:bodyPr lIns="0" tIns="0" rIns="0" bIns="0">
+          <a:bodyPr lIns="0" rIns="0" tIns="0" bIns="0">
             <a:normAutofit/>
           </a:bodyPr>
-          <a:lstStyle/>
-          <a:p>
-            <a:endParaRPr lang="pt-BR" sz="3200" b="0" strike="noStrike" spc="-1">
+          <a:p>
+            <a:endParaRPr b="0" lang="pt-BR" sz="2800" spc="-1" strike="noStrike">
+              <a:solidFill>
+                <a:srgbClr val="000000"/>
+              </a:solidFill>
               <a:latin typeface="Arial"/>
             </a:endParaRPr>
           </a:p>
@@ -566,12 +476,14 @@
           </a:prstGeom>
         </p:spPr>
         <p:txBody>
-          <a:bodyPr lIns="0" tIns="0" rIns="0" bIns="0">
+          <a:bodyPr lIns="0" rIns="0" tIns="0" bIns="0">
             <a:normAutofit/>
           </a:bodyPr>
-          <a:lstStyle/>
-          <a:p>
-            <a:endParaRPr lang="pt-BR" sz="3200" b="0" strike="noStrike" spc="-1">
+          <a:p>
+            <a:endParaRPr b="0" lang="pt-BR" sz="2800" spc="-1" strike="noStrike">
+              <a:solidFill>
+                <a:srgbClr val="000000"/>
+              </a:solidFill>
               <a:latin typeface="Arial"/>
             </a:endParaRPr>
           </a:p>
@@ -597,12 +509,14 @@
           </a:prstGeom>
         </p:spPr>
         <p:txBody>
-          <a:bodyPr lIns="0" tIns="0" rIns="0" bIns="0">
+          <a:bodyPr lIns="0" rIns="0" tIns="0" bIns="0">
             <a:normAutofit/>
           </a:bodyPr>
-          <a:lstStyle/>
-          <a:p>
-            <a:endParaRPr lang="pt-BR" sz="3200" b="0" strike="noStrike" spc="-1">
+          <a:p>
+            <a:endParaRPr b="0" lang="pt-BR" sz="2800" spc="-1" strike="noStrike">
+              <a:solidFill>
+                <a:srgbClr val="000000"/>
+              </a:solidFill>
               <a:latin typeface="Arial"/>
             </a:endParaRPr>
           </a:p>
@@ -628,12 +542,14 @@
           </a:prstGeom>
         </p:spPr>
         <p:txBody>
-          <a:bodyPr lIns="0" tIns="0" rIns="0" bIns="0">
+          <a:bodyPr lIns="0" rIns="0" tIns="0" bIns="0">
             <a:normAutofit/>
           </a:bodyPr>
-          <a:lstStyle/>
-          <a:p>
-            <a:endParaRPr lang="pt-BR" sz="3200" b="0" strike="noStrike" spc="-1">
+          <a:p>
+            <a:endParaRPr b="0" lang="pt-BR" sz="2800" spc="-1" strike="noStrike">
+              <a:solidFill>
+                <a:srgbClr val="000000"/>
+              </a:solidFill>
               <a:latin typeface="Arial"/>
             </a:endParaRPr>
           </a:p>
@@ -659,12 +575,14 @@
           </a:prstGeom>
         </p:spPr>
         <p:txBody>
-          <a:bodyPr lIns="0" tIns="0" rIns="0" bIns="0">
+          <a:bodyPr lIns="0" rIns="0" tIns="0" bIns="0">
             <a:normAutofit/>
           </a:bodyPr>
-          <a:lstStyle/>
-          <a:p>
-            <a:endParaRPr lang="pt-BR" sz="3200" b="0" strike="noStrike" spc="-1">
+          <a:p>
+            <a:endParaRPr b="0" lang="pt-BR" sz="2800" spc="-1" strike="noStrike">
+              <a:solidFill>
+                <a:srgbClr val="000000"/>
+              </a:solidFill>
               <a:latin typeface="Arial"/>
             </a:endParaRPr>
           </a:p>
@@ -672,14 +590,11 @@
       </p:sp>
     </p:spTree>
   </p:cSld>
-  <p:clrMapOvr>
-    <a:masterClrMapping/>
-  </p:clrMapOvr>
 </p:sldLayout>
 </file>
 
 <file path=ppt/slideLayouts/slideLayout2.xml><?xml version="1.0" encoding="utf-8"?>
-<p:sldLayout xmlns:a="http://schemas.openxmlformats.org/drawingml/2006/main" xmlns:r="http://schemas.openxmlformats.org/officeDocument/2006/relationships" xmlns:p="http://schemas.openxmlformats.org/presentationml/2006/main" type="tx" preserve="1">
+<p:sldLayout xmlns:a="http://schemas.openxmlformats.org/drawingml/2006/main" xmlns:p="http://schemas.openxmlformats.org/presentationml/2006/main" xmlns:r="http://schemas.openxmlformats.org/officeDocument/2006/relationships" xmlns:p14="http://schemas.microsoft.com/office/powerpoint/2010/main" xmlns:p15="http://schemas.microsoft.com/office/powerpoint/2012/main" xmlns:mc="http://schemas.openxmlformats.org/markup-compatibility/2006" type="tx" preserve="1">
   <p:cSld name="Title Slide">
     <p:spTree>
       <p:nvGrpSpPr>
@@ -715,11 +630,12 @@
           </a:prstGeom>
         </p:spPr>
         <p:txBody>
-          <a:bodyPr lIns="0" tIns="0" rIns="0" bIns="0" anchor="ctr"/>
-          <a:lstStyle/>
-          <a:p>
-            <a:pPr algn="ctr"/>
-            <a:endParaRPr lang="pt-BR" sz="4400" b="0" strike="noStrike" spc="-1">
+          <a:bodyPr lIns="0" rIns="0" tIns="0" bIns="0" anchor="ctr"/>
+          <a:p>
+            <a:endParaRPr b="0" lang="pt-BR" sz="1800" spc="-1" strike="noStrike">
+              <a:solidFill>
+                <a:srgbClr val="000000"/>
+              </a:solidFill>
               <a:latin typeface="Arial"/>
             </a:endParaRPr>
           </a:p>
@@ -745,11 +661,10 @@
           </a:prstGeom>
         </p:spPr>
         <p:txBody>
-          <a:bodyPr lIns="0" tIns="0" rIns="0" bIns="0" anchor="ctr"/>
-          <a:lstStyle/>
+          <a:bodyPr lIns="0" rIns="0" tIns="0" bIns="0" anchor="ctr"/>
           <a:p>
             <a:pPr algn="ctr"/>
-            <a:endParaRPr lang="pt-BR" sz="3200" b="0" strike="noStrike" spc="-1">
+            <a:endParaRPr b="0" lang="pt-BR" sz="3200" spc="-1" strike="noStrike">
               <a:latin typeface="Arial"/>
             </a:endParaRPr>
           </a:p>
@@ -757,14 +672,11 @@
       </p:sp>
     </p:spTree>
   </p:cSld>
-  <p:clrMapOvr>
-    <a:masterClrMapping/>
-  </p:clrMapOvr>
 </p:sldLayout>
 </file>
 
 <file path=ppt/slideLayouts/slideLayout3.xml><?xml version="1.0" encoding="utf-8"?>
-<p:sldLayout xmlns:a="http://schemas.openxmlformats.org/drawingml/2006/main" xmlns:r="http://schemas.openxmlformats.org/officeDocument/2006/relationships" xmlns:p="http://schemas.openxmlformats.org/presentationml/2006/main" type="obj" preserve="1">
+<p:sldLayout xmlns:a="http://schemas.openxmlformats.org/drawingml/2006/main" xmlns:p="http://schemas.openxmlformats.org/presentationml/2006/main" xmlns:r="http://schemas.openxmlformats.org/officeDocument/2006/relationships" xmlns:p14="http://schemas.microsoft.com/office/powerpoint/2010/main" xmlns:p15="http://schemas.microsoft.com/office/powerpoint/2012/main" xmlns:mc="http://schemas.openxmlformats.org/markup-compatibility/2006" type="obj" preserve="1">
   <p:cSld name="Title, Content">
     <p:spTree>
       <p:nvGrpSpPr>
@@ -800,11 +712,12 @@
           </a:prstGeom>
         </p:spPr>
         <p:txBody>
-          <a:bodyPr lIns="0" tIns="0" rIns="0" bIns="0" anchor="ctr"/>
-          <a:lstStyle/>
-          <a:p>
-            <a:pPr algn="ctr"/>
-            <a:endParaRPr lang="pt-BR" sz="4400" b="0" strike="noStrike" spc="-1">
+          <a:bodyPr lIns="0" rIns="0" tIns="0" bIns="0" anchor="ctr"/>
+          <a:p>
+            <a:endParaRPr b="0" lang="pt-BR" sz="1800" spc="-1" strike="noStrike">
+              <a:solidFill>
+                <a:srgbClr val="000000"/>
+              </a:solidFill>
               <a:latin typeface="Arial"/>
             </a:endParaRPr>
           </a:p>
@@ -830,12 +743,14 @@
           </a:prstGeom>
         </p:spPr>
         <p:txBody>
-          <a:bodyPr lIns="0" tIns="0" rIns="0" bIns="0">
+          <a:bodyPr lIns="0" rIns="0" tIns="0" bIns="0">
             <a:normAutofit/>
           </a:bodyPr>
-          <a:lstStyle/>
-          <a:p>
-            <a:endParaRPr lang="pt-BR" sz="3200" b="0" strike="noStrike" spc="-1">
+          <a:p>
+            <a:endParaRPr b="0" lang="pt-BR" sz="2800" spc="-1" strike="noStrike">
+              <a:solidFill>
+                <a:srgbClr val="000000"/>
+              </a:solidFill>
               <a:latin typeface="Arial"/>
             </a:endParaRPr>
           </a:p>
@@ -843,14 +758,11 @@
       </p:sp>
     </p:spTree>
   </p:cSld>
-  <p:clrMapOvr>
-    <a:masterClrMapping/>
-  </p:clrMapOvr>
 </p:sldLayout>
 </file>
 
 <file path=ppt/slideLayouts/slideLayout4.xml><?xml version="1.0" encoding="utf-8"?>
-<p:sldLayout xmlns:a="http://schemas.openxmlformats.org/drawingml/2006/main" xmlns:r="http://schemas.openxmlformats.org/officeDocument/2006/relationships" xmlns:p="http://schemas.openxmlformats.org/presentationml/2006/main" type="twoObj" preserve="1">
+<p:sldLayout xmlns:a="http://schemas.openxmlformats.org/drawingml/2006/main" xmlns:p="http://schemas.openxmlformats.org/presentationml/2006/main" xmlns:r="http://schemas.openxmlformats.org/officeDocument/2006/relationships" xmlns:p14="http://schemas.microsoft.com/office/powerpoint/2010/main" xmlns:p15="http://schemas.microsoft.com/office/powerpoint/2012/main" xmlns:mc="http://schemas.openxmlformats.org/markup-compatibility/2006" type="twoObj" preserve="1">
   <p:cSld name="Title, 2 Content">
     <p:spTree>
       <p:nvGrpSpPr>
@@ -886,11 +798,12 @@
           </a:prstGeom>
         </p:spPr>
         <p:txBody>
-          <a:bodyPr lIns="0" tIns="0" rIns="0" bIns="0" anchor="ctr"/>
-          <a:lstStyle/>
-          <a:p>
-            <a:pPr algn="ctr"/>
-            <a:endParaRPr lang="pt-BR" sz="4400" b="0" strike="noStrike" spc="-1">
+          <a:bodyPr lIns="0" rIns="0" tIns="0" bIns="0" anchor="ctr"/>
+          <a:p>
+            <a:endParaRPr b="0" lang="pt-BR" sz="1800" spc="-1" strike="noStrike">
+              <a:solidFill>
+                <a:srgbClr val="000000"/>
+              </a:solidFill>
               <a:latin typeface="Arial"/>
             </a:endParaRPr>
           </a:p>
@@ -916,12 +829,14 @@
           </a:prstGeom>
         </p:spPr>
         <p:txBody>
-          <a:bodyPr lIns="0" tIns="0" rIns="0" bIns="0">
+          <a:bodyPr lIns="0" rIns="0" tIns="0" bIns="0">
             <a:normAutofit/>
           </a:bodyPr>
-          <a:lstStyle/>
-          <a:p>
-            <a:endParaRPr lang="pt-BR" sz="3200" b="0" strike="noStrike" spc="-1">
+          <a:p>
+            <a:endParaRPr b="0" lang="pt-BR" sz="2800" spc="-1" strike="noStrike">
+              <a:solidFill>
+                <a:srgbClr val="000000"/>
+              </a:solidFill>
               <a:latin typeface="Arial"/>
             </a:endParaRPr>
           </a:p>
@@ -947,12 +862,14 @@
           </a:prstGeom>
         </p:spPr>
         <p:txBody>
-          <a:bodyPr lIns="0" tIns="0" rIns="0" bIns="0">
+          <a:bodyPr lIns="0" rIns="0" tIns="0" bIns="0">
             <a:normAutofit/>
           </a:bodyPr>
-          <a:lstStyle/>
-          <a:p>
-            <a:endParaRPr lang="pt-BR" sz="3200" b="0" strike="noStrike" spc="-1">
+          <a:p>
+            <a:endParaRPr b="0" lang="pt-BR" sz="2800" spc="-1" strike="noStrike">
+              <a:solidFill>
+                <a:srgbClr val="000000"/>
+              </a:solidFill>
               <a:latin typeface="Arial"/>
             </a:endParaRPr>
           </a:p>
@@ -960,14 +877,11 @@
       </p:sp>
     </p:spTree>
   </p:cSld>
-  <p:clrMapOvr>
-    <a:masterClrMapping/>
-  </p:clrMapOvr>
 </p:sldLayout>
 </file>
 
 <file path=ppt/slideLayouts/slideLayout5.xml><?xml version="1.0" encoding="utf-8"?>
-<p:sldLayout xmlns:a="http://schemas.openxmlformats.org/drawingml/2006/main" xmlns:r="http://schemas.openxmlformats.org/officeDocument/2006/relationships" xmlns:p="http://schemas.openxmlformats.org/presentationml/2006/main" type="titleOnly" preserve="1">
+<p:sldLayout xmlns:a="http://schemas.openxmlformats.org/drawingml/2006/main" xmlns:p="http://schemas.openxmlformats.org/presentationml/2006/main" xmlns:r="http://schemas.openxmlformats.org/officeDocument/2006/relationships" xmlns:p14="http://schemas.microsoft.com/office/powerpoint/2010/main" xmlns:p15="http://schemas.microsoft.com/office/powerpoint/2012/main" xmlns:mc="http://schemas.openxmlformats.org/markup-compatibility/2006" type="titleOnly" preserve="1">
   <p:cSld name="Title Only">
     <p:spTree>
       <p:nvGrpSpPr>
@@ -1003,11 +917,12 @@
           </a:prstGeom>
         </p:spPr>
         <p:txBody>
-          <a:bodyPr lIns="0" tIns="0" rIns="0" bIns="0" anchor="ctr"/>
-          <a:lstStyle/>
-          <a:p>
-            <a:pPr algn="ctr"/>
-            <a:endParaRPr lang="pt-BR" sz="4400" b="0" strike="noStrike" spc="-1">
+          <a:bodyPr lIns="0" rIns="0" tIns="0" bIns="0" anchor="ctr"/>
+          <a:p>
+            <a:endParaRPr b="0" lang="pt-BR" sz="1800" spc="-1" strike="noStrike">
+              <a:solidFill>
+                <a:srgbClr val="000000"/>
+              </a:solidFill>
               <a:latin typeface="Arial"/>
             </a:endParaRPr>
           </a:p>
@@ -1015,14 +930,11 @@
       </p:sp>
     </p:spTree>
   </p:cSld>
-  <p:clrMapOvr>
-    <a:masterClrMapping/>
-  </p:clrMapOvr>
 </p:sldLayout>
 </file>
 
 <file path=ppt/slideLayouts/slideLayout6.xml><?xml version="1.0" encoding="utf-8"?>
-<p:sldLayout xmlns:a="http://schemas.openxmlformats.org/drawingml/2006/main" xmlns:r="http://schemas.openxmlformats.org/officeDocument/2006/relationships" xmlns:p="http://schemas.openxmlformats.org/presentationml/2006/main" type="objOnly" preserve="1">
+<p:sldLayout xmlns:a="http://schemas.openxmlformats.org/drawingml/2006/main" xmlns:p="http://schemas.openxmlformats.org/presentationml/2006/main" xmlns:r="http://schemas.openxmlformats.org/officeDocument/2006/relationships" xmlns:p14="http://schemas.microsoft.com/office/powerpoint/2010/main" xmlns:p15="http://schemas.microsoft.com/office/powerpoint/2012/main" xmlns:mc="http://schemas.openxmlformats.org/markup-compatibility/2006" type="objOnly" preserve="1">
   <p:cSld name="Centered Text">
     <p:spTree>
       <p:nvGrpSpPr>
@@ -1058,11 +970,10 @@
           </a:prstGeom>
         </p:spPr>
         <p:txBody>
-          <a:bodyPr lIns="0" tIns="0" rIns="0" bIns="0" anchor="ctr"/>
-          <a:lstStyle/>
+          <a:bodyPr lIns="0" rIns="0" tIns="0" bIns="0" anchor="ctr"/>
           <a:p>
             <a:pPr algn="ctr"/>
-            <a:endParaRPr lang="pt-BR" sz="3200" b="0" strike="noStrike" spc="-1">
+            <a:endParaRPr b="0" lang="pt-BR" sz="3200" spc="-1" strike="noStrike">
               <a:latin typeface="Arial"/>
             </a:endParaRPr>
           </a:p>
@@ -1070,14 +981,11 @@
       </p:sp>
     </p:spTree>
   </p:cSld>
-  <p:clrMapOvr>
-    <a:masterClrMapping/>
-  </p:clrMapOvr>
 </p:sldLayout>
 </file>
 
 <file path=ppt/slideLayouts/slideLayout7.xml><?xml version="1.0" encoding="utf-8"?>
-<p:sldLayout xmlns:a="http://schemas.openxmlformats.org/drawingml/2006/main" xmlns:r="http://schemas.openxmlformats.org/officeDocument/2006/relationships" xmlns:p="http://schemas.openxmlformats.org/presentationml/2006/main" type="twoObjAndObj" preserve="1">
+<p:sldLayout xmlns:a="http://schemas.openxmlformats.org/drawingml/2006/main" xmlns:p="http://schemas.openxmlformats.org/presentationml/2006/main" xmlns:r="http://schemas.openxmlformats.org/officeDocument/2006/relationships" xmlns:p14="http://schemas.microsoft.com/office/powerpoint/2010/main" xmlns:p15="http://schemas.microsoft.com/office/powerpoint/2012/main" xmlns:mc="http://schemas.openxmlformats.org/markup-compatibility/2006" type="twoObjAndObj" preserve="1">
   <p:cSld name="Title, 2 Content and Content">
     <p:spTree>
       <p:nvGrpSpPr>
@@ -1113,11 +1021,12 @@
           </a:prstGeom>
         </p:spPr>
         <p:txBody>
-          <a:bodyPr lIns="0" tIns="0" rIns="0" bIns="0" anchor="ctr"/>
-          <a:lstStyle/>
-          <a:p>
-            <a:pPr algn="ctr"/>
-            <a:endParaRPr lang="pt-BR" sz="4400" b="0" strike="noStrike" spc="-1">
+          <a:bodyPr lIns="0" rIns="0" tIns="0" bIns="0" anchor="ctr"/>
+          <a:p>
+            <a:endParaRPr b="0" lang="pt-BR" sz="1800" spc="-1" strike="noStrike">
+              <a:solidFill>
+                <a:srgbClr val="000000"/>
+              </a:solidFill>
               <a:latin typeface="Arial"/>
             </a:endParaRPr>
           </a:p>
@@ -1143,12 +1052,14 @@
           </a:prstGeom>
         </p:spPr>
         <p:txBody>
-          <a:bodyPr lIns="0" tIns="0" rIns="0" bIns="0">
+          <a:bodyPr lIns="0" rIns="0" tIns="0" bIns="0">
             <a:normAutofit/>
           </a:bodyPr>
-          <a:lstStyle/>
-          <a:p>
-            <a:endParaRPr lang="pt-BR" sz="3200" b="0" strike="noStrike" spc="-1">
+          <a:p>
+            <a:endParaRPr b="0" lang="pt-BR" sz="2800" spc="-1" strike="noStrike">
+              <a:solidFill>
+                <a:srgbClr val="000000"/>
+              </a:solidFill>
               <a:latin typeface="Arial"/>
             </a:endParaRPr>
           </a:p>
@@ -1174,12 +1085,14 @@
           </a:prstGeom>
         </p:spPr>
         <p:txBody>
-          <a:bodyPr lIns="0" tIns="0" rIns="0" bIns="0">
+          <a:bodyPr lIns="0" rIns="0" tIns="0" bIns="0">
             <a:normAutofit/>
           </a:bodyPr>
-          <a:lstStyle/>
-          <a:p>
-            <a:endParaRPr lang="pt-BR" sz="3200" b="0" strike="noStrike" spc="-1">
+          <a:p>
+            <a:endParaRPr b="0" lang="pt-BR" sz="2800" spc="-1" strike="noStrike">
+              <a:solidFill>
+                <a:srgbClr val="000000"/>
+              </a:solidFill>
               <a:latin typeface="Arial"/>
             </a:endParaRPr>
           </a:p>
@@ -1205,12 +1118,14 @@
           </a:prstGeom>
         </p:spPr>
         <p:txBody>
-          <a:bodyPr lIns="0" tIns="0" rIns="0" bIns="0">
+          <a:bodyPr lIns="0" rIns="0" tIns="0" bIns="0">
             <a:normAutofit/>
           </a:bodyPr>
-          <a:lstStyle/>
-          <a:p>
-            <a:endParaRPr lang="pt-BR" sz="3200" b="0" strike="noStrike" spc="-1">
+          <a:p>
+            <a:endParaRPr b="0" lang="pt-BR" sz="2800" spc="-1" strike="noStrike">
+              <a:solidFill>
+                <a:srgbClr val="000000"/>
+              </a:solidFill>
               <a:latin typeface="Arial"/>
             </a:endParaRPr>
           </a:p>
@@ -1218,14 +1133,11 @@
       </p:sp>
     </p:spTree>
   </p:cSld>
-  <p:clrMapOvr>
-    <a:masterClrMapping/>
-  </p:clrMapOvr>
 </p:sldLayout>
 </file>
 
 <file path=ppt/slideLayouts/slideLayout8.xml><?xml version="1.0" encoding="utf-8"?>
-<p:sldLayout xmlns:a="http://schemas.openxmlformats.org/drawingml/2006/main" xmlns:r="http://schemas.openxmlformats.org/officeDocument/2006/relationships" xmlns:p="http://schemas.openxmlformats.org/presentationml/2006/main" type="objAndTwoObj" preserve="1">
+<p:sldLayout xmlns:a="http://schemas.openxmlformats.org/drawingml/2006/main" xmlns:p="http://schemas.openxmlformats.org/presentationml/2006/main" xmlns:r="http://schemas.openxmlformats.org/officeDocument/2006/relationships" xmlns:p14="http://schemas.microsoft.com/office/powerpoint/2010/main" xmlns:p15="http://schemas.microsoft.com/office/powerpoint/2012/main" xmlns:mc="http://schemas.openxmlformats.org/markup-compatibility/2006" type="objAndTwoObj" preserve="1">
   <p:cSld name="Title Content and 2 Content">
     <p:spTree>
       <p:nvGrpSpPr>
@@ -1261,11 +1173,12 @@
           </a:prstGeom>
         </p:spPr>
         <p:txBody>
-          <a:bodyPr lIns="0" tIns="0" rIns="0" bIns="0" anchor="ctr"/>
-          <a:lstStyle/>
-          <a:p>
-            <a:pPr algn="ctr"/>
-            <a:endParaRPr lang="pt-BR" sz="4400" b="0" strike="noStrike" spc="-1">
+          <a:bodyPr lIns="0" rIns="0" tIns="0" bIns="0" anchor="ctr"/>
+          <a:p>
+            <a:endParaRPr b="0" lang="pt-BR" sz="1800" spc="-1" strike="noStrike">
+              <a:solidFill>
+                <a:srgbClr val="000000"/>
+              </a:solidFill>
               <a:latin typeface="Arial"/>
             </a:endParaRPr>
           </a:p>
@@ -1291,12 +1204,14 @@
           </a:prstGeom>
         </p:spPr>
         <p:txBody>
-          <a:bodyPr lIns="0" tIns="0" rIns="0" bIns="0">
+          <a:bodyPr lIns="0" rIns="0" tIns="0" bIns="0">
             <a:normAutofit/>
           </a:bodyPr>
-          <a:lstStyle/>
-          <a:p>
-            <a:endParaRPr lang="pt-BR" sz="3200" b="0" strike="noStrike" spc="-1">
+          <a:p>
+            <a:endParaRPr b="0" lang="pt-BR" sz="2800" spc="-1" strike="noStrike">
+              <a:solidFill>
+                <a:srgbClr val="000000"/>
+              </a:solidFill>
               <a:latin typeface="Arial"/>
             </a:endParaRPr>
           </a:p>
@@ -1322,12 +1237,14 @@
           </a:prstGeom>
         </p:spPr>
         <p:txBody>
-          <a:bodyPr lIns="0" tIns="0" rIns="0" bIns="0">
+          <a:bodyPr lIns="0" rIns="0" tIns="0" bIns="0">
             <a:normAutofit/>
           </a:bodyPr>
-          <a:lstStyle/>
-          <a:p>
-            <a:endParaRPr lang="pt-BR" sz="3200" b="0" strike="noStrike" spc="-1">
+          <a:p>
+            <a:endParaRPr b="0" lang="pt-BR" sz="2800" spc="-1" strike="noStrike">
+              <a:solidFill>
+                <a:srgbClr val="000000"/>
+              </a:solidFill>
               <a:latin typeface="Arial"/>
             </a:endParaRPr>
           </a:p>
@@ -1353,12 +1270,14 @@
           </a:prstGeom>
         </p:spPr>
         <p:txBody>
-          <a:bodyPr lIns="0" tIns="0" rIns="0" bIns="0">
+          <a:bodyPr lIns="0" rIns="0" tIns="0" bIns="0">
             <a:normAutofit/>
           </a:bodyPr>
-          <a:lstStyle/>
-          <a:p>
-            <a:endParaRPr lang="pt-BR" sz="3200" b="0" strike="noStrike" spc="-1">
+          <a:p>
+            <a:endParaRPr b="0" lang="pt-BR" sz="2800" spc="-1" strike="noStrike">
+              <a:solidFill>
+                <a:srgbClr val="000000"/>
+              </a:solidFill>
               <a:latin typeface="Arial"/>
             </a:endParaRPr>
           </a:p>
@@ -1366,14 +1285,11 @@
       </p:sp>
     </p:spTree>
   </p:cSld>
-  <p:clrMapOvr>
-    <a:masterClrMapping/>
-  </p:clrMapOvr>
 </p:sldLayout>
 </file>
 
 <file path=ppt/slideLayouts/slideLayout9.xml><?xml version="1.0" encoding="utf-8"?>
-<p:sldLayout xmlns:a="http://schemas.openxmlformats.org/drawingml/2006/main" xmlns:r="http://schemas.openxmlformats.org/officeDocument/2006/relationships" xmlns:p="http://schemas.openxmlformats.org/presentationml/2006/main" type="twoObjOverTx" preserve="1">
+<p:sldLayout xmlns:a="http://schemas.openxmlformats.org/drawingml/2006/main" xmlns:p="http://schemas.openxmlformats.org/presentationml/2006/main" xmlns:r="http://schemas.openxmlformats.org/officeDocument/2006/relationships" xmlns:p14="http://schemas.microsoft.com/office/powerpoint/2010/main" xmlns:p15="http://schemas.microsoft.com/office/powerpoint/2012/main" xmlns:mc="http://schemas.openxmlformats.org/markup-compatibility/2006" type="twoObjOverTx" preserve="1">
   <p:cSld name="Title, 2 Content over Content">
     <p:spTree>
       <p:nvGrpSpPr>
@@ -1409,11 +1325,12 @@
           </a:prstGeom>
         </p:spPr>
         <p:txBody>
-          <a:bodyPr lIns="0" tIns="0" rIns="0" bIns="0" anchor="ctr"/>
-          <a:lstStyle/>
-          <a:p>
-            <a:pPr algn="ctr"/>
-            <a:endParaRPr lang="pt-BR" sz="4400" b="0" strike="noStrike" spc="-1">
+          <a:bodyPr lIns="0" rIns="0" tIns="0" bIns="0" anchor="ctr"/>
+          <a:p>
+            <a:endParaRPr b="0" lang="pt-BR" sz="1800" spc="-1" strike="noStrike">
+              <a:solidFill>
+                <a:srgbClr val="000000"/>
+              </a:solidFill>
               <a:latin typeface="Arial"/>
             </a:endParaRPr>
           </a:p>
@@ -1439,12 +1356,14 @@
           </a:prstGeom>
         </p:spPr>
         <p:txBody>
-          <a:bodyPr lIns="0" tIns="0" rIns="0" bIns="0">
+          <a:bodyPr lIns="0" rIns="0" tIns="0" bIns="0">
             <a:normAutofit/>
           </a:bodyPr>
-          <a:lstStyle/>
-          <a:p>
-            <a:endParaRPr lang="pt-BR" sz="3200" b="0" strike="noStrike" spc="-1">
+          <a:p>
+            <a:endParaRPr b="0" lang="pt-BR" sz="2800" spc="-1" strike="noStrike">
+              <a:solidFill>
+                <a:srgbClr val="000000"/>
+              </a:solidFill>
               <a:latin typeface="Arial"/>
             </a:endParaRPr>
           </a:p>
@@ -1470,12 +1389,14 @@
           </a:prstGeom>
         </p:spPr>
         <p:txBody>
-          <a:bodyPr lIns="0" tIns="0" rIns="0" bIns="0">
+          <a:bodyPr lIns="0" rIns="0" tIns="0" bIns="0">
             <a:normAutofit/>
           </a:bodyPr>
-          <a:lstStyle/>
-          <a:p>
-            <a:endParaRPr lang="pt-BR" sz="3200" b="0" strike="noStrike" spc="-1">
+          <a:p>
+            <a:endParaRPr b="0" lang="pt-BR" sz="2800" spc="-1" strike="noStrike">
+              <a:solidFill>
+                <a:srgbClr val="000000"/>
+              </a:solidFill>
               <a:latin typeface="Arial"/>
             </a:endParaRPr>
           </a:p>
@@ -1501,12 +1422,14 @@
           </a:prstGeom>
         </p:spPr>
         <p:txBody>
-          <a:bodyPr lIns="0" tIns="0" rIns="0" bIns="0">
+          <a:bodyPr lIns="0" rIns="0" tIns="0" bIns="0">
             <a:normAutofit/>
           </a:bodyPr>
-          <a:lstStyle/>
-          <a:p>
-            <a:endParaRPr lang="pt-BR" sz="3200" b="0" strike="noStrike" spc="-1">
+          <a:p>
+            <a:endParaRPr b="0" lang="pt-BR" sz="2800" spc="-1" strike="noStrike">
+              <a:solidFill>
+                <a:srgbClr val="000000"/>
+              </a:solidFill>
               <a:latin typeface="Arial"/>
             </a:endParaRPr>
           </a:p>
@@ -1514,21 +1437,17 @@
       </p:sp>
     </p:spTree>
   </p:cSld>
-  <p:clrMapOvr>
-    <a:masterClrMapping/>
-  </p:clrMapOvr>
 </p:sldLayout>
 </file>
 
 <file path=ppt/slideMasters/slideMaster1.xml><?xml version="1.0" encoding="utf-8"?>
-<p:sldMaster xmlns:a="http://schemas.openxmlformats.org/drawingml/2006/main" xmlns:r="http://schemas.openxmlformats.org/officeDocument/2006/relationships" xmlns:p="http://schemas.openxmlformats.org/presentationml/2006/main">
+<p:sldMaster xmlns:a="http://schemas.openxmlformats.org/drawingml/2006/main" xmlns:p="http://schemas.openxmlformats.org/presentationml/2006/main" xmlns:r="http://schemas.openxmlformats.org/officeDocument/2006/relationships" xmlns:p14="http://schemas.microsoft.com/office/powerpoint/2010/main" xmlns:p15="http://schemas.microsoft.com/office/powerpoint/2012/main" xmlns:mc="http://schemas.openxmlformats.org/markup-compatibility/2006">
   <p:cSld>
     <p:bg>
       <p:bgPr>
         <a:solidFill>
-          <a:srgbClr val="FFFFFF"/>
+          <a:srgbClr val="ffffff"/>
         </a:solidFill>
-        <a:effectLst/>
       </p:bgPr>
     </p:bg>
     <p:spTree>
@@ -1547,7 +1466,7 @@
       </p:grpSpPr>
       <p:sp>
         <p:nvSpPr>
-          <p:cNvPr id="2" name="PlaceHolder 1"/>
+          <p:cNvPr id="0" name="PlaceHolder 1"/>
           <p:cNvSpPr>
             <a:spLocks noGrp="1"/>
           </p:cNvSpPr>
@@ -1565,22 +1484,29 @@
           </a:prstGeom>
         </p:spPr>
         <p:txBody>
-          <a:bodyPr lIns="0" tIns="0" rIns="0" bIns="0" anchor="ctr"/>
-          <a:lstStyle/>
-          <a:p>
-            <a:pPr algn="ctr"/>
+          <a:bodyPr lIns="0" rIns="0" tIns="0" bIns="0" anchor="ctr"/>
+          <a:p>
             <a:r>
-              <a:rPr lang="pt-BR" sz="4400" b="0" strike="noStrike" spc="-1">
+              <a:rPr b="0" lang="pt-BR" sz="1800" spc="-1" strike="noStrike">
+                <a:solidFill>
+                  <a:srgbClr val="000000"/>
+                </a:solidFill>
                 <a:latin typeface="Arial"/>
               </a:rPr>
               <a:t>Clique para editar o formato do texto do título</a:t>
             </a:r>
-          </a:p>
-        </p:txBody>
-      </p:sp>
-      <p:sp>
-        <p:nvSpPr>
-          <p:cNvPr id="3" name="PlaceHolder 2"/>
+            <a:endParaRPr b="0" lang="pt-BR" sz="1800" spc="-1" strike="noStrike">
+              <a:solidFill>
+                <a:srgbClr val="000000"/>
+              </a:solidFill>
+              <a:latin typeface="Arial"/>
+            </a:endParaRPr>
+          </a:p>
+        </p:txBody>
+      </p:sp>
+      <p:sp>
+        <p:nvSpPr>
+          <p:cNvPr id="1" name="PlaceHolder 2"/>
           <p:cNvSpPr>
             <a:spLocks noGrp="1"/>
           </p:cNvSpPr>
@@ -1598,10 +1524,9 @@
           </a:prstGeom>
         </p:spPr>
         <p:txBody>
-          <a:bodyPr lIns="0" tIns="0" rIns="0" bIns="0">
+          <a:bodyPr lIns="0" rIns="0" tIns="0" bIns="0">
             <a:normAutofit/>
           </a:bodyPr>
-          <a:lstStyle/>
           <a:p>
             <a:pPr marL="432000" indent="-324000">
               <a:spcBef>
@@ -1615,14 +1540,23 @@
               <a:buChar char=""/>
             </a:pPr>
             <a:r>
-              <a:rPr lang="pt-BR" sz="3200" b="0" strike="noStrike" spc="-1">
+              <a:rPr b="0" lang="pt-BR" sz="2800" spc="-1" strike="noStrike">
+                <a:solidFill>
+                  <a:srgbClr val="000000"/>
+                </a:solidFill>
                 <a:latin typeface="Arial"/>
               </a:rPr>
               <a:t>Clique para editar o formato do texto da estrutura de tópicos</a:t>
             </a:r>
-          </a:p>
-          <a:p>
-            <a:pPr marL="864000" lvl="1" indent="-324000">
+            <a:endParaRPr b="0" lang="pt-BR" sz="2800" spc="-1" strike="noStrike">
+              <a:solidFill>
+                <a:srgbClr val="000000"/>
+              </a:solidFill>
+              <a:latin typeface="Arial"/>
+            </a:endParaRPr>
+          </a:p>
+          <a:p>
+            <a:pPr lvl="1" marL="864000" indent="-324000">
               <a:spcBef>
                 <a:spcPts val="1134"/>
               </a:spcBef>
@@ -1634,14 +1568,23 @@
               <a:buChar char=""/>
             </a:pPr>
             <a:r>
-              <a:rPr lang="pt-BR" sz="2800" b="0" strike="noStrike" spc="-1">
+              <a:rPr b="0" lang="pt-BR" sz="2000" spc="-1" strike="noStrike">
+                <a:solidFill>
+                  <a:srgbClr val="000000"/>
+                </a:solidFill>
                 <a:latin typeface="Arial"/>
               </a:rPr>
               <a:t>2.º nível da estrutura de tópicos</a:t>
             </a:r>
-          </a:p>
-          <a:p>
-            <a:pPr marL="1296000" lvl="2" indent="-288000">
+            <a:endParaRPr b="0" lang="pt-BR" sz="2000" spc="-1" strike="noStrike">
+              <a:solidFill>
+                <a:srgbClr val="000000"/>
+              </a:solidFill>
+              <a:latin typeface="Arial"/>
+            </a:endParaRPr>
+          </a:p>
+          <a:p>
+            <a:pPr lvl="2" marL="1296000" indent="-288000">
               <a:spcBef>
                 <a:spcPts val="850"/>
               </a:spcBef>
@@ -1653,14 +1596,23 @@
               <a:buChar char=""/>
             </a:pPr>
             <a:r>
-              <a:rPr lang="pt-BR" sz="2400" b="0" strike="noStrike" spc="-1">
+              <a:rPr b="0" lang="pt-BR" sz="1800" spc="-1" strike="noStrike">
+                <a:solidFill>
+                  <a:srgbClr val="000000"/>
+                </a:solidFill>
                 <a:latin typeface="Arial"/>
               </a:rPr>
               <a:t>3.º nível da estrutura de tópicos</a:t>
             </a:r>
-          </a:p>
-          <a:p>
-            <a:pPr marL="1728000" lvl="3" indent="-216000">
+            <a:endParaRPr b="0" lang="pt-BR" sz="1800" spc="-1" strike="noStrike">
+              <a:solidFill>
+                <a:srgbClr val="000000"/>
+              </a:solidFill>
+              <a:latin typeface="Arial"/>
+            </a:endParaRPr>
+          </a:p>
+          <a:p>
+            <a:pPr lvl="3" marL="1728000" indent="-216000">
               <a:spcBef>
                 <a:spcPts val="567"/>
               </a:spcBef>
@@ -1672,14 +1624,23 @@
               <a:buChar char=""/>
             </a:pPr>
             <a:r>
-              <a:rPr lang="pt-BR" sz="2000" b="0" strike="noStrike" spc="-1">
+              <a:rPr b="0" lang="pt-BR" sz="1800" spc="-1" strike="noStrike">
+                <a:solidFill>
+                  <a:srgbClr val="000000"/>
+                </a:solidFill>
                 <a:latin typeface="Arial"/>
               </a:rPr>
               <a:t>4.º nível da estrutura de tópicos</a:t>
             </a:r>
-          </a:p>
-          <a:p>
-            <a:pPr marL="2160000" lvl="4" indent="-216000">
+            <a:endParaRPr b="0" lang="pt-BR" sz="1800" spc="-1" strike="noStrike">
+              <a:solidFill>
+                <a:srgbClr val="000000"/>
+              </a:solidFill>
+              <a:latin typeface="Arial"/>
+            </a:endParaRPr>
+          </a:p>
+          <a:p>
+            <a:pPr lvl="4" marL="2160000" indent="-216000">
               <a:spcBef>
                 <a:spcPts val="283"/>
               </a:spcBef>
@@ -1691,14 +1652,23 @@
               <a:buChar char=""/>
             </a:pPr>
             <a:r>
-              <a:rPr lang="pt-BR" sz="2000" b="0" strike="noStrike" spc="-1">
+              <a:rPr b="0" lang="pt-BR" sz="2000" spc="-1" strike="noStrike">
+                <a:solidFill>
+                  <a:srgbClr val="000000"/>
+                </a:solidFill>
                 <a:latin typeface="Arial"/>
               </a:rPr>
               <a:t>5.º nível da estrutura de tópicos</a:t>
             </a:r>
-          </a:p>
-          <a:p>
-            <a:pPr marL="2592000" lvl="5" indent="-216000">
+            <a:endParaRPr b="0" lang="pt-BR" sz="2000" spc="-1" strike="noStrike">
+              <a:solidFill>
+                <a:srgbClr val="000000"/>
+              </a:solidFill>
+              <a:latin typeface="Arial"/>
+            </a:endParaRPr>
+          </a:p>
+          <a:p>
+            <a:pPr lvl="5" marL="2592000" indent="-216000">
               <a:spcBef>
                 <a:spcPts val="283"/>
               </a:spcBef>
@@ -1710,14 +1680,23 @@
               <a:buChar char=""/>
             </a:pPr>
             <a:r>
-              <a:rPr lang="pt-BR" sz="2000" b="0" strike="noStrike" spc="-1">
+              <a:rPr b="0" lang="pt-BR" sz="2000" spc="-1" strike="noStrike">
+                <a:solidFill>
+                  <a:srgbClr val="000000"/>
+                </a:solidFill>
                 <a:latin typeface="Arial"/>
               </a:rPr>
               <a:t>6.º nível da estrutura de tópicos</a:t>
             </a:r>
-          </a:p>
-          <a:p>
-            <a:pPr marL="3024000" lvl="6" indent="-216000">
+            <a:endParaRPr b="0" lang="pt-BR" sz="2000" spc="-1" strike="noStrike">
+              <a:solidFill>
+                <a:srgbClr val="000000"/>
+              </a:solidFill>
+              <a:latin typeface="Arial"/>
+            </a:endParaRPr>
+          </a:p>
+          <a:p>
+            <a:pPr lvl="6" marL="3024000" indent="-216000">
               <a:spcBef>
                 <a:spcPts val="283"/>
               </a:spcBef>
@@ -1729,323 +1708,51 @@
               <a:buChar char=""/>
             </a:pPr>
             <a:r>
-              <a:rPr lang="pt-BR" sz="2000" b="0" strike="noStrike" spc="-1">
+              <a:rPr b="0" lang="pt-BR" sz="2000" spc="-1" strike="noStrike">
+                <a:solidFill>
+                  <a:srgbClr val="000000"/>
+                </a:solidFill>
                 <a:latin typeface="Arial"/>
               </a:rPr>
               <a:t>7.º nível da estrutura de tópicos</a:t>
             </a:r>
+            <a:endParaRPr b="0" lang="pt-BR" sz="2000" spc="-1" strike="noStrike">
+              <a:solidFill>
+                <a:srgbClr val="000000"/>
+              </a:solidFill>
+              <a:latin typeface="Arial"/>
+            </a:endParaRPr>
           </a:p>
         </p:txBody>
       </p:sp>
     </p:spTree>
   </p:cSld>
-  <p:clrMap bg1="lt1" tx1="dk1" bg2="lt2" tx2="dk2" accent1="accent1" accent2="accent2" accent3="accent3" accent4="accent4" accent5="accent5" accent6="accent6" hlink="hlink" folHlink="folHlink"/>
+  <p:clrMap bg1="lt1" bg2="lt2" tx1="dk1" tx2="dk2" accent1="accent1" accent2="accent2" accent3="accent3" accent4="accent4" accent5="accent5" accent6="accent6" hlink="hlink" folHlink="folHlink"/>
   <p:sldLayoutIdLst>
-    <p:sldLayoutId id="2147483649" r:id="rId1"/>
-    <p:sldLayoutId id="2147483650" r:id="rId2"/>
-    <p:sldLayoutId id="2147483651" r:id="rId3"/>
-    <p:sldLayoutId id="2147483652" r:id="rId4"/>
-    <p:sldLayoutId id="2147483653" r:id="rId5"/>
-    <p:sldLayoutId id="2147483654" r:id="rId6"/>
-    <p:sldLayoutId id="2147483655" r:id="rId7"/>
-    <p:sldLayoutId id="2147483656" r:id="rId8"/>
-    <p:sldLayoutId id="2147483657" r:id="rId9"/>
-    <p:sldLayoutId id="2147483658" r:id="rId10"/>
-    <p:sldLayoutId id="2147483659" r:id="rId11"/>
-    <p:sldLayoutId id="2147483660" r:id="rId12"/>
+    <p:sldLayoutId id="2147483649" r:id="rId2"/>
+    <p:sldLayoutId id="2147483650" r:id="rId3"/>
+    <p:sldLayoutId id="2147483651" r:id="rId4"/>
+    <p:sldLayoutId id="2147483652" r:id="rId5"/>
+    <p:sldLayoutId id="2147483653" r:id="rId6"/>
+    <p:sldLayoutId id="2147483654" r:id="rId7"/>
+    <p:sldLayoutId id="2147483655" r:id="rId8"/>
+    <p:sldLayoutId id="2147483656" r:id="rId9"/>
+    <p:sldLayoutId id="2147483657" r:id="rId10"/>
+    <p:sldLayoutId id="2147483658" r:id="rId11"/>
+    <p:sldLayoutId id="2147483659" r:id="rId12"/>
+    <p:sldLayoutId id="2147483660" r:id="rId13"/>
   </p:sldLayoutIdLst>
-  <p:txStyles>
-    <p:titleStyle>
-      <a:lvl1pPr algn="l" defTabSz="914400" rtl="0" eaLnBrk="1" latinLnBrk="0" hangingPunct="1">
-        <a:lnSpc>
-          <a:spcPct val="90000"/>
-        </a:lnSpc>
-        <a:spcBef>
-          <a:spcPct val="0"/>
-        </a:spcBef>
-        <a:buNone/>
-        <a:defRPr sz="4400" kern="1200">
-          <a:solidFill>
-            <a:schemeClr val="tx1"/>
-          </a:solidFill>
-          <a:latin typeface="+mj-lt"/>
-          <a:ea typeface="+mj-ea"/>
-          <a:cs typeface="+mj-cs"/>
-        </a:defRPr>
-      </a:lvl1pPr>
-    </p:titleStyle>
-    <p:bodyStyle>
-      <a:lvl1pPr marL="228600" indent="-228600" algn="l" defTabSz="914400" rtl="0" eaLnBrk="1" latinLnBrk="0" hangingPunct="1">
-        <a:lnSpc>
-          <a:spcPct val="90000"/>
-        </a:lnSpc>
-        <a:spcBef>
-          <a:spcPts val="1000"/>
-        </a:spcBef>
-        <a:buFont typeface="Arial" panose="020B0604020202020204" pitchFamily="34" charset="0"/>
-        <a:buChar char="•"/>
-        <a:defRPr sz="2800" kern="1200">
-          <a:solidFill>
-            <a:schemeClr val="tx1"/>
-          </a:solidFill>
-          <a:latin typeface="+mn-lt"/>
-          <a:ea typeface="+mn-ea"/>
-          <a:cs typeface="+mn-cs"/>
-        </a:defRPr>
-      </a:lvl1pPr>
-      <a:lvl2pPr marL="685800" indent="-228600" algn="l" defTabSz="914400" rtl="0" eaLnBrk="1" latinLnBrk="0" hangingPunct="1">
-        <a:lnSpc>
-          <a:spcPct val="90000"/>
-        </a:lnSpc>
-        <a:spcBef>
-          <a:spcPts val="500"/>
-        </a:spcBef>
-        <a:buFont typeface="Arial" panose="020B0604020202020204" pitchFamily="34" charset="0"/>
-        <a:buChar char="•"/>
-        <a:defRPr sz="2400" kern="1200">
-          <a:solidFill>
-            <a:schemeClr val="tx1"/>
-          </a:solidFill>
-          <a:latin typeface="+mn-lt"/>
-          <a:ea typeface="+mn-ea"/>
-          <a:cs typeface="+mn-cs"/>
-        </a:defRPr>
-      </a:lvl2pPr>
-      <a:lvl3pPr marL="1143000" indent="-228600" algn="l" defTabSz="914400" rtl="0" eaLnBrk="1" latinLnBrk="0" hangingPunct="1">
-        <a:lnSpc>
-          <a:spcPct val="90000"/>
-        </a:lnSpc>
-        <a:spcBef>
-          <a:spcPts val="500"/>
-        </a:spcBef>
-        <a:buFont typeface="Arial" panose="020B0604020202020204" pitchFamily="34" charset="0"/>
-        <a:buChar char="•"/>
-        <a:defRPr sz="2000" kern="1200">
-          <a:solidFill>
-            <a:schemeClr val="tx1"/>
-          </a:solidFill>
-          <a:latin typeface="+mn-lt"/>
-          <a:ea typeface="+mn-ea"/>
-          <a:cs typeface="+mn-cs"/>
-        </a:defRPr>
-      </a:lvl3pPr>
-      <a:lvl4pPr marL="1600200" indent="-228600" algn="l" defTabSz="914400" rtl="0" eaLnBrk="1" latinLnBrk="0" hangingPunct="1">
-        <a:lnSpc>
-          <a:spcPct val="90000"/>
-        </a:lnSpc>
-        <a:spcBef>
-          <a:spcPts val="500"/>
-        </a:spcBef>
-        <a:buFont typeface="Arial" panose="020B0604020202020204" pitchFamily="34" charset="0"/>
-        <a:buChar char="•"/>
-        <a:defRPr sz="1800" kern="1200">
-          <a:solidFill>
-            <a:schemeClr val="tx1"/>
-          </a:solidFill>
-          <a:latin typeface="+mn-lt"/>
-          <a:ea typeface="+mn-ea"/>
-          <a:cs typeface="+mn-cs"/>
-        </a:defRPr>
-      </a:lvl4pPr>
-      <a:lvl5pPr marL="2057400" indent="-228600" algn="l" defTabSz="914400" rtl="0" eaLnBrk="1" latinLnBrk="0" hangingPunct="1">
-        <a:lnSpc>
-          <a:spcPct val="90000"/>
-        </a:lnSpc>
-        <a:spcBef>
-          <a:spcPts val="500"/>
-        </a:spcBef>
-        <a:buFont typeface="Arial" panose="020B0604020202020204" pitchFamily="34" charset="0"/>
-        <a:buChar char="•"/>
-        <a:defRPr sz="1800" kern="1200">
-          <a:solidFill>
-            <a:schemeClr val="tx1"/>
-          </a:solidFill>
-          <a:latin typeface="+mn-lt"/>
-          <a:ea typeface="+mn-ea"/>
-          <a:cs typeface="+mn-cs"/>
-        </a:defRPr>
-      </a:lvl5pPr>
-      <a:lvl6pPr marL="2514600" indent="-228600" algn="l" defTabSz="914400" rtl="0" eaLnBrk="1" latinLnBrk="0" hangingPunct="1">
-        <a:lnSpc>
-          <a:spcPct val="90000"/>
-        </a:lnSpc>
-        <a:spcBef>
-          <a:spcPts val="500"/>
-        </a:spcBef>
-        <a:buFont typeface="Arial" panose="020B0604020202020204" pitchFamily="34" charset="0"/>
-        <a:buChar char="•"/>
-        <a:defRPr sz="1800" kern="1200">
-          <a:solidFill>
-            <a:schemeClr val="tx1"/>
-          </a:solidFill>
-          <a:latin typeface="+mn-lt"/>
-          <a:ea typeface="+mn-ea"/>
-          <a:cs typeface="+mn-cs"/>
-        </a:defRPr>
-      </a:lvl6pPr>
-      <a:lvl7pPr marL="2971800" indent="-228600" algn="l" defTabSz="914400" rtl="0" eaLnBrk="1" latinLnBrk="0" hangingPunct="1">
-        <a:lnSpc>
-          <a:spcPct val="90000"/>
-        </a:lnSpc>
-        <a:spcBef>
-          <a:spcPts val="500"/>
-        </a:spcBef>
-        <a:buFont typeface="Arial" panose="020B0604020202020204" pitchFamily="34" charset="0"/>
-        <a:buChar char="•"/>
-        <a:defRPr sz="1800" kern="1200">
-          <a:solidFill>
-            <a:schemeClr val="tx1"/>
-          </a:solidFill>
-          <a:latin typeface="+mn-lt"/>
-          <a:ea typeface="+mn-ea"/>
-          <a:cs typeface="+mn-cs"/>
-        </a:defRPr>
-      </a:lvl7pPr>
-      <a:lvl8pPr marL="3429000" indent="-228600" algn="l" defTabSz="914400" rtl="0" eaLnBrk="1" latinLnBrk="0" hangingPunct="1">
-        <a:lnSpc>
-          <a:spcPct val="90000"/>
-        </a:lnSpc>
-        <a:spcBef>
-          <a:spcPts val="500"/>
-        </a:spcBef>
-        <a:buFont typeface="Arial" panose="020B0604020202020204" pitchFamily="34" charset="0"/>
-        <a:buChar char="•"/>
-        <a:defRPr sz="1800" kern="1200">
-          <a:solidFill>
-            <a:schemeClr val="tx1"/>
-          </a:solidFill>
-          <a:latin typeface="+mn-lt"/>
-          <a:ea typeface="+mn-ea"/>
-          <a:cs typeface="+mn-cs"/>
-        </a:defRPr>
-      </a:lvl8pPr>
-      <a:lvl9pPr marL="3886200" indent="-228600" algn="l" defTabSz="914400" rtl="0" eaLnBrk="1" latinLnBrk="0" hangingPunct="1">
-        <a:lnSpc>
-          <a:spcPct val="90000"/>
-        </a:lnSpc>
-        <a:spcBef>
-          <a:spcPts val="500"/>
-        </a:spcBef>
-        <a:buFont typeface="Arial" panose="020B0604020202020204" pitchFamily="34" charset="0"/>
-        <a:buChar char="•"/>
-        <a:defRPr sz="1800" kern="1200">
-          <a:solidFill>
-            <a:schemeClr val="tx1"/>
-          </a:solidFill>
-          <a:latin typeface="+mn-lt"/>
-          <a:ea typeface="+mn-ea"/>
-          <a:cs typeface="+mn-cs"/>
-        </a:defRPr>
-      </a:lvl9pPr>
-    </p:bodyStyle>
-    <p:otherStyle>
-      <a:defPPr>
-        <a:defRPr lang="pt-BR"/>
-      </a:defPPr>
-      <a:lvl1pPr marL="0" algn="l" defTabSz="914400" rtl="0" eaLnBrk="1" latinLnBrk="0" hangingPunct="1">
-        <a:defRPr sz="1800" kern="1200">
-          <a:solidFill>
-            <a:schemeClr val="tx1"/>
-          </a:solidFill>
-          <a:latin typeface="+mn-lt"/>
-          <a:ea typeface="+mn-ea"/>
-          <a:cs typeface="+mn-cs"/>
-        </a:defRPr>
-      </a:lvl1pPr>
-      <a:lvl2pPr marL="457200" algn="l" defTabSz="914400" rtl="0" eaLnBrk="1" latinLnBrk="0" hangingPunct="1">
-        <a:defRPr sz="1800" kern="1200">
-          <a:solidFill>
-            <a:schemeClr val="tx1"/>
-          </a:solidFill>
-          <a:latin typeface="+mn-lt"/>
-          <a:ea typeface="+mn-ea"/>
-          <a:cs typeface="+mn-cs"/>
-        </a:defRPr>
-      </a:lvl2pPr>
-      <a:lvl3pPr marL="914400" algn="l" defTabSz="914400" rtl="0" eaLnBrk="1" latinLnBrk="0" hangingPunct="1">
-        <a:defRPr sz="1800" kern="1200">
-          <a:solidFill>
-            <a:schemeClr val="tx1"/>
-          </a:solidFill>
-          <a:latin typeface="+mn-lt"/>
-          <a:ea typeface="+mn-ea"/>
-          <a:cs typeface="+mn-cs"/>
-        </a:defRPr>
-      </a:lvl3pPr>
-      <a:lvl4pPr marL="1371600" algn="l" defTabSz="914400" rtl="0" eaLnBrk="1" latinLnBrk="0" hangingPunct="1">
-        <a:defRPr sz="1800" kern="1200">
-          <a:solidFill>
-            <a:schemeClr val="tx1"/>
-          </a:solidFill>
-          <a:latin typeface="+mn-lt"/>
-          <a:ea typeface="+mn-ea"/>
-          <a:cs typeface="+mn-cs"/>
-        </a:defRPr>
-      </a:lvl4pPr>
-      <a:lvl5pPr marL="1828800" algn="l" defTabSz="914400" rtl="0" eaLnBrk="1" latinLnBrk="0" hangingPunct="1">
-        <a:defRPr sz="1800" kern="1200">
-          <a:solidFill>
-            <a:schemeClr val="tx1"/>
-          </a:solidFill>
-          <a:latin typeface="+mn-lt"/>
-          <a:ea typeface="+mn-ea"/>
-          <a:cs typeface="+mn-cs"/>
-        </a:defRPr>
-      </a:lvl5pPr>
-      <a:lvl6pPr marL="2286000" algn="l" defTabSz="914400" rtl="0" eaLnBrk="1" latinLnBrk="0" hangingPunct="1">
-        <a:defRPr sz="1800" kern="1200">
-          <a:solidFill>
-            <a:schemeClr val="tx1"/>
-          </a:solidFill>
-          <a:latin typeface="+mn-lt"/>
-          <a:ea typeface="+mn-ea"/>
-          <a:cs typeface="+mn-cs"/>
-        </a:defRPr>
-      </a:lvl6pPr>
-      <a:lvl7pPr marL="2743200" algn="l" defTabSz="914400" rtl="0" eaLnBrk="1" latinLnBrk="0" hangingPunct="1">
-        <a:defRPr sz="1800" kern="1200">
-          <a:solidFill>
-            <a:schemeClr val="tx1"/>
-          </a:solidFill>
-          <a:latin typeface="+mn-lt"/>
-          <a:ea typeface="+mn-ea"/>
-          <a:cs typeface="+mn-cs"/>
-        </a:defRPr>
-      </a:lvl7pPr>
-      <a:lvl8pPr marL="3200400" algn="l" defTabSz="914400" rtl="0" eaLnBrk="1" latinLnBrk="0" hangingPunct="1">
-        <a:defRPr sz="1800" kern="1200">
-          <a:solidFill>
-            <a:schemeClr val="tx1"/>
-          </a:solidFill>
-          <a:latin typeface="+mn-lt"/>
-          <a:ea typeface="+mn-ea"/>
-          <a:cs typeface="+mn-cs"/>
-        </a:defRPr>
-      </a:lvl8pPr>
-      <a:lvl9pPr marL="3657600" algn="l" defTabSz="914400" rtl="0" eaLnBrk="1" latinLnBrk="0" hangingPunct="1">
-        <a:defRPr sz="1800" kern="1200">
-          <a:solidFill>
-            <a:schemeClr val="tx1"/>
-          </a:solidFill>
-          <a:latin typeface="+mn-lt"/>
-          <a:ea typeface="+mn-ea"/>
-          <a:cs typeface="+mn-cs"/>
-        </a:defRPr>
-      </a:lvl9pPr>
-    </p:otherStyle>
-  </p:txStyles>
 </p:sldMaster>
 </file>
 
 <file path=ppt/slides/slide1.xml><?xml version="1.0" encoding="utf-8"?>
-<p:sld xmlns:a="http://schemas.openxmlformats.org/drawingml/2006/main" xmlns:r="http://schemas.openxmlformats.org/officeDocument/2006/relationships" xmlns:p="http://schemas.openxmlformats.org/presentationml/2006/main">
+<p:sld xmlns:a="http://schemas.openxmlformats.org/drawingml/2006/main" xmlns:p="http://schemas.openxmlformats.org/presentationml/2006/main" xmlns:r="http://schemas.openxmlformats.org/officeDocument/2006/relationships" xmlns:p14="http://schemas.microsoft.com/office/powerpoint/2010/main" xmlns:p15="http://schemas.microsoft.com/office/powerpoint/2012/main" xmlns:mc="http://schemas.openxmlformats.org/markup-compatibility/2006">
   <p:cSld>
     <p:bg>
       <p:bgPr>
         <a:solidFill>
-          <a:srgbClr val="FFFFFF"/>
+          <a:srgbClr val="ffffff"/>
         </a:solidFill>
-        <a:effectLst/>
       </p:bgPr>
     </p:bg>
     <p:spTree>
@@ -2071,34 +1778,110 @@
         <p:spPr>
           <a:xfrm>
             <a:off x="0" y="0"/>
-            <a:ext cx="12188880" cy="1583280"/>
+            <a:ext cx="12188520" cy="1582920"/>
           </a:xfrm>
           <a:prstGeom prst="rect">
             <a:avLst/>
           </a:prstGeom>
           <a:solidFill>
-            <a:srgbClr val="347C36"/>
+            <a:srgbClr val="347c36"/>
           </a:solidFill>
           <a:ln>
             <a:noFill/>
           </a:ln>
         </p:spPr>
         <p:style>
-          <a:lnRef idx="0">
-            <a:scrgbClr r="0" g="0" b="0"/>
-          </a:lnRef>
-          <a:fillRef idx="0">
-            <a:scrgbClr r="0" g="0" b="0"/>
-          </a:fillRef>
-          <a:effectRef idx="0">
-            <a:scrgbClr r="0" g="0" b="0"/>
-          </a:effectRef>
+          <a:lnRef idx="0"/>
+          <a:fillRef idx="0"/>
+          <a:effectRef idx="0"/>
           <a:fontRef idx="minor"/>
         </p:style>
       </p:sp>
       <p:pic>
         <p:nvPicPr>
-          <p:cNvPr id="39" name="Google Shape;89;p13"/>
+          <p:cNvPr id="39" name="Google Shape;89;p13" descr=""/>
+          <p:cNvPicPr/>
+          <p:nvPr/>
+        </p:nvPicPr>
+        <p:blipFill>
+          <a:blip r:embed="rId1"/>
+          <a:stretch/>
+        </p:blipFill>
+        <p:spPr>
+          <a:xfrm>
+            <a:off x="10561680" y="0"/>
+            <a:ext cx="1079640" cy="2503440"/>
+          </a:xfrm>
+          <a:prstGeom prst="rect">
+            <a:avLst/>
+          </a:prstGeom>
+          <a:ln>
+            <a:noFill/>
+          </a:ln>
+        </p:spPr>
+      </p:pic>
+      <p:sp>
+        <p:nvSpPr>
+          <p:cNvPr id="40" name="CustomShape 2"/>
+          <p:cNvSpPr/>
+          <p:nvPr/>
+        </p:nvSpPr>
+        <p:spPr>
+          <a:xfrm>
+            <a:off x="504000" y="6479280"/>
+            <a:ext cx="11126520" cy="716400"/>
+          </a:xfrm>
+          <a:prstGeom prst="rect">
+            <a:avLst/>
+          </a:prstGeom>
+          <a:noFill/>
+          <a:ln>
+            <a:noFill/>
+          </a:ln>
+        </p:spPr>
+        <p:style>
+          <a:lnRef idx="0"/>
+          <a:fillRef idx="0"/>
+          <a:effectRef idx="0"/>
+          <a:fontRef idx="minor"/>
+        </p:style>
+        <p:txBody>
+          <a:bodyPr lIns="90000" rIns="90000" tIns="45000" bIns="45000"/>
+          <a:p>
+            <a:pPr algn="ctr">
+              <a:lnSpc>
+                <a:spcPct val="100000"/>
+              </a:lnSpc>
+            </a:pPr>
+            <a:r>
+              <a:rPr b="1" lang="pt-BR" sz="1500" spc="-1" strike="noStrike">
+                <a:solidFill>
+                  <a:srgbClr val="8dc641"/>
+                </a:solidFill>
+                <a:latin typeface="Arial"/>
+                <a:ea typeface="Arial"/>
+              </a:rPr>
+              <a:t> </a:t>
+            </a:r>
+            <a:r>
+              <a:rPr b="1" lang="pt-BR" sz="1500" spc="-1" strike="noStrike">
+                <a:solidFill>
+                  <a:srgbClr val="8dc641"/>
+                </a:solidFill>
+                <a:latin typeface="Arial"/>
+                <a:ea typeface="Arial"/>
+              </a:rPr>
+              <a:t>Fabio Vasques, Gieder Loreto</a:t>
+            </a:r>
+            <a:endParaRPr b="0" lang="pt-BR" sz="1500" spc="-1" strike="noStrike">
+              <a:latin typeface="Arial"/>
+            </a:endParaRPr>
+          </a:p>
+        </p:txBody>
+      </p:sp>
+      <p:pic>
+        <p:nvPicPr>
+          <p:cNvPr id="41" name="Google Shape;166;p39" descr=""/>
           <p:cNvPicPr/>
           <p:nvPr/>
         </p:nvPicPr>
@@ -2108,8 +1891,8 @@
         </p:blipFill>
         <p:spPr>
           <a:xfrm>
-            <a:off x="10561680" y="0"/>
-            <a:ext cx="1080000" cy="2503800"/>
+            <a:off x="235080" y="283680"/>
+            <a:ext cx="3997080" cy="1015920"/>
           </a:xfrm>
           <a:prstGeom prst="rect">
             <a:avLst/>
@@ -2121,14 +1904,14 @@
       </p:pic>
       <p:sp>
         <p:nvSpPr>
-          <p:cNvPr id="40" name="CustomShape 2"/>
+          <p:cNvPr id="42" name="CustomShape 3"/>
           <p:cNvSpPr/>
           <p:nvPr/>
         </p:nvSpPr>
         <p:spPr>
           <a:xfrm>
-            <a:off x="504000" y="6479280"/>
-            <a:ext cx="11126880" cy="716760"/>
+            <a:off x="3603240" y="3470040"/>
+            <a:ext cx="4928400" cy="1121760"/>
           </a:xfrm>
           <a:prstGeom prst="rect">
             <a:avLst/>
@@ -2139,20 +1922,13 @@
           </a:ln>
         </p:spPr>
         <p:style>
-          <a:lnRef idx="0">
-            <a:scrgbClr r="0" g="0" b="0"/>
-          </a:lnRef>
-          <a:fillRef idx="0">
-            <a:scrgbClr r="0" g="0" b="0"/>
-          </a:fillRef>
-          <a:effectRef idx="0">
-            <a:scrgbClr r="0" g="0" b="0"/>
-          </a:effectRef>
+          <a:lnRef idx="0"/>
+          <a:fillRef idx="0"/>
+          <a:effectRef idx="0"/>
           <a:fontRef idx="minor"/>
         </p:style>
         <p:txBody>
-          <a:bodyPr lIns="90000" tIns="45000" rIns="90000" bIns="45000"/>
-          <a:lstStyle/>
+          <a:bodyPr lIns="90000" rIns="90000" tIns="45000" bIns="45000"/>
           <a:p>
             <a:pPr algn="ctr">
               <a:lnSpc>
@@ -2160,88 +1936,9 @@
               </a:lnSpc>
             </a:pPr>
             <a:r>
-              <a:rPr lang="pt-BR" sz="1500" b="1" strike="noStrike" spc="-1">
+              <a:rPr b="1" lang="pt-BR" sz="1500" spc="-1" strike="noStrike">
                 <a:solidFill>
-                  <a:srgbClr val="8DC641"/>
-                </a:solidFill>
-                <a:latin typeface="Arial"/>
-                <a:ea typeface="Arial"/>
-              </a:rPr>
-              <a:t> Fabio Vasques, Gieder Loreto</a:t>
-            </a:r>
-            <a:endParaRPr lang="pt-BR" sz="1500" b="0" strike="noStrike" spc="-1">
-              <a:latin typeface="Arial"/>
-            </a:endParaRPr>
-          </a:p>
-        </p:txBody>
-      </p:sp>
-      <p:pic>
-        <p:nvPicPr>
-          <p:cNvPr id="41" name="Google Shape;166;p39"/>
-          <p:cNvPicPr/>
-          <p:nvPr/>
-        </p:nvPicPr>
-        <p:blipFill>
-          <a:blip r:embed="rId3"/>
-          <a:stretch/>
-        </p:blipFill>
-        <p:spPr>
-          <a:xfrm>
-            <a:off x="235080" y="283680"/>
-            <a:ext cx="3997440" cy="1016280"/>
-          </a:xfrm>
-          <a:prstGeom prst="rect">
-            <a:avLst/>
-          </a:prstGeom>
-          <a:ln>
-            <a:noFill/>
-          </a:ln>
-        </p:spPr>
-      </p:pic>
-      <p:sp>
-        <p:nvSpPr>
-          <p:cNvPr id="42" name="CustomShape 3"/>
-          <p:cNvSpPr/>
-          <p:nvPr/>
-        </p:nvSpPr>
-        <p:spPr>
-          <a:xfrm>
-            <a:off x="3603240" y="3470040"/>
-            <a:ext cx="4928760" cy="1122120"/>
-          </a:xfrm>
-          <a:prstGeom prst="rect">
-            <a:avLst/>
-          </a:prstGeom>
-          <a:noFill/>
-          <a:ln>
-            <a:noFill/>
-          </a:ln>
-        </p:spPr>
-        <p:style>
-          <a:lnRef idx="0">
-            <a:scrgbClr r="0" g="0" b="0"/>
-          </a:lnRef>
-          <a:fillRef idx="0">
-            <a:scrgbClr r="0" g="0" b="0"/>
-          </a:fillRef>
-          <a:effectRef idx="0">
-            <a:scrgbClr r="0" g="0" b="0"/>
-          </a:effectRef>
-          <a:fontRef idx="minor"/>
-        </p:style>
-        <p:txBody>
-          <a:bodyPr lIns="90000" tIns="45000" rIns="90000" bIns="45000"/>
-          <a:lstStyle/>
-          <a:p>
-            <a:pPr algn="ctr">
-              <a:lnSpc>
-                <a:spcPct val="100000"/>
-              </a:lnSpc>
-            </a:pPr>
-            <a:r>
-              <a:rPr lang="pt-BR" sz="1500" b="1" strike="noStrike" spc="-1" dirty="0">
-                <a:solidFill>
-                  <a:srgbClr val="8DC641"/>
+                  <a:srgbClr val="8dc641"/>
                 </a:solidFill>
                 <a:latin typeface="Arial"/>
                 <a:ea typeface="Arial"/>
@@ -2249,16 +1946,16 @@
               <a:t> </a:t>
             </a:r>
             <a:r>
-              <a:rPr lang="pt-BR" sz="3200" b="1" strike="noStrike" spc="-1" dirty="0">
+              <a:rPr b="1" lang="pt-BR" sz="3200" spc="-1" strike="noStrike">
                 <a:solidFill>
-                  <a:srgbClr val="8DC641"/>
+                  <a:srgbClr val="8dc641"/>
                 </a:solidFill>
                 <a:latin typeface="Arial"/>
                 <a:ea typeface="Arial"/>
               </a:rPr>
               <a:t>Análise do Sistema</a:t>
             </a:r>
-            <a:endParaRPr lang="pt-BR" sz="3200" b="0" strike="noStrike" spc="-1" dirty="0">
+            <a:endParaRPr b="0" lang="pt-BR" sz="3200" spc="-1" strike="noStrike">
               <a:latin typeface="Arial"/>
             </a:endParaRPr>
           </a:p>
@@ -2268,7 +1965,7 @@
                 <a:spcPct val="100000"/>
               </a:lnSpc>
             </a:pPr>
-            <a:endParaRPr lang="pt-BR" sz="3200" b="0" strike="noStrike" spc="-1" dirty="0">
+            <a:endParaRPr b="0" lang="pt-BR" sz="3200" spc="-1" strike="noStrike">
               <a:latin typeface="Arial"/>
             </a:endParaRPr>
           </a:p>
@@ -2278,7 +1975,7 @@
                 <a:spcPct val="100000"/>
               </a:lnSpc>
             </a:pPr>
-            <a:endParaRPr lang="pt-BR" sz="3200" b="0" strike="noStrike" spc="-1" dirty="0">
+            <a:endParaRPr b="0" lang="pt-BR" sz="3200" spc="-1" strike="noStrike">
               <a:latin typeface="Arial"/>
             </a:endParaRPr>
           </a:p>
@@ -2288,7 +1985,7 @@
                 <a:spcPct val="100000"/>
               </a:lnSpc>
             </a:pPr>
-            <a:endParaRPr lang="pt-BR" sz="3200" b="0" strike="noStrike" spc="-1" dirty="0">
+            <a:endParaRPr b="0" lang="pt-BR" sz="3200" spc="-1" strike="noStrike">
               <a:latin typeface="Arial"/>
             </a:endParaRPr>
           </a:p>
@@ -2299,16 +1996,16 @@
               </a:lnSpc>
             </a:pPr>
             <a:r>
-              <a:rPr lang="pt-BR" sz="2000" b="1" strike="noStrike" spc="-1" dirty="0">
+              <a:rPr b="1" lang="pt-BR" sz="2000" spc="-1" strike="noStrike">
                 <a:solidFill>
-                  <a:srgbClr val="8DC641"/>
+                  <a:srgbClr val="8dc641"/>
                 </a:solidFill>
                 <a:latin typeface="Arial"/>
                 <a:ea typeface="Arial"/>
               </a:rPr>
               <a:t>TECH SUS</a:t>
             </a:r>
-            <a:endParaRPr lang="pt-BR" sz="2000" b="0" strike="noStrike" spc="-1" dirty="0">
+            <a:endParaRPr b="0" lang="pt-BR" sz="2000" spc="-1" strike="noStrike">
               <a:latin typeface="Arial"/>
             </a:endParaRPr>
           </a:p>
@@ -2318,7 +2015,7 @@
                 <a:spcPct val="100000"/>
               </a:lnSpc>
             </a:pPr>
-            <a:endParaRPr lang="pt-BR" sz="2000" b="0" strike="noStrike" spc="-1" dirty="0">
+            <a:endParaRPr b="0" lang="pt-BR" sz="2000" spc="-1" strike="noStrike">
               <a:latin typeface="Arial"/>
             </a:endParaRPr>
           </a:p>
@@ -2328,7 +2025,7 @@
                 <a:spcPct val="100000"/>
               </a:lnSpc>
             </a:pPr>
-            <a:endParaRPr lang="pt-BR" sz="2000" b="0" strike="noStrike" spc="-1" dirty="0">
+            <a:endParaRPr b="0" lang="pt-BR" sz="2000" spc="-1" strike="noStrike">
               <a:latin typeface="Arial"/>
             </a:endParaRPr>
           </a:p>
@@ -2336,9 +2033,6 @@
       </p:sp>
     </p:spTree>
   </p:cSld>
-  <p:clrMapOvr>
-    <a:masterClrMapping/>
-  </p:clrMapOvr>
   <p:timing>
     <p:tnLst>
       <p:par>
@@ -2347,14 +2041,14 @@
             <p:seq>
               <p:cTn id="2" dur="indefinite" nodeType="mainSeq"/>
               <p:prevCondLst>
-                <p:cond evt="onPrev" delay="0">
+                <p:cond delay="0" evt="onPrev">
                   <p:tgtEl>
                     <p:sldTgt/>
                   </p:tgtEl>
                 </p:cond>
               </p:prevCondLst>
               <p:nextCondLst>
-                <p:cond evt="onNext" delay="0">
+                <p:cond delay="0" evt="onNext">
                   <p:tgtEl>
                     <p:sldTgt/>
                   </p:tgtEl>
@@ -2370,14 +2064,13 @@
 </file>
 
 <file path=ppt/slides/slide2.xml><?xml version="1.0" encoding="utf-8"?>
-<p:sld xmlns:a="http://schemas.openxmlformats.org/drawingml/2006/main" xmlns:r="http://schemas.openxmlformats.org/officeDocument/2006/relationships" xmlns:p="http://schemas.openxmlformats.org/presentationml/2006/main">
+<p:sld xmlns:a="http://schemas.openxmlformats.org/drawingml/2006/main" xmlns:p="http://schemas.openxmlformats.org/presentationml/2006/main" xmlns:r="http://schemas.openxmlformats.org/officeDocument/2006/relationships" xmlns:p14="http://schemas.microsoft.com/office/powerpoint/2010/main" xmlns:p15="http://schemas.microsoft.com/office/powerpoint/2012/main" xmlns:mc="http://schemas.openxmlformats.org/markup-compatibility/2006">
   <p:cSld>
     <p:bg>
       <p:bgPr>
         <a:solidFill>
-          <a:srgbClr val="FFFFFF"/>
+          <a:srgbClr val="ffffff"/>
         </a:solidFill>
-        <a:effectLst/>
       </p:bgPr>
     </p:bg>
     <p:spTree>
@@ -2403,34 +2096,51 @@
         <p:spPr>
           <a:xfrm>
             <a:off x="0" y="0"/>
-            <a:ext cx="12188880" cy="1583280"/>
+            <a:ext cx="12188520" cy="1582920"/>
           </a:xfrm>
           <a:prstGeom prst="rect">
             <a:avLst/>
           </a:prstGeom>
           <a:solidFill>
-            <a:srgbClr val="347C36"/>
+            <a:srgbClr val="347c36"/>
           </a:solidFill>
           <a:ln>
             <a:noFill/>
           </a:ln>
         </p:spPr>
         <p:style>
-          <a:lnRef idx="0">
-            <a:scrgbClr r="0" g="0" b="0"/>
-          </a:lnRef>
-          <a:fillRef idx="0">
-            <a:scrgbClr r="0" g="0" b="0"/>
-          </a:fillRef>
-          <a:effectRef idx="0">
-            <a:scrgbClr r="0" g="0" b="0"/>
-          </a:effectRef>
+          <a:lnRef idx="0"/>
+          <a:fillRef idx="0"/>
+          <a:effectRef idx="0"/>
           <a:fontRef idx="minor"/>
         </p:style>
       </p:sp>
       <p:pic>
         <p:nvPicPr>
-          <p:cNvPr id="45" name="Google Shape;166;p39"/>
+          <p:cNvPr id="44" name="Google Shape;166;p39" descr=""/>
+          <p:cNvPicPr/>
+          <p:nvPr/>
+        </p:nvPicPr>
+        <p:blipFill>
+          <a:blip r:embed="rId1"/>
+          <a:stretch/>
+        </p:blipFill>
+        <p:spPr>
+          <a:xfrm>
+            <a:off x="235080" y="283680"/>
+            <a:ext cx="3997080" cy="1015920"/>
+          </a:xfrm>
+          <a:prstGeom prst="rect">
+            <a:avLst/>
+          </a:prstGeom>
+          <a:ln>
+            <a:noFill/>
+          </a:ln>
+        </p:spPr>
+      </p:pic>
+      <p:pic>
+        <p:nvPicPr>
+          <p:cNvPr id="45" name="Imagem 2" descr=""/>
           <p:cNvPicPr/>
           <p:nvPr/>
         </p:nvPicPr>
@@ -2440,8 +2150,8 @@
         </p:blipFill>
         <p:spPr>
           <a:xfrm>
-            <a:off x="235080" y="283680"/>
-            <a:ext cx="3997440" cy="1016280"/>
+            <a:off x="0" y="1583280"/>
+            <a:ext cx="12202560" cy="4999320"/>
           </a:xfrm>
           <a:prstGeom prst="rect">
             <a:avLst/>
@@ -2453,54 +2163,18 @@
       </p:pic>
       <p:pic>
         <p:nvPicPr>
-          <p:cNvPr id="3" name="Imagem 2">
-            <a:extLst>
-              <a:ext uri="{FF2B5EF4-FFF2-40B4-BE49-F238E27FC236}">
-                <a16:creationId xmlns:a16="http://schemas.microsoft.com/office/drawing/2014/main" id="{D6F106C3-2DE3-43EA-8B95-036E2D7E555A}"/>
-              </a:ext>
-            </a:extLst>
-          </p:cNvPr>
-          <p:cNvPicPr>
-            <a:picLocks noChangeAspect="1"/>
-          </p:cNvPicPr>
-          <p:nvPr/>
-        </p:nvPicPr>
-        <p:blipFill>
-          <a:blip r:embed="rId3">
-            <a:extLst>
-              <a:ext uri="{28A0092B-C50C-407E-A947-70E740481C1C}">
-                <a14:useLocalDpi xmlns:a14="http://schemas.microsoft.com/office/drawing/2010/main" val="0"/>
-              </a:ext>
-            </a:extLst>
-          </a:blip>
-          <a:stretch>
-            <a:fillRect/>
-          </a:stretch>
-        </p:blipFill>
-        <p:spPr>
-          <a:xfrm>
-            <a:off x="0" y="1583280"/>
-            <a:ext cx="12203067" cy="4999703"/>
-          </a:xfrm>
-          <a:prstGeom prst="rect">
-            <a:avLst/>
-          </a:prstGeom>
-        </p:spPr>
-      </p:pic>
-      <p:pic>
-        <p:nvPicPr>
-          <p:cNvPr id="47" name="Google Shape;89;p13"/>
+          <p:cNvPr id="46" name="Google Shape;89;p13" descr=""/>
           <p:cNvPicPr/>
           <p:nvPr/>
         </p:nvPicPr>
         <p:blipFill>
-          <a:blip r:embed="rId4"/>
+          <a:blip r:embed="rId3"/>
           <a:stretch/>
         </p:blipFill>
         <p:spPr>
           <a:xfrm>
             <a:off x="10561680" y="0"/>
-            <a:ext cx="1080000" cy="2503800"/>
+            <a:ext cx="1079640" cy="2503440"/>
           </a:xfrm>
           <a:prstGeom prst="rect">
             <a:avLst/>
@@ -2512,14 +2186,14 @@
       </p:pic>
       <p:sp>
         <p:nvSpPr>
-          <p:cNvPr id="44" name="CustomShape 2"/>
+          <p:cNvPr id="47" name="CustomShape 2"/>
           <p:cNvSpPr/>
           <p:nvPr/>
         </p:nvSpPr>
         <p:spPr>
           <a:xfrm>
             <a:off x="504000" y="6479280"/>
-            <a:ext cx="11126880" cy="716760"/>
+            <a:ext cx="11126520" cy="716400"/>
           </a:xfrm>
           <a:prstGeom prst="rect">
             <a:avLst/>
@@ -2530,20 +2204,13 @@
           </a:ln>
         </p:spPr>
         <p:style>
-          <a:lnRef idx="0">
-            <a:scrgbClr r="0" g="0" b="0"/>
-          </a:lnRef>
-          <a:fillRef idx="0">
-            <a:scrgbClr r="0" g="0" b="0"/>
-          </a:fillRef>
-          <a:effectRef idx="0">
-            <a:scrgbClr r="0" g="0" b="0"/>
-          </a:effectRef>
+          <a:lnRef idx="0"/>
+          <a:fillRef idx="0"/>
+          <a:effectRef idx="0"/>
           <a:fontRef idx="minor"/>
         </p:style>
         <p:txBody>
-          <a:bodyPr lIns="90000" tIns="45000" rIns="90000" bIns="45000"/>
-          <a:lstStyle/>
+          <a:bodyPr lIns="90000" rIns="90000" tIns="45000" bIns="45000"/>
           <a:p>
             <a:pPr algn="ctr">
               <a:lnSpc>
@@ -2551,16 +2218,26 @@
               </a:lnSpc>
             </a:pPr>
             <a:r>
-              <a:rPr lang="pt-BR" sz="1500" b="1" strike="noStrike" spc="-1" dirty="0">
+              <a:rPr b="1" lang="pt-BR" sz="1500" spc="-1" strike="noStrike">
                 <a:solidFill>
-                  <a:srgbClr val="8DC641"/>
+                  <a:srgbClr val="8dc641"/>
                 </a:solidFill>
                 <a:latin typeface="Arial"/>
                 <a:ea typeface="Arial"/>
               </a:rPr>
-              <a:t> Fabio Vasques, Gieder Loreto</a:t>
+              <a:t> </a:t>
             </a:r>
-            <a:endParaRPr lang="pt-BR" sz="1500" b="0" strike="noStrike" spc="-1" dirty="0">
+            <a:r>
+              <a:rPr b="1" lang="pt-BR" sz="1500" spc="-1" strike="noStrike">
+                <a:solidFill>
+                  <a:srgbClr val="8dc641"/>
+                </a:solidFill>
+                <a:latin typeface="Arial"/>
+                <a:ea typeface="Arial"/>
+              </a:rPr>
+              <a:t>Fabio Vasques, Gieder Loreto</a:t>
+            </a:r>
+            <a:endParaRPr b="0" lang="pt-BR" sz="1500" spc="-1" strike="noStrike">
               <a:latin typeface="Arial"/>
             </a:endParaRPr>
           </a:p>
@@ -2568,25 +2245,22 @@
       </p:sp>
     </p:spTree>
   </p:cSld>
-  <p:clrMapOvr>
-    <a:masterClrMapping/>
-  </p:clrMapOvr>
   <p:timing>
     <p:tnLst>
       <p:par>
-        <p:cTn id="1" dur="indefinite" restart="never" nodeType="tmRoot">
+        <p:cTn id="3" dur="indefinite" restart="never" nodeType="tmRoot">
           <p:childTnLst>
             <p:seq>
-              <p:cTn id="2" dur="indefinite" nodeType="mainSeq"/>
+              <p:cTn id="4" dur="indefinite" nodeType="mainSeq"/>
               <p:prevCondLst>
-                <p:cond evt="onPrev" delay="0">
+                <p:cond delay="0" evt="onPrev">
                   <p:tgtEl>
                     <p:sldTgt/>
                   </p:tgtEl>
                 </p:cond>
               </p:prevCondLst>
               <p:nextCondLst>
-                <p:cond evt="onNext" delay="0">
+                <p:cond delay="0" evt="onNext">
                   <p:tgtEl>
                     <p:sldTgt/>
                   </p:tgtEl>
@@ -2602,14 +2276,13 @@
 </file>
 
 <file path=ppt/slides/slide3.xml><?xml version="1.0" encoding="utf-8"?>
-<p:sld xmlns:a="http://schemas.openxmlformats.org/drawingml/2006/main" xmlns:r="http://schemas.openxmlformats.org/officeDocument/2006/relationships" xmlns:p="http://schemas.openxmlformats.org/presentationml/2006/main">
+<p:sld xmlns:a="http://schemas.openxmlformats.org/drawingml/2006/main" xmlns:p="http://schemas.openxmlformats.org/presentationml/2006/main" xmlns:r="http://schemas.openxmlformats.org/officeDocument/2006/relationships" xmlns:p14="http://schemas.microsoft.com/office/powerpoint/2010/main" xmlns:p15="http://schemas.microsoft.com/office/powerpoint/2012/main" xmlns:mc="http://schemas.openxmlformats.org/markup-compatibility/2006">
   <p:cSld>
     <p:bg>
       <p:bgPr>
         <a:solidFill>
-          <a:srgbClr val="FFFFFF"/>
+          <a:srgbClr val="ffffff"/>
         </a:solidFill>
-        <a:effectLst/>
       </p:bgPr>
     </p:bg>
     <p:spTree>
@@ -2628,7 +2301,30 @@
       </p:grpSpPr>
       <p:pic>
         <p:nvPicPr>
-          <p:cNvPr id="48" name="Google Shape;89;p13"/>
+          <p:cNvPr id="48" name="Google Shape;89;p13" descr=""/>
+          <p:cNvPicPr/>
+          <p:nvPr/>
+        </p:nvPicPr>
+        <p:blipFill>
+          <a:blip r:embed="rId1"/>
+          <a:stretch/>
+        </p:blipFill>
+        <p:spPr>
+          <a:xfrm>
+            <a:off x="10561680" y="0"/>
+            <a:ext cx="1079640" cy="2503440"/>
+          </a:xfrm>
+          <a:prstGeom prst="rect">
+            <a:avLst/>
+          </a:prstGeom>
+          <a:ln>
+            <a:noFill/>
+          </a:ln>
+        </p:spPr>
+      </p:pic>
+      <p:pic>
+        <p:nvPicPr>
+          <p:cNvPr id="49" name="Google Shape;166;p39" descr=""/>
           <p:cNvPicPr/>
           <p:nvPr/>
         </p:nvPicPr>
@@ -2638,8 +2334,8 @@
         </p:blipFill>
         <p:spPr>
           <a:xfrm>
-            <a:off x="10561680" y="0"/>
-            <a:ext cx="1080000" cy="2503800"/>
+            <a:off x="235080" y="283680"/>
+            <a:ext cx="3997080" cy="1015920"/>
           </a:xfrm>
           <a:prstGeom prst="rect">
             <a:avLst/>
@@ -2649,9 +2345,58 @@
           </a:ln>
         </p:spPr>
       </p:pic>
+      <p:sp>
+        <p:nvSpPr>
+          <p:cNvPr id="50" name="CustomShape 1"/>
+          <p:cNvSpPr/>
+          <p:nvPr/>
+        </p:nvSpPr>
+        <p:spPr>
+          <a:xfrm rot="16200000">
+            <a:off x="-4416120" y="2727360"/>
+            <a:ext cx="10609920" cy="676080"/>
+          </a:xfrm>
+          <a:prstGeom prst="rect">
+            <a:avLst/>
+          </a:prstGeom>
+          <a:noFill/>
+          <a:ln>
+            <a:noFill/>
+          </a:ln>
+        </p:spPr>
+        <p:style>
+          <a:lnRef idx="0"/>
+          <a:fillRef idx="0"/>
+          <a:effectRef idx="0"/>
+          <a:fontRef idx="minor"/>
+        </p:style>
+        <p:txBody>
+          <a:bodyPr lIns="0" rIns="0" tIns="0" bIns="0" anchor="ctr"/>
+          <a:p>
+            <a:pPr algn="ctr">
+              <a:lnSpc>
+                <a:spcPct val="100000"/>
+              </a:lnSpc>
+            </a:pPr>
+            <a:r>
+              <a:rPr b="1" lang="pt-BR" sz="1800" spc="-1" strike="noStrike">
+                <a:solidFill>
+                  <a:srgbClr val="8dc641"/>
+                </a:solidFill>
+                <a:latin typeface="Arial"/>
+                <a:ea typeface="Arial"/>
+              </a:rPr>
+              <a:t>Diagrama Casos de Uso</a:t>
+            </a:r>
+            <a:endParaRPr b="0" lang="pt-BR" sz="1800" spc="-1" strike="noStrike">
+              <a:latin typeface="Arial"/>
+            </a:endParaRPr>
+          </a:p>
+        </p:txBody>
+      </p:sp>
       <p:pic>
         <p:nvPicPr>
-          <p:cNvPr id="49" name="Google Shape;166;p39"/>
+          <p:cNvPr id="51" name="Imagem 50" descr=""/>
           <p:cNvPicPr/>
           <p:nvPr/>
         </p:nvPicPr>
@@ -2661,8 +2406,8 @@
         </p:blipFill>
         <p:spPr>
           <a:xfrm>
-            <a:off x="235080" y="283680"/>
-            <a:ext cx="3997440" cy="1016280"/>
+            <a:off x="2466360" y="34560"/>
+            <a:ext cx="7332480" cy="6856200"/>
           </a:xfrm>
           <a:prstGeom prst="rect">
             <a:avLst/>
@@ -2672,106 +2417,24 @@
           </a:ln>
         </p:spPr>
       </p:pic>
-      <p:sp>
-        <p:nvSpPr>
-          <p:cNvPr id="50" name="CustomShape 1"/>
-          <p:cNvSpPr/>
-          <p:nvPr/>
-        </p:nvSpPr>
-        <p:spPr>
-          <a:xfrm rot="16200000">
-            <a:off x="-4416480" y="2727000"/>
-            <a:ext cx="10610280" cy="676440"/>
-          </a:xfrm>
-          <a:prstGeom prst="rect">
-            <a:avLst/>
-          </a:prstGeom>
-          <a:noFill/>
-          <a:ln>
-            <a:noFill/>
-          </a:ln>
-        </p:spPr>
-        <p:style>
-          <a:lnRef idx="0">
-            <a:scrgbClr r="0" g="0" b="0"/>
-          </a:lnRef>
-          <a:fillRef idx="0">
-            <a:scrgbClr r="0" g="0" b="0"/>
-          </a:fillRef>
-          <a:effectRef idx="0">
-            <a:scrgbClr r="0" g="0" b="0"/>
-          </a:effectRef>
-          <a:fontRef idx="minor"/>
-        </p:style>
-        <p:txBody>
-          <a:bodyPr lIns="0" tIns="0" rIns="0" bIns="0" anchor="ctr"/>
-          <a:lstStyle/>
-          <a:p>
-            <a:pPr algn="ctr">
-              <a:lnSpc>
-                <a:spcPct val="100000"/>
-              </a:lnSpc>
-            </a:pPr>
-            <a:r>
-              <a:rPr lang="pt-BR" sz="1800" b="1" strike="noStrike" spc="-1">
-                <a:solidFill>
-                  <a:srgbClr val="8DC641"/>
-                </a:solidFill>
-                <a:latin typeface="Arial"/>
-                <a:ea typeface="Arial"/>
-              </a:rPr>
-              <a:t>Diagrama Casos de Uso</a:t>
-            </a:r>
-            <a:endParaRPr lang="pt-BR" sz="1800" b="0" strike="noStrike" spc="-1">
-              <a:latin typeface="Arial"/>
-            </a:endParaRPr>
-          </a:p>
-        </p:txBody>
-      </p:sp>
-      <p:pic>
-        <p:nvPicPr>
-          <p:cNvPr id="51" name="Imagem 50"/>
-          <p:cNvPicPr/>
-          <p:nvPr/>
-        </p:nvPicPr>
-        <p:blipFill>
-          <a:blip r:embed="rId4"/>
-          <a:stretch/>
-        </p:blipFill>
-        <p:spPr>
-          <a:xfrm>
-            <a:off x="2466360" y="34560"/>
-            <a:ext cx="7332840" cy="6856560"/>
-          </a:xfrm>
-          <a:prstGeom prst="rect">
-            <a:avLst/>
-          </a:prstGeom>
-          <a:ln>
-            <a:noFill/>
-          </a:ln>
-        </p:spPr>
-      </p:pic>
     </p:spTree>
   </p:cSld>
-  <p:clrMapOvr>
-    <a:masterClrMapping/>
-  </p:clrMapOvr>
   <p:timing>
     <p:tnLst>
       <p:par>
-        <p:cTn id="1" dur="indefinite" restart="never" nodeType="tmRoot">
+        <p:cTn id="5" dur="indefinite" restart="never" nodeType="tmRoot">
           <p:childTnLst>
             <p:seq>
-              <p:cTn id="2" dur="indefinite" nodeType="mainSeq"/>
+              <p:cTn id="6" dur="indefinite" nodeType="mainSeq"/>
               <p:prevCondLst>
-                <p:cond evt="onPrev" delay="0">
+                <p:cond delay="0" evt="onPrev">
                   <p:tgtEl>
                     <p:sldTgt/>
                   </p:tgtEl>
                 </p:cond>
               </p:prevCondLst>
               <p:nextCondLst>
-                <p:cond evt="onNext" delay="0">
+                <p:cond delay="0" evt="onNext">
                   <p:tgtEl>
                     <p:sldTgt/>
                   </p:tgtEl>
@@ -2787,14 +2450,13 @@
 </file>
 
 <file path=ppt/slides/slide4.xml><?xml version="1.0" encoding="utf-8"?>
-<p:sld xmlns:a="http://schemas.openxmlformats.org/drawingml/2006/main" xmlns:r="http://schemas.openxmlformats.org/officeDocument/2006/relationships" xmlns:p="http://schemas.openxmlformats.org/presentationml/2006/main">
+<p:sld xmlns:a="http://schemas.openxmlformats.org/drawingml/2006/main" xmlns:p="http://schemas.openxmlformats.org/presentationml/2006/main" xmlns:r="http://schemas.openxmlformats.org/officeDocument/2006/relationships" xmlns:p14="http://schemas.microsoft.com/office/powerpoint/2010/main" xmlns:p15="http://schemas.microsoft.com/office/powerpoint/2012/main" xmlns:mc="http://schemas.openxmlformats.org/markup-compatibility/2006">
   <p:cSld>
     <p:bg>
       <p:bgPr>
         <a:solidFill>
-          <a:srgbClr val="FFFFFF"/>
+          <a:srgbClr val="ffffff"/>
         </a:solidFill>
-        <a:effectLst/>
       </p:bgPr>
     </p:bg>
     <p:spTree>
@@ -2813,7 +2475,138 @@
       </p:grpSpPr>
       <p:pic>
         <p:nvPicPr>
-          <p:cNvPr id="52" name="Google Shape;89;p13"/>
+          <p:cNvPr id="52" name="Google Shape;89;p13" descr=""/>
+          <p:cNvPicPr/>
+          <p:nvPr/>
+        </p:nvPicPr>
+        <p:blipFill>
+          <a:blip r:embed="rId1"/>
+          <a:stretch/>
+        </p:blipFill>
+        <p:spPr>
+          <a:xfrm>
+            <a:off x="10561680" y="0"/>
+            <a:ext cx="1079640" cy="2503440"/>
+          </a:xfrm>
+          <a:prstGeom prst="rect">
+            <a:avLst/>
+          </a:prstGeom>
+          <a:ln>
+            <a:noFill/>
+          </a:ln>
+        </p:spPr>
+      </p:pic>
+      <p:sp>
+        <p:nvSpPr>
+          <p:cNvPr id="53" name="CustomShape 1"/>
+          <p:cNvSpPr/>
+          <p:nvPr/>
+        </p:nvSpPr>
+        <p:spPr>
+          <a:xfrm>
+            <a:off x="504000" y="6479280"/>
+            <a:ext cx="11126520" cy="716400"/>
+          </a:xfrm>
+          <a:prstGeom prst="rect">
+            <a:avLst/>
+          </a:prstGeom>
+          <a:noFill/>
+          <a:ln>
+            <a:noFill/>
+          </a:ln>
+        </p:spPr>
+        <p:style>
+          <a:lnRef idx="0"/>
+          <a:fillRef idx="0"/>
+          <a:effectRef idx="0"/>
+          <a:fontRef idx="minor"/>
+        </p:style>
+        <p:txBody>
+          <a:bodyPr lIns="90000" rIns="90000" tIns="45000" bIns="45000"/>
+          <a:p>
+            <a:pPr algn="ctr">
+              <a:lnSpc>
+                <a:spcPct val="100000"/>
+              </a:lnSpc>
+            </a:pPr>
+            <a:r>
+              <a:rPr b="1" lang="pt-BR" sz="1500" spc="-1" strike="noStrike">
+                <a:solidFill>
+                  <a:srgbClr val="8dc641"/>
+                </a:solidFill>
+                <a:latin typeface="Arial"/>
+                <a:ea typeface="Arial"/>
+              </a:rPr>
+              <a:t> </a:t>
+            </a:r>
+            <a:r>
+              <a:rPr b="1" lang="pt-BR" sz="1500" spc="-1" strike="noStrike">
+                <a:solidFill>
+                  <a:srgbClr val="8dc641"/>
+                </a:solidFill>
+                <a:latin typeface="Arial"/>
+                <a:ea typeface="Arial"/>
+              </a:rPr>
+              <a:t>Fabio Vasques, Gieder Loreto</a:t>
+            </a:r>
+            <a:endParaRPr b="0" lang="pt-BR" sz="1500" spc="-1" strike="noStrike">
+              <a:latin typeface="Arial"/>
+            </a:endParaRPr>
+          </a:p>
+        </p:txBody>
+      </p:sp>
+      <p:sp>
+        <p:nvSpPr>
+          <p:cNvPr id="54" name="CustomShape 2"/>
+          <p:cNvSpPr/>
+          <p:nvPr/>
+        </p:nvSpPr>
+        <p:spPr>
+          <a:xfrm rot="16200000">
+            <a:off x="-4416120" y="2727720"/>
+            <a:ext cx="10609920" cy="676080"/>
+          </a:xfrm>
+          <a:prstGeom prst="rect">
+            <a:avLst/>
+          </a:prstGeom>
+          <a:noFill/>
+          <a:ln>
+            <a:noFill/>
+          </a:ln>
+        </p:spPr>
+        <p:style>
+          <a:lnRef idx="0"/>
+          <a:fillRef idx="0"/>
+          <a:effectRef idx="0"/>
+          <a:fontRef idx="minor"/>
+        </p:style>
+        <p:txBody>
+          <a:bodyPr lIns="0" rIns="0" tIns="0" bIns="0" anchor="ctr"/>
+          <a:p>
+            <a:pPr algn="ctr">
+              <a:lnSpc>
+                <a:spcPct val="100000"/>
+              </a:lnSpc>
+            </a:pPr>
+            <a:r>
+              <a:rPr b="1" lang="pt-BR" sz="1800" spc="-1" strike="noStrike">
+                <a:solidFill>
+                  <a:srgbClr val="8dc641"/>
+                </a:solidFill>
+                <a:latin typeface="Arial"/>
+                <a:ea typeface="Arial"/>
+              </a:rPr>
+              <a:t>Diagrama Classe</a:t>
+            </a:r>
+            <a:endParaRPr b="0" lang="pt-BR" sz="1800" spc="-1" strike="noStrike">
+              <a:latin typeface="Arial"/>
+            </a:endParaRPr>
+          </a:p>
+        </p:txBody>
+      </p:sp>
+      <p:pic>
+        <p:nvPicPr>
+          <p:cNvPr id="55" name="Imagem 54" descr=""/>
           <p:cNvPicPr/>
           <p:nvPr/>
         </p:nvPicPr>
@@ -2823,8 +2616,8 @@
         </p:blipFill>
         <p:spPr>
           <a:xfrm>
-            <a:off x="10561680" y="0"/>
-            <a:ext cx="1080000" cy="2503800"/>
+            <a:off x="1379160" y="32760"/>
+            <a:ext cx="9513360" cy="6857280"/>
           </a:xfrm>
           <a:prstGeom prst="rect">
             <a:avLst/>
@@ -2834,162 +2627,24 @@
           </a:ln>
         </p:spPr>
       </p:pic>
-      <p:sp>
-        <p:nvSpPr>
-          <p:cNvPr id="53" name="CustomShape 1"/>
-          <p:cNvSpPr/>
-          <p:nvPr/>
-        </p:nvSpPr>
-        <p:spPr>
-          <a:xfrm>
-            <a:off x="504000" y="6479280"/>
-            <a:ext cx="11126880" cy="716760"/>
-          </a:xfrm>
-          <a:prstGeom prst="rect">
-            <a:avLst/>
-          </a:prstGeom>
-          <a:noFill/>
-          <a:ln>
-            <a:noFill/>
-          </a:ln>
-        </p:spPr>
-        <p:style>
-          <a:lnRef idx="0">
-            <a:scrgbClr r="0" g="0" b="0"/>
-          </a:lnRef>
-          <a:fillRef idx="0">
-            <a:scrgbClr r="0" g="0" b="0"/>
-          </a:fillRef>
-          <a:effectRef idx="0">
-            <a:scrgbClr r="0" g="0" b="0"/>
-          </a:effectRef>
-          <a:fontRef idx="minor"/>
-        </p:style>
-        <p:txBody>
-          <a:bodyPr lIns="90000" tIns="45000" rIns="90000" bIns="45000"/>
-          <a:lstStyle/>
-          <a:p>
-            <a:pPr algn="ctr">
-              <a:lnSpc>
-                <a:spcPct val="100000"/>
-              </a:lnSpc>
-            </a:pPr>
-            <a:r>
-              <a:rPr lang="pt-BR" sz="1500" b="1" strike="noStrike" spc="-1">
-                <a:solidFill>
-                  <a:srgbClr val="8DC641"/>
-                </a:solidFill>
-                <a:latin typeface="Arial"/>
-                <a:ea typeface="Arial"/>
-              </a:rPr>
-              <a:t> Fabio Vasques, Gieder Loreto</a:t>
-            </a:r>
-            <a:endParaRPr lang="pt-BR" sz="1500" b="0" strike="noStrike" spc="-1">
-              <a:latin typeface="Arial"/>
-            </a:endParaRPr>
-          </a:p>
-        </p:txBody>
-      </p:sp>
-      <p:sp>
-        <p:nvSpPr>
-          <p:cNvPr id="54" name="CustomShape 2"/>
-          <p:cNvSpPr/>
-          <p:nvPr/>
-        </p:nvSpPr>
-        <p:spPr>
-          <a:xfrm rot="16200000">
-            <a:off x="-4416480" y="2727360"/>
-            <a:ext cx="10610280" cy="676440"/>
-          </a:xfrm>
-          <a:prstGeom prst="rect">
-            <a:avLst/>
-          </a:prstGeom>
-          <a:noFill/>
-          <a:ln>
-            <a:noFill/>
-          </a:ln>
-        </p:spPr>
-        <p:style>
-          <a:lnRef idx="0">
-            <a:scrgbClr r="0" g="0" b="0"/>
-          </a:lnRef>
-          <a:fillRef idx="0">
-            <a:scrgbClr r="0" g="0" b="0"/>
-          </a:fillRef>
-          <a:effectRef idx="0">
-            <a:scrgbClr r="0" g="0" b="0"/>
-          </a:effectRef>
-          <a:fontRef idx="minor"/>
-        </p:style>
-        <p:txBody>
-          <a:bodyPr lIns="0" tIns="0" rIns="0" bIns="0" anchor="ctr"/>
-          <a:lstStyle/>
-          <a:p>
-            <a:pPr algn="ctr">
-              <a:lnSpc>
-                <a:spcPct val="100000"/>
-              </a:lnSpc>
-            </a:pPr>
-            <a:r>
-              <a:rPr lang="pt-BR" sz="1800" b="1" strike="noStrike" spc="-1">
-                <a:solidFill>
-                  <a:srgbClr val="8DC641"/>
-                </a:solidFill>
-                <a:latin typeface="Arial"/>
-                <a:ea typeface="Arial"/>
-              </a:rPr>
-              <a:t>Diagrama Classe</a:t>
-            </a:r>
-            <a:endParaRPr lang="pt-BR" sz="1800" b="0" strike="noStrike" spc="-1">
-              <a:latin typeface="Arial"/>
-            </a:endParaRPr>
-          </a:p>
-        </p:txBody>
-      </p:sp>
-      <p:pic>
-        <p:nvPicPr>
-          <p:cNvPr id="55" name="Imagem 54"/>
-          <p:cNvPicPr/>
-          <p:nvPr/>
-        </p:nvPicPr>
-        <p:blipFill>
-          <a:blip r:embed="rId3"/>
-          <a:stretch/>
-        </p:blipFill>
-        <p:spPr>
-          <a:xfrm>
-            <a:off x="1379160" y="32760"/>
-            <a:ext cx="9513720" cy="6857640"/>
-          </a:xfrm>
-          <a:prstGeom prst="rect">
-            <a:avLst/>
-          </a:prstGeom>
-          <a:ln>
-            <a:noFill/>
-          </a:ln>
-        </p:spPr>
-      </p:pic>
     </p:spTree>
   </p:cSld>
-  <p:clrMapOvr>
-    <a:masterClrMapping/>
-  </p:clrMapOvr>
   <p:timing>
     <p:tnLst>
       <p:par>
-        <p:cTn id="1" dur="indefinite" restart="never" nodeType="tmRoot">
+        <p:cTn id="7" dur="indefinite" restart="never" nodeType="tmRoot">
           <p:childTnLst>
             <p:seq>
-              <p:cTn id="2" dur="indefinite" nodeType="mainSeq"/>
+              <p:cTn id="8" dur="indefinite" nodeType="mainSeq"/>
               <p:prevCondLst>
-                <p:cond evt="onPrev" delay="0">
+                <p:cond delay="0" evt="onPrev">
                   <p:tgtEl>
                     <p:sldTgt/>
                   </p:tgtEl>
                 </p:cond>
               </p:prevCondLst>
               <p:nextCondLst>
-                <p:cond evt="onNext" delay="0">
+                <p:cond delay="0" evt="onNext">
                   <p:tgtEl>
                     <p:sldTgt/>
                   </p:tgtEl>
@@ -3005,14 +2660,13 @@
 </file>
 
 <file path=ppt/slides/slide5.xml><?xml version="1.0" encoding="utf-8"?>
-<p:sld xmlns:a="http://schemas.openxmlformats.org/drawingml/2006/main" xmlns:r="http://schemas.openxmlformats.org/officeDocument/2006/relationships" xmlns:p="http://schemas.openxmlformats.org/presentationml/2006/main">
+<p:sld xmlns:a="http://schemas.openxmlformats.org/drawingml/2006/main" xmlns:p="http://schemas.openxmlformats.org/presentationml/2006/main" xmlns:r="http://schemas.openxmlformats.org/officeDocument/2006/relationships" xmlns:p14="http://schemas.microsoft.com/office/powerpoint/2010/main" xmlns:p15="http://schemas.microsoft.com/office/powerpoint/2012/main" xmlns:mc="http://schemas.openxmlformats.org/markup-compatibility/2006">
   <p:cSld>
     <p:bg>
       <p:bgPr>
         <a:solidFill>
-          <a:srgbClr val="FFFFFF"/>
+          <a:srgbClr val="ffffff"/>
         </a:solidFill>
-        <a:effectLst/>
       </p:bgPr>
     </p:bg>
     <p:spTree>
@@ -3038,7 +2692,7 @@
         <p:spPr>
           <a:xfrm>
             <a:off x="504000" y="6479280"/>
-            <a:ext cx="11126880" cy="716760"/>
+            <a:ext cx="11126520" cy="716400"/>
           </a:xfrm>
           <a:prstGeom prst="rect">
             <a:avLst/>
@@ -3049,20 +2703,13 @@
           </a:ln>
         </p:spPr>
         <p:style>
-          <a:lnRef idx="0">
-            <a:scrgbClr r="0" g="0" b="0"/>
-          </a:lnRef>
-          <a:fillRef idx="0">
-            <a:scrgbClr r="0" g="0" b="0"/>
-          </a:fillRef>
-          <a:effectRef idx="0">
-            <a:scrgbClr r="0" g="0" b="0"/>
-          </a:effectRef>
+          <a:lnRef idx="0"/>
+          <a:fillRef idx="0"/>
+          <a:effectRef idx="0"/>
           <a:fontRef idx="minor"/>
         </p:style>
         <p:txBody>
-          <a:bodyPr lIns="90000" tIns="45000" rIns="90000" bIns="45000"/>
-          <a:lstStyle/>
+          <a:bodyPr lIns="90000" rIns="90000" tIns="45000" bIns="45000"/>
           <a:p>
             <a:pPr algn="ctr">
               <a:lnSpc>
@@ -3070,16 +2717,26 @@
               </a:lnSpc>
             </a:pPr>
             <a:r>
-              <a:rPr lang="pt-BR" sz="1500" b="1" strike="noStrike" spc="-1">
+              <a:rPr b="1" lang="pt-BR" sz="1500" spc="-1" strike="noStrike">
                 <a:solidFill>
-                  <a:srgbClr val="8DC641"/>
+                  <a:srgbClr val="8dc641"/>
                 </a:solidFill>
                 <a:latin typeface="Arial"/>
                 <a:ea typeface="Arial"/>
               </a:rPr>
-              <a:t> Fabio Vasques, Gieder Loreto</a:t>
+              <a:t> </a:t>
             </a:r>
-            <a:endParaRPr lang="pt-BR" sz="1500" b="0" strike="noStrike" spc="-1">
+            <a:r>
+              <a:rPr b="1" lang="pt-BR" sz="1500" spc="-1" strike="noStrike">
+                <a:solidFill>
+                  <a:srgbClr val="8dc641"/>
+                </a:solidFill>
+                <a:latin typeface="Arial"/>
+                <a:ea typeface="Arial"/>
+              </a:rPr>
+              <a:t>Fabio Vasques, Gieder Loreto</a:t>
+            </a:r>
+            <a:endParaRPr b="0" lang="pt-BR" sz="1500" spc="-1" strike="noStrike">
               <a:latin typeface="Arial"/>
             </a:endParaRPr>
           </a:p>
@@ -3093,8 +2750,8 @@
         </p:nvSpPr>
         <p:spPr>
           <a:xfrm rot="16200000">
-            <a:off x="-4992480" y="2727360"/>
-            <a:ext cx="10610280" cy="676440"/>
+            <a:off x="-4992120" y="2727720"/>
+            <a:ext cx="10609920" cy="676080"/>
           </a:xfrm>
           <a:prstGeom prst="rect">
             <a:avLst/>
@@ -3105,20 +2762,13 @@
           </a:ln>
         </p:spPr>
         <p:style>
-          <a:lnRef idx="0">
-            <a:scrgbClr r="0" g="0" b="0"/>
-          </a:lnRef>
-          <a:fillRef idx="0">
-            <a:scrgbClr r="0" g="0" b="0"/>
-          </a:fillRef>
-          <a:effectRef idx="0">
-            <a:scrgbClr r="0" g="0" b="0"/>
-          </a:effectRef>
+          <a:lnRef idx="0"/>
+          <a:fillRef idx="0"/>
+          <a:effectRef idx="0"/>
           <a:fontRef idx="minor"/>
         </p:style>
         <p:txBody>
-          <a:bodyPr lIns="0" tIns="0" rIns="0" bIns="0" anchor="ctr"/>
-          <a:lstStyle/>
+          <a:bodyPr lIns="0" rIns="0" tIns="0" bIns="0" anchor="ctr"/>
           <a:p>
             <a:pPr algn="ctr">
               <a:lnSpc>
@@ -3126,16 +2776,16 @@
               </a:lnSpc>
             </a:pPr>
             <a:r>
-              <a:rPr lang="pt-BR" sz="1800" b="1" strike="noStrike" spc="-1">
+              <a:rPr b="1" lang="pt-BR" sz="1800" spc="-1" strike="noStrike">
                 <a:solidFill>
-                  <a:srgbClr val="8DC641"/>
+                  <a:srgbClr val="8dc641"/>
                 </a:solidFill>
                 <a:latin typeface="Arial"/>
                 <a:ea typeface="Arial"/>
               </a:rPr>
               <a:t>Modelo Lógico</a:t>
             </a:r>
-            <a:endParaRPr lang="pt-BR" sz="1800" b="0" strike="noStrike" spc="-1">
+            <a:endParaRPr b="0" lang="pt-BR" sz="1800" spc="-1" strike="noStrike">
               <a:latin typeface="Arial"/>
             </a:endParaRPr>
           </a:p>
@@ -3143,18 +2793,18 @@
       </p:sp>
       <p:pic>
         <p:nvPicPr>
-          <p:cNvPr id="58" name="Imagem 57"/>
+          <p:cNvPr id="58" name="" descr=""/>
           <p:cNvPicPr/>
           <p:nvPr/>
         </p:nvPicPr>
         <p:blipFill>
-          <a:blip r:embed="rId2"/>
+          <a:blip r:embed="rId1"/>
           <a:stretch/>
         </p:blipFill>
         <p:spPr>
           <a:xfrm>
-            <a:off x="1266120" y="32760"/>
-            <a:ext cx="9739800" cy="6857640"/>
+            <a:off x="878760" y="32760"/>
+            <a:ext cx="10514880" cy="6857640"/>
           </a:xfrm>
           <a:prstGeom prst="rect">
             <a:avLst/>
@@ -3166,25 +2816,22 @@
       </p:pic>
     </p:spTree>
   </p:cSld>
-  <p:clrMapOvr>
-    <a:masterClrMapping/>
-  </p:clrMapOvr>
   <p:timing>
     <p:tnLst>
       <p:par>
-        <p:cTn id="1" dur="indefinite" restart="never" nodeType="tmRoot">
+        <p:cTn id="9" dur="indefinite" restart="never" nodeType="tmRoot">
           <p:childTnLst>
             <p:seq>
-              <p:cTn id="2" dur="indefinite" nodeType="mainSeq"/>
+              <p:cTn id="10" dur="indefinite" nodeType="mainSeq"/>
               <p:prevCondLst>
-                <p:cond evt="onPrev" delay="0">
+                <p:cond delay="0" evt="onPrev">
                   <p:tgtEl>
                     <p:sldTgt/>
                   </p:tgtEl>
                 </p:cond>
               </p:prevCondLst>
               <p:nextCondLst>
-                <p:cond evt="onNext" delay="0">
+                <p:cond delay="0" evt="onNext">
                   <p:tgtEl>
                     <p:sldTgt/>
                   </p:tgtEl>
@@ -3210,22 +2857,22 @@
         <a:sysClr val="window" lastClr="FFFFFF"/>
       </a:lt1>
       <a:dk2>
-        <a:srgbClr val="6A7887"/>
+        <a:srgbClr val="6a7887"/>
       </a:dk2>
       <a:lt2>
-        <a:srgbClr val="E7E6E6"/>
+        <a:srgbClr val="e7e6e6"/>
       </a:lt2>
       <a:accent1>
-        <a:srgbClr val="1D9A78"/>
+        <a:srgbClr val="1d9a78"/>
       </a:accent1>
       <a:accent2>
-        <a:srgbClr val="7BC68E"/>
+        <a:srgbClr val="7bc68e"/>
       </a:accent2>
       <a:accent3>
-        <a:srgbClr val="3F3F3F"/>
+        <a:srgbClr val="3f3f3f"/>
       </a:accent3>
       <a:accent4>
-        <a:srgbClr val="3F3F3F"/>
+        <a:srgbClr val="3f3f3f"/>
       </a:accent4>
       <a:accent5>
         <a:srgbClr val="595959"/>
@@ -3419,7 +3066,5 @@
       </a:bgFillStyleLst>
     </a:fmtScheme>
   </a:themeElements>
-  <a:objectDefaults/>
-  <a:extraClrSchemeLst/>
 </a:theme>
 </file>
</xml_diff>